<commit_message>
began slides and pulled some tweets
</commit_message>
<xml_diff>
--- a/slides/Sentiment Analysis in R.pptx
+++ b/slides/Sentiment Analysis in R.pptx
@@ -5,28 +5,29 @@
     <p:sldMasterId id="2147483660" r:id="rId1"/>
   </p:sldMasterIdLst>
   <p:notesMasterIdLst>
-    <p:notesMasterId r:id="rId21"/>
+    <p:notesMasterId r:id="rId22"/>
   </p:notesMasterIdLst>
   <p:sldIdLst>
     <p:sldId id="344" r:id="rId2"/>
     <p:sldId id="263" r:id="rId3"/>
-    <p:sldId id="261" r:id="rId4"/>
-    <p:sldId id="349" r:id="rId5"/>
-    <p:sldId id="350" r:id="rId6"/>
-    <p:sldId id="351" r:id="rId7"/>
-    <p:sldId id="352" r:id="rId8"/>
-    <p:sldId id="262" r:id="rId9"/>
-    <p:sldId id="269" r:id="rId10"/>
-    <p:sldId id="346" r:id="rId11"/>
-    <p:sldId id="345" r:id="rId12"/>
-    <p:sldId id="284" r:id="rId13"/>
+    <p:sldId id="262" r:id="rId4"/>
+    <p:sldId id="261" r:id="rId5"/>
+    <p:sldId id="349" r:id="rId6"/>
+    <p:sldId id="350" r:id="rId7"/>
+    <p:sldId id="351" r:id="rId8"/>
+    <p:sldId id="274" r:id="rId9"/>
+    <p:sldId id="267" r:id="rId10"/>
+    <p:sldId id="269" r:id="rId11"/>
+    <p:sldId id="346" r:id="rId12"/>
+    <p:sldId id="345" r:id="rId13"/>
     <p:sldId id="348" r:id="rId14"/>
-    <p:sldId id="286" r:id="rId15"/>
-    <p:sldId id="353" r:id="rId16"/>
-    <p:sldId id="291" r:id="rId17"/>
-    <p:sldId id="342" r:id="rId18"/>
-    <p:sldId id="347" r:id="rId19"/>
-    <p:sldId id="343" r:id="rId20"/>
+    <p:sldId id="284" r:id="rId15"/>
+    <p:sldId id="286" r:id="rId16"/>
+    <p:sldId id="353" r:id="rId17"/>
+    <p:sldId id="291" r:id="rId18"/>
+    <p:sldId id="342" r:id="rId19"/>
+    <p:sldId id="347" r:id="rId20"/>
+    <p:sldId id="343" r:id="rId21"/>
   </p:sldIdLst>
   <p:sldSz cx="12192000" cy="6858000"/>
   <p:notesSz cx="6858000" cy="9144000"/>
@@ -215,7 +216,7 @@
           <a:p>
             <a:fld id="{73CD064E-05FC-4E18-9D0C-A4994F368CAC}" type="datetimeFigureOut">
               <a:rPr lang="en-US" smtClean="0"/>
-              <a:t>8/30/2021</a:t>
+              <a:t>9/16/2021</a:t>
             </a:fld>
             <a:endParaRPr lang="en-US"/>
           </a:p>
@@ -675,610 +676,6 @@
           <a:bodyPr/>
           <a:lstStyle/>
           <a:p>
-            <a:endParaRPr lang="en-US" dirty="0"/>
-          </a:p>
-        </p:txBody>
-      </p:sp>
-      <p:sp>
-        <p:nvSpPr>
-          <p:cNvPr id="4" name="Slide Number Placeholder 3"/>
-          <p:cNvSpPr>
-            <a:spLocks noGrp="1"/>
-          </p:cNvSpPr>
-          <p:nvPr>
-            <p:ph type="sldNum" sz="quarter" idx="5"/>
-          </p:nvPr>
-        </p:nvSpPr>
-        <p:spPr/>
-        <p:txBody>
-          <a:bodyPr/>
-          <a:lstStyle/>
-          <a:p>
-            <a:fld id="{3C20A7C7-CA8D-4C49-BCFB-55E6C5267475}" type="slidenum">
-              <a:rPr lang="en-US" smtClean="0"/>
-              <a:t>16</a:t>
-            </a:fld>
-            <a:endParaRPr lang="en-US"/>
-          </a:p>
-        </p:txBody>
-      </p:sp>
-    </p:spTree>
-    <p:extLst>
-      <p:ext uri="{BB962C8B-B14F-4D97-AF65-F5344CB8AC3E}">
-        <p14:creationId xmlns:p14="http://schemas.microsoft.com/office/powerpoint/2010/main" val="4098988218"/>
-      </p:ext>
-    </p:extLst>
-  </p:cSld>
-  <p:clrMapOvr>
-    <a:masterClrMapping/>
-  </p:clrMapOvr>
-</p:notes>
-</file>
-
-<file path=ppt/notesSlides/notesSlide11.xml><?xml version="1.0" encoding="utf-8"?>
-<p:notes xmlns:a="http://schemas.openxmlformats.org/drawingml/2006/main" xmlns:r="http://schemas.openxmlformats.org/officeDocument/2006/relationships" xmlns:p="http://schemas.openxmlformats.org/presentationml/2006/main">
-  <p:cSld>
-    <p:spTree>
-      <p:nvGrpSpPr>
-        <p:cNvPr id="1" name=""/>
-        <p:cNvGrpSpPr/>
-        <p:nvPr/>
-      </p:nvGrpSpPr>
-      <p:grpSpPr>
-        <a:xfrm>
-          <a:off x="0" y="0"/>
-          <a:ext cx="0" cy="0"/>
-          <a:chOff x="0" y="0"/>
-          <a:chExt cx="0" cy="0"/>
-        </a:xfrm>
-      </p:grpSpPr>
-      <p:sp>
-        <p:nvSpPr>
-          <p:cNvPr id="2" name="Slide Image Placeholder 1"/>
-          <p:cNvSpPr>
-            <a:spLocks noGrp="1" noRot="1" noChangeAspect="1"/>
-          </p:cNvSpPr>
-          <p:nvPr>
-            <p:ph type="sldImg"/>
-          </p:nvPr>
-        </p:nvSpPr>
-        <p:spPr/>
-      </p:sp>
-      <p:sp>
-        <p:nvSpPr>
-          <p:cNvPr id="3" name="Notes Placeholder 2"/>
-          <p:cNvSpPr>
-            <a:spLocks noGrp="1"/>
-          </p:cNvSpPr>
-          <p:nvPr>
-            <p:ph type="body" idx="1"/>
-          </p:nvPr>
-        </p:nvSpPr>
-        <p:spPr/>
-        <p:txBody>
-          <a:bodyPr/>
-          <a:lstStyle/>
-          <a:p>
-            <a:endParaRPr lang="en-US" dirty="0"/>
-          </a:p>
-        </p:txBody>
-      </p:sp>
-      <p:sp>
-        <p:nvSpPr>
-          <p:cNvPr id="4" name="Slide Number Placeholder 3"/>
-          <p:cNvSpPr>
-            <a:spLocks noGrp="1"/>
-          </p:cNvSpPr>
-          <p:nvPr>
-            <p:ph type="sldNum" sz="quarter" idx="5"/>
-          </p:nvPr>
-        </p:nvSpPr>
-        <p:spPr/>
-        <p:txBody>
-          <a:bodyPr/>
-          <a:lstStyle/>
-          <a:p>
-            <a:fld id="{3C20A7C7-CA8D-4C49-BCFB-55E6C5267475}" type="slidenum">
-              <a:rPr lang="en-US" smtClean="0"/>
-              <a:t>17</a:t>
-            </a:fld>
-            <a:endParaRPr lang="en-US"/>
-          </a:p>
-        </p:txBody>
-      </p:sp>
-    </p:spTree>
-    <p:extLst>
-      <p:ext uri="{BB962C8B-B14F-4D97-AF65-F5344CB8AC3E}">
-        <p14:creationId xmlns:p14="http://schemas.microsoft.com/office/powerpoint/2010/main" val="838260591"/>
-      </p:ext>
-    </p:extLst>
-  </p:cSld>
-  <p:clrMapOvr>
-    <a:masterClrMapping/>
-  </p:clrMapOvr>
-</p:notes>
-</file>
-
-<file path=ppt/notesSlides/notesSlide2.xml><?xml version="1.0" encoding="utf-8"?>
-<p:notes xmlns:a="http://schemas.openxmlformats.org/drawingml/2006/main" xmlns:r="http://schemas.openxmlformats.org/officeDocument/2006/relationships" xmlns:p="http://schemas.openxmlformats.org/presentationml/2006/main">
-  <p:cSld>
-    <p:spTree>
-      <p:nvGrpSpPr>
-        <p:cNvPr id="1" name=""/>
-        <p:cNvGrpSpPr/>
-        <p:nvPr/>
-      </p:nvGrpSpPr>
-      <p:grpSpPr>
-        <a:xfrm>
-          <a:off x="0" y="0"/>
-          <a:ext cx="0" cy="0"/>
-          <a:chOff x="0" y="0"/>
-          <a:chExt cx="0" cy="0"/>
-        </a:xfrm>
-      </p:grpSpPr>
-      <p:sp>
-        <p:nvSpPr>
-          <p:cNvPr id="2" name="Slide Image Placeholder 1"/>
-          <p:cNvSpPr>
-            <a:spLocks noGrp="1" noRot="1" noChangeAspect="1"/>
-          </p:cNvSpPr>
-          <p:nvPr>
-            <p:ph type="sldImg"/>
-          </p:nvPr>
-        </p:nvSpPr>
-        <p:spPr/>
-      </p:sp>
-      <p:sp>
-        <p:nvSpPr>
-          <p:cNvPr id="3" name="Notes Placeholder 2"/>
-          <p:cNvSpPr>
-            <a:spLocks noGrp="1"/>
-          </p:cNvSpPr>
-          <p:nvPr>
-            <p:ph type="body" idx="1"/>
-          </p:nvPr>
-        </p:nvSpPr>
-        <p:spPr/>
-        <p:txBody>
-          <a:bodyPr/>
-          <a:lstStyle/>
-          <a:p>
-            <a:r>
-              <a:rPr lang="en-US" dirty="0"/>
-              <a:t>Welcome to Day 1 of the Sentiment Analysis in R webinar. I’m Jenn Schilling, my pronouns are she/her/hers, and I am so happy you’re here. I am a senior data analyst at the University of Arizona, and an adjunct faculty member at the College for Creative Studies where I teach graduate classes on data visualization. Thank you for being here, and I hope you will find this webinar beneficial. Before I begin, I would like acknowledge that I am on the </a:t>
-            </a:r>
-            <a:r>
-              <a:rPr lang="en-US" b="0" i="0" dirty="0">
-                <a:solidFill>
-                  <a:srgbClr val="403635"/>
-                </a:solidFill>
-                <a:effectLst/>
-                <a:latin typeface="MiloWeb"/>
-              </a:rPr>
-              <a:t>ancestral lands of the Tohono O'odham and Pascua Yaqui nations, indigenous peoples who have occupied this land since time immemorial. </a:t>
-            </a:r>
-          </a:p>
-          <a:p>
-            <a:endParaRPr lang="en-US" b="0" i="0" dirty="0">
-              <a:solidFill>
-                <a:srgbClr val="403635"/>
-              </a:solidFill>
-              <a:effectLst/>
-              <a:latin typeface="MiloWeb"/>
-            </a:endParaRPr>
-          </a:p>
-          <a:p>
-            <a:r>
-              <a:rPr lang="en-US" b="0" i="0" dirty="0">
-                <a:solidFill>
-                  <a:srgbClr val="403635"/>
-                </a:solidFill>
-                <a:effectLst/>
-                <a:latin typeface="MiloWeb"/>
-              </a:rPr>
-              <a:t>Territory acknowledgements are one small part of disrupting and dismantling colonial structures.</a:t>
-            </a:r>
-            <a:endParaRPr lang="en-US" dirty="0"/>
-          </a:p>
-        </p:txBody>
-      </p:sp>
-      <p:sp>
-        <p:nvSpPr>
-          <p:cNvPr id="4" name="Slide Number Placeholder 3"/>
-          <p:cNvSpPr>
-            <a:spLocks noGrp="1"/>
-          </p:cNvSpPr>
-          <p:nvPr>
-            <p:ph type="sldNum" sz="quarter" idx="5"/>
-          </p:nvPr>
-        </p:nvSpPr>
-        <p:spPr/>
-        <p:txBody>
-          <a:bodyPr/>
-          <a:lstStyle/>
-          <a:p>
-            <a:fld id="{3C20A7C7-CA8D-4C49-BCFB-55E6C5267475}" type="slidenum">
-              <a:rPr lang="en-US" smtClean="0"/>
-              <a:t>2</a:t>
-            </a:fld>
-            <a:endParaRPr lang="en-US"/>
-          </a:p>
-        </p:txBody>
-      </p:sp>
-    </p:spTree>
-    <p:extLst>
-      <p:ext uri="{BB962C8B-B14F-4D97-AF65-F5344CB8AC3E}">
-        <p14:creationId xmlns:p14="http://schemas.microsoft.com/office/powerpoint/2010/main" val="841766359"/>
-      </p:ext>
-    </p:extLst>
-  </p:cSld>
-  <p:clrMapOvr>
-    <a:masterClrMapping/>
-  </p:clrMapOvr>
-</p:notes>
-</file>
-
-<file path=ppt/notesSlides/notesSlide3.xml><?xml version="1.0" encoding="utf-8"?>
-<p:notes xmlns:a="http://schemas.openxmlformats.org/drawingml/2006/main" xmlns:r="http://schemas.openxmlformats.org/officeDocument/2006/relationships" xmlns:p="http://schemas.openxmlformats.org/presentationml/2006/main">
-  <p:cSld>
-    <p:spTree>
-      <p:nvGrpSpPr>
-        <p:cNvPr id="1" name=""/>
-        <p:cNvGrpSpPr/>
-        <p:nvPr/>
-      </p:nvGrpSpPr>
-      <p:grpSpPr>
-        <a:xfrm>
-          <a:off x="0" y="0"/>
-          <a:ext cx="0" cy="0"/>
-          <a:chOff x="0" y="0"/>
-          <a:chExt cx="0" cy="0"/>
-        </a:xfrm>
-      </p:grpSpPr>
-      <p:sp>
-        <p:nvSpPr>
-          <p:cNvPr id="2" name="Slide Image Placeholder 1"/>
-          <p:cNvSpPr>
-            <a:spLocks noGrp="1" noRot="1" noChangeAspect="1"/>
-          </p:cNvSpPr>
-          <p:nvPr>
-            <p:ph type="sldImg"/>
-          </p:nvPr>
-        </p:nvSpPr>
-        <p:spPr/>
-      </p:sp>
-      <p:sp>
-        <p:nvSpPr>
-          <p:cNvPr id="3" name="Notes Placeholder 2"/>
-          <p:cNvSpPr>
-            <a:spLocks noGrp="1"/>
-          </p:cNvSpPr>
-          <p:nvPr>
-            <p:ph type="body" idx="1"/>
-          </p:nvPr>
-        </p:nvSpPr>
-        <p:spPr/>
-        <p:txBody>
-          <a:bodyPr/>
-          <a:lstStyle/>
-          <a:p>
-            <a:pPr marL="0" marR="0">
-              <a:lnSpc>
-                <a:spcPct val="107000"/>
-              </a:lnSpc>
-              <a:spcBef>
-                <a:spcPts val="0"/>
-              </a:spcBef>
-              <a:spcAft>
-                <a:spcPts val="0"/>
-              </a:spcAft>
-            </a:pPr>
-            <a:r>
-              <a:rPr lang="en-US" sz="1800" dirty="0">
-                <a:effectLst/>
-                <a:latin typeface="Calibri" panose="020F0502020204030204" pitchFamily="34" charset="0"/>
-                <a:ea typeface="Calibri" panose="020F0502020204030204" pitchFamily="34" charset="0"/>
-                <a:cs typeface="Times New Roman" panose="02020603050405020304" pitchFamily="18" charset="0"/>
-              </a:rPr>
-              <a:t>This webinar will teach participants how to complete a text analysis in R, including data processing and cleaning, visualization of word frequencies, and sentiment analysis. Sentiment analysis is useful for finding patterns in text data from open response questions on surveys and course evaluations as well as evaluating social media posts. </a:t>
-            </a:r>
-          </a:p>
-          <a:p>
-            <a:pPr marL="0" marR="0">
-              <a:lnSpc>
-                <a:spcPct val="107000"/>
-              </a:lnSpc>
-              <a:spcBef>
-                <a:spcPts val="0"/>
-              </a:spcBef>
-              <a:spcAft>
-                <a:spcPts val="0"/>
-              </a:spcAft>
-            </a:pPr>
-            <a:endParaRPr lang="en-US" sz="1800" dirty="0">
-              <a:effectLst/>
-              <a:latin typeface="Calibri" panose="020F0502020204030204" pitchFamily="34" charset="0"/>
-              <a:cs typeface="Times New Roman" panose="02020603050405020304" pitchFamily="18" charset="0"/>
-            </a:endParaRPr>
-          </a:p>
-          <a:p>
-            <a:pPr marL="0" marR="0">
-              <a:lnSpc>
-                <a:spcPct val="107000"/>
-              </a:lnSpc>
-              <a:spcBef>
-                <a:spcPts val="0"/>
-              </a:spcBef>
-              <a:spcAft>
-                <a:spcPts val="0"/>
-              </a:spcAft>
-            </a:pPr>
-            <a:r>
-              <a:rPr lang="en-US" sz="1800" dirty="0">
-                <a:effectLst/>
-                <a:latin typeface="Calibri" panose="020F0502020204030204" pitchFamily="34" charset="0"/>
-                <a:cs typeface="Times New Roman" panose="02020603050405020304" pitchFamily="18" charset="0"/>
-              </a:rPr>
-              <a:t>Today we will go over…</a:t>
-            </a:r>
-            <a:endParaRPr lang="en-US" dirty="0"/>
-          </a:p>
-        </p:txBody>
-      </p:sp>
-      <p:sp>
-        <p:nvSpPr>
-          <p:cNvPr id="4" name="Slide Number Placeholder 3"/>
-          <p:cNvSpPr>
-            <a:spLocks noGrp="1"/>
-          </p:cNvSpPr>
-          <p:nvPr>
-            <p:ph type="sldNum" sz="quarter" idx="5"/>
-          </p:nvPr>
-        </p:nvSpPr>
-        <p:spPr/>
-        <p:txBody>
-          <a:bodyPr/>
-          <a:lstStyle/>
-          <a:p>
-            <a:fld id="{3C20A7C7-CA8D-4C49-BCFB-55E6C5267475}" type="slidenum">
-              <a:rPr lang="en-US" smtClean="0"/>
-              <a:t>3</a:t>
-            </a:fld>
-            <a:endParaRPr lang="en-US"/>
-          </a:p>
-        </p:txBody>
-      </p:sp>
-    </p:spTree>
-    <p:extLst>
-      <p:ext uri="{BB962C8B-B14F-4D97-AF65-F5344CB8AC3E}">
-        <p14:creationId xmlns:p14="http://schemas.microsoft.com/office/powerpoint/2010/main" val="3914118533"/>
-      </p:ext>
-    </p:extLst>
-  </p:cSld>
-  <p:clrMapOvr>
-    <a:masterClrMapping/>
-  </p:clrMapOvr>
-</p:notes>
-</file>
-
-<file path=ppt/notesSlides/notesSlide4.xml><?xml version="1.0" encoding="utf-8"?>
-<p:notes xmlns:a="http://schemas.openxmlformats.org/drawingml/2006/main" xmlns:r="http://schemas.openxmlformats.org/officeDocument/2006/relationships" xmlns:p="http://schemas.openxmlformats.org/presentationml/2006/main">
-  <p:cSld>
-    <p:spTree>
-      <p:nvGrpSpPr>
-        <p:cNvPr id="1" name=""/>
-        <p:cNvGrpSpPr/>
-        <p:nvPr/>
-      </p:nvGrpSpPr>
-      <p:grpSpPr>
-        <a:xfrm>
-          <a:off x="0" y="0"/>
-          <a:ext cx="0" cy="0"/>
-          <a:chOff x="0" y="0"/>
-          <a:chExt cx="0" cy="0"/>
-        </a:xfrm>
-      </p:grpSpPr>
-      <p:sp>
-        <p:nvSpPr>
-          <p:cNvPr id="2" name="Slide Image Placeholder 1"/>
-          <p:cNvSpPr>
-            <a:spLocks noGrp="1" noRot="1" noChangeAspect="1"/>
-          </p:cNvSpPr>
-          <p:nvPr>
-            <p:ph type="sldImg"/>
-          </p:nvPr>
-        </p:nvSpPr>
-        <p:spPr/>
-      </p:sp>
-      <p:sp>
-        <p:nvSpPr>
-          <p:cNvPr id="3" name="Notes Placeholder 2"/>
-          <p:cNvSpPr>
-            <a:spLocks noGrp="1"/>
-          </p:cNvSpPr>
-          <p:nvPr>
-            <p:ph type="body" idx="1"/>
-          </p:nvPr>
-        </p:nvSpPr>
-        <p:spPr/>
-        <p:txBody>
-          <a:bodyPr/>
-          <a:lstStyle/>
-          <a:p>
-            <a:endParaRPr lang="en-US" dirty="0"/>
-          </a:p>
-        </p:txBody>
-      </p:sp>
-      <p:sp>
-        <p:nvSpPr>
-          <p:cNvPr id="4" name="Slide Number Placeholder 3"/>
-          <p:cNvSpPr>
-            <a:spLocks noGrp="1"/>
-          </p:cNvSpPr>
-          <p:nvPr>
-            <p:ph type="sldNum" sz="quarter" idx="5"/>
-          </p:nvPr>
-        </p:nvSpPr>
-        <p:spPr/>
-        <p:txBody>
-          <a:bodyPr/>
-          <a:lstStyle/>
-          <a:p>
-            <a:fld id="{3C20A7C7-CA8D-4C49-BCFB-55E6C5267475}" type="slidenum">
-              <a:rPr lang="en-US" smtClean="0"/>
-              <a:t>6</a:t>
-            </a:fld>
-            <a:endParaRPr lang="en-US"/>
-          </a:p>
-        </p:txBody>
-      </p:sp>
-    </p:spTree>
-    <p:extLst>
-      <p:ext uri="{BB962C8B-B14F-4D97-AF65-F5344CB8AC3E}">
-        <p14:creationId xmlns:p14="http://schemas.microsoft.com/office/powerpoint/2010/main" val="2234667991"/>
-      </p:ext>
-    </p:extLst>
-  </p:cSld>
-  <p:clrMapOvr>
-    <a:masterClrMapping/>
-  </p:clrMapOvr>
-</p:notes>
-</file>
-
-<file path=ppt/notesSlides/notesSlide5.xml><?xml version="1.0" encoding="utf-8"?>
-<p:notes xmlns:a="http://schemas.openxmlformats.org/drawingml/2006/main" xmlns:r="http://schemas.openxmlformats.org/officeDocument/2006/relationships" xmlns:p="http://schemas.openxmlformats.org/presentationml/2006/main">
-  <p:cSld>
-    <p:spTree>
-      <p:nvGrpSpPr>
-        <p:cNvPr id="1" name=""/>
-        <p:cNvGrpSpPr/>
-        <p:nvPr/>
-      </p:nvGrpSpPr>
-      <p:grpSpPr>
-        <a:xfrm>
-          <a:off x="0" y="0"/>
-          <a:ext cx="0" cy="0"/>
-          <a:chOff x="0" y="0"/>
-          <a:chExt cx="0" cy="0"/>
-        </a:xfrm>
-      </p:grpSpPr>
-      <p:sp>
-        <p:nvSpPr>
-          <p:cNvPr id="2" name="Slide Image Placeholder 1"/>
-          <p:cNvSpPr>
-            <a:spLocks noGrp="1" noRot="1" noChangeAspect="1"/>
-          </p:cNvSpPr>
-          <p:nvPr>
-            <p:ph type="sldImg"/>
-          </p:nvPr>
-        </p:nvSpPr>
-        <p:spPr/>
-      </p:sp>
-      <p:sp>
-        <p:nvSpPr>
-          <p:cNvPr id="3" name="Notes Placeholder 2"/>
-          <p:cNvSpPr>
-            <a:spLocks noGrp="1"/>
-          </p:cNvSpPr>
-          <p:nvPr>
-            <p:ph type="body" idx="1"/>
-          </p:nvPr>
-        </p:nvSpPr>
-        <p:spPr/>
-        <p:txBody>
-          <a:bodyPr/>
-          <a:lstStyle/>
-          <a:p>
-            <a:r>
-              <a:rPr lang="en-US" dirty="0"/>
-              <a:t>The learning outcomes of this webinar are that participants will be able to prepare data for a text analysis, conduct text mining, and complete a sentiment analysis in R.</a:t>
-            </a:r>
-          </a:p>
-          <a:p>
-            <a:endParaRPr lang="en-US" dirty="0"/>
-          </a:p>
-        </p:txBody>
-      </p:sp>
-      <p:sp>
-        <p:nvSpPr>
-          <p:cNvPr id="4" name="Slide Number Placeholder 3"/>
-          <p:cNvSpPr>
-            <a:spLocks noGrp="1"/>
-          </p:cNvSpPr>
-          <p:nvPr>
-            <p:ph type="sldNum" sz="quarter" idx="5"/>
-          </p:nvPr>
-        </p:nvSpPr>
-        <p:spPr/>
-        <p:txBody>
-          <a:bodyPr/>
-          <a:lstStyle/>
-          <a:p>
-            <a:fld id="{3C20A7C7-CA8D-4C49-BCFB-55E6C5267475}" type="slidenum">
-              <a:rPr lang="en-US" smtClean="0"/>
-              <a:t>8</a:t>
-            </a:fld>
-            <a:endParaRPr lang="en-US"/>
-          </a:p>
-        </p:txBody>
-      </p:sp>
-    </p:spTree>
-    <p:extLst>
-      <p:ext uri="{BB962C8B-B14F-4D97-AF65-F5344CB8AC3E}">
-        <p14:creationId xmlns:p14="http://schemas.microsoft.com/office/powerpoint/2010/main" val="2686607455"/>
-      </p:ext>
-    </p:extLst>
-  </p:cSld>
-  <p:clrMapOvr>
-    <a:masterClrMapping/>
-  </p:clrMapOvr>
-</p:notes>
-</file>
-
-<file path=ppt/notesSlides/notesSlide6.xml><?xml version="1.0" encoding="utf-8"?>
-<p:notes xmlns:a="http://schemas.openxmlformats.org/drawingml/2006/main" xmlns:r="http://schemas.openxmlformats.org/officeDocument/2006/relationships" xmlns:p="http://schemas.openxmlformats.org/presentationml/2006/main">
-  <p:cSld>
-    <p:spTree>
-      <p:nvGrpSpPr>
-        <p:cNvPr id="1" name=""/>
-        <p:cNvGrpSpPr/>
-        <p:nvPr/>
-      </p:nvGrpSpPr>
-      <p:grpSpPr>
-        <a:xfrm>
-          <a:off x="0" y="0"/>
-          <a:ext cx="0" cy="0"/>
-          <a:chOff x="0" y="0"/>
-          <a:chExt cx="0" cy="0"/>
-        </a:xfrm>
-      </p:grpSpPr>
-      <p:sp>
-        <p:nvSpPr>
-          <p:cNvPr id="2" name="Slide Image Placeholder 1"/>
-          <p:cNvSpPr>
-            <a:spLocks noGrp="1" noRot="1" noChangeAspect="1"/>
-          </p:cNvSpPr>
-          <p:nvPr>
-            <p:ph type="sldImg"/>
-          </p:nvPr>
-        </p:nvSpPr>
-        <p:spPr/>
-      </p:sp>
-      <p:sp>
-        <p:nvSpPr>
-          <p:cNvPr id="3" name="Notes Placeholder 2"/>
-          <p:cNvSpPr>
-            <a:spLocks noGrp="1"/>
-          </p:cNvSpPr>
-          <p:nvPr>
-            <p:ph type="body" idx="1"/>
-          </p:nvPr>
-        </p:nvSpPr>
-        <p:spPr/>
-        <p:txBody>
-          <a:bodyPr/>
-          <a:lstStyle/>
-          <a:p>
             <a:r>
               <a:rPr lang="en-US" dirty="0">
                 <a:cs typeface="Calibri"/>
@@ -1352,7 +749,7 @@
                 <a:tabLst/>
                 <a:defRPr/>
               </a:pPr>
-              <a:t>11</a:t>
+              <a:t>12</a:t>
             </a:fld>
             <a:endParaRPr kumimoji="0" lang="en-US" sz="1200" b="0" i="0" u="none" strike="noStrike" kern="1200" cap="none" spc="0" normalizeH="0" baseline="0" noProof="0">
               <a:ln>
@@ -1375,6 +772,1022 @@
     <p:extLst>
       <p:ext uri="{BB962C8B-B14F-4D97-AF65-F5344CB8AC3E}">
         <p14:creationId xmlns:p14="http://schemas.microsoft.com/office/powerpoint/2010/main" val="2814412822"/>
+      </p:ext>
+    </p:extLst>
+  </p:cSld>
+  <p:clrMapOvr>
+    <a:masterClrMapping/>
+  </p:clrMapOvr>
+</p:notes>
+</file>
+
+<file path=ppt/notesSlides/notesSlide11.xml><?xml version="1.0" encoding="utf-8"?>
+<p:notes xmlns:a="http://schemas.openxmlformats.org/drawingml/2006/main" xmlns:r="http://schemas.openxmlformats.org/officeDocument/2006/relationships" xmlns:p="http://schemas.openxmlformats.org/presentationml/2006/main">
+  <p:cSld>
+    <p:spTree>
+      <p:nvGrpSpPr>
+        <p:cNvPr id="1" name=""/>
+        <p:cNvGrpSpPr/>
+        <p:nvPr/>
+      </p:nvGrpSpPr>
+      <p:grpSpPr>
+        <a:xfrm>
+          <a:off x="0" y="0"/>
+          <a:ext cx="0" cy="0"/>
+          <a:chOff x="0" y="0"/>
+          <a:chExt cx="0" cy="0"/>
+        </a:xfrm>
+      </p:grpSpPr>
+      <p:sp>
+        <p:nvSpPr>
+          <p:cNvPr id="2" name="Slide Image Placeholder 1"/>
+          <p:cNvSpPr>
+            <a:spLocks noGrp="1" noRot="1" noChangeAspect="1"/>
+          </p:cNvSpPr>
+          <p:nvPr>
+            <p:ph type="sldImg"/>
+          </p:nvPr>
+        </p:nvSpPr>
+        <p:spPr/>
+      </p:sp>
+      <p:sp>
+        <p:nvSpPr>
+          <p:cNvPr id="3" name="Notes Placeholder 2"/>
+          <p:cNvSpPr>
+            <a:spLocks noGrp="1"/>
+          </p:cNvSpPr>
+          <p:nvPr>
+            <p:ph type="body" idx="1"/>
+          </p:nvPr>
+        </p:nvSpPr>
+        <p:spPr/>
+        <p:txBody>
+          <a:bodyPr/>
+          <a:lstStyle/>
+          <a:p>
+            <a:r>
+              <a:rPr lang="en-US" dirty="0"/>
+              <a:t>The learning outcomes of this webinar are that participants will be able to prepare data for a text analysis, conduct text mining, and complete a sentiment analysis in R.</a:t>
+            </a:r>
+          </a:p>
+          <a:p>
+            <a:endParaRPr lang="en-US" dirty="0"/>
+          </a:p>
+        </p:txBody>
+      </p:sp>
+      <p:sp>
+        <p:nvSpPr>
+          <p:cNvPr id="4" name="Slide Number Placeholder 3"/>
+          <p:cNvSpPr>
+            <a:spLocks noGrp="1"/>
+          </p:cNvSpPr>
+          <p:nvPr>
+            <p:ph type="sldNum" sz="quarter" idx="5"/>
+          </p:nvPr>
+        </p:nvSpPr>
+        <p:spPr/>
+        <p:txBody>
+          <a:bodyPr/>
+          <a:lstStyle/>
+          <a:p>
+            <a:fld id="{3C20A7C7-CA8D-4C49-BCFB-55E6C5267475}" type="slidenum">
+              <a:rPr lang="en-US" smtClean="0"/>
+              <a:t>13</a:t>
+            </a:fld>
+            <a:endParaRPr lang="en-US"/>
+          </a:p>
+        </p:txBody>
+      </p:sp>
+    </p:spTree>
+    <p:extLst>
+      <p:ext uri="{BB962C8B-B14F-4D97-AF65-F5344CB8AC3E}">
+        <p14:creationId xmlns:p14="http://schemas.microsoft.com/office/powerpoint/2010/main" val="1363480395"/>
+      </p:ext>
+    </p:extLst>
+  </p:cSld>
+  <p:clrMapOvr>
+    <a:masterClrMapping/>
+  </p:clrMapOvr>
+</p:notes>
+</file>
+
+<file path=ppt/notesSlides/notesSlide12.xml><?xml version="1.0" encoding="utf-8"?>
+<p:notes xmlns:a="http://schemas.openxmlformats.org/drawingml/2006/main" xmlns:r="http://schemas.openxmlformats.org/officeDocument/2006/relationships" xmlns:p="http://schemas.openxmlformats.org/presentationml/2006/main">
+  <p:cSld>
+    <p:spTree>
+      <p:nvGrpSpPr>
+        <p:cNvPr id="1" name=""/>
+        <p:cNvGrpSpPr/>
+        <p:nvPr/>
+      </p:nvGrpSpPr>
+      <p:grpSpPr>
+        <a:xfrm>
+          <a:off x="0" y="0"/>
+          <a:ext cx="0" cy="0"/>
+          <a:chOff x="0" y="0"/>
+          <a:chExt cx="0" cy="0"/>
+        </a:xfrm>
+      </p:grpSpPr>
+      <p:sp>
+        <p:nvSpPr>
+          <p:cNvPr id="2" name="Slide Image Placeholder 1"/>
+          <p:cNvSpPr>
+            <a:spLocks noGrp="1" noRot="1" noChangeAspect="1"/>
+          </p:cNvSpPr>
+          <p:nvPr>
+            <p:ph type="sldImg"/>
+          </p:nvPr>
+        </p:nvSpPr>
+        <p:spPr/>
+      </p:sp>
+      <p:sp>
+        <p:nvSpPr>
+          <p:cNvPr id="3" name="Notes Placeholder 2"/>
+          <p:cNvSpPr>
+            <a:spLocks noGrp="1"/>
+          </p:cNvSpPr>
+          <p:nvPr>
+            <p:ph type="body" idx="1"/>
+          </p:nvPr>
+        </p:nvSpPr>
+        <p:spPr/>
+        <p:txBody>
+          <a:bodyPr/>
+          <a:lstStyle/>
+          <a:p>
+            <a:r>
+              <a:rPr lang="en-US" dirty="0"/>
+              <a:t>Welcome back to Day 2 of the Sentiment Analysis in R webinar. I’m so happy you’re here.</a:t>
+            </a:r>
+          </a:p>
+          <a:p>
+            <a:pPr marL="0" marR="0">
+              <a:lnSpc>
+                <a:spcPct val="107000"/>
+              </a:lnSpc>
+              <a:spcBef>
+                <a:spcPts val="0"/>
+              </a:spcBef>
+              <a:spcAft>
+                <a:spcPts val="0"/>
+              </a:spcAft>
+            </a:pPr>
+            <a:r>
+              <a:rPr lang="en-US" sz="1800" dirty="0">
+                <a:solidFill>
+                  <a:srgbClr val="545E6B"/>
+                </a:solidFill>
+                <a:effectLst/>
+                <a:latin typeface="Arial" panose="020B0604020202020204" pitchFamily="34" charset="0"/>
+                <a:ea typeface="Times New Roman" panose="02020603050405020304" pitchFamily="18" charset="0"/>
+                <a:cs typeface="Times New Roman" panose="02020603050405020304" pitchFamily="18" charset="0"/>
+              </a:rPr>
+              <a:t> </a:t>
+            </a:r>
+            <a:endParaRPr lang="en-US" sz="1800" dirty="0">
+              <a:effectLst/>
+              <a:latin typeface="Calibri" panose="020F0502020204030204" pitchFamily="34" charset="0"/>
+              <a:ea typeface="Calibri" panose="020F0502020204030204" pitchFamily="34" charset="0"/>
+              <a:cs typeface="Times New Roman" panose="02020603050405020304" pitchFamily="18" charset="0"/>
+            </a:endParaRPr>
+          </a:p>
+          <a:p>
+            <a:r>
+              <a:rPr lang="en-US" sz="1800" dirty="0">
+                <a:effectLst/>
+                <a:latin typeface="Calibri" panose="020F0502020204030204" pitchFamily="34" charset="0"/>
+                <a:ea typeface="Calibri" panose="020F0502020204030204" pitchFamily="34" charset="0"/>
+                <a:cs typeface="Times New Roman" panose="02020603050405020304" pitchFamily="18" charset="0"/>
+              </a:rPr>
+              <a:t>This webinar will teach participants how to complete a text analysis in R, including data processing and cleaning, visualization of word frequencies, and sentiment analysis. Sentiment analysis is useful for finding patterns in text data from open response questions on surveys and course evaluations as well as evaluating social media posts. </a:t>
+            </a:r>
+            <a:endParaRPr lang="en-US" dirty="0"/>
+          </a:p>
+          <a:p>
+            <a:endParaRPr lang="en-US" dirty="0"/>
+          </a:p>
+          <a:p>
+            <a:r>
+              <a:rPr lang="en-US" dirty="0"/>
+              <a:t>Here’s today’s agenda…</a:t>
+            </a:r>
+          </a:p>
+        </p:txBody>
+      </p:sp>
+      <p:sp>
+        <p:nvSpPr>
+          <p:cNvPr id="4" name="Slide Number Placeholder 3"/>
+          <p:cNvSpPr>
+            <a:spLocks noGrp="1"/>
+          </p:cNvSpPr>
+          <p:nvPr>
+            <p:ph type="sldNum" sz="quarter" idx="5"/>
+          </p:nvPr>
+        </p:nvSpPr>
+        <p:spPr/>
+        <p:txBody>
+          <a:bodyPr/>
+          <a:lstStyle/>
+          <a:p>
+            <a:fld id="{3C20A7C7-CA8D-4C49-BCFB-55E6C5267475}" type="slidenum">
+              <a:rPr lang="en-US" smtClean="0"/>
+              <a:t>14</a:t>
+            </a:fld>
+            <a:endParaRPr lang="en-US"/>
+          </a:p>
+        </p:txBody>
+      </p:sp>
+    </p:spTree>
+    <p:extLst>
+      <p:ext uri="{BB962C8B-B14F-4D97-AF65-F5344CB8AC3E}">
+        <p14:creationId xmlns:p14="http://schemas.microsoft.com/office/powerpoint/2010/main" val="4038417624"/>
+      </p:ext>
+    </p:extLst>
+  </p:cSld>
+  <p:clrMapOvr>
+    <a:masterClrMapping/>
+  </p:clrMapOvr>
+</p:notes>
+</file>
+
+<file path=ppt/notesSlides/notesSlide13.xml><?xml version="1.0" encoding="utf-8"?>
+<p:notes xmlns:a="http://schemas.openxmlformats.org/drawingml/2006/main" xmlns:r="http://schemas.openxmlformats.org/officeDocument/2006/relationships" xmlns:p="http://schemas.openxmlformats.org/presentationml/2006/main">
+  <p:cSld>
+    <p:spTree>
+      <p:nvGrpSpPr>
+        <p:cNvPr id="1" name=""/>
+        <p:cNvGrpSpPr/>
+        <p:nvPr/>
+      </p:nvGrpSpPr>
+      <p:grpSpPr>
+        <a:xfrm>
+          <a:off x="0" y="0"/>
+          <a:ext cx="0" cy="0"/>
+          <a:chOff x="0" y="0"/>
+          <a:chExt cx="0" cy="0"/>
+        </a:xfrm>
+      </p:grpSpPr>
+      <p:sp>
+        <p:nvSpPr>
+          <p:cNvPr id="2" name="Slide Image Placeholder 1"/>
+          <p:cNvSpPr>
+            <a:spLocks noGrp="1" noRot="1" noChangeAspect="1"/>
+          </p:cNvSpPr>
+          <p:nvPr>
+            <p:ph type="sldImg"/>
+          </p:nvPr>
+        </p:nvSpPr>
+        <p:spPr/>
+      </p:sp>
+      <p:sp>
+        <p:nvSpPr>
+          <p:cNvPr id="3" name="Notes Placeholder 2"/>
+          <p:cNvSpPr>
+            <a:spLocks noGrp="1"/>
+          </p:cNvSpPr>
+          <p:nvPr>
+            <p:ph type="body" idx="1"/>
+          </p:nvPr>
+        </p:nvSpPr>
+        <p:spPr/>
+        <p:txBody>
+          <a:bodyPr/>
+          <a:lstStyle/>
+          <a:p>
+            <a:endParaRPr lang="en-US" dirty="0"/>
+          </a:p>
+        </p:txBody>
+      </p:sp>
+      <p:sp>
+        <p:nvSpPr>
+          <p:cNvPr id="4" name="Slide Number Placeholder 3"/>
+          <p:cNvSpPr>
+            <a:spLocks noGrp="1"/>
+          </p:cNvSpPr>
+          <p:nvPr>
+            <p:ph type="sldNum" sz="quarter" idx="5"/>
+          </p:nvPr>
+        </p:nvSpPr>
+        <p:spPr/>
+        <p:txBody>
+          <a:bodyPr/>
+          <a:lstStyle/>
+          <a:p>
+            <a:fld id="{3C20A7C7-CA8D-4C49-BCFB-55E6C5267475}" type="slidenum">
+              <a:rPr lang="en-US" smtClean="0"/>
+              <a:t>15</a:t>
+            </a:fld>
+            <a:endParaRPr lang="en-US"/>
+          </a:p>
+        </p:txBody>
+      </p:sp>
+    </p:spTree>
+    <p:extLst>
+      <p:ext uri="{BB962C8B-B14F-4D97-AF65-F5344CB8AC3E}">
+        <p14:creationId xmlns:p14="http://schemas.microsoft.com/office/powerpoint/2010/main" val="3336625752"/>
+      </p:ext>
+    </p:extLst>
+  </p:cSld>
+  <p:clrMapOvr>
+    <a:masterClrMapping/>
+  </p:clrMapOvr>
+</p:notes>
+</file>
+
+<file path=ppt/notesSlides/notesSlide14.xml><?xml version="1.0" encoding="utf-8"?>
+<p:notes xmlns:a="http://schemas.openxmlformats.org/drawingml/2006/main" xmlns:r="http://schemas.openxmlformats.org/officeDocument/2006/relationships" xmlns:p="http://schemas.openxmlformats.org/presentationml/2006/main">
+  <p:cSld>
+    <p:spTree>
+      <p:nvGrpSpPr>
+        <p:cNvPr id="1" name=""/>
+        <p:cNvGrpSpPr/>
+        <p:nvPr/>
+      </p:nvGrpSpPr>
+      <p:grpSpPr>
+        <a:xfrm>
+          <a:off x="0" y="0"/>
+          <a:ext cx="0" cy="0"/>
+          <a:chOff x="0" y="0"/>
+          <a:chExt cx="0" cy="0"/>
+        </a:xfrm>
+      </p:grpSpPr>
+      <p:sp>
+        <p:nvSpPr>
+          <p:cNvPr id="2" name="Slide Image Placeholder 1"/>
+          <p:cNvSpPr>
+            <a:spLocks noGrp="1" noRot="1" noChangeAspect="1"/>
+          </p:cNvSpPr>
+          <p:nvPr>
+            <p:ph type="sldImg"/>
+          </p:nvPr>
+        </p:nvSpPr>
+        <p:spPr/>
+      </p:sp>
+      <p:sp>
+        <p:nvSpPr>
+          <p:cNvPr id="3" name="Notes Placeholder 2"/>
+          <p:cNvSpPr>
+            <a:spLocks noGrp="1"/>
+          </p:cNvSpPr>
+          <p:nvPr>
+            <p:ph type="body" idx="1"/>
+          </p:nvPr>
+        </p:nvSpPr>
+        <p:spPr/>
+        <p:txBody>
+          <a:bodyPr/>
+          <a:lstStyle/>
+          <a:p>
+            <a:endParaRPr lang="en-US" dirty="0"/>
+          </a:p>
+        </p:txBody>
+      </p:sp>
+      <p:sp>
+        <p:nvSpPr>
+          <p:cNvPr id="4" name="Slide Number Placeholder 3"/>
+          <p:cNvSpPr>
+            <a:spLocks noGrp="1"/>
+          </p:cNvSpPr>
+          <p:nvPr>
+            <p:ph type="sldNum" sz="quarter" idx="5"/>
+          </p:nvPr>
+        </p:nvSpPr>
+        <p:spPr/>
+        <p:txBody>
+          <a:bodyPr/>
+          <a:lstStyle/>
+          <a:p>
+            <a:fld id="{3C20A7C7-CA8D-4C49-BCFB-55E6C5267475}" type="slidenum">
+              <a:rPr lang="en-US" smtClean="0"/>
+              <a:t>17</a:t>
+            </a:fld>
+            <a:endParaRPr lang="en-US"/>
+          </a:p>
+        </p:txBody>
+      </p:sp>
+    </p:spTree>
+    <p:extLst>
+      <p:ext uri="{BB962C8B-B14F-4D97-AF65-F5344CB8AC3E}">
+        <p14:creationId xmlns:p14="http://schemas.microsoft.com/office/powerpoint/2010/main" val="4098988218"/>
+      </p:ext>
+    </p:extLst>
+  </p:cSld>
+  <p:clrMapOvr>
+    <a:masterClrMapping/>
+  </p:clrMapOvr>
+</p:notes>
+</file>
+
+<file path=ppt/notesSlides/notesSlide15.xml><?xml version="1.0" encoding="utf-8"?>
+<p:notes xmlns:a="http://schemas.openxmlformats.org/drawingml/2006/main" xmlns:r="http://schemas.openxmlformats.org/officeDocument/2006/relationships" xmlns:p="http://schemas.openxmlformats.org/presentationml/2006/main">
+  <p:cSld>
+    <p:spTree>
+      <p:nvGrpSpPr>
+        <p:cNvPr id="1" name=""/>
+        <p:cNvGrpSpPr/>
+        <p:nvPr/>
+      </p:nvGrpSpPr>
+      <p:grpSpPr>
+        <a:xfrm>
+          <a:off x="0" y="0"/>
+          <a:ext cx="0" cy="0"/>
+          <a:chOff x="0" y="0"/>
+          <a:chExt cx="0" cy="0"/>
+        </a:xfrm>
+      </p:grpSpPr>
+      <p:sp>
+        <p:nvSpPr>
+          <p:cNvPr id="2" name="Slide Image Placeholder 1"/>
+          <p:cNvSpPr>
+            <a:spLocks noGrp="1" noRot="1" noChangeAspect="1"/>
+          </p:cNvSpPr>
+          <p:nvPr>
+            <p:ph type="sldImg"/>
+          </p:nvPr>
+        </p:nvSpPr>
+        <p:spPr/>
+      </p:sp>
+      <p:sp>
+        <p:nvSpPr>
+          <p:cNvPr id="3" name="Notes Placeholder 2"/>
+          <p:cNvSpPr>
+            <a:spLocks noGrp="1"/>
+          </p:cNvSpPr>
+          <p:nvPr>
+            <p:ph type="body" idx="1"/>
+          </p:nvPr>
+        </p:nvSpPr>
+        <p:spPr/>
+        <p:txBody>
+          <a:bodyPr/>
+          <a:lstStyle/>
+          <a:p>
+            <a:endParaRPr lang="en-US" dirty="0"/>
+          </a:p>
+        </p:txBody>
+      </p:sp>
+      <p:sp>
+        <p:nvSpPr>
+          <p:cNvPr id="4" name="Slide Number Placeholder 3"/>
+          <p:cNvSpPr>
+            <a:spLocks noGrp="1"/>
+          </p:cNvSpPr>
+          <p:nvPr>
+            <p:ph type="sldNum" sz="quarter" idx="5"/>
+          </p:nvPr>
+        </p:nvSpPr>
+        <p:spPr/>
+        <p:txBody>
+          <a:bodyPr/>
+          <a:lstStyle/>
+          <a:p>
+            <a:fld id="{3C20A7C7-CA8D-4C49-BCFB-55E6C5267475}" type="slidenum">
+              <a:rPr lang="en-US" smtClean="0"/>
+              <a:t>18</a:t>
+            </a:fld>
+            <a:endParaRPr lang="en-US"/>
+          </a:p>
+        </p:txBody>
+      </p:sp>
+    </p:spTree>
+    <p:extLst>
+      <p:ext uri="{BB962C8B-B14F-4D97-AF65-F5344CB8AC3E}">
+        <p14:creationId xmlns:p14="http://schemas.microsoft.com/office/powerpoint/2010/main" val="838260591"/>
+      </p:ext>
+    </p:extLst>
+  </p:cSld>
+  <p:clrMapOvr>
+    <a:masterClrMapping/>
+  </p:clrMapOvr>
+</p:notes>
+</file>
+
+<file path=ppt/notesSlides/notesSlide2.xml><?xml version="1.0" encoding="utf-8"?>
+<p:notes xmlns:a="http://schemas.openxmlformats.org/drawingml/2006/main" xmlns:r="http://schemas.openxmlformats.org/officeDocument/2006/relationships" xmlns:p="http://schemas.openxmlformats.org/presentationml/2006/main">
+  <p:cSld>
+    <p:spTree>
+      <p:nvGrpSpPr>
+        <p:cNvPr id="1" name=""/>
+        <p:cNvGrpSpPr/>
+        <p:nvPr/>
+      </p:nvGrpSpPr>
+      <p:grpSpPr>
+        <a:xfrm>
+          <a:off x="0" y="0"/>
+          <a:ext cx="0" cy="0"/>
+          <a:chOff x="0" y="0"/>
+          <a:chExt cx="0" cy="0"/>
+        </a:xfrm>
+      </p:grpSpPr>
+      <p:sp>
+        <p:nvSpPr>
+          <p:cNvPr id="2" name="Slide Image Placeholder 1"/>
+          <p:cNvSpPr>
+            <a:spLocks noGrp="1" noRot="1" noChangeAspect="1"/>
+          </p:cNvSpPr>
+          <p:nvPr>
+            <p:ph type="sldImg"/>
+          </p:nvPr>
+        </p:nvSpPr>
+        <p:spPr/>
+      </p:sp>
+      <p:sp>
+        <p:nvSpPr>
+          <p:cNvPr id="3" name="Notes Placeholder 2"/>
+          <p:cNvSpPr>
+            <a:spLocks noGrp="1"/>
+          </p:cNvSpPr>
+          <p:nvPr>
+            <p:ph type="body" idx="1"/>
+          </p:nvPr>
+        </p:nvSpPr>
+        <p:spPr/>
+        <p:txBody>
+          <a:bodyPr/>
+          <a:lstStyle/>
+          <a:p>
+            <a:r>
+              <a:rPr lang="en-US" dirty="0"/>
+              <a:t>Welcome to Day 1 of the Sentiment Analysis in R webinar. I’m Jenn Schilling, my pronouns are she/her/hers, and I am so happy you’re here. I am a senior data analyst at the University of Arizona, and an adjunct faculty member at the College for Creative Studies where I teach graduate classes on data visualization. Thank you for being here, and I hope you will find this webinar beneficial. Before I begin, I would like acknowledge that I am on the </a:t>
+            </a:r>
+            <a:r>
+              <a:rPr lang="en-US" b="0" i="0" dirty="0">
+                <a:solidFill>
+                  <a:srgbClr val="403635"/>
+                </a:solidFill>
+                <a:effectLst/>
+                <a:latin typeface="MiloWeb"/>
+              </a:rPr>
+              <a:t>ancestral lands of the Tohono O'odham and Pascua Yaqui nations, indigenous peoples who have occupied this land since time immemorial. </a:t>
+            </a:r>
+          </a:p>
+          <a:p>
+            <a:endParaRPr lang="en-US" b="0" i="0" dirty="0">
+              <a:solidFill>
+                <a:srgbClr val="403635"/>
+              </a:solidFill>
+              <a:effectLst/>
+              <a:latin typeface="MiloWeb"/>
+            </a:endParaRPr>
+          </a:p>
+          <a:p>
+            <a:r>
+              <a:rPr lang="en-US" b="0" i="0" dirty="0">
+                <a:solidFill>
+                  <a:srgbClr val="403635"/>
+                </a:solidFill>
+                <a:effectLst/>
+                <a:latin typeface="MiloWeb"/>
+              </a:rPr>
+              <a:t>Territory acknowledgements are one small part of disrupting and dismantling colonial structures.</a:t>
+            </a:r>
+            <a:endParaRPr lang="en-US" dirty="0"/>
+          </a:p>
+        </p:txBody>
+      </p:sp>
+      <p:sp>
+        <p:nvSpPr>
+          <p:cNvPr id="4" name="Slide Number Placeholder 3"/>
+          <p:cNvSpPr>
+            <a:spLocks noGrp="1"/>
+          </p:cNvSpPr>
+          <p:nvPr>
+            <p:ph type="sldNum" sz="quarter" idx="5"/>
+          </p:nvPr>
+        </p:nvSpPr>
+        <p:spPr/>
+        <p:txBody>
+          <a:bodyPr/>
+          <a:lstStyle/>
+          <a:p>
+            <a:fld id="{3C20A7C7-CA8D-4C49-BCFB-55E6C5267475}" type="slidenum">
+              <a:rPr lang="en-US" smtClean="0"/>
+              <a:t>2</a:t>
+            </a:fld>
+            <a:endParaRPr lang="en-US"/>
+          </a:p>
+        </p:txBody>
+      </p:sp>
+    </p:spTree>
+    <p:extLst>
+      <p:ext uri="{BB962C8B-B14F-4D97-AF65-F5344CB8AC3E}">
+        <p14:creationId xmlns:p14="http://schemas.microsoft.com/office/powerpoint/2010/main" val="841766359"/>
+      </p:ext>
+    </p:extLst>
+  </p:cSld>
+  <p:clrMapOvr>
+    <a:masterClrMapping/>
+  </p:clrMapOvr>
+</p:notes>
+</file>
+
+<file path=ppt/notesSlides/notesSlide3.xml><?xml version="1.0" encoding="utf-8"?>
+<p:notes xmlns:a="http://schemas.openxmlformats.org/drawingml/2006/main" xmlns:r="http://schemas.openxmlformats.org/officeDocument/2006/relationships" xmlns:p="http://schemas.openxmlformats.org/presentationml/2006/main">
+  <p:cSld>
+    <p:spTree>
+      <p:nvGrpSpPr>
+        <p:cNvPr id="1" name=""/>
+        <p:cNvGrpSpPr/>
+        <p:nvPr/>
+      </p:nvGrpSpPr>
+      <p:grpSpPr>
+        <a:xfrm>
+          <a:off x="0" y="0"/>
+          <a:ext cx="0" cy="0"/>
+          <a:chOff x="0" y="0"/>
+          <a:chExt cx="0" cy="0"/>
+        </a:xfrm>
+      </p:grpSpPr>
+      <p:sp>
+        <p:nvSpPr>
+          <p:cNvPr id="2" name="Slide Image Placeholder 1"/>
+          <p:cNvSpPr>
+            <a:spLocks noGrp="1" noRot="1" noChangeAspect="1"/>
+          </p:cNvSpPr>
+          <p:nvPr>
+            <p:ph type="sldImg"/>
+          </p:nvPr>
+        </p:nvSpPr>
+        <p:spPr/>
+      </p:sp>
+      <p:sp>
+        <p:nvSpPr>
+          <p:cNvPr id="3" name="Notes Placeholder 2"/>
+          <p:cNvSpPr>
+            <a:spLocks noGrp="1"/>
+          </p:cNvSpPr>
+          <p:nvPr>
+            <p:ph type="body" idx="1"/>
+          </p:nvPr>
+        </p:nvSpPr>
+        <p:spPr/>
+        <p:txBody>
+          <a:bodyPr/>
+          <a:lstStyle/>
+          <a:p>
+            <a:r>
+              <a:rPr lang="en-US" dirty="0"/>
+              <a:t>The learning outcomes of this webinar are that participants will be able to prepare data for a text analysis, conduct text mining, and complete a sentiment analysis in R.</a:t>
+            </a:r>
+          </a:p>
+          <a:p>
+            <a:endParaRPr lang="en-US" dirty="0"/>
+          </a:p>
+        </p:txBody>
+      </p:sp>
+      <p:sp>
+        <p:nvSpPr>
+          <p:cNvPr id="4" name="Slide Number Placeholder 3"/>
+          <p:cNvSpPr>
+            <a:spLocks noGrp="1"/>
+          </p:cNvSpPr>
+          <p:nvPr>
+            <p:ph type="sldNum" sz="quarter" idx="5"/>
+          </p:nvPr>
+        </p:nvSpPr>
+        <p:spPr/>
+        <p:txBody>
+          <a:bodyPr/>
+          <a:lstStyle/>
+          <a:p>
+            <a:fld id="{3C20A7C7-CA8D-4C49-BCFB-55E6C5267475}" type="slidenum">
+              <a:rPr lang="en-US" smtClean="0"/>
+              <a:t>3</a:t>
+            </a:fld>
+            <a:endParaRPr lang="en-US"/>
+          </a:p>
+        </p:txBody>
+      </p:sp>
+    </p:spTree>
+    <p:extLst>
+      <p:ext uri="{BB962C8B-B14F-4D97-AF65-F5344CB8AC3E}">
+        <p14:creationId xmlns:p14="http://schemas.microsoft.com/office/powerpoint/2010/main" val="2686607455"/>
+      </p:ext>
+    </p:extLst>
+  </p:cSld>
+  <p:clrMapOvr>
+    <a:masterClrMapping/>
+  </p:clrMapOvr>
+</p:notes>
+</file>
+
+<file path=ppt/notesSlides/notesSlide4.xml><?xml version="1.0" encoding="utf-8"?>
+<p:notes xmlns:a="http://schemas.openxmlformats.org/drawingml/2006/main" xmlns:r="http://schemas.openxmlformats.org/officeDocument/2006/relationships" xmlns:p="http://schemas.openxmlformats.org/presentationml/2006/main">
+  <p:cSld>
+    <p:spTree>
+      <p:nvGrpSpPr>
+        <p:cNvPr id="1" name=""/>
+        <p:cNvGrpSpPr/>
+        <p:nvPr/>
+      </p:nvGrpSpPr>
+      <p:grpSpPr>
+        <a:xfrm>
+          <a:off x="0" y="0"/>
+          <a:ext cx="0" cy="0"/>
+          <a:chOff x="0" y="0"/>
+          <a:chExt cx="0" cy="0"/>
+        </a:xfrm>
+      </p:grpSpPr>
+      <p:sp>
+        <p:nvSpPr>
+          <p:cNvPr id="2" name="Slide Image Placeholder 1"/>
+          <p:cNvSpPr>
+            <a:spLocks noGrp="1" noRot="1" noChangeAspect="1"/>
+          </p:cNvSpPr>
+          <p:nvPr>
+            <p:ph type="sldImg"/>
+          </p:nvPr>
+        </p:nvSpPr>
+        <p:spPr/>
+      </p:sp>
+      <p:sp>
+        <p:nvSpPr>
+          <p:cNvPr id="3" name="Notes Placeholder 2"/>
+          <p:cNvSpPr>
+            <a:spLocks noGrp="1"/>
+          </p:cNvSpPr>
+          <p:nvPr>
+            <p:ph type="body" idx="1"/>
+          </p:nvPr>
+        </p:nvSpPr>
+        <p:spPr/>
+        <p:txBody>
+          <a:bodyPr/>
+          <a:lstStyle/>
+          <a:p>
+            <a:pPr marL="0" marR="0">
+              <a:lnSpc>
+                <a:spcPct val="107000"/>
+              </a:lnSpc>
+              <a:spcBef>
+                <a:spcPts val="0"/>
+              </a:spcBef>
+              <a:spcAft>
+                <a:spcPts val="0"/>
+              </a:spcAft>
+            </a:pPr>
+            <a:r>
+              <a:rPr lang="en-US" sz="1800" dirty="0">
+                <a:effectLst/>
+                <a:latin typeface="Calibri" panose="020F0502020204030204" pitchFamily="34" charset="0"/>
+                <a:ea typeface="Calibri" panose="020F0502020204030204" pitchFamily="34" charset="0"/>
+                <a:cs typeface="Times New Roman" panose="02020603050405020304" pitchFamily="18" charset="0"/>
+              </a:rPr>
+              <a:t>This webinar will teach participants how to complete a text analysis in R, including data processing and cleaning, visualization of word frequencies, and sentiment analysis. Sentiment analysis is useful for finding patterns in text data from open response questions on surveys and course evaluations as well as evaluating social media posts. </a:t>
+            </a:r>
+          </a:p>
+          <a:p>
+            <a:pPr marL="0" marR="0">
+              <a:lnSpc>
+                <a:spcPct val="107000"/>
+              </a:lnSpc>
+              <a:spcBef>
+                <a:spcPts val="0"/>
+              </a:spcBef>
+              <a:spcAft>
+                <a:spcPts val="0"/>
+              </a:spcAft>
+            </a:pPr>
+            <a:endParaRPr lang="en-US" sz="1800" dirty="0">
+              <a:effectLst/>
+              <a:latin typeface="Calibri" panose="020F0502020204030204" pitchFamily="34" charset="0"/>
+              <a:cs typeface="Times New Roman" panose="02020603050405020304" pitchFamily="18" charset="0"/>
+            </a:endParaRPr>
+          </a:p>
+          <a:p>
+            <a:pPr marL="0" marR="0">
+              <a:lnSpc>
+                <a:spcPct val="107000"/>
+              </a:lnSpc>
+              <a:spcBef>
+                <a:spcPts val="0"/>
+              </a:spcBef>
+              <a:spcAft>
+                <a:spcPts val="0"/>
+              </a:spcAft>
+            </a:pPr>
+            <a:r>
+              <a:rPr lang="en-US" sz="1800" dirty="0">
+                <a:effectLst/>
+                <a:latin typeface="Calibri" panose="020F0502020204030204" pitchFamily="34" charset="0"/>
+                <a:cs typeface="Times New Roman" panose="02020603050405020304" pitchFamily="18" charset="0"/>
+              </a:rPr>
+              <a:t>Today we will go over…</a:t>
+            </a:r>
+            <a:endParaRPr lang="en-US" dirty="0"/>
+          </a:p>
+        </p:txBody>
+      </p:sp>
+      <p:sp>
+        <p:nvSpPr>
+          <p:cNvPr id="4" name="Slide Number Placeholder 3"/>
+          <p:cNvSpPr>
+            <a:spLocks noGrp="1"/>
+          </p:cNvSpPr>
+          <p:nvPr>
+            <p:ph type="sldNum" sz="quarter" idx="5"/>
+          </p:nvPr>
+        </p:nvSpPr>
+        <p:spPr/>
+        <p:txBody>
+          <a:bodyPr/>
+          <a:lstStyle/>
+          <a:p>
+            <a:fld id="{3C20A7C7-CA8D-4C49-BCFB-55E6C5267475}" type="slidenum">
+              <a:rPr lang="en-US" smtClean="0"/>
+              <a:t>4</a:t>
+            </a:fld>
+            <a:endParaRPr lang="en-US"/>
+          </a:p>
+        </p:txBody>
+      </p:sp>
+    </p:spTree>
+    <p:extLst>
+      <p:ext uri="{BB962C8B-B14F-4D97-AF65-F5344CB8AC3E}">
+        <p14:creationId xmlns:p14="http://schemas.microsoft.com/office/powerpoint/2010/main" val="3914118533"/>
+      </p:ext>
+    </p:extLst>
+  </p:cSld>
+  <p:clrMapOvr>
+    <a:masterClrMapping/>
+  </p:clrMapOvr>
+</p:notes>
+</file>
+
+<file path=ppt/notesSlides/notesSlide5.xml><?xml version="1.0" encoding="utf-8"?>
+<p:notes xmlns:a="http://schemas.openxmlformats.org/drawingml/2006/main" xmlns:r="http://schemas.openxmlformats.org/officeDocument/2006/relationships" xmlns:p="http://schemas.openxmlformats.org/presentationml/2006/main">
+  <p:cSld>
+    <p:spTree>
+      <p:nvGrpSpPr>
+        <p:cNvPr id="1" name=""/>
+        <p:cNvGrpSpPr/>
+        <p:nvPr/>
+      </p:nvGrpSpPr>
+      <p:grpSpPr>
+        <a:xfrm>
+          <a:off x="0" y="0"/>
+          <a:ext cx="0" cy="0"/>
+          <a:chOff x="0" y="0"/>
+          <a:chExt cx="0" cy="0"/>
+        </a:xfrm>
+      </p:grpSpPr>
+      <p:sp>
+        <p:nvSpPr>
+          <p:cNvPr id="2" name="Slide Image Placeholder 1"/>
+          <p:cNvSpPr>
+            <a:spLocks noGrp="1" noRot="1" noChangeAspect="1"/>
+          </p:cNvSpPr>
+          <p:nvPr>
+            <p:ph type="sldImg"/>
+          </p:nvPr>
+        </p:nvSpPr>
+        <p:spPr/>
+      </p:sp>
+      <p:sp>
+        <p:nvSpPr>
+          <p:cNvPr id="3" name="Notes Placeholder 2"/>
+          <p:cNvSpPr>
+            <a:spLocks noGrp="1"/>
+          </p:cNvSpPr>
+          <p:nvPr>
+            <p:ph type="body" idx="1"/>
+          </p:nvPr>
+        </p:nvSpPr>
+        <p:spPr/>
+        <p:txBody>
+          <a:bodyPr/>
+          <a:lstStyle/>
+          <a:p>
+            <a:r>
+              <a:rPr lang="en-US" dirty="0"/>
+              <a:t>Text analysis is the processing and analyzing of text data. We frequently encounter text data in higher education through course descriptions, student feedback on surveys or course evaluations, and social media posts. Text analysis allows us to analyze that data to determine word frequencies, common themes, and patterns.</a:t>
+            </a:r>
+          </a:p>
+          <a:p>
+            <a:endParaRPr lang="en-US" dirty="0"/>
+          </a:p>
+          <a:p>
+            <a:r>
+              <a:rPr lang="en-US" dirty="0"/>
+              <a:t>One challenge with text analysis is that words can have multiple meanings depending on context and interpretation. Text analysis and sentiment analysis do not pick up on sarcasm, tone, or context. However, they can be useful to find broad commonalities and overarching themes.</a:t>
+            </a:r>
+          </a:p>
+        </p:txBody>
+      </p:sp>
+      <p:sp>
+        <p:nvSpPr>
+          <p:cNvPr id="4" name="Slide Number Placeholder 3"/>
+          <p:cNvSpPr>
+            <a:spLocks noGrp="1"/>
+          </p:cNvSpPr>
+          <p:nvPr>
+            <p:ph type="sldNum" sz="quarter" idx="5"/>
+          </p:nvPr>
+        </p:nvSpPr>
+        <p:spPr/>
+        <p:txBody>
+          <a:bodyPr/>
+          <a:lstStyle/>
+          <a:p>
+            <a:fld id="{3C20A7C7-CA8D-4C49-BCFB-55E6C5267475}" type="slidenum">
+              <a:rPr lang="en-US" smtClean="0"/>
+              <a:t>5</a:t>
+            </a:fld>
+            <a:endParaRPr lang="en-US"/>
+          </a:p>
+        </p:txBody>
+      </p:sp>
+    </p:spTree>
+    <p:extLst>
+      <p:ext uri="{BB962C8B-B14F-4D97-AF65-F5344CB8AC3E}">
+        <p14:creationId xmlns:p14="http://schemas.microsoft.com/office/powerpoint/2010/main" val="2984997324"/>
+      </p:ext>
+    </p:extLst>
+  </p:cSld>
+  <p:clrMapOvr>
+    <a:masterClrMapping/>
+  </p:clrMapOvr>
+</p:notes>
+</file>
+
+<file path=ppt/notesSlides/notesSlide6.xml><?xml version="1.0" encoding="utf-8"?>
+<p:notes xmlns:a="http://schemas.openxmlformats.org/drawingml/2006/main" xmlns:r="http://schemas.openxmlformats.org/officeDocument/2006/relationships" xmlns:p="http://schemas.openxmlformats.org/presentationml/2006/main">
+  <p:cSld>
+    <p:spTree>
+      <p:nvGrpSpPr>
+        <p:cNvPr id="1" name=""/>
+        <p:cNvGrpSpPr/>
+        <p:nvPr/>
+      </p:nvGrpSpPr>
+      <p:grpSpPr>
+        <a:xfrm>
+          <a:off x="0" y="0"/>
+          <a:ext cx="0" cy="0"/>
+          <a:chOff x="0" y="0"/>
+          <a:chExt cx="0" cy="0"/>
+        </a:xfrm>
+      </p:grpSpPr>
+      <p:sp>
+        <p:nvSpPr>
+          <p:cNvPr id="2" name="Slide Image Placeholder 1"/>
+          <p:cNvSpPr>
+            <a:spLocks noGrp="1" noRot="1" noChangeAspect="1"/>
+          </p:cNvSpPr>
+          <p:nvPr>
+            <p:ph type="sldImg"/>
+          </p:nvPr>
+        </p:nvSpPr>
+        <p:spPr/>
+      </p:sp>
+      <p:sp>
+        <p:nvSpPr>
+          <p:cNvPr id="3" name="Notes Placeholder 2"/>
+          <p:cNvSpPr>
+            <a:spLocks noGrp="1"/>
+          </p:cNvSpPr>
+          <p:nvPr>
+            <p:ph type="body" idx="1"/>
+          </p:nvPr>
+        </p:nvSpPr>
+        <p:spPr/>
+        <p:txBody>
+          <a:bodyPr/>
+          <a:lstStyle/>
+          <a:p>
+            <a:r>
+              <a:rPr lang="en-US" dirty="0"/>
+              <a:t>A component of text analysis is sentiment analysis which aims to determine the sentiment of a piece of text – is it positive or negative? Does it invoke joy or sadness? There are a few different dictionaries of word sentiments that can be used to determine the feeling behind a piece of text. Again, the sentiment can sometimes be off due to context, sarcasm, etc. but it can be a useful analysis for approximating the broad feelings behind text.</a:t>
+            </a:r>
+          </a:p>
+        </p:txBody>
+      </p:sp>
+      <p:sp>
+        <p:nvSpPr>
+          <p:cNvPr id="4" name="Slide Number Placeholder 3"/>
+          <p:cNvSpPr>
+            <a:spLocks noGrp="1"/>
+          </p:cNvSpPr>
+          <p:nvPr>
+            <p:ph type="sldNum" sz="quarter" idx="5"/>
+          </p:nvPr>
+        </p:nvSpPr>
+        <p:spPr/>
+        <p:txBody>
+          <a:bodyPr/>
+          <a:lstStyle/>
+          <a:p>
+            <a:fld id="{3C20A7C7-CA8D-4C49-BCFB-55E6C5267475}" type="slidenum">
+              <a:rPr lang="en-US" smtClean="0"/>
+              <a:t>6</a:t>
+            </a:fld>
+            <a:endParaRPr lang="en-US"/>
+          </a:p>
+        </p:txBody>
+      </p:sp>
+    </p:spTree>
+    <p:extLst>
+      <p:ext uri="{BB962C8B-B14F-4D97-AF65-F5344CB8AC3E}">
+        <p14:creationId xmlns:p14="http://schemas.microsoft.com/office/powerpoint/2010/main" val="3779928158"/>
       </p:ext>
     </p:extLst>
   </p:cSld>
@@ -1430,59 +1843,7 @@
           <a:p>
             <a:r>
               <a:rPr lang="en-US" dirty="0"/>
-              <a:t>Welcome back to Day 2 of the Sentiment Analysis in R webinar. I’m so happy you’re here.</a:t>
-            </a:r>
-          </a:p>
-          <a:p>
-            <a:pPr marL="0" marR="0">
-              <a:lnSpc>
-                <a:spcPct val="107000"/>
-              </a:lnSpc>
-              <a:spcBef>
-                <a:spcPts val="0"/>
-              </a:spcBef>
-              <a:spcAft>
-                <a:spcPts val="0"/>
-              </a:spcAft>
-            </a:pPr>
-            <a:r>
-              <a:rPr lang="en-US" sz="1800" dirty="0">
-                <a:solidFill>
-                  <a:srgbClr val="545E6B"/>
-                </a:solidFill>
-                <a:effectLst/>
-                <a:latin typeface="Arial" panose="020B0604020202020204" pitchFamily="34" charset="0"/>
-                <a:ea typeface="Times New Roman" panose="02020603050405020304" pitchFamily="18" charset="0"/>
-                <a:cs typeface="Times New Roman" panose="02020603050405020304" pitchFamily="18" charset="0"/>
-              </a:rPr>
-              <a:t> </a:t>
-            </a:r>
-            <a:endParaRPr lang="en-US" sz="1800" dirty="0">
-              <a:effectLst/>
-              <a:latin typeface="Calibri" panose="020F0502020204030204" pitchFamily="34" charset="0"/>
-              <a:ea typeface="Calibri" panose="020F0502020204030204" pitchFamily="34" charset="0"/>
-              <a:cs typeface="Times New Roman" panose="02020603050405020304" pitchFamily="18" charset="0"/>
-            </a:endParaRPr>
-          </a:p>
-          <a:p>
-            <a:r>
-              <a:rPr lang="en-US" sz="1800" dirty="0">
-                <a:effectLst/>
-                <a:latin typeface="Calibri" panose="020F0502020204030204" pitchFamily="34" charset="0"/>
-                <a:ea typeface="Calibri" panose="020F0502020204030204" pitchFamily="34" charset="0"/>
-                <a:cs typeface="Times New Roman" panose="02020603050405020304" pitchFamily="18" charset="0"/>
-              </a:rPr>
-              <a:t>This webinar will teach participants how to complete a text analysis in R, including data processing and cleaning, visualization of word frequencies, and sentiment analysis. Sentiment analysis is useful for finding patterns in text data from open response questions on surveys and course evaluations as well as evaluating social media posts. </a:t>
-            </a:r>
-            <a:endParaRPr lang="en-US" dirty="0"/>
-          </a:p>
-          <a:p>
-            <a:endParaRPr lang="en-US" dirty="0"/>
-          </a:p>
-          <a:p>
-            <a:r>
-              <a:rPr lang="en-US" dirty="0"/>
-              <a:t>Here’s today’s agenda…</a:t>
+              <a:t>Text and sentiment analysis are useful for analyzing large quantities of text automatically. They can help us find general themes and feelings, and they allow us to quite quickly analyze text data that could take a long time to process by hand. Applications to institutional research include analyzing course evaluations, student, faculty, or staff responses to surveys, and social media content. In the example we will walk through in this webinar, I will be analyzing tweets that use the University of Arizona hashtag.</a:t>
             </a:r>
           </a:p>
         </p:txBody>
@@ -1504,7 +1865,7 @@
           <a:p>
             <a:fld id="{3C20A7C7-CA8D-4C49-BCFB-55E6C5267475}" type="slidenum">
               <a:rPr lang="en-US" smtClean="0"/>
-              <a:t>12</a:t>
+              <a:t>7</a:t>
             </a:fld>
             <a:endParaRPr lang="en-US"/>
           </a:p>
@@ -1513,7 +1874,7 @@
     </p:spTree>
     <p:extLst>
       <p:ext uri="{BB962C8B-B14F-4D97-AF65-F5344CB8AC3E}">
-        <p14:creationId xmlns:p14="http://schemas.microsoft.com/office/powerpoint/2010/main" val="4038417624"/>
+        <p14:creationId xmlns:p14="http://schemas.microsoft.com/office/powerpoint/2010/main" val="2234667991"/>
       </p:ext>
     </p:extLst>
   </p:cSld>
@@ -1569,11 +1930,8 @@
           <a:p>
             <a:r>
               <a:rPr lang="en-US" dirty="0"/>
-              <a:t>The learning outcomes of this webinar are that participants will be able to prepare data for a text analysis, conduct text mining, and complete a sentiment analysis in R.</a:t>
-            </a:r>
-          </a:p>
-          <a:p>
-            <a:endParaRPr lang="en-US" dirty="0"/>
+              <a:t>Before we get started in R, I would like to define tidy data. Tidy data is a structure of data in which each variable is a column, each observation is a row, and each cell is a single measurement. For text analysis, we can create a tidy text data table or data frame which contains one token per row. A token is a meaningful unit of text, such as a word. The first step in text analysis is called tokenizing, which involves splitting a long text string, such as a tweet, document, or open-ended responses, into individual words or sets of words. </a:t>
+            </a:r>
           </a:p>
         </p:txBody>
       </p:sp>
@@ -1594,7 +1952,7 @@
           <a:p>
             <a:fld id="{3C20A7C7-CA8D-4C49-BCFB-55E6C5267475}" type="slidenum">
               <a:rPr lang="en-US" smtClean="0"/>
-              <a:t>13</a:t>
+              <a:t>8</a:t>
             </a:fld>
             <a:endParaRPr lang="en-US"/>
           </a:p>
@@ -1603,7 +1961,7 @@
     </p:spTree>
     <p:extLst>
       <p:ext uri="{BB962C8B-B14F-4D97-AF65-F5344CB8AC3E}">
-        <p14:creationId xmlns:p14="http://schemas.microsoft.com/office/powerpoint/2010/main" val="1363480395"/>
+        <p14:creationId xmlns:p14="http://schemas.microsoft.com/office/powerpoint/2010/main" val="252622341"/>
       </p:ext>
     </p:extLst>
   </p:cSld>
@@ -1657,7 +2015,55 @@
           <a:bodyPr/>
           <a:lstStyle/>
           <a:p>
+            <a:r>
+              <a:rPr lang="en-US" dirty="0"/>
+              <a:t>To get set up in R, all you will need is the </a:t>
+            </a:r>
+            <a:r>
+              <a:rPr lang="en-US" dirty="0" err="1"/>
+              <a:t>tidyverse</a:t>
+            </a:r>
+            <a:r>
+              <a:rPr lang="en-US" dirty="0"/>
+              <a:t> and </a:t>
+            </a:r>
+            <a:r>
+              <a:rPr lang="en-US" dirty="0" err="1"/>
+              <a:t>tidytext</a:t>
+            </a:r>
+            <a:r>
+              <a:rPr lang="en-US" dirty="0"/>
+              <a:t> packages installed and a set of text data. </a:t>
+            </a:r>
+          </a:p>
+          <a:p>
             <a:endParaRPr lang="en-US" dirty="0"/>
+          </a:p>
+          <a:p>
+            <a:r>
+              <a:rPr lang="en-US" dirty="0"/>
+              <a:t>R Markdown is a very useful tool/file format that can be used to create documentation along with your code. This is ideal for reproducibility.</a:t>
+            </a:r>
+          </a:p>
+          <a:p>
+            <a:r>
+              <a:rPr lang="en-US" b="1" dirty="0">
+                <a:highlight>
+                  <a:srgbClr val="FFFF00"/>
+                </a:highlight>
+              </a:rPr>
+              <a:t> </a:t>
+            </a:r>
+          </a:p>
+          <a:p>
+            <a:r>
+              <a:rPr lang="en-US" b="1" dirty="0">
+                <a:highlight>
+                  <a:srgbClr val="FFFF00"/>
+                </a:highlight>
+              </a:rPr>
+              <a:t>The webinar materials provided include an R Markdown file with all the code to process the data and create the plots used in this webinar, the data files used, which I will discuss in a little more detail soon, and a folder for plots. The .here file is needed so that the R Markdown code knows where to find the data files and save the plot. The README file contains more information about each individual file and the structure of the folder.</a:t>
+            </a:r>
           </a:p>
         </p:txBody>
       </p:sp>
@@ -1678,7 +2084,7 @@
           <a:p>
             <a:fld id="{3C20A7C7-CA8D-4C49-BCFB-55E6C5267475}" type="slidenum">
               <a:rPr lang="en-US" smtClean="0"/>
-              <a:t>14</a:t>
+              <a:t>9</a:t>
             </a:fld>
             <a:endParaRPr lang="en-US"/>
           </a:p>
@@ -1687,7 +2093,7 @@
     </p:spTree>
     <p:extLst>
       <p:ext uri="{BB962C8B-B14F-4D97-AF65-F5344CB8AC3E}">
-        <p14:creationId xmlns:p14="http://schemas.microsoft.com/office/powerpoint/2010/main" val="3336625752"/>
+        <p14:creationId xmlns:p14="http://schemas.microsoft.com/office/powerpoint/2010/main" val="1536740705"/>
       </p:ext>
     </p:extLst>
   </p:cSld>
@@ -3644,7 +4050,7 @@
           <a:p>
             <a:fld id="{C9727A96-7105-44AE-B9F0-3BA74D06A54C}" type="datetimeFigureOut">
               <a:rPr lang="en-US" smtClean="0"/>
-              <a:t>8/30/2021</a:t>
+              <a:t>9/16/2021</a:t>
             </a:fld>
             <a:endParaRPr lang="en-US"/>
           </a:p>
@@ -3842,7 +4248,7 @@
           <a:p>
             <a:fld id="{C9727A96-7105-44AE-B9F0-3BA74D06A54C}" type="datetimeFigureOut">
               <a:rPr lang="en-US" smtClean="0"/>
-              <a:t>8/30/2021</a:t>
+              <a:t>9/16/2021</a:t>
             </a:fld>
             <a:endParaRPr lang="en-US"/>
           </a:p>
@@ -4078,7 +4484,7 @@
           <a:p>
             <a:fld id="{C9727A96-7105-44AE-B9F0-3BA74D06A54C}" type="datetimeFigureOut">
               <a:rPr lang="en-US" smtClean="0"/>
-              <a:t>8/30/2021</a:t>
+              <a:t>9/16/2021</a:t>
             </a:fld>
             <a:endParaRPr lang="en-US"/>
           </a:p>
@@ -4414,7 +4820,7 @@
           <a:p>
             <a:fld id="{986F8839-423C-1541-BA9A-A38B5B6A10D1}" type="datetimeFigureOut">
               <a:rPr lang="en-US" smtClean="0"/>
-              <a:t>8/30/2021</a:t>
+              <a:t>9/16/2021</a:t>
             </a:fld>
             <a:endParaRPr lang="en-US"/>
           </a:p>
@@ -4907,6 +5313,14 @@
 <file path=ppt/slides/slide10.xml><?xml version="1.0" encoding="utf-8"?>
 <p:sld xmlns:a="http://schemas.openxmlformats.org/drawingml/2006/main" xmlns:r="http://schemas.openxmlformats.org/officeDocument/2006/relationships" xmlns:p="http://schemas.openxmlformats.org/presentationml/2006/main">
   <p:cSld>
+    <p:bg>
+      <p:bgPr>
+        <a:solidFill>
+          <a:schemeClr val="bg1"/>
+        </a:solidFill>
+        <a:effectLst/>
+      </p:bgPr>
+    </p:bg>
     <p:spTree>
       <p:nvGrpSpPr>
         <p:cNvPr id="1" name=""/>
@@ -4923,36 +5337,75 @@
       </p:grpSpPr>
       <p:sp>
         <p:nvSpPr>
-          <p:cNvPr id="4" name="Title 3">
-            <a:extLst>
-              <a:ext uri="{FF2B5EF4-FFF2-40B4-BE49-F238E27FC236}">
-                <a16:creationId xmlns:a16="http://schemas.microsoft.com/office/drawing/2014/main" id="{B86A4B02-4000-49F6-A883-1F84DEF62767}"/>
-              </a:ext>
-            </a:extLst>
-          </p:cNvPr>
-          <p:cNvSpPr>
-            <a:spLocks noGrp="1"/>
-          </p:cNvSpPr>
-          <p:nvPr>
-            <p:ph type="ctrTitle"/>
-          </p:nvPr>
-        </p:nvSpPr>
-        <p:spPr/>
-        <p:txBody>
-          <a:bodyPr/>
-          <a:lstStyle/>
-          <a:p>
-            <a:r>
-              <a:rPr lang="en-US" dirty="0"/>
-              <a:t>Questions</a:t>
-            </a:r>
+          <p:cNvPr id="2" name="Title 1">
+            <a:extLst>
+              <a:ext uri="{FF2B5EF4-FFF2-40B4-BE49-F238E27FC236}">
+                <a16:creationId xmlns:a16="http://schemas.microsoft.com/office/drawing/2014/main" id="{BDA1388A-4824-4A29-ADD9-8CFCC321EE86}"/>
+              </a:ext>
+            </a:extLst>
+          </p:cNvPr>
+          <p:cNvSpPr>
+            <a:spLocks noGrp="1"/>
+          </p:cNvSpPr>
+          <p:nvPr>
+            <p:ph type="title"/>
+          </p:nvPr>
+        </p:nvSpPr>
+        <p:spPr>
+          <a:xfrm>
+            <a:off x="643467" y="321734"/>
+            <a:ext cx="10905066" cy="1135737"/>
+          </a:xfrm>
+        </p:spPr>
+        <p:txBody>
+          <a:bodyPr>
+            <a:normAutofit/>
+          </a:bodyPr>
+          <a:lstStyle/>
+          <a:p>
+            <a:r>
+              <a:rPr lang="en-US" sz="3600" dirty="0"/>
+              <a:t>What did we learn today?</a:t>
+            </a:r>
+          </a:p>
+        </p:txBody>
+      </p:sp>
+      <p:sp>
+        <p:nvSpPr>
+          <p:cNvPr id="3" name="Content Placeholder 2">
+            <a:extLst>
+              <a:ext uri="{FF2B5EF4-FFF2-40B4-BE49-F238E27FC236}">
+                <a16:creationId xmlns:a16="http://schemas.microsoft.com/office/drawing/2014/main" id="{9CD29E42-4D8E-43A2-BF12-9FC55D34DB03}"/>
+              </a:ext>
+            </a:extLst>
+          </p:cNvPr>
+          <p:cNvSpPr>
+            <a:spLocks noGrp="1"/>
+          </p:cNvSpPr>
+          <p:nvPr>
+            <p:ph idx="1"/>
+          </p:nvPr>
+        </p:nvSpPr>
+        <p:spPr>
+          <a:xfrm>
+            <a:off x="643467" y="1782981"/>
+            <a:ext cx="10905066" cy="4393982"/>
+          </a:xfrm>
+        </p:spPr>
+        <p:txBody>
+          <a:bodyPr>
+            <a:normAutofit/>
+          </a:bodyPr>
+          <a:lstStyle/>
+          <a:p>
+            <a:endParaRPr lang="en-US" dirty="0"/>
           </a:p>
         </p:txBody>
       </p:sp>
     </p:spTree>
     <p:extLst>
       <p:ext uri="{BB962C8B-B14F-4D97-AF65-F5344CB8AC3E}">
-        <p14:creationId xmlns:p14="http://schemas.microsoft.com/office/powerpoint/2010/main" val="4289990813"/>
+        <p14:creationId xmlns:p14="http://schemas.microsoft.com/office/powerpoint/2010/main" val="1722121953"/>
       </p:ext>
     </p:extLst>
   </p:cSld>
@@ -4984,7 +5437,7 @@
           <p:cNvPr id="4" name="Title 3">
             <a:extLst>
               <a:ext uri="{FF2B5EF4-FFF2-40B4-BE49-F238E27FC236}">
-                <a16:creationId xmlns:a16="http://schemas.microsoft.com/office/drawing/2014/main" id="{B498E96C-64BE-FC49-848F-A8C5DFBE2F4F}"/>
+                <a16:creationId xmlns:a16="http://schemas.microsoft.com/office/drawing/2014/main" id="{B86A4B02-4000-49F6-A883-1F84DEF62767}"/>
               </a:ext>
             </a:extLst>
           </p:cNvPr>
@@ -5002,41 +5455,7 @@
           <a:p>
             <a:r>
               <a:rPr lang="en-US" dirty="0"/>
-              <a:t>Sentiment Analysis in R</a:t>
-            </a:r>
-          </a:p>
-        </p:txBody>
-      </p:sp>
-      <p:sp>
-        <p:nvSpPr>
-          <p:cNvPr id="5" name="Subtitle 4">
-            <a:extLst>
-              <a:ext uri="{FF2B5EF4-FFF2-40B4-BE49-F238E27FC236}">
-                <a16:creationId xmlns:a16="http://schemas.microsoft.com/office/drawing/2014/main" id="{8FDA3654-1A1B-7749-B5C0-2D9829A8FDD8}"/>
-              </a:ext>
-            </a:extLst>
-          </p:cNvPr>
-          <p:cNvSpPr>
-            <a:spLocks noGrp="1"/>
-          </p:cNvSpPr>
-          <p:nvPr>
-            <p:ph type="subTitle" idx="1"/>
-          </p:nvPr>
-        </p:nvSpPr>
-        <p:spPr/>
-        <p:txBody>
-          <a:bodyPr/>
-          <a:lstStyle/>
-          <a:p>
-            <a:r>
-              <a:rPr lang="en-US" dirty="0"/>
-              <a:t>Jenn Schilling</a:t>
-            </a:r>
-          </a:p>
-          <a:p>
-            <a:r>
-              <a:rPr lang="en-US" dirty="0"/>
-              <a:t>October 22, 2021</a:t>
+              <a:t>Questions</a:t>
             </a:r>
           </a:p>
         </p:txBody>
@@ -5044,7 +5463,7 @@
     </p:spTree>
     <p:extLst>
       <p:ext uri="{BB962C8B-B14F-4D97-AF65-F5344CB8AC3E}">
-        <p14:creationId xmlns:p14="http://schemas.microsoft.com/office/powerpoint/2010/main" val="3791872727"/>
+        <p14:creationId xmlns:p14="http://schemas.microsoft.com/office/powerpoint/2010/main" val="4289990813"/>
       </p:ext>
     </p:extLst>
   </p:cSld>
@@ -5057,14 +5476,6 @@
 <file path=ppt/slides/slide12.xml><?xml version="1.0" encoding="utf-8"?>
 <p:sld xmlns:a="http://schemas.openxmlformats.org/drawingml/2006/main" xmlns:r="http://schemas.openxmlformats.org/officeDocument/2006/relationships" xmlns:p="http://schemas.openxmlformats.org/presentationml/2006/main">
   <p:cSld>
-    <p:bg>
-      <p:bgPr>
-        <a:solidFill>
-          <a:schemeClr val="bg1"/>
-        </a:solidFill>
-        <a:effectLst/>
-      </p:bgPr>
-    </p:bg>
     <p:spTree>
       <p:nvGrpSpPr>
         <p:cNvPr id="1" name=""/>
@@ -5081,100 +5492,62 @@
       </p:grpSpPr>
       <p:sp>
         <p:nvSpPr>
-          <p:cNvPr id="2" name="Title 1">
-            <a:extLst>
-              <a:ext uri="{FF2B5EF4-FFF2-40B4-BE49-F238E27FC236}">
-                <a16:creationId xmlns:a16="http://schemas.microsoft.com/office/drawing/2014/main" id="{303FC117-54AE-4231-8219-69E3526E2341}"/>
-              </a:ext>
-            </a:extLst>
-          </p:cNvPr>
-          <p:cNvSpPr>
-            <a:spLocks noGrp="1"/>
-          </p:cNvSpPr>
-          <p:nvPr>
-            <p:ph type="title"/>
-          </p:nvPr>
-        </p:nvSpPr>
-        <p:spPr>
-          <a:xfrm>
-            <a:off x="643467" y="321734"/>
-            <a:ext cx="10905066" cy="1135737"/>
-          </a:xfrm>
-        </p:spPr>
-        <p:txBody>
-          <a:bodyPr>
-            <a:normAutofit/>
-          </a:bodyPr>
-          <a:lstStyle/>
-          <a:p>
-            <a:r>
-              <a:rPr lang="en-US" sz="3600" dirty="0"/>
-              <a:t>Day 2 Agenda</a:t>
-            </a:r>
-          </a:p>
-        </p:txBody>
-      </p:sp>
-      <p:sp>
-        <p:nvSpPr>
-          <p:cNvPr id="3" name="Content Placeholder 2">
-            <a:extLst>
-              <a:ext uri="{FF2B5EF4-FFF2-40B4-BE49-F238E27FC236}">
-                <a16:creationId xmlns:a16="http://schemas.microsoft.com/office/drawing/2014/main" id="{BDAA0CD9-D632-4B6B-BF3C-73302529A4C9}"/>
-              </a:ext>
-            </a:extLst>
-          </p:cNvPr>
-          <p:cNvSpPr>
-            <a:spLocks noGrp="1"/>
-          </p:cNvSpPr>
-          <p:nvPr>
-            <p:ph idx="1"/>
-          </p:nvPr>
-        </p:nvSpPr>
-        <p:spPr>
-          <a:xfrm>
-            <a:off x="643467" y="1782981"/>
-            <a:ext cx="10905066" cy="4393982"/>
-          </a:xfrm>
-        </p:spPr>
-        <p:txBody>
-          <a:bodyPr>
-            <a:normAutofit/>
-          </a:bodyPr>
+          <p:cNvPr id="4" name="Title 3">
+            <a:extLst>
+              <a:ext uri="{FF2B5EF4-FFF2-40B4-BE49-F238E27FC236}">
+                <a16:creationId xmlns:a16="http://schemas.microsoft.com/office/drawing/2014/main" id="{B498E96C-64BE-FC49-848F-A8C5DFBE2F4F}"/>
+              </a:ext>
+            </a:extLst>
+          </p:cNvPr>
+          <p:cNvSpPr>
+            <a:spLocks noGrp="1"/>
+          </p:cNvSpPr>
+          <p:nvPr>
+            <p:ph type="ctrTitle"/>
+          </p:nvPr>
+        </p:nvSpPr>
+        <p:spPr/>
+        <p:txBody>
+          <a:bodyPr/>
           <a:lstStyle/>
           <a:p>
             <a:r>
               <a:rPr lang="en-US" dirty="0"/>
-              <a:t>Recap of previous session </a:t>
-            </a:r>
-          </a:p>
+              <a:t>Sentiment Analysis in R</a:t>
+            </a:r>
+          </a:p>
+        </p:txBody>
+      </p:sp>
+      <p:sp>
+        <p:nvSpPr>
+          <p:cNvPr id="5" name="Subtitle 4">
+            <a:extLst>
+              <a:ext uri="{FF2B5EF4-FFF2-40B4-BE49-F238E27FC236}">
+                <a16:creationId xmlns:a16="http://schemas.microsoft.com/office/drawing/2014/main" id="{8FDA3654-1A1B-7749-B5C0-2D9829A8FDD8}"/>
+              </a:ext>
+            </a:extLst>
+          </p:cNvPr>
+          <p:cNvSpPr>
+            <a:spLocks noGrp="1"/>
+          </p:cNvSpPr>
+          <p:nvPr>
+            <p:ph type="subTitle" idx="1"/>
+          </p:nvPr>
+        </p:nvSpPr>
+        <p:spPr/>
+        <p:txBody>
+          <a:bodyPr/>
+          <a:lstStyle/>
           <a:p>
             <a:r>
               <a:rPr lang="en-US" dirty="0"/>
-              <a:t>Evaluating Sentiment</a:t>
+              <a:t>Jenn Schilling</a:t>
             </a:r>
           </a:p>
           <a:p>
             <a:r>
               <a:rPr lang="en-US" dirty="0"/>
-              <a:t>Visualizing Results</a:t>
-            </a:r>
-          </a:p>
-          <a:p>
-            <a:r>
-              <a:rPr lang="en-US" dirty="0"/>
-              <a:t>Moving Beyond Words</a:t>
-            </a:r>
-          </a:p>
-          <a:p>
-            <a:r>
-              <a:rPr lang="en-US" dirty="0"/>
-              <a:t>Where to go from here </a:t>
-            </a:r>
-          </a:p>
-          <a:p>
-            <a:r>
-              <a:rPr lang="en-US" dirty="0"/>
-              <a:t>Questions</a:t>
+              <a:t>October 22, 2021</a:t>
             </a:r>
           </a:p>
         </p:txBody>
@@ -5182,7 +5555,7 @@
     </p:spTree>
     <p:extLst>
       <p:ext uri="{BB962C8B-B14F-4D97-AF65-F5344CB8AC3E}">
-        <p14:creationId xmlns:p14="http://schemas.microsoft.com/office/powerpoint/2010/main" val="1105622917"/>
+        <p14:creationId xmlns:p14="http://schemas.microsoft.com/office/powerpoint/2010/main" val="3791872727"/>
       </p:ext>
     </p:extLst>
   </p:cSld>
@@ -5346,7 +5719,7 @@
           <p:cNvPr id="2" name="Title 1">
             <a:extLst>
               <a:ext uri="{FF2B5EF4-FFF2-40B4-BE49-F238E27FC236}">
-                <a16:creationId xmlns:a16="http://schemas.microsoft.com/office/drawing/2014/main" id="{68E7F413-5848-4FF9-90FF-F4D1B37E4837}"/>
+                <a16:creationId xmlns:a16="http://schemas.microsoft.com/office/drawing/2014/main" id="{303FC117-54AE-4231-8219-69E3526E2341}"/>
               </a:ext>
             </a:extLst>
           </p:cNvPr>
@@ -5371,7 +5744,7 @@
           <a:p>
             <a:r>
               <a:rPr lang="en-US" sz="3600" dirty="0"/>
-              <a:t>Quick Recap</a:t>
+              <a:t>Day 2 Agenda</a:t>
             </a:r>
           </a:p>
         </p:txBody>
@@ -5381,7 +5754,7 @@
           <p:cNvPr id="3" name="Content Placeholder 2">
             <a:extLst>
               <a:ext uri="{FF2B5EF4-FFF2-40B4-BE49-F238E27FC236}">
-                <a16:creationId xmlns:a16="http://schemas.microsoft.com/office/drawing/2014/main" id="{A366A98A-E3CA-4E30-9B3F-09E95FB08DB4}"/>
+                <a16:creationId xmlns:a16="http://schemas.microsoft.com/office/drawing/2014/main" id="{BDAA0CD9-D632-4B6B-BF3C-73302529A4C9}"/>
               </a:ext>
             </a:extLst>
           </p:cNvPr>
@@ -5404,14 +5777,47 @@
           </a:bodyPr>
           <a:lstStyle/>
           <a:p>
-            <a:endParaRPr lang="en-US" dirty="0"/>
+            <a:r>
+              <a:rPr lang="en-US" dirty="0"/>
+              <a:t>Recap of previous session </a:t>
+            </a:r>
+          </a:p>
+          <a:p>
+            <a:r>
+              <a:rPr lang="en-US" dirty="0"/>
+              <a:t>Evaluating Sentiment</a:t>
+            </a:r>
+          </a:p>
+          <a:p>
+            <a:r>
+              <a:rPr lang="en-US" dirty="0"/>
+              <a:t>Visualizing Results</a:t>
+            </a:r>
+          </a:p>
+          <a:p>
+            <a:r>
+              <a:rPr lang="en-US" dirty="0"/>
+              <a:t>Moving Beyond Words</a:t>
+            </a:r>
+          </a:p>
+          <a:p>
+            <a:r>
+              <a:rPr lang="en-US" dirty="0"/>
+              <a:t>Where to go from here </a:t>
+            </a:r>
+          </a:p>
+          <a:p>
+            <a:r>
+              <a:rPr lang="en-US" dirty="0"/>
+              <a:t>Questions</a:t>
+            </a:r>
           </a:p>
         </p:txBody>
       </p:sp>
     </p:spTree>
     <p:extLst>
       <p:ext uri="{BB962C8B-B14F-4D97-AF65-F5344CB8AC3E}">
-        <p14:creationId xmlns:p14="http://schemas.microsoft.com/office/powerpoint/2010/main" val="1063841203"/>
+        <p14:creationId xmlns:p14="http://schemas.microsoft.com/office/powerpoint/2010/main" val="1105622917"/>
       </p:ext>
     </p:extLst>
   </p:cSld>
@@ -5422,89 +5828,6 @@
 </file>
 
 <file path=ppt/slides/slide15.xml><?xml version="1.0" encoding="utf-8"?>
-<p:sld xmlns:a="http://schemas.openxmlformats.org/drawingml/2006/main" xmlns:r="http://schemas.openxmlformats.org/officeDocument/2006/relationships" xmlns:p="http://schemas.openxmlformats.org/presentationml/2006/main">
-  <p:cSld>
-    <p:spTree>
-      <p:nvGrpSpPr>
-        <p:cNvPr id="1" name=""/>
-        <p:cNvGrpSpPr/>
-        <p:nvPr/>
-      </p:nvGrpSpPr>
-      <p:grpSpPr>
-        <a:xfrm>
-          <a:off x="0" y="0"/>
-          <a:ext cx="0" cy="0"/>
-          <a:chOff x="0" y="0"/>
-          <a:chExt cx="0" cy="0"/>
-        </a:xfrm>
-      </p:grpSpPr>
-      <p:sp>
-        <p:nvSpPr>
-          <p:cNvPr id="2" name="Title 1">
-            <a:extLst>
-              <a:ext uri="{FF2B5EF4-FFF2-40B4-BE49-F238E27FC236}">
-                <a16:creationId xmlns:a16="http://schemas.microsoft.com/office/drawing/2014/main" id="{0EB5568E-6A7C-412F-99C9-20C7929FFADE}"/>
-              </a:ext>
-            </a:extLst>
-          </p:cNvPr>
-          <p:cNvSpPr>
-            <a:spLocks noGrp="1"/>
-          </p:cNvSpPr>
-          <p:nvPr>
-            <p:ph type="title"/>
-          </p:nvPr>
-        </p:nvSpPr>
-        <p:spPr/>
-        <p:txBody>
-          <a:bodyPr/>
-          <a:lstStyle/>
-          <a:p>
-            <a:r>
-              <a:rPr lang="en-US" dirty="0"/>
-              <a:t>What insights can be gained from text and sentiment analysis?</a:t>
-            </a:r>
-          </a:p>
-        </p:txBody>
-      </p:sp>
-      <p:sp>
-        <p:nvSpPr>
-          <p:cNvPr id="3" name="Content Placeholder 2">
-            <a:extLst>
-              <a:ext uri="{FF2B5EF4-FFF2-40B4-BE49-F238E27FC236}">
-                <a16:creationId xmlns:a16="http://schemas.microsoft.com/office/drawing/2014/main" id="{86EADB23-05E2-4531-A642-95D222FF1F30}"/>
-              </a:ext>
-            </a:extLst>
-          </p:cNvPr>
-          <p:cNvSpPr>
-            <a:spLocks noGrp="1"/>
-          </p:cNvSpPr>
-          <p:nvPr>
-            <p:ph idx="1"/>
-          </p:nvPr>
-        </p:nvSpPr>
-        <p:spPr/>
-        <p:txBody>
-          <a:bodyPr/>
-          <a:lstStyle/>
-          <a:p>
-            <a:endParaRPr lang="en-US"/>
-          </a:p>
-        </p:txBody>
-      </p:sp>
-    </p:spTree>
-    <p:extLst>
-      <p:ext uri="{BB962C8B-B14F-4D97-AF65-F5344CB8AC3E}">
-        <p14:creationId xmlns:p14="http://schemas.microsoft.com/office/powerpoint/2010/main" val="2504649934"/>
-      </p:ext>
-    </p:extLst>
-  </p:cSld>
-  <p:clrMapOvr>
-    <a:masterClrMapping/>
-  </p:clrMapOvr>
-</p:sld>
-</file>
-
-<file path=ppt/slides/slide16.xml><?xml version="1.0" encoding="utf-8"?>
 <p:sld xmlns:a="http://schemas.openxmlformats.org/drawingml/2006/main" xmlns:r="http://schemas.openxmlformats.org/officeDocument/2006/relationships" xmlns:p="http://schemas.openxmlformats.org/presentationml/2006/main">
   <p:cSld>
     <p:bg>
@@ -5559,7 +5882,7 @@
           <a:p>
             <a:r>
               <a:rPr lang="en-US" sz="3600" dirty="0"/>
-              <a:t>Where to go next</a:t>
+              <a:t>Quick Recap</a:t>
             </a:r>
           </a:p>
         </p:txBody>
@@ -5592,27 +5915,6 @@
           </a:bodyPr>
           <a:lstStyle/>
           <a:p>
-            <a:pPr marL="0" indent="0">
-              <a:buNone/>
-            </a:pPr>
-            <a:r>
-              <a:rPr lang="en-US" dirty="0"/>
-              <a:t>Experiment with the provided code and data sources. </a:t>
-            </a:r>
-          </a:p>
-          <a:p>
-            <a:pPr marL="0" indent="0">
-              <a:buNone/>
-            </a:pPr>
-            <a:r>
-              <a:rPr lang="en-US" dirty="0"/>
-              <a:t>Some Resources:</a:t>
-            </a:r>
-            <a:endParaRPr lang="en-US" dirty="0">
-              <a:hlinkClick r:id="rId3"/>
-            </a:endParaRPr>
-          </a:p>
-          <a:p>
             <a:endParaRPr lang="en-US" dirty="0"/>
           </a:p>
         </p:txBody>
@@ -5620,7 +5922,90 @@
     </p:spTree>
     <p:extLst>
       <p:ext uri="{BB962C8B-B14F-4D97-AF65-F5344CB8AC3E}">
-        <p14:creationId xmlns:p14="http://schemas.microsoft.com/office/powerpoint/2010/main" val="254307914"/>
+        <p14:creationId xmlns:p14="http://schemas.microsoft.com/office/powerpoint/2010/main" val="1063841203"/>
+      </p:ext>
+    </p:extLst>
+  </p:cSld>
+  <p:clrMapOvr>
+    <a:masterClrMapping/>
+  </p:clrMapOvr>
+</p:sld>
+</file>
+
+<file path=ppt/slides/slide16.xml><?xml version="1.0" encoding="utf-8"?>
+<p:sld xmlns:a="http://schemas.openxmlformats.org/drawingml/2006/main" xmlns:r="http://schemas.openxmlformats.org/officeDocument/2006/relationships" xmlns:p="http://schemas.openxmlformats.org/presentationml/2006/main">
+  <p:cSld>
+    <p:spTree>
+      <p:nvGrpSpPr>
+        <p:cNvPr id="1" name=""/>
+        <p:cNvGrpSpPr/>
+        <p:nvPr/>
+      </p:nvGrpSpPr>
+      <p:grpSpPr>
+        <a:xfrm>
+          <a:off x="0" y="0"/>
+          <a:ext cx="0" cy="0"/>
+          <a:chOff x="0" y="0"/>
+          <a:chExt cx="0" cy="0"/>
+        </a:xfrm>
+      </p:grpSpPr>
+      <p:sp>
+        <p:nvSpPr>
+          <p:cNvPr id="2" name="Title 1">
+            <a:extLst>
+              <a:ext uri="{FF2B5EF4-FFF2-40B4-BE49-F238E27FC236}">
+                <a16:creationId xmlns:a16="http://schemas.microsoft.com/office/drawing/2014/main" id="{0EB5568E-6A7C-412F-99C9-20C7929FFADE}"/>
+              </a:ext>
+            </a:extLst>
+          </p:cNvPr>
+          <p:cNvSpPr>
+            <a:spLocks noGrp="1"/>
+          </p:cNvSpPr>
+          <p:nvPr>
+            <p:ph type="title"/>
+          </p:nvPr>
+        </p:nvSpPr>
+        <p:spPr/>
+        <p:txBody>
+          <a:bodyPr/>
+          <a:lstStyle/>
+          <a:p>
+            <a:r>
+              <a:rPr lang="en-US" dirty="0"/>
+              <a:t>What insights can be gained from text and sentiment analysis?</a:t>
+            </a:r>
+          </a:p>
+        </p:txBody>
+      </p:sp>
+      <p:sp>
+        <p:nvSpPr>
+          <p:cNvPr id="3" name="Content Placeholder 2">
+            <a:extLst>
+              <a:ext uri="{FF2B5EF4-FFF2-40B4-BE49-F238E27FC236}">
+                <a16:creationId xmlns:a16="http://schemas.microsoft.com/office/drawing/2014/main" id="{86EADB23-05E2-4531-A642-95D222FF1F30}"/>
+              </a:ext>
+            </a:extLst>
+          </p:cNvPr>
+          <p:cNvSpPr>
+            <a:spLocks noGrp="1"/>
+          </p:cNvSpPr>
+          <p:nvPr>
+            <p:ph idx="1"/>
+          </p:nvPr>
+        </p:nvSpPr>
+        <p:spPr/>
+        <p:txBody>
+          <a:bodyPr/>
+          <a:lstStyle/>
+          <a:p>
+            <a:endParaRPr lang="en-US"/>
+          </a:p>
+        </p:txBody>
+      </p:sp>
+    </p:spTree>
+    <p:extLst>
+      <p:ext uri="{BB962C8B-B14F-4D97-AF65-F5344CB8AC3E}">
+        <p14:creationId xmlns:p14="http://schemas.microsoft.com/office/powerpoint/2010/main" val="2504649934"/>
       </p:ext>
     </p:extLst>
   </p:cSld>
@@ -5660,7 +6045,7 @@
           <p:cNvPr id="2" name="Title 1">
             <a:extLst>
               <a:ext uri="{FF2B5EF4-FFF2-40B4-BE49-F238E27FC236}">
-                <a16:creationId xmlns:a16="http://schemas.microsoft.com/office/drawing/2014/main" id="{BDA1388A-4824-4A29-ADD9-8CFCC321EE86}"/>
+                <a16:creationId xmlns:a16="http://schemas.microsoft.com/office/drawing/2014/main" id="{68E7F413-5848-4FF9-90FF-F4D1B37E4837}"/>
               </a:ext>
             </a:extLst>
           </p:cNvPr>
@@ -5685,7 +6070,7 @@
           <a:p>
             <a:r>
               <a:rPr lang="en-US" sz="3600" dirty="0"/>
-              <a:t>What did we learn today?</a:t>
+              <a:t>Where to go next</a:t>
             </a:r>
           </a:p>
         </p:txBody>
@@ -5695,7 +6080,7 @@
           <p:cNvPr id="3" name="Content Placeholder 2">
             <a:extLst>
               <a:ext uri="{FF2B5EF4-FFF2-40B4-BE49-F238E27FC236}">
-                <a16:creationId xmlns:a16="http://schemas.microsoft.com/office/drawing/2014/main" id="{9CD29E42-4D8E-43A2-BF12-9FC55D34DB03}"/>
+                <a16:creationId xmlns:a16="http://schemas.microsoft.com/office/drawing/2014/main" id="{A366A98A-E3CA-4E30-9B3F-09E95FB08DB4}"/>
               </a:ext>
             </a:extLst>
           </p:cNvPr>
@@ -5718,6 +6103,27 @@
           </a:bodyPr>
           <a:lstStyle/>
           <a:p>
+            <a:pPr marL="0" indent="0">
+              <a:buNone/>
+            </a:pPr>
+            <a:r>
+              <a:rPr lang="en-US" dirty="0"/>
+              <a:t>Experiment with the provided code and data sources. </a:t>
+            </a:r>
+          </a:p>
+          <a:p>
+            <a:pPr marL="0" indent="0">
+              <a:buNone/>
+            </a:pPr>
+            <a:r>
+              <a:rPr lang="en-US" dirty="0"/>
+              <a:t>Some Resources:</a:t>
+            </a:r>
+            <a:endParaRPr lang="en-US" dirty="0">
+              <a:hlinkClick r:id="rId3"/>
+            </a:endParaRPr>
+          </a:p>
+          <a:p>
             <a:endParaRPr lang="en-US" dirty="0"/>
           </a:p>
         </p:txBody>
@@ -5725,7 +6131,7 @@
     </p:spTree>
     <p:extLst>
       <p:ext uri="{BB962C8B-B14F-4D97-AF65-F5344CB8AC3E}">
-        <p14:creationId xmlns:p14="http://schemas.microsoft.com/office/powerpoint/2010/main" val="182398492"/>
+        <p14:creationId xmlns:p14="http://schemas.microsoft.com/office/powerpoint/2010/main" val="254307914"/>
       </p:ext>
     </p:extLst>
   </p:cSld>
@@ -5736,64 +6142,6 @@
 </file>
 
 <file path=ppt/slides/slide18.xml><?xml version="1.0" encoding="utf-8"?>
-<p:sld xmlns:a="http://schemas.openxmlformats.org/drawingml/2006/main" xmlns:r="http://schemas.openxmlformats.org/officeDocument/2006/relationships" xmlns:p="http://schemas.openxmlformats.org/presentationml/2006/main">
-  <p:cSld>
-    <p:spTree>
-      <p:nvGrpSpPr>
-        <p:cNvPr id="1" name=""/>
-        <p:cNvGrpSpPr/>
-        <p:nvPr/>
-      </p:nvGrpSpPr>
-      <p:grpSpPr>
-        <a:xfrm>
-          <a:off x="0" y="0"/>
-          <a:ext cx="0" cy="0"/>
-          <a:chOff x="0" y="0"/>
-          <a:chExt cx="0" cy="0"/>
-        </a:xfrm>
-      </p:grpSpPr>
-      <p:sp>
-        <p:nvSpPr>
-          <p:cNvPr id="4" name="Title 3">
-            <a:extLst>
-              <a:ext uri="{FF2B5EF4-FFF2-40B4-BE49-F238E27FC236}">
-                <a16:creationId xmlns:a16="http://schemas.microsoft.com/office/drawing/2014/main" id="{B86A4B02-4000-49F6-A883-1F84DEF62767}"/>
-              </a:ext>
-            </a:extLst>
-          </p:cNvPr>
-          <p:cNvSpPr>
-            <a:spLocks noGrp="1"/>
-          </p:cNvSpPr>
-          <p:nvPr>
-            <p:ph type="ctrTitle"/>
-          </p:nvPr>
-        </p:nvSpPr>
-        <p:spPr/>
-        <p:txBody>
-          <a:bodyPr/>
-          <a:lstStyle/>
-          <a:p>
-            <a:r>
-              <a:rPr lang="en-US" dirty="0"/>
-              <a:t>Questions</a:t>
-            </a:r>
-          </a:p>
-        </p:txBody>
-      </p:sp>
-    </p:spTree>
-    <p:extLst>
-      <p:ext uri="{BB962C8B-B14F-4D97-AF65-F5344CB8AC3E}">
-        <p14:creationId xmlns:p14="http://schemas.microsoft.com/office/powerpoint/2010/main" val="2093359691"/>
-      </p:ext>
-    </p:extLst>
-  </p:cSld>
-  <p:clrMapOvr>
-    <a:masterClrMapping/>
-  </p:clrMapOvr>
-</p:sld>
-</file>
-
-<file path=ppt/slides/slide19.xml><?xml version="1.0" encoding="utf-8"?>
 <p:sld xmlns:a="http://schemas.openxmlformats.org/drawingml/2006/main" xmlns:r="http://schemas.openxmlformats.org/officeDocument/2006/relationships" xmlns:p="http://schemas.openxmlformats.org/presentationml/2006/main">
   <p:cSld>
     <p:bg>
@@ -5848,7 +6196,7 @@
           <a:p>
             <a:r>
               <a:rPr lang="en-US" sz="3600" dirty="0"/>
-              <a:t>References</a:t>
+              <a:t>What did we learn today?</a:t>
             </a:r>
           </a:p>
         </p:txBody>
@@ -5871,8 +6219,8 @@
         </p:nvSpPr>
         <p:spPr>
           <a:xfrm>
-            <a:off x="1014060" y="1782981"/>
-            <a:ext cx="9904908" cy="4393982"/>
+            <a:off x="643467" y="1782981"/>
+            <a:ext cx="10905066" cy="4393982"/>
           </a:xfrm>
         </p:spPr>
         <p:txBody>
@@ -5881,29 +6229,72 @@
           </a:bodyPr>
           <a:lstStyle/>
           <a:p>
-            <a:pPr marL="0" indent="0">
-              <a:buNone/>
-            </a:pPr>
-            <a:endParaRPr lang="en-US" sz="2000" dirty="0"/>
-          </a:p>
-          <a:p>
-            <a:pPr marL="0" indent="0">
-              <a:buNone/>
-            </a:pPr>
-            <a:endParaRPr lang="en-US" sz="2000" dirty="0"/>
-          </a:p>
-          <a:p>
-            <a:pPr marL="0" indent="0">
-              <a:buNone/>
-            </a:pPr>
-            <a:endParaRPr lang="en-US" sz="2000" dirty="0"/>
+            <a:endParaRPr lang="en-US" dirty="0"/>
           </a:p>
         </p:txBody>
       </p:sp>
     </p:spTree>
     <p:extLst>
       <p:ext uri="{BB962C8B-B14F-4D97-AF65-F5344CB8AC3E}">
-        <p14:creationId xmlns:p14="http://schemas.microsoft.com/office/powerpoint/2010/main" val="3518840135"/>
+        <p14:creationId xmlns:p14="http://schemas.microsoft.com/office/powerpoint/2010/main" val="182398492"/>
+      </p:ext>
+    </p:extLst>
+  </p:cSld>
+  <p:clrMapOvr>
+    <a:masterClrMapping/>
+  </p:clrMapOvr>
+</p:sld>
+</file>
+
+<file path=ppt/slides/slide19.xml><?xml version="1.0" encoding="utf-8"?>
+<p:sld xmlns:a="http://schemas.openxmlformats.org/drawingml/2006/main" xmlns:r="http://schemas.openxmlformats.org/officeDocument/2006/relationships" xmlns:p="http://schemas.openxmlformats.org/presentationml/2006/main">
+  <p:cSld>
+    <p:spTree>
+      <p:nvGrpSpPr>
+        <p:cNvPr id="1" name=""/>
+        <p:cNvGrpSpPr/>
+        <p:nvPr/>
+      </p:nvGrpSpPr>
+      <p:grpSpPr>
+        <a:xfrm>
+          <a:off x="0" y="0"/>
+          <a:ext cx="0" cy="0"/>
+          <a:chOff x="0" y="0"/>
+          <a:chExt cx="0" cy="0"/>
+        </a:xfrm>
+      </p:grpSpPr>
+      <p:sp>
+        <p:nvSpPr>
+          <p:cNvPr id="4" name="Title 3">
+            <a:extLst>
+              <a:ext uri="{FF2B5EF4-FFF2-40B4-BE49-F238E27FC236}">
+                <a16:creationId xmlns:a16="http://schemas.microsoft.com/office/drawing/2014/main" id="{B86A4B02-4000-49F6-A883-1F84DEF62767}"/>
+              </a:ext>
+            </a:extLst>
+          </p:cNvPr>
+          <p:cNvSpPr>
+            <a:spLocks noGrp="1"/>
+          </p:cNvSpPr>
+          <p:nvPr>
+            <p:ph type="ctrTitle"/>
+          </p:nvPr>
+        </p:nvSpPr>
+        <p:spPr/>
+        <p:txBody>
+          <a:bodyPr/>
+          <a:lstStyle/>
+          <a:p>
+            <a:r>
+              <a:rPr lang="en-US" dirty="0"/>
+              <a:t>Questions</a:t>
+            </a:r>
+          </a:p>
+        </p:txBody>
+      </p:sp>
+    </p:spTree>
+    <p:extLst>
+      <p:ext uri="{BB962C8B-B14F-4D97-AF65-F5344CB8AC3E}">
+        <p14:creationId xmlns:p14="http://schemas.microsoft.com/office/powerpoint/2010/main" val="2093359691"/>
       </p:ext>
     </p:extLst>
   </p:cSld>
@@ -6118,6 +6509,126 @@
 </p:sld>
 </file>
 
+<file path=ppt/slides/slide20.xml><?xml version="1.0" encoding="utf-8"?>
+<p:sld xmlns:a="http://schemas.openxmlformats.org/drawingml/2006/main" xmlns:r="http://schemas.openxmlformats.org/officeDocument/2006/relationships" xmlns:p="http://schemas.openxmlformats.org/presentationml/2006/main">
+  <p:cSld>
+    <p:bg>
+      <p:bgPr>
+        <a:solidFill>
+          <a:schemeClr val="bg1"/>
+        </a:solidFill>
+        <a:effectLst/>
+      </p:bgPr>
+    </p:bg>
+    <p:spTree>
+      <p:nvGrpSpPr>
+        <p:cNvPr id="1" name=""/>
+        <p:cNvGrpSpPr/>
+        <p:nvPr/>
+      </p:nvGrpSpPr>
+      <p:grpSpPr>
+        <a:xfrm>
+          <a:off x="0" y="0"/>
+          <a:ext cx="0" cy="0"/>
+          <a:chOff x="0" y="0"/>
+          <a:chExt cx="0" cy="0"/>
+        </a:xfrm>
+      </p:grpSpPr>
+      <p:sp>
+        <p:nvSpPr>
+          <p:cNvPr id="2" name="Title 1">
+            <a:extLst>
+              <a:ext uri="{FF2B5EF4-FFF2-40B4-BE49-F238E27FC236}">
+                <a16:creationId xmlns:a16="http://schemas.microsoft.com/office/drawing/2014/main" id="{BDA1388A-4824-4A29-ADD9-8CFCC321EE86}"/>
+              </a:ext>
+            </a:extLst>
+          </p:cNvPr>
+          <p:cNvSpPr>
+            <a:spLocks noGrp="1"/>
+          </p:cNvSpPr>
+          <p:nvPr>
+            <p:ph type="title"/>
+          </p:nvPr>
+        </p:nvSpPr>
+        <p:spPr>
+          <a:xfrm>
+            <a:off x="643467" y="321734"/>
+            <a:ext cx="10905066" cy="1135737"/>
+          </a:xfrm>
+        </p:spPr>
+        <p:txBody>
+          <a:bodyPr>
+            <a:normAutofit/>
+          </a:bodyPr>
+          <a:lstStyle/>
+          <a:p>
+            <a:r>
+              <a:rPr lang="en-US" sz="3600" dirty="0"/>
+              <a:t>References</a:t>
+            </a:r>
+          </a:p>
+        </p:txBody>
+      </p:sp>
+      <p:sp>
+        <p:nvSpPr>
+          <p:cNvPr id="3" name="Content Placeholder 2">
+            <a:extLst>
+              <a:ext uri="{FF2B5EF4-FFF2-40B4-BE49-F238E27FC236}">
+                <a16:creationId xmlns:a16="http://schemas.microsoft.com/office/drawing/2014/main" id="{9CD29E42-4D8E-43A2-BF12-9FC55D34DB03}"/>
+              </a:ext>
+            </a:extLst>
+          </p:cNvPr>
+          <p:cNvSpPr>
+            <a:spLocks noGrp="1"/>
+          </p:cNvSpPr>
+          <p:nvPr>
+            <p:ph idx="1"/>
+          </p:nvPr>
+        </p:nvSpPr>
+        <p:spPr>
+          <a:xfrm>
+            <a:off x="1014060" y="1782981"/>
+            <a:ext cx="9904908" cy="4393982"/>
+          </a:xfrm>
+        </p:spPr>
+        <p:txBody>
+          <a:bodyPr>
+            <a:normAutofit/>
+          </a:bodyPr>
+          <a:lstStyle/>
+          <a:p>
+            <a:pPr marL="0" indent="0">
+              <a:buNone/>
+            </a:pPr>
+            <a:endParaRPr lang="en-US" sz="2000" dirty="0"/>
+          </a:p>
+          <a:p>
+            <a:pPr marL="0" indent="0">
+              <a:buNone/>
+            </a:pPr>
+            <a:endParaRPr lang="en-US" sz="2000" dirty="0"/>
+          </a:p>
+          <a:p>
+            <a:pPr marL="0" indent="0">
+              <a:buNone/>
+            </a:pPr>
+            <a:endParaRPr lang="en-US" sz="2000" dirty="0"/>
+          </a:p>
+        </p:txBody>
+      </p:sp>
+    </p:spTree>
+    <p:extLst>
+      <p:ext uri="{BB962C8B-B14F-4D97-AF65-F5344CB8AC3E}">
+        <p14:creationId xmlns:p14="http://schemas.microsoft.com/office/powerpoint/2010/main" val="3518840135"/>
+      </p:ext>
+    </p:extLst>
+  </p:cSld>
+  <p:clrMapOvr>
+    <a:masterClrMapping/>
+  </p:clrMapOvr>
+</p:sld>
+</file>
+
 <file path=ppt/slides/slide3.xml><?xml version="1.0" encoding="utf-8"?>
 <p:sld xmlns:a="http://schemas.openxmlformats.org/drawingml/2006/main" xmlns:r="http://schemas.openxmlformats.org/officeDocument/2006/relationships" xmlns:p="http://schemas.openxmlformats.org/presentationml/2006/main">
   <p:cSld>
@@ -6148,7 +6659,7 @@
           <p:cNvPr id="2" name="Title 1">
             <a:extLst>
               <a:ext uri="{FF2B5EF4-FFF2-40B4-BE49-F238E27FC236}">
-                <a16:creationId xmlns:a16="http://schemas.microsoft.com/office/drawing/2014/main" id="{303FC117-54AE-4231-8219-69E3526E2341}"/>
+                <a16:creationId xmlns:a16="http://schemas.microsoft.com/office/drawing/2014/main" id="{68E7F413-5848-4FF9-90FF-F4D1B37E4837}"/>
               </a:ext>
             </a:extLst>
           </p:cNvPr>
@@ -6159,7 +6670,12 @@
             <p:ph type="title"/>
           </p:nvPr>
         </p:nvSpPr>
-        <p:spPr/>
+        <p:spPr>
+          <a:xfrm>
+            <a:off x="643467" y="321734"/>
+            <a:ext cx="10905066" cy="1135737"/>
+          </a:xfrm>
+        </p:spPr>
         <p:txBody>
           <a:bodyPr>
             <a:normAutofit/>
@@ -6168,7 +6684,7 @@
           <a:p>
             <a:r>
               <a:rPr lang="en-US" sz="3600" dirty="0"/>
-              <a:t>Day 1 Agenda</a:t>
+              <a:t>Learning Outcomes</a:t>
             </a:r>
           </a:p>
         </p:txBody>
@@ -6178,7 +6694,7 @@
           <p:cNvPr id="3" name="Content Placeholder 2">
             <a:extLst>
               <a:ext uri="{FF2B5EF4-FFF2-40B4-BE49-F238E27FC236}">
-                <a16:creationId xmlns:a16="http://schemas.microsoft.com/office/drawing/2014/main" id="{BDAA0CD9-D632-4B6B-BF3C-73302529A4C9}"/>
+                <a16:creationId xmlns:a16="http://schemas.microsoft.com/office/drawing/2014/main" id="{A366A98A-E3CA-4E30-9B3F-09E95FB08DB4}"/>
               </a:ext>
             </a:extLst>
           </p:cNvPr>
@@ -6189,46 +6705,45 @@
             <p:ph idx="1"/>
           </p:nvPr>
         </p:nvSpPr>
-        <p:spPr/>
+        <p:spPr>
+          <a:xfrm>
+            <a:off x="643467" y="1782981"/>
+            <a:ext cx="10905066" cy="4393982"/>
+          </a:xfrm>
+        </p:spPr>
         <p:txBody>
           <a:bodyPr>
             <a:normAutofit/>
           </a:bodyPr>
           <a:lstStyle/>
           <a:p>
+            <a:pPr>
+              <a:buFont typeface="Arial" panose="020B0604020202020204" pitchFamily="34" charset="0"/>
+              <a:buChar char="•"/>
+            </a:pPr>
             <a:r>
               <a:rPr lang="en-US" dirty="0"/>
-              <a:t>Introduction to Text &amp; Sentiment Analysis</a:t>
-            </a:r>
-          </a:p>
-          <a:p>
+              <a:t>Prepare data for a text analysis in R</a:t>
+            </a:r>
+          </a:p>
+          <a:p>
+            <a:pPr>
+              <a:buFont typeface="Arial" panose="020B0604020202020204" pitchFamily="34" charset="0"/>
+              <a:buChar char="•"/>
+            </a:pPr>
             <a:r>
               <a:rPr lang="en-US" dirty="0"/>
-              <a:t>R Set-Up</a:t>
-            </a:r>
-          </a:p>
-          <a:p>
+              <a:t>Conduct text mining in R</a:t>
+            </a:r>
+          </a:p>
+          <a:p>
+            <a:pPr>
+              <a:buFont typeface="Arial" panose="020B0604020202020204" pitchFamily="34" charset="0"/>
+              <a:buChar char="•"/>
+            </a:pPr>
             <a:r>
               <a:rPr lang="en-US" dirty="0"/>
-              <a:t>Data Processing</a:t>
-            </a:r>
-          </a:p>
-          <a:p>
-            <a:r>
-              <a:rPr lang="en-US" dirty="0"/>
-              <a:t>Tokenizing</a:t>
-            </a:r>
-          </a:p>
-          <a:p>
-            <a:r>
-              <a:rPr lang="en-US" dirty="0"/>
-              <a:t>Word Frequencies </a:t>
-            </a:r>
-          </a:p>
-          <a:p>
-            <a:r>
-              <a:rPr lang="en-US" dirty="0"/>
-              <a:t>Questions</a:t>
+              <a:t>Complete sentiment analysis in R</a:t>
             </a:r>
           </a:p>
         </p:txBody>
@@ -6236,7 +6751,7 @@
     </p:spTree>
     <p:extLst>
       <p:ext uri="{BB962C8B-B14F-4D97-AF65-F5344CB8AC3E}">
-        <p14:creationId xmlns:p14="http://schemas.microsoft.com/office/powerpoint/2010/main" val="1916753367"/>
+        <p14:creationId xmlns:p14="http://schemas.microsoft.com/office/powerpoint/2010/main" val="3265437436"/>
       </p:ext>
     </p:extLst>
   </p:cSld>
@@ -6249,6 +6764,14 @@
 <file path=ppt/slides/slide4.xml><?xml version="1.0" encoding="utf-8"?>
 <p:sld xmlns:a="http://schemas.openxmlformats.org/drawingml/2006/main" xmlns:r="http://schemas.openxmlformats.org/officeDocument/2006/relationships" xmlns:p="http://schemas.openxmlformats.org/presentationml/2006/main">
   <p:cSld>
+    <p:bg>
+      <p:bgPr>
+        <a:solidFill>
+          <a:schemeClr val="bg1"/>
+        </a:solidFill>
+        <a:effectLst/>
+      </p:bgPr>
+    </p:bg>
     <p:spTree>
       <p:nvGrpSpPr>
         <p:cNvPr id="1" name=""/>
@@ -6268,7 +6791,7 @@
           <p:cNvPr id="2" name="Title 1">
             <a:extLst>
               <a:ext uri="{FF2B5EF4-FFF2-40B4-BE49-F238E27FC236}">
-                <a16:creationId xmlns:a16="http://schemas.microsoft.com/office/drawing/2014/main" id="{8F3F6C8D-C7C5-44B9-B201-1F96B16478C5}"/>
+                <a16:creationId xmlns:a16="http://schemas.microsoft.com/office/drawing/2014/main" id="{303FC117-54AE-4231-8219-69E3526E2341}"/>
               </a:ext>
             </a:extLst>
           </p:cNvPr>
@@ -6281,45 +6804,82 @@
         </p:nvSpPr>
         <p:spPr/>
         <p:txBody>
-          <a:bodyPr/>
+          <a:bodyPr>
+            <a:normAutofit/>
+          </a:bodyPr>
+          <a:lstStyle/>
+          <a:p>
+            <a:r>
+              <a:rPr lang="en-US" sz="3600" dirty="0"/>
+              <a:t>Day 1 Agenda</a:t>
+            </a:r>
+          </a:p>
+        </p:txBody>
+      </p:sp>
+      <p:sp>
+        <p:nvSpPr>
+          <p:cNvPr id="3" name="Content Placeholder 2">
+            <a:extLst>
+              <a:ext uri="{FF2B5EF4-FFF2-40B4-BE49-F238E27FC236}">
+                <a16:creationId xmlns:a16="http://schemas.microsoft.com/office/drawing/2014/main" id="{BDAA0CD9-D632-4B6B-BF3C-73302529A4C9}"/>
+              </a:ext>
+            </a:extLst>
+          </p:cNvPr>
+          <p:cNvSpPr>
+            <a:spLocks noGrp="1"/>
+          </p:cNvSpPr>
+          <p:nvPr>
+            <p:ph idx="1"/>
+          </p:nvPr>
+        </p:nvSpPr>
+        <p:spPr/>
+        <p:txBody>
+          <a:bodyPr>
+            <a:normAutofit/>
+          </a:bodyPr>
           <a:lstStyle/>
           <a:p>
             <a:r>
               <a:rPr lang="en-US" dirty="0"/>
-              <a:t>What is text analysis?</a:t>
-            </a:r>
-          </a:p>
-        </p:txBody>
-      </p:sp>
-      <p:sp>
-        <p:nvSpPr>
-          <p:cNvPr id="3" name="Content Placeholder 2">
-            <a:extLst>
-              <a:ext uri="{FF2B5EF4-FFF2-40B4-BE49-F238E27FC236}">
-                <a16:creationId xmlns:a16="http://schemas.microsoft.com/office/drawing/2014/main" id="{6C6DDE67-868B-4DE7-9C92-72769257527A}"/>
-              </a:ext>
-            </a:extLst>
-          </p:cNvPr>
-          <p:cNvSpPr>
-            <a:spLocks noGrp="1"/>
-          </p:cNvSpPr>
-          <p:nvPr>
-            <p:ph idx="1"/>
-          </p:nvPr>
-        </p:nvSpPr>
-        <p:spPr/>
-        <p:txBody>
-          <a:bodyPr/>
-          <a:lstStyle/>
-          <a:p>
-            <a:endParaRPr lang="en-US"/>
+              <a:t>Introduction to Text &amp; Sentiment Analysis</a:t>
+            </a:r>
+          </a:p>
+          <a:p>
+            <a:r>
+              <a:rPr lang="en-US" dirty="0"/>
+              <a:t>R Set-Up</a:t>
+            </a:r>
+          </a:p>
+          <a:p>
+            <a:r>
+              <a:rPr lang="en-US" dirty="0"/>
+              <a:t>Data Processing</a:t>
+            </a:r>
+          </a:p>
+          <a:p>
+            <a:r>
+              <a:rPr lang="en-US" dirty="0"/>
+              <a:t>Tokenizing</a:t>
+            </a:r>
+          </a:p>
+          <a:p>
+            <a:r>
+              <a:rPr lang="en-US" dirty="0"/>
+              <a:t>Word Frequencies </a:t>
+            </a:r>
+          </a:p>
+          <a:p>
+            <a:r>
+              <a:rPr lang="en-US" dirty="0"/>
+              <a:t>Questions</a:t>
+            </a:r>
           </a:p>
         </p:txBody>
       </p:sp>
     </p:spTree>
     <p:extLst>
       <p:ext uri="{BB962C8B-B14F-4D97-AF65-F5344CB8AC3E}">
-        <p14:creationId xmlns:p14="http://schemas.microsoft.com/office/powerpoint/2010/main" val="792072978"/>
+        <p14:creationId xmlns:p14="http://schemas.microsoft.com/office/powerpoint/2010/main" val="1916753367"/>
       </p:ext>
     </p:extLst>
   </p:cSld>
@@ -6351,15 +6911,15 @@
           <p:cNvPr id="2" name="Title 1">
             <a:extLst>
               <a:ext uri="{FF2B5EF4-FFF2-40B4-BE49-F238E27FC236}">
-                <a16:creationId xmlns:a16="http://schemas.microsoft.com/office/drawing/2014/main" id="{9EE3DD11-BDBF-4438-A86A-88C077BFDD6A}"/>
-              </a:ext>
-            </a:extLst>
-          </p:cNvPr>
-          <p:cNvSpPr>
-            <a:spLocks noGrp="1"/>
-          </p:cNvSpPr>
-          <p:nvPr>
-            <p:ph type="title"/>
+                <a16:creationId xmlns:a16="http://schemas.microsoft.com/office/drawing/2014/main" id="{8F3F6C8D-C7C5-44B9-B201-1F96B16478C5}"/>
+              </a:ext>
+            </a:extLst>
+          </p:cNvPr>
+          <p:cNvSpPr>
+            <a:spLocks noGrp="1"/>
+          </p:cNvSpPr>
+          <p:nvPr>
+            <p:ph type="ctrTitle"/>
           </p:nvPr>
         </p:nvSpPr>
         <p:spPr/>
@@ -6369,25 +6929,25 @@
           <a:p>
             <a:r>
               <a:rPr lang="en-US" dirty="0"/>
-              <a:t>What is sentiment analysis?</a:t>
-            </a:r>
-          </a:p>
-        </p:txBody>
-      </p:sp>
-      <p:sp>
-        <p:nvSpPr>
-          <p:cNvPr id="3" name="Content Placeholder 2">
-            <a:extLst>
-              <a:ext uri="{FF2B5EF4-FFF2-40B4-BE49-F238E27FC236}">
-                <a16:creationId xmlns:a16="http://schemas.microsoft.com/office/drawing/2014/main" id="{13ED34A2-2FED-4904-816B-E8EF6801836A}"/>
-              </a:ext>
-            </a:extLst>
-          </p:cNvPr>
-          <p:cNvSpPr>
-            <a:spLocks noGrp="1"/>
-          </p:cNvSpPr>
-          <p:nvPr>
-            <p:ph idx="1"/>
+              <a:t>What is text analysis?</a:t>
+            </a:r>
+          </a:p>
+        </p:txBody>
+      </p:sp>
+      <p:sp>
+        <p:nvSpPr>
+          <p:cNvPr id="4" name="Subtitle 3">
+            <a:extLst>
+              <a:ext uri="{FF2B5EF4-FFF2-40B4-BE49-F238E27FC236}">
+                <a16:creationId xmlns:a16="http://schemas.microsoft.com/office/drawing/2014/main" id="{A4895290-8209-4102-B8F4-2A8AD83C8F4D}"/>
+              </a:ext>
+            </a:extLst>
+          </p:cNvPr>
+          <p:cNvSpPr>
+            <a:spLocks noGrp="1"/>
+          </p:cNvSpPr>
+          <p:nvPr>
+            <p:ph type="subTitle" idx="1"/>
           </p:nvPr>
         </p:nvSpPr>
         <p:spPr/>
@@ -6402,7 +6962,7 @@
     </p:spTree>
     <p:extLst>
       <p:ext uri="{BB962C8B-B14F-4D97-AF65-F5344CB8AC3E}">
-        <p14:creationId xmlns:p14="http://schemas.microsoft.com/office/powerpoint/2010/main" val="1484413891"/>
+        <p14:creationId xmlns:p14="http://schemas.microsoft.com/office/powerpoint/2010/main" val="792072978"/>
       </p:ext>
     </p:extLst>
   </p:cSld>
@@ -6434,15 +6994,15 @@
           <p:cNvPr id="2" name="Title 1">
             <a:extLst>
               <a:ext uri="{FF2B5EF4-FFF2-40B4-BE49-F238E27FC236}">
-                <a16:creationId xmlns:a16="http://schemas.microsoft.com/office/drawing/2014/main" id="{C7EBA0B0-4B45-43E2-8946-767BD898F096}"/>
-              </a:ext>
-            </a:extLst>
-          </p:cNvPr>
-          <p:cNvSpPr>
-            <a:spLocks noGrp="1"/>
-          </p:cNvSpPr>
-          <p:nvPr>
-            <p:ph type="title"/>
+                <a16:creationId xmlns:a16="http://schemas.microsoft.com/office/drawing/2014/main" id="{9EE3DD11-BDBF-4438-A86A-88C077BFDD6A}"/>
+              </a:ext>
+            </a:extLst>
+          </p:cNvPr>
+          <p:cNvSpPr>
+            <a:spLocks noGrp="1"/>
+          </p:cNvSpPr>
+          <p:nvPr>
+            <p:ph type="ctrTitle"/>
           </p:nvPr>
         </p:nvSpPr>
         <p:spPr/>
@@ -6452,25 +7012,25 @@
           <a:p>
             <a:r>
               <a:rPr lang="en-US" dirty="0"/>
-              <a:t>Why is it useful?</a:t>
-            </a:r>
-          </a:p>
-        </p:txBody>
-      </p:sp>
-      <p:sp>
-        <p:nvSpPr>
-          <p:cNvPr id="3" name="Content Placeholder 2">
-            <a:extLst>
-              <a:ext uri="{FF2B5EF4-FFF2-40B4-BE49-F238E27FC236}">
-                <a16:creationId xmlns:a16="http://schemas.microsoft.com/office/drawing/2014/main" id="{8CC0829B-D692-4887-BF13-96FB84145A62}"/>
-              </a:ext>
-            </a:extLst>
-          </p:cNvPr>
-          <p:cNvSpPr>
-            <a:spLocks noGrp="1"/>
-          </p:cNvSpPr>
-          <p:nvPr>
-            <p:ph idx="1"/>
+              <a:t>What is sentiment analysis?</a:t>
+            </a:r>
+          </a:p>
+        </p:txBody>
+      </p:sp>
+      <p:sp>
+        <p:nvSpPr>
+          <p:cNvPr id="4" name="Subtitle 3">
+            <a:extLst>
+              <a:ext uri="{FF2B5EF4-FFF2-40B4-BE49-F238E27FC236}">
+                <a16:creationId xmlns:a16="http://schemas.microsoft.com/office/drawing/2014/main" id="{9899B9B8-42D3-420C-B136-760653B0EA30}"/>
+              </a:ext>
+            </a:extLst>
+          </p:cNvPr>
+          <p:cNvSpPr>
+            <a:spLocks noGrp="1"/>
+          </p:cNvSpPr>
+          <p:nvPr>
+            <p:ph type="subTitle" idx="1"/>
           </p:nvPr>
         </p:nvSpPr>
         <p:spPr/>
@@ -6478,17 +7038,14 @@
           <a:bodyPr/>
           <a:lstStyle/>
           <a:p>
-            <a:r>
-              <a:rPr lang="en-US" dirty="0"/>
-              <a:t>Applications to IR</a:t>
-            </a:r>
+            <a:endParaRPr lang="en-US"/>
           </a:p>
         </p:txBody>
       </p:sp>
     </p:spTree>
     <p:extLst>
       <p:ext uri="{BB962C8B-B14F-4D97-AF65-F5344CB8AC3E}">
-        <p14:creationId xmlns:p14="http://schemas.microsoft.com/office/powerpoint/2010/main" val="3936930374"/>
+        <p14:creationId xmlns:p14="http://schemas.microsoft.com/office/powerpoint/2010/main" val="1484413891"/>
       </p:ext>
     </p:extLst>
   </p:cSld>
@@ -6520,15 +7077,15 @@
           <p:cNvPr id="2" name="Title 1">
             <a:extLst>
               <a:ext uri="{FF2B5EF4-FFF2-40B4-BE49-F238E27FC236}">
-                <a16:creationId xmlns:a16="http://schemas.microsoft.com/office/drawing/2014/main" id="{9EA6827B-A758-47AC-85C0-91057C864B35}"/>
-              </a:ext>
-            </a:extLst>
-          </p:cNvPr>
-          <p:cNvSpPr>
-            <a:spLocks noGrp="1"/>
-          </p:cNvSpPr>
-          <p:nvPr>
-            <p:ph type="title"/>
+                <a16:creationId xmlns:a16="http://schemas.microsoft.com/office/drawing/2014/main" id="{C7EBA0B0-4B45-43E2-8946-767BD898F096}"/>
+              </a:ext>
+            </a:extLst>
+          </p:cNvPr>
+          <p:cNvSpPr>
+            <a:spLocks noGrp="1"/>
+          </p:cNvSpPr>
+          <p:nvPr>
+            <p:ph type="ctrTitle"/>
           </p:nvPr>
         </p:nvSpPr>
         <p:spPr/>
@@ -6536,7 +7093,10 @@
           <a:bodyPr/>
           <a:lstStyle/>
           <a:p>
-            <a:endParaRPr lang="en-US"/>
+            <a:r>
+              <a:rPr lang="en-US" dirty="0"/>
+              <a:t>Why is it useful?</a:t>
+            </a:r>
           </a:p>
         </p:txBody>
       </p:sp>
@@ -6545,15 +7105,15 @@
           <p:cNvPr id="3" name="Content Placeholder 2">
             <a:extLst>
               <a:ext uri="{FF2B5EF4-FFF2-40B4-BE49-F238E27FC236}">
-                <a16:creationId xmlns:a16="http://schemas.microsoft.com/office/drawing/2014/main" id="{25AEF62F-B79A-41BA-B3B4-E2AB85BC5D41}"/>
-              </a:ext>
-            </a:extLst>
-          </p:cNvPr>
-          <p:cNvSpPr>
-            <a:spLocks noGrp="1"/>
-          </p:cNvSpPr>
-          <p:nvPr>
-            <p:ph idx="1"/>
+                <a16:creationId xmlns:a16="http://schemas.microsoft.com/office/drawing/2014/main" id="{8CC0829B-D692-4887-BF13-96FB84145A62}"/>
+              </a:ext>
+            </a:extLst>
+          </p:cNvPr>
+          <p:cNvSpPr>
+            <a:spLocks noGrp="1"/>
+          </p:cNvSpPr>
+          <p:nvPr>
+            <p:ph type="subTitle" idx="1"/>
           </p:nvPr>
         </p:nvSpPr>
         <p:spPr/>
@@ -6561,14 +7121,14 @@
           <a:bodyPr/>
           <a:lstStyle/>
           <a:p>
-            <a:endParaRPr lang="en-US"/>
+            <a:endParaRPr lang="en-US" dirty="0"/>
           </a:p>
         </p:txBody>
       </p:sp>
     </p:spTree>
     <p:extLst>
       <p:ext uri="{BB962C8B-B14F-4D97-AF65-F5344CB8AC3E}">
-        <p14:creationId xmlns:p14="http://schemas.microsoft.com/office/powerpoint/2010/main" val="3490687795"/>
+        <p14:creationId xmlns:p14="http://schemas.microsoft.com/office/powerpoint/2010/main" val="3936930374"/>
       </p:ext>
     </p:extLst>
   </p:cSld>
@@ -6581,14 +7141,6 @@
 <file path=ppt/slides/slide8.xml><?xml version="1.0" encoding="utf-8"?>
 <p:sld xmlns:a="http://schemas.openxmlformats.org/drawingml/2006/main" xmlns:r="http://schemas.openxmlformats.org/officeDocument/2006/relationships" xmlns:p="http://schemas.openxmlformats.org/presentationml/2006/main">
   <p:cSld>
-    <p:bg>
-      <p:bgPr>
-        <a:solidFill>
-          <a:schemeClr val="bg1"/>
-        </a:solidFill>
-        <a:effectLst/>
-      </p:bgPr>
-    </p:bg>
     <p:spTree>
       <p:nvGrpSpPr>
         <p:cNvPr id="1" name=""/>
@@ -6603,96 +7155,137 @@
           <a:chExt cx="0" cy="0"/>
         </a:xfrm>
       </p:grpSpPr>
-      <p:sp>
-        <p:nvSpPr>
-          <p:cNvPr id="2" name="Title 1">
-            <a:extLst>
-              <a:ext uri="{FF2B5EF4-FFF2-40B4-BE49-F238E27FC236}">
-                <a16:creationId xmlns:a16="http://schemas.microsoft.com/office/drawing/2014/main" id="{68E7F413-5848-4FF9-90FF-F4D1B37E4837}"/>
-              </a:ext>
-            </a:extLst>
-          </p:cNvPr>
-          <p:cNvSpPr>
-            <a:spLocks noGrp="1"/>
-          </p:cNvSpPr>
-          <p:nvPr>
-            <p:ph type="title"/>
-          </p:nvPr>
+      <p:pic>
+        <p:nvPicPr>
+          <p:cNvPr id="7170" name="Picture 2">
+            <a:extLst>
+              <a:ext uri="{FF2B5EF4-FFF2-40B4-BE49-F238E27FC236}">
+                <a16:creationId xmlns:a16="http://schemas.microsoft.com/office/drawing/2014/main" id="{C186A01D-08FB-4F8C-AF97-9DD16D3655A7}"/>
+              </a:ext>
+            </a:extLst>
+          </p:cNvPr>
+          <p:cNvPicPr>
+            <a:picLocks noGrp="1" noChangeAspect="1" noChangeArrowheads="1"/>
+          </p:cNvPicPr>
+          <p:nvPr>
+            <p:ph idx="1"/>
+          </p:nvPr>
+        </p:nvPicPr>
+        <p:blipFill>
+          <a:blip r:embed="rId3">
+            <a:extLst>
+              <a:ext uri="{28A0092B-C50C-407E-A947-70E740481C1C}">
+                <a14:useLocalDpi xmlns:a14="http://schemas.microsoft.com/office/drawing/2010/main" val="0"/>
+              </a:ext>
+            </a:extLst>
+          </a:blip>
+          <a:stretch>
+            <a:fillRect/>
+          </a:stretch>
+        </p:blipFill>
+        <p:spPr bwMode="auto">
+          <a:xfrm>
+            <a:off x="1143942" y="460586"/>
+            <a:ext cx="9904115" cy="5571065"/>
+          </a:xfrm>
+          <a:prstGeom prst="rect">
+            <a:avLst/>
+          </a:prstGeom>
+          <a:noFill/>
+          <a:ln>
+            <a:noFill/>
+          </a:ln>
+          <a:extLst>
+            <a:ext uri="{909E8E84-426E-40DD-AFC4-6F175D3DCCD1}">
+              <a14:hiddenFill xmlns:a14="http://schemas.microsoft.com/office/drawing/2010/main">
+                <a:solidFill>
+                  <a:srgbClr val="FFFFFF"/>
+                </a:solidFill>
+              </a14:hiddenFill>
+            </a:ext>
+          </a:extLst>
+        </p:spPr>
+      </p:pic>
+      <p:sp>
+        <p:nvSpPr>
+          <p:cNvPr id="17" name="Rectangle 16">
+            <a:extLst>
+              <a:ext uri="{FF2B5EF4-FFF2-40B4-BE49-F238E27FC236}">
+                <a16:creationId xmlns:a16="http://schemas.microsoft.com/office/drawing/2014/main" id="{C4A50008-FECC-4FDA-94B7-D1B3FA56D450}"/>
+              </a:ext>
+            </a:extLst>
+          </p:cNvPr>
+          <p:cNvSpPr/>
+          <p:nvPr/>
         </p:nvSpPr>
         <p:spPr>
           <a:xfrm>
-            <a:off x="643467" y="321734"/>
-            <a:ext cx="10905066" cy="1135737"/>
+            <a:off x="0" y="6610231"/>
+            <a:ext cx="8322802" cy="261610"/>
           </a:xfrm>
+          <a:prstGeom prst="rect">
+            <a:avLst/>
+          </a:prstGeom>
         </p:spPr>
         <p:txBody>
-          <a:bodyPr>
-            <a:normAutofit/>
+          <a:bodyPr wrap="square">
+            <a:spAutoFit/>
           </a:bodyPr>
           <a:lstStyle/>
           <a:p>
             <a:r>
-              <a:rPr lang="en-US" sz="3600" dirty="0"/>
-              <a:t>Learning Outcomes</a:t>
-            </a:r>
-          </a:p>
-        </p:txBody>
-      </p:sp>
-      <p:sp>
-        <p:nvSpPr>
-          <p:cNvPr id="3" name="Content Placeholder 2">
-            <a:extLst>
-              <a:ext uri="{FF2B5EF4-FFF2-40B4-BE49-F238E27FC236}">
-                <a16:creationId xmlns:a16="http://schemas.microsoft.com/office/drawing/2014/main" id="{A366A98A-E3CA-4E30-9B3F-09E95FB08DB4}"/>
-              </a:ext>
-            </a:extLst>
-          </p:cNvPr>
-          <p:cNvSpPr>
-            <a:spLocks noGrp="1"/>
-          </p:cNvSpPr>
-          <p:nvPr>
-            <p:ph idx="1"/>
-          </p:nvPr>
-        </p:nvSpPr>
-        <p:spPr>
-          <a:xfrm>
-            <a:off x="643467" y="1782981"/>
-            <a:ext cx="10905066" cy="4393982"/>
-          </a:xfrm>
-        </p:spPr>
-        <p:txBody>
-          <a:bodyPr>
-            <a:normAutofit/>
-          </a:bodyPr>
-          <a:lstStyle/>
-          <a:p>
-            <a:pPr>
-              <a:buFont typeface="Arial" panose="020B0604020202020204" pitchFamily="34" charset="0"/>
-              <a:buChar char="•"/>
-            </a:pPr>
-            <a:r>
-              <a:rPr lang="en-US" dirty="0"/>
-              <a:t>Prepare data for a text analysis in R</a:t>
-            </a:r>
-          </a:p>
-          <a:p>
-            <a:pPr>
-              <a:buFont typeface="Arial" panose="020B0604020202020204" pitchFamily="34" charset="0"/>
-              <a:buChar char="•"/>
-            </a:pPr>
-            <a:r>
-              <a:rPr lang="en-US" dirty="0"/>
-              <a:t>Conduct text mining in R</a:t>
-            </a:r>
-          </a:p>
-          <a:p>
-            <a:pPr>
-              <a:buFont typeface="Arial" panose="020B0604020202020204" pitchFamily="34" charset="0"/>
-              <a:buChar char="•"/>
-            </a:pPr>
-            <a:r>
-              <a:rPr lang="en-US" dirty="0"/>
-              <a:t>Complete sentiment analysis in R</a:t>
+              <a:rPr lang="en-US" sz="1100" dirty="0">
+                <a:solidFill>
+                  <a:srgbClr val="8B8B8B"/>
+                </a:solidFill>
+              </a:rPr>
+              <a:t>Illustrations from the </a:t>
+            </a:r>
+            <a:r>
+              <a:rPr lang="en-US" sz="1100" dirty="0" err="1">
+                <a:solidFill>
+                  <a:srgbClr val="8B8B8B"/>
+                </a:solidFill>
+                <a:hlinkClick r:id="rId4">
+                  <a:extLst>
+                    <a:ext uri="{A12FA001-AC4F-418D-AE19-62706E023703}">
+                      <ahyp:hlinkClr xmlns:ahyp="http://schemas.microsoft.com/office/drawing/2018/hyperlinkcolor" val="tx"/>
+                    </a:ext>
+                  </a:extLst>
+                </a:hlinkClick>
+              </a:rPr>
+              <a:t>Openscapes</a:t>
+            </a:r>
+            <a:r>
+              <a:rPr lang="en-US" sz="1100" dirty="0">
+                <a:solidFill>
+                  <a:srgbClr val="8B8B8B"/>
+                </a:solidFill>
+              </a:rPr>
+              <a:t> blog </a:t>
+            </a:r>
+            <a:r>
+              <a:rPr lang="en-US" sz="1100" i="1" dirty="0">
+                <a:solidFill>
+                  <a:srgbClr val="8B8B8B"/>
+                </a:solidFill>
+                <a:hlinkClick r:id="rId5">
+                  <a:extLst>
+                    <a:ext uri="{A12FA001-AC4F-418D-AE19-62706E023703}">
+                      <ahyp:hlinkClr xmlns:ahyp="http://schemas.microsoft.com/office/drawing/2018/hyperlinkcolor" val="tx"/>
+                    </a:ext>
+                  </a:extLst>
+                </a:hlinkClick>
+              </a:rPr>
+              <a:t>Tidy Data for reproducibility, efficiency, and collaboration</a:t>
+            </a:r>
+            <a:r>
+              <a:rPr lang="en-US" sz="1100" dirty="0">
+                <a:solidFill>
+                  <a:srgbClr val="8B8B8B"/>
+                </a:solidFill>
+              </a:rPr>
+              <a:t> by Julia Lowndes and Allison Horst</a:t>
             </a:r>
           </a:p>
         </p:txBody>
@@ -6700,7 +7293,7 @@
     </p:spTree>
     <p:extLst>
       <p:ext uri="{BB962C8B-B14F-4D97-AF65-F5344CB8AC3E}">
-        <p14:creationId xmlns:p14="http://schemas.microsoft.com/office/powerpoint/2010/main" val="3265437436"/>
+        <p14:creationId xmlns:p14="http://schemas.microsoft.com/office/powerpoint/2010/main" val="3685208553"/>
       </p:ext>
     </p:extLst>
   </p:cSld>
@@ -6713,14 +7306,6 @@
 <file path=ppt/slides/slide9.xml><?xml version="1.0" encoding="utf-8"?>
 <p:sld xmlns:a="http://schemas.openxmlformats.org/drawingml/2006/main" xmlns:r="http://schemas.openxmlformats.org/officeDocument/2006/relationships" xmlns:p="http://schemas.openxmlformats.org/presentationml/2006/main">
   <p:cSld>
-    <p:bg>
-      <p:bgPr>
-        <a:solidFill>
-          <a:schemeClr val="bg1"/>
-        </a:solidFill>
-        <a:effectLst/>
-      </p:bgPr>
-    </p:bg>
     <p:spTree>
       <p:nvGrpSpPr>
         <p:cNvPr id="1" name=""/>
@@ -6740,7 +7325,7 @@
           <p:cNvPr id="2" name="Title 1">
             <a:extLst>
               <a:ext uri="{FF2B5EF4-FFF2-40B4-BE49-F238E27FC236}">
-                <a16:creationId xmlns:a16="http://schemas.microsoft.com/office/drawing/2014/main" id="{BDA1388A-4824-4A29-ADD9-8CFCC321EE86}"/>
+                <a16:creationId xmlns:a16="http://schemas.microsoft.com/office/drawing/2014/main" id="{5CFA8286-B7CA-4F35-89FA-F6178820F7C2}"/>
               </a:ext>
             </a:extLst>
           </p:cNvPr>
@@ -6751,12 +7336,7 @@
             <p:ph type="title"/>
           </p:nvPr>
         </p:nvSpPr>
-        <p:spPr>
-          <a:xfrm>
-            <a:off x="643467" y="321734"/>
-            <a:ext cx="10905066" cy="1135737"/>
-          </a:xfrm>
-        </p:spPr>
+        <p:spPr/>
         <p:txBody>
           <a:bodyPr>
             <a:normAutofit/>
@@ -6765,7 +7345,7 @@
           <a:p>
             <a:r>
               <a:rPr lang="en-US" sz="3600" dirty="0"/>
-              <a:t>What did we learn today?</a:t>
+              <a:t>R Setup</a:t>
             </a:r>
           </a:p>
         </p:txBody>
@@ -6775,7 +7355,7 @@
           <p:cNvPr id="3" name="Content Placeholder 2">
             <a:extLst>
               <a:ext uri="{FF2B5EF4-FFF2-40B4-BE49-F238E27FC236}">
-                <a16:creationId xmlns:a16="http://schemas.microsoft.com/office/drawing/2014/main" id="{9CD29E42-4D8E-43A2-BF12-9FC55D34DB03}"/>
+                <a16:creationId xmlns:a16="http://schemas.microsoft.com/office/drawing/2014/main" id="{D594763D-F8F1-4390-8C8F-6443B90B59F6}"/>
               </a:ext>
             </a:extLst>
           </p:cNvPr>
@@ -6786,26 +7366,263 @@
             <p:ph idx="1"/>
           </p:nvPr>
         </p:nvSpPr>
-        <p:spPr>
-          <a:xfrm>
-            <a:off x="643467" y="1782981"/>
-            <a:ext cx="10905066" cy="4393982"/>
-          </a:xfrm>
-        </p:spPr>
+        <p:spPr/>
         <p:txBody>
           <a:bodyPr>
             <a:normAutofit/>
           </a:bodyPr>
           <a:lstStyle/>
           <a:p>
+            <a:pPr marL="0" indent="0">
+              <a:buNone/>
+            </a:pPr>
+            <a:r>
+              <a:rPr lang="en-US" b="1" dirty="0"/>
+              <a:t>General Setup</a:t>
+            </a:r>
+            <a:endParaRPr lang="en-US" b="1" dirty="0">
+              <a:hlinkClick r:id="rId3"/>
+            </a:endParaRPr>
+          </a:p>
+          <a:p>
+            <a:r>
+              <a:rPr lang="en-US" dirty="0">
+                <a:hlinkClick r:id="rId3"/>
+              </a:rPr>
+              <a:t>R Markdown</a:t>
+            </a:r>
             <a:endParaRPr lang="en-US" dirty="0"/>
+          </a:p>
+          <a:p>
+            <a:r>
+              <a:rPr lang="en-US" dirty="0" err="1"/>
+              <a:t>tidyverse</a:t>
+            </a:r>
+            <a:r>
+              <a:rPr lang="en-US" dirty="0"/>
+              <a:t> package</a:t>
+            </a:r>
+          </a:p>
+          <a:p>
+            <a:r>
+              <a:rPr lang="en-US" dirty="0" err="1"/>
+              <a:t>tidytext</a:t>
+            </a:r>
+            <a:r>
+              <a:rPr lang="en-US" dirty="0"/>
+              <a:t> package</a:t>
+            </a:r>
+          </a:p>
+          <a:p>
+            <a:r>
+              <a:rPr lang="en-US" dirty="0"/>
+              <a:t>Text data</a:t>
+            </a:r>
+          </a:p>
+          <a:p>
+            <a:endParaRPr lang="en-US" dirty="0"/>
+          </a:p>
+        </p:txBody>
+      </p:sp>
+      <p:sp>
+        <p:nvSpPr>
+          <p:cNvPr id="4" name="Content Placeholder 3">
+            <a:extLst>
+              <a:ext uri="{FF2B5EF4-FFF2-40B4-BE49-F238E27FC236}">
+                <a16:creationId xmlns:a16="http://schemas.microsoft.com/office/drawing/2014/main" id="{9CF57461-3B39-405F-B0EC-CF7B9C46B13A}"/>
+              </a:ext>
+            </a:extLst>
+          </p:cNvPr>
+          <p:cNvSpPr>
+            <a:spLocks noGrp="1"/>
+          </p:cNvSpPr>
+          <p:nvPr>
+            <p:ph idx="13"/>
+          </p:nvPr>
+        </p:nvSpPr>
+        <p:spPr/>
+        <p:txBody>
+          <a:bodyPr>
+            <a:normAutofit fontScale="92500" lnSpcReduction="10000"/>
+          </a:bodyPr>
+          <a:lstStyle/>
+          <a:p>
+            <a:pPr marL="0" indent="0">
+              <a:buNone/>
+            </a:pPr>
+            <a:r>
+              <a:rPr lang="en-US" b="1" dirty="0">
+                <a:highlight>
+                  <a:srgbClr val="FFFF00"/>
+                </a:highlight>
+              </a:rPr>
+              <a:t>Webinar Materials</a:t>
+            </a:r>
+          </a:p>
+          <a:p>
+            <a:pPr>
+              <a:buFont typeface="Calibri" panose="020F0502020204030204" pitchFamily="34" charset="0"/>
+              <a:buChar char="-"/>
+            </a:pPr>
+            <a:r>
+              <a:rPr lang="en-US" dirty="0">
+                <a:highlight>
+                  <a:srgbClr val="FFFF00"/>
+                </a:highlight>
+              </a:rPr>
+              <a:t>code</a:t>
+            </a:r>
+          </a:p>
+          <a:p>
+            <a:pPr lvl="1">
+              <a:buFont typeface="Calibri" panose="020F0502020204030204" pitchFamily="34" charset="0"/>
+              <a:buChar char="-"/>
+            </a:pPr>
+            <a:r>
+              <a:rPr lang="en-US" dirty="0">
+                <a:highlight>
+                  <a:srgbClr val="FFFF00"/>
+                </a:highlight>
+              </a:rPr>
+              <a:t>data-viz-in-r-</a:t>
+            </a:r>
+            <a:r>
+              <a:rPr lang="en-US" dirty="0" err="1">
+                <a:highlight>
+                  <a:srgbClr val="FFFF00"/>
+                </a:highlight>
+              </a:rPr>
+              <a:t>code.Rmd</a:t>
+            </a:r>
+            <a:endParaRPr lang="en-US" dirty="0">
+              <a:highlight>
+                <a:srgbClr val="FFFF00"/>
+              </a:highlight>
+            </a:endParaRPr>
+          </a:p>
+          <a:p>
+            <a:pPr>
+              <a:buFont typeface="Calibri" panose="020F0502020204030204" pitchFamily="34" charset="0"/>
+              <a:buChar char="-"/>
+            </a:pPr>
+            <a:r>
+              <a:rPr lang="en-US" dirty="0">
+                <a:highlight>
+                  <a:srgbClr val="FFFF00"/>
+                </a:highlight>
+              </a:rPr>
+              <a:t>data</a:t>
+            </a:r>
+          </a:p>
+          <a:p>
+            <a:pPr lvl="1">
+              <a:buFont typeface="Calibri" panose="020F0502020204030204" pitchFamily="34" charset="0"/>
+              <a:buChar char="-"/>
+            </a:pPr>
+            <a:r>
+              <a:rPr lang="en-US" dirty="0">
+                <a:highlight>
+                  <a:srgbClr val="FFFF00"/>
+                </a:highlight>
+              </a:rPr>
+              <a:t>ipeds_2017</a:t>
+            </a:r>
+          </a:p>
+          <a:p>
+            <a:pPr lvl="1">
+              <a:buFont typeface="Calibri" panose="020F0502020204030204" pitchFamily="34" charset="0"/>
+              <a:buChar char="-"/>
+            </a:pPr>
+            <a:r>
+              <a:rPr lang="en-US" dirty="0">
+                <a:highlight>
+                  <a:srgbClr val="FFFF00"/>
+                </a:highlight>
+              </a:rPr>
+              <a:t>ipeds_2018</a:t>
+            </a:r>
+          </a:p>
+          <a:p>
+            <a:pPr lvl="1">
+              <a:buFont typeface="Calibri" panose="020F0502020204030204" pitchFamily="34" charset="0"/>
+              <a:buChar char="-"/>
+            </a:pPr>
+            <a:r>
+              <a:rPr lang="en-US" dirty="0">
+                <a:highlight>
+                  <a:srgbClr val="FFFF00"/>
+                </a:highlight>
+              </a:rPr>
+              <a:t>ipeds_2019</a:t>
+            </a:r>
+          </a:p>
+          <a:p>
+            <a:pPr lvl="1">
+              <a:buFont typeface="Calibri" panose="020F0502020204030204" pitchFamily="34" charset="0"/>
+              <a:buChar char="-"/>
+            </a:pPr>
+            <a:r>
+              <a:rPr lang="en-US" dirty="0" err="1">
+                <a:highlight>
+                  <a:srgbClr val="FFFF00"/>
+                </a:highlight>
+              </a:rPr>
+              <a:t>ipeds_dict</a:t>
+            </a:r>
+            <a:endParaRPr lang="en-US" dirty="0">
+              <a:highlight>
+                <a:srgbClr val="FFFF00"/>
+              </a:highlight>
+            </a:endParaRPr>
+          </a:p>
+          <a:p>
+            <a:pPr>
+              <a:buFont typeface="Calibri" panose="020F0502020204030204" pitchFamily="34" charset="0"/>
+              <a:buChar char="-"/>
+            </a:pPr>
+            <a:r>
+              <a:rPr lang="en-US" dirty="0">
+                <a:highlight>
+                  <a:srgbClr val="FFFF00"/>
+                </a:highlight>
+              </a:rPr>
+              <a:t>plots</a:t>
+            </a:r>
+          </a:p>
+          <a:p>
+            <a:pPr>
+              <a:buFont typeface="Calibri" panose="020F0502020204030204" pitchFamily="34" charset="0"/>
+              <a:buChar char="-"/>
+            </a:pPr>
+            <a:r>
+              <a:rPr lang="en-US" dirty="0">
+                <a:highlight>
+                  <a:srgbClr val="FFFF00"/>
+                </a:highlight>
+              </a:rPr>
+              <a:t>.here</a:t>
+            </a:r>
+          </a:p>
+          <a:p>
+            <a:pPr>
+              <a:buFont typeface="Calibri" panose="020F0502020204030204" pitchFamily="34" charset="0"/>
+              <a:buChar char="-"/>
+            </a:pPr>
+            <a:r>
+              <a:rPr lang="en-US" dirty="0">
+                <a:highlight>
+                  <a:srgbClr val="FFFF00"/>
+                </a:highlight>
+              </a:rPr>
+              <a:t>README.txt</a:t>
+            </a:r>
           </a:p>
         </p:txBody>
       </p:sp>
     </p:spTree>
     <p:extLst>
       <p:ext uri="{BB962C8B-B14F-4D97-AF65-F5344CB8AC3E}">
-        <p14:creationId xmlns:p14="http://schemas.microsoft.com/office/powerpoint/2010/main" val="1722121953"/>
+        <p14:creationId xmlns:p14="http://schemas.microsoft.com/office/powerpoint/2010/main" val="1723584121"/>
       </p:ext>
     </p:extLst>
   </p:cSld>

</xml_diff>

<commit_message>
added outline and began working on code
</commit_message>
<xml_diff>
--- a/slides/Sentiment Analysis in R.pptx
+++ b/slides/Sentiment Analysis in R.pptx
@@ -216,7 +216,7 @@
           <a:p>
             <a:fld id="{73CD064E-05FC-4E18-9D0C-A4994F368CAC}" type="datetimeFigureOut">
               <a:rPr lang="en-US" smtClean="0"/>
-              <a:t>9/16/2021</a:t>
+              <a:t>9/22/2021</a:t>
             </a:fld>
             <a:endParaRPr lang="en-US"/>
           </a:p>
@@ -4050,7 +4050,7 @@
           <a:p>
             <a:fld id="{C9727A96-7105-44AE-B9F0-3BA74D06A54C}" type="datetimeFigureOut">
               <a:rPr lang="en-US" smtClean="0"/>
-              <a:t>9/16/2021</a:t>
+              <a:t>9/22/2021</a:t>
             </a:fld>
             <a:endParaRPr lang="en-US"/>
           </a:p>
@@ -4248,7 +4248,7 @@
           <a:p>
             <a:fld id="{C9727A96-7105-44AE-B9F0-3BA74D06A54C}" type="datetimeFigureOut">
               <a:rPr lang="en-US" smtClean="0"/>
-              <a:t>9/16/2021</a:t>
+              <a:t>9/22/2021</a:t>
             </a:fld>
             <a:endParaRPr lang="en-US"/>
           </a:p>
@@ -4484,7 +4484,7 @@
           <a:p>
             <a:fld id="{C9727A96-7105-44AE-B9F0-3BA74D06A54C}" type="datetimeFigureOut">
               <a:rPr lang="en-US" smtClean="0"/>
-              <a:t>9/16/2021</a:t>
+              <a:t>9/22/2021</a:t>
             </a:fld>
             <a:endParaRPr lang="en-US"/>
           </a:p>
@@ -4820,7 +4820,7 @@
           <a:p>
             <a:fld id="{986F8839-423C-1541-BA9A-A38B5B6A10D1}" type="datetimeFigureOut">
               <a:rPr lang="en-US" smtClean="0"/>
-              <a:t>9/16/2021</a:t>
+              <a:t>9/22/2021</a:t>
             </a:fld>
             <a:endParaRPr lang="en-US"/>
           </a:p>
@@ -5785,7 +5785,7 @@
           <a:p>
             <a:r>
               <a:rPr lang="en-US" dirty="0"/>
-              <a:t>Evaluating Sentiment</a:t>
+              <a:t>Sentiment Analysis</a:t>
             </a:r>
           </a:p>
           <a:p>

</xml_diff>

<commit_message>
added notes about n-gram
</commit_message>
<xml_diff>
--- a/slides/Sentiment Analysis in R.pptx
+++ b/slides/Sentiment Analysis in R.pptx
@@ -2091,7 +2091,15 @@
           <a:p>
             <a:r>
               <a:rPr lang="en-US" dirty="0"/>
-              <a:t>After recapping the previous session, we dove into a complete sentiment analysis and visualized the findings. We also discussed how to move beyond individual words in a text analysis. Finally, we reviewed the insights that can be gained from text and sentiment analysis and discussed how to go further. </a:t>
+              <a:t>After recapping the previous session, we dove into a complete sentiment analysis and visualized the findings. We also discussed how to move beyond individual words in a text analysis and went through a </a:t>
+            </a:r>
+            <a:r>
+              <a:rPr lang="en-US"/>
+              <a:t>short example of two-word phrases. </a:t>
+            </a:r>
+            <a:r>
+              <a:rPr lang="en-US" dirty="0"/>
+              <a:t>Finally, we reviewed the insights that can be gained from text and sentiment analysis and discussed how to go further. </a:t>
             </a:r>
           </a:p>
         </p:txBody>

</xml_diff>

<commit_message>
updated notes and code from practice session
</commit_message>
<xml_diff>
--- a/slides/Sentiment Analysis in R.pptx
+++ b/slides/Sentiment Analysis in R.pptx
@@ -5,7 +5,7 @@
     <p:sldMasterId id="2147483660" r:id="rId1"/>
   </p:sldMasterIdLst>
   <p:notesMasterIdLst>
-    <p:notesMasterId r:id="rId27"/>
+    <p:notesMasterId r:id="rId28"/>
   </p:notesMasterIdLst>
   <p:sldIdLst>
     <p:sldId id="344" r:id="rId2"/>
@@ -22,17 +22,18 @@
     <p:sldId id="269" r:id="rId13"/>
     <p:sldId id="346" r:id="rId14"/>
     <p:sldId id="345" r:id="rId15"/>
-    <p:sldId id="348" r:id="rId16"/>
-    <p:sldId id="284" r:id="rId17"/>
-    <p:sldId id="286" r:id="rId18"/>
-    <p:sldId id="355" r:id="rId19"/>
-    <p:sldId id="356" r:id="rId20"/>
-    <p:sldId id="357" r:id="rId21"/>
-    <p:sldId id="353" r:id="rId22"/>
-    <p:sldId id="291" r:id="rId23"/>
-    <p:sldId id="342" r:id="rId24"/>
-    <p:sldId id="347" r:id="rId25"/>
-    <p:sldId id="343" r:id="rId26"/>
+    <p:sldId id="359" r:id="rId16"/>
+    <p:sldId id="348" r:id="rId17"/>
+    <p:sldId id="284" r:id="rId18"/>
+    <p:sldId id="286" r:id="rId19"/>
+    <p:sldId id="355" r:id="rId20"/>
+    <p:sldId id="356" r:id="rId21"/>
+    <p:sldId id="357" r:id="rId22"/>
+    <p:sldId id="353" r:id="rId23"/>
+    <p:sldId id="291" r:id="rId24"/>
+    <p:sldId id="342" r:id="rId25"/>
+    <p:sldId id="347" r:id="rId26"/>
+    <p:sldId id="343" r:id="rId27"/>
   </p:sldIdLst>
   <p:sldSz cx="12192000" cy="6858000"/>
   <p:notesSz cx="6858000" cy="9144000"/>
@@ -221,7 +222,7 @@
           <a:p>
             <a:fld id="{73CD064E-05FC-4E18-9D0C-A4994F368CAC}" type="datetimeFigureOut">
               <a:rPr lang="en-US" smtClean="0"/>
-              <a:t>9/28/2021</a:t>
+              <a:t>10/18/2021</a:t>
             </a:fld>
             <a:endParaRPr lang="en-US"/>
           </a:p>
@@ -533,11 +534,12 @@
           <a:lstStyle/>
           <a:p>
             <a:r>
-              <a:rPr lang="en-US" dirty="0">
-                <a:cs typeface="Calibri"/>
-              </a:rPr>
-              <a:t>Your notes here</a:t>
-            </a:r>
+              <a:rPr lang="en-US" dirty="0"/>
+              <a:t>Welcome to Day 1 of the Sentiment Analysis in R webinar. I am so happy you’re here.</a:t>
+            </a:r>
+            <a:endParaRPr lang="en-US" dirty="0">
+              <a:cs typeface="Calibri"/>
+            </a:endParaRPr>
           </a:p>
         </p:txBody>
       </p:sp>
@@ -823,7 +825,7 @@
           <a:p>
             <a:r>
               <a:rPr lang="en-US" dirty="0"/>
-              <a:t>We talked about text analysis and sentiment analysis and how they can be used. Then we discussed how to set up R for text analysis. In R, we jumped into processing and preparing the data for text analysis. Next, we covered tokenizing and computed word frequencies. </a:t>
+              <a:t>We talked about text analysis and sentiment analysis and how they can be used. Then we discussed how to set up R for text analysis. In R, we jumped into processing and preparing the data for text analysis. Next, we covered tokenizing and computing word frequencies. </a:t>
             </a:r>
           </a:p>
           <a:p>
@@ -918,11 +920,126 @@
           <a:lstStyle/>
           <a:p>
             <a:r>
-              <a:rPr lang="en-US" dirty="0">
-                <a:cs typeface="Calibri"/>
-              </a:rPr>
-              <a:t>Your notes here</a:t>
-            </a:r>
+              <a:rPr lang="en-US" dirty="0"/>
+              <a:t>Thank you so much for being here today! I look forward to seeing you in Part 2. Thank you to AIR and Emily and Elaine for their support and </a:t>
+            </a:r>
+            <a:r>
+              <a:rPr lang="en-US"/>
+              <a:t>for having me. </a:t>
+            </a:r>
+            <a:endParaRPr lang="en-US" dirty="0"/>
+          </a:p>
+        </p:txBody>
+      </p:sp>
+      <p:sp>
+        <p:nvSpPr>
+          <p:cNvPr id="4" name="Slide Number Placeholder 3"/>
+          <p:cNvSpPr>
+            <a:spLocks noGrp="1"/>
+          </p:cNvSpPr>
+          <p:nvPr>
+            <p:ph type="sldNum" sz="quarter" idx="5"/>
+          </p:nvPr>
+        </p:nvSpPr>
+        <p:spPr/>
+        <p:txBody>
+          <a:bodyPr/>
+          <a:lstStyle/>
+          <a:p>
+            <a:fld id="{3C20A7C7-CA8D-4C49-BCFB-55E6C5267475}" type="slidenum">
+              <a:rPr lang="en-US" smtClean="0"/>
+              <a:t>13</a:t>
+            </a:fld>
+            <a:endParaRPr lang="en-US"/>
+          </a:p>
+        </p:txBody>
+      </p:sp>
+    </p:spTree>
+    <p:extLst>
+      <p:ext uri="{BB962C8B-B14F-4D97-AF65-F5344CB8AC3E}">
+        <p14:creationId xmlns:p14="http://schemas.microsoft.com/office/powerpoint/2010/main" val="2581998537"/>
+      </p:ext>
+    </p:extLst>
+  </p:cSld>
+  <p:clrMapOvr>
+    <a:masterClrMapping/>
+  </p:clrMapOvr>
+</p:notes>
+</file>
+
+<file path=ppt/notesSlides/notesSlide13.xml><?xml version="1.0" encoding="utf-8"?>
+<p:notes xmlns:a="http://schemas.openxmlformats.org/drawingml/2006/main" xmlns:r="http://schemas.openxmlformats.org/officeDocument/2006/relationships" xmlns:p="http://schemas.openxmlformats.org/presentationml/2006/main">
+  <p:cSld>
+    <p:spTree>
+      <p:nvGrpSpPr>
+        <p:cNvPr id="1" name=""/>
+        <p:cNvGrpSpPr/>
+        <p:nvPr/>
+      </p:nvGrpSpPr>
+      <p:grpSpPr>
+        <a:xfrm>
+          <a:off x="0" y="0"/>
+          <a:ext cx="0" cy="0"/>
+          <a:chOff x="0" y="0"/>
+          <a:chExt cx="0" cy="0"/>
+        </a:xfrm>
+      </p:grpSpPr>
+      <p:sp>
+        <p:nvSpPr>
+          <p:cNvPr id="2" name="Slide Image Placeholder 1"/>
+          <p:cNvSpPr>
+            <a:spLocks noGrp="1" noRot="1" noChangeAspect="1"/>
+          </p:cNvSpPr>
+          <p:nvPr>
+            <p:ph type="sldImg"/>
+          </p:nvPr>
+        </p:nvSpPr>
+        <p:spPr/>
+      </p:sp>
+      <p:sp>
+        <p:nvSpPr>
+          <p:cNvPr id="3" name="Notes Placeholder 2"/>
+          <p:cNvSpPr>
+            <a:spLocks noGrp="1"/>
+          </p:cNvSpPr>
+          <p:nvPr>
+            <p:ph type="body" idx="1"/>
+          </p:nvPr>
+        </p:nvSpPr>
+        <p:spPr/>
+        <p:txBody>
+          <a:bodyPr/>
+          <a:lstStyle/>
+          <a:p>
+            <a:pPr marL="0" marR="0" lvl="0" indent="0" algn="l" defTabSz="914400" rtl="0" eaLnBrk="1" fontAlgn="auto" latinLnBrk="0" hangingPunct="1">
+              <a:lnSpc>
+                <a:spcPct val="100000"/>
+              </a:lnSpc>
+              <a:spcBef>
+                <a:spcPts val="0"/>
+              </a:spcBef>
+              <a:spcAft>
+                <a:spcPts val="0"/>
+              </a:spcAft>
+              <a:buClrTx/>
+              <a:buSzTx/>
+              <a:buFontTx/>
+              <a:buNone/>
+              <a:tabLst/>
+              <a:defRPr/>
+            </a:pPr>
+            <a:r>
+              <a:rPr lang="en-US" dirty="0"/>
+              <a:t>Welcome back to Day 2 of the Sentiment Analysis in R webinar. I am so happy you’re here.</a:t>
+            </a:r>
+            <a:endParaRPr lang="en-US" dirty="0">
+              <a:cs typeface="Calibri"/>
+            </a:endParaRPr>
+          </a:p>
+          <a:p>
+            <a:endParaRPr lang="en-US" dirty="0">
+              <a:cs typeface="Calibri"/>
+            </a:endParaRPr>
           </a:p>
         </p:txBody>
       </p:sp>
@@ -1022,96 +1139,6 @@
 </p:notes>
 </file>
 
-<file path=ppt/notesSlides/notesSlide13.xml><?xml version="1.0" encoding="utf-8"?>
-<p:notes xmlns:a="http://schemas.openxmlformats.org/drawingml/2006/main" xmlns:r="http://schemas.openxmlformats.org/officeDocument/2006/relationships" xmlns:p="http://schemas.openxmlformats.org/presentationml/2006/main">
-  <p:cSld>
-    <p:spTree>
-      <p:nvGrpSpPr>
-        <p:cNvPr id="1" name=""/>
-        <p:cNvGrpSpPr/>
-        <p:nvPr/>
-      </p:nvGrpSpPr>
-      <p:grpSpPr>
-        <a:xfrm>
-          <a:off x="0" y="0"/>
-          <a:ext cx="0" cy="0"/>
-          <a:chOff x="0" y="0"/>
-          <a:chExt cx="0" cy="0"/>
-        </a:xfrm>
-      </p:grpSpPr>
-      <p:sp>
-        <p:nvSpPr>
-          <p:cNvPr id="2" name="Slide Image Placeholder 1"/>
-          <p:cNvSpPr>
-            <a:spLocks noGrp="1" noRot="1" noChangeAspect="1"/>
-          </p:cNvSpPr>
-          <p:nvPr>
-            <p:ph type="sldImg"/>
-          </p:nvPr>
-        </p:nvSpPr>
-        <p:spPr/>
-      </p:sp>
-      <p:sp>
-        <p:nvSpPr>
-          <p:cNvPr id="3" name="Notes Placeholder 2"/>
-          <p:cNvSpPr>
-            <a:spLocks noGrp="1"/>
-          </p:cNvSpPr>
-          <p:nvPr>
-            <p:ph type="body" idx="1"/>
-          </p:nvPr>
-        </p:nvSpPr>
-        <p:spPr/>
-        <p:txBody>
-          <a:bodyPr/>
-          <a:lstStyle/>
-          <a:p>
-            <a:r>
-              <a:rPr lang="en-US" dirty="0"/>
-              <a:t>The learning outcomes of this webinar are that participants will be able to prepare data for a text analysis, conduct text mining, and complete a sentiment analysis in R.</a:t>
-            </a:r>
-          </a:p>
-          <a:p>
-            <a:endParaRPr lang="en-US" dirty="0"/>
-          </a:p>
-        </p:txBody>
-      </p:sp>
-      <p:sp>
-        <p:nvSpPr>
-          <p:cNvPr id="4" name="Slide Number Placeholder 3"/>
-          <p:cNvSpPr>
-            <a:spLocks noGrp="1"/>
-          </p:cNvSpPr>
-          <p:nvPr>
-            <p:ph type="sldNum" sz="quarter" idx="5"/>
-          </p:nvPr>
-        </p:nvSpPr>
-        <p:spPr/>
-        <p:txBody>
-          <a:bodyPr/>
-          <a:lstStyle/>
-          <a:p>
-            <a:fld id="{3C20A7C7-CA8D-4C49-BCFB-55E6C5267475}" type="slidenum">
-              <a:rPr lang="en-US" smtClean="0"/>
-              <a:t>15</a:t>
-            </a:fld>
-            <a:endParaRPr lang="en-US"/>
-          </a:p>
-        </p:txBody>
-      </p:sp>
-    </p:spTree>
-    <p:extLst>
-      <p:ext uri="{BB962C8B-B14F-4D97-AF65-F5344CB8AC3E}">
-        <p14:creationId xmlns:p14="http://schemas.microsoft.com/office/powerpoint/2010/main" val="1363480395"/>
-      </p:ext>
-    </p:extLst>
-  </p:cSld>
-  <p:clrMapOvr>
-    <a:masterClrMapping/>
-  </p:clrMapOvr>
-</p:notes>
-</file>
-
 <file path=ppt/notesSlides/notesSlide14.xml><?xml version="1.0" encoding="utf-8"?>
 <p:notes xmlns:a="http://schemas.openxmlformats.org/drawingml/2006/main" xmlns:r="http://schemas.openxmlformats.org/officeDocument/2006/relationships" xmlns:p="http://schemas.openxmlformats.org/presentationml/2006/main">
   <p:cSld>
@@ -1158,59 +1185,7 @@
           <a:p>
             <a:r>
               <a:rPr lang="en-US" dirty="0"/>
-              <a:t>Welcome back to Day 2 of the Sentiment Analysis in R webinar. I’m so happy you’re here.</a:t>
-            </a:r>
-          </a:p>
-          <a:p>
-            <a:pPr marL="0" marR="0">
-              <a:lnSpc>
-                <a:spcPct val="107000"/>
-              </a:lnSpc>
-              <a:spcBef>
-                <a:spcPts val="0"/>
-              </a:spcBef>
-              <a:spcAft>
-                <a:spcPts val="0"/>
-              </a:spcAft>
-            </a:pPr>
-            <a:r>
-              <a:rPr lang="en-US" sz="1800" dirty="0">
-                <a:solidFill>
-                  <a:srgbClr val="545E6B"/>
-                </a:solidFill>
-                <a:effectLst/>
-                <a:latin typeface="Arial" panose="020B0604020202020204" pitchFamily="34" charset="0"/>
-                <a:ea typeface="Times New Roman" panose="02020603050405020304" pitchFamily="18" charset="0"/>
-                <a:cs typeface="Times New Roman" panose="02020603050405020304" pitchFamily="18" charset="0"/>
-              </a:rPr>
-              <a:t> </a:t>
-            </a:r>
-            <a:endParaRPr lang="en-US" sz="1800" dirty="0">
-              <a:effectLst/>
-              <a:latin typeface="Calibri" panose="020F0502020204030204" pitchFamily="34" charset="0"/>
-              <a:ea typeface="Calibri" panose="020F0502020204030204" pitchFamily="34" charset="0"/>
-              <a:cs typeface="Times New Roman" panose="02020603050405020304" pitchFamily="18" charset="0"/>
-            </a:endParaRPr>
-          </a:p>
-          <a:p>
-            <a:r>
-              <a:rPr lang="en-US" sz="1800" dirty="0">
-                <a:effectLst/>
-                <a:latin typeface="Calibri" panose="020F0502020204030204" pitchFamily="34" charset="0"/>
-                <a:ea typeface="Calibri" panose="020F0502020204030204" pitchFamily="34" charset="0"/>
-                <a:cs typeface="Times New Roman" panose="02020603050405020304" pitchFamily="18" charset="0"/>
-              </a:rPr>
-              <a:t>This webinar will teach participants how to complete a text analysis in R, including data processing and cleaning, visualization of word frequencies, and sentiment analysis. Sentiment analysis is useful for finding patterns in text data from open response questions on surveys and course evaluations as well as evaluating social media posts. </a:t>
-            </a:r>
-            <a:endParaRPr lang="en-US" dirty="0"/>
-          </a:p>
-          <a:p>
-            <a:endParaRPr lang="en-US" dirty="0"/>
-          </a:p>
-          <a:p>
-            <a:r>
-              <a:rPr lang="en-US" dirty="0"/>
-              <a:t>Here’s today’s agenda…</a:t>
+              <a:t>I’m Jenn Schilling, my pronouns are she/her/hers. I am a senior data analyst at the University of Arizona, and an adjunct faculty member at the College for Creative Studies where I teach graduate classes on data visualization. Thank you for being here, and I hope you will find this webinar beneficial. </a:t>
             </a:r>
           </a:p>
         </p:txBody>
@@ -1232,7 +1207,7 @@
           <a:p>
             <a:fld id="{3C20A7C7-CA8D-4C49-BCFB-55E6C5267475}" type="slidenum">
               <a:rPr lang="en-US" smtClean="0"/>
-              <a:t>16</a:t>
+              <a:t>15</a:t>
             </a:fld>
             <a:endParaRPr lang="en-US"/>
           </a:p>
@@ -1241,7 +1216,7 @@
     </p:spTree>
     <p:extLst>
       <p:ext uri="{BB962C8B-B14F-4D97-AF65-F5344CB8AC3E}">
-        <p14:creationId xmlns:p14="http://schemas.microsoft.com/office/powerpoint/2010/main" val="4038417624"/>
+        <p14:creationId xmlns:p14="http://schemas.microsoft.com/office/powerpoint/2010/main" val="1838861702"/>
       </p:ext>
     </p:extLst>
   </p:cSld>
@@ -1295,126 +1270,10 @@
           <a:bodyPr/>
           <a:lstStyle/>
           <a:p>
-            <a:pPr marL="0" marR="0" lvl="0" indent="0" algn="l" defTabSz="914400" rtl="0" eaLnBrk="1" fontAlgn="auto" latinLnBrk="0" hangingPunct="1">
-              <a:lnSpc>
-                <a:spcPct val="100000"/>
-              </a:lnSpc>
-              <a:spcBef>
-                <a:spcPts val="0"/>
-              </a:spcBef>
-              <a:spcAft>
-                <a:spcPts val="0"/>
-              </a:spcAft>
-              <a:buClrTx/>
-              <a:buSzTx/>
-              <a:buFontTx/>
-              <a:buNone/>
-              <a:tabLst/>
-              <a:defRPr/>
-            </a:pPr>
-            <a:r>
-              <a:rPr lang="en-US" dirty="0"/>
-              <a:t>In Day 1, we talked about text analysis and sentiment analysis and how they can be used. Then we discussed how to set up R for text analysis. In R, we jumped into processing and preparing the data for text analysis. Next, we covered tokenizing and computed word frequencies. </a:t>
-            </a:r>
-          </a:p>
-          <a:p>
-            <a:pPr marL="0" marR="0" lvl="0" indent="0" algn="l" defTabSz="914400" rtl="0" eaLnBrk="1" fontAlgn="auto" latinLnBrk="0" hangingPunct="1">
-              <a:lnSpc>
-                <a:spcPct val="100000"/>
-              </a:lnSpc>
-              <a:spcBef>
-                <a:spcPts val="0"/>
-              </a:spcBef>
-              <a:spcAft>
-                <a:spcPts val="0"/>
-              </a:spcAft>
-              <a:buClrTx/>
-              <a:buSzTx/>
-              <a:buFontTx/>
-              <a:buNone/>
-              <a:tabLst/>
-              <a:defRPr/>
-            </a:pPr>
-            <a:endParaRPr lang="en-US" dirty="0"/>
-          </a:p>
-          <a:p>
-            <a:pPr marL="0" marR="0" lvl="0" indent="0" algn="l" defTabSz="914400" rtl="0" eaLnBrk="1" fontAlgn="auto" latinLnBrk="0" hangingPunct="1">
-              <a:lnSpc>
-                <a:spcPct val="100000"/>
-              </a:lnSpc>
-              <a:spcBef>
-                <a:spcPts val="0"/>
-              </a:spcBef>
-              <a:spcAft>
-                <a:spcPts val="0"/>
-              </a:spcAft>
-              <a:buClrTx/>
-              <a:buSzTx/>
-              <a:buFontTx/>
-              <a:buNone/>
-              <a:tabLst/>
-              <a:defRPr/>
-            </a:pPr>
-            <a:r>
-              <a:rPr lang="en-US" dirty="0"/>
-              <a:t>As a reminder, in R you need the {</a:t>
-            </a:r>
-            <a:r>
-              <a:rPr lang="en-US" dirty="0" err="1"/>
-              <a:t>tidyverse</a:t>
-            </a:r>
-            <a:r>
-              <a:rPr lang="en-US" dirty="0"/>
-              <a:t>} and {</a:t>
-            </a:r>
-            <a:r>
-              <a:rPr lang="en-US" dirty="0" err="1"/>
-              <a:t>tidytext</a:t>
-            </a:r>
-            <a:r>
-              <a:rPr lang="en-US" dirty="0"/>
-              <a:t>} packages for data processing and text analysis. </a:t>
-            </a:r>
-          </a:p>
-          <a:p>
-            <a:pPr marL="0" marR="0" lvl="0" indent="0" algn="l" defTabSz="914400" rtl="0" eaLnBrk="1" fontAlgn="auto" latinLnBrk="0" hangingPunct="1">
-              <a:lnSpc>
-                <a:spcPct val="100000"/>
-              </a:lnSpc>
-              <a:spcBef>
-                <a:spcPts val="0"/>
-              </a:spcBef>
-              <a:spcAft>
-                <a:spcPts val="0"/>
-              </a:spcAft>
-              <a:buClrTx/>
-              <a:buSzTx/>
-              <a:buFontTx/>
-              <a:buNone/>
-              <a:tabLst/>
-              <a:defRPr/>
-            </a:pPr>
-            <a:endParaRPr lang="en-US" dirty="0"/>
-          </a:p>
-          <a:p>
-            <a:pPr marL="0" marR="0" lvl="0" indent="0" algn="l" defTabSz="914400" rtl="0" eaLnBrk="1" fontAlgn="auto" latinLnBrk="0" hangingPunct="1">
-              <a:lnSpc>
-                <a:spcPct val="100000"/>
-              </a:lnSpc>
-              <a:spcBef>
-                <a:spcPts val="0"/>
-              </a:spcBef>
-              <a:spcAft>
-                <a:spcPts val="0"/>
-              </a:spcAft>
-              <a:buClrTx/>
-              <a:buSzTx/>
-              <a:buFontTx/>
-              <a:buNone/>
-              <a:tabLst/>
-              <a:defRPr/>
-            </a:pPr>
-            <a:endParaRPr lang="en-US" dirty="0"/>
+            <a:r>
+              <a:rPr lang="en-US" dirty="0"/>
+              <a:t>The learning outcomes of this webinar are that participants will be able to prepare data for a text analysis, conduct text mining, and complete a sentiment analysis in R.</a:t>
+            </a:r>
           </a:p>
           <a:p>
             <a:endParaRPr lang="en-US" dirty="0"/>
@@ -1438,7 +1297,7 @@
           <a:p>
             <a:fld id="{3C20A7C7-CA8D-4C49-BCFB-55E6C5267475}" type="slidenum">
               <a:rPr lang="en-US" smtClean="0"/>
-              <a:t>17</a:t>
+              <a:t>16</a:t>
             </a:fld>
             <a:endParaRPr lang="en-US"/>
           </a:p>
@@ -1447,7 +1306,7 @@
     </p:spTree>
     <p:extLst>
       <p:ext uri="{BB962C8B-B14F-4D97-AF65-F5344CB8AC3E}">
-        <p14:creationId xmlns:p14="http://schemas.microsoft.com/office/powerpoint/2010/main" val="3336625752"/>
+        <p14:creationId xmlns:p14="http://schemas.microsoft.com/office/powerpoint/2010/main" val="1363480395"/>
       </p:ext>
     </p:extLst>
   </p:cSld>
@@ -1502,44 +1361,23 @@
           <a:lstStyle/>
           <a:p>
             <a:r>
-              <a:rPr lang="en-US" dirty="0"/>
-              <a:t>Here’s a quick review of some of the terminology used in text analysis.</a:t>
-            </a:r>
-          </a:p>
-          <a:p>
+              <a:rPr lang="en-US" sz="1800" dirty="0">
+                <a:effectLst/>
+                <a:latin typeface="Calibri" panose="020F0502020204030204" pitchFamily="34" charset="0"/>
+                <a:ea typeface="Calibri" panose="020F0502020204030204" pitchFamily="34" charset="0"/>
+                <a:cs typeface="Times New Roman" panose="02020603050405020304" pitchFamily="18" charset="0"/>
+              </a:rPr>
+              <a:t>This webinar will teach participants how to complete a text analysis in R, including data processing and cleaning, visualization of word frequencies, and sentiment analysis. Sentiment analysis is useful for finding patterns in text data from open response questions on surveys and course evaluations as well as evaluating social media posts. </a:t>
+            </a:r>
             <a:endParaRPr lang="en-US" dirty="0"/>
           </a:p>
           <a:p>
-            <a:r>
-              <a:rPr lang="en-US" dirty="0"/>
-              <a:t>A corpus is a large collection or set of documents.</a:t>
-            </a:r>
-          </a:p>
-          <a:p>
             <a:endParaRPr lang="en-US" dirty="0"/>
           </a:p>
           <a:p>
             <a:r>
               <a:rPr lang="en-US" dirty="0"/>
-              <a:t>A document is an individual piece of text data such as a book, an email, a tweet or set of tweets, responses to an open-ended survey question, a course evaluation, etc.</a:t>
-            </a:r>
-          </a:p>
-          <a:p>
-            <a:endParaRPr lang="en-US" dirty="0"/>
-          </a:p>
-          <a:p>
-            <a:r>
-              <a:rPr lang="en-US" dirty="0"/>
-              <a:t>A token is a meaningful unit of text, such as a word. Tokens may also be referred to as terms. </a:t>
-            </a:r>
-          </a:p>
-          <a:p>
-            <a:endParaRPr lang="en-US" dirty="0"/>
-          </a:p>
-          <a:p>
-            <a:r>
-              <a:rPr lang="en-US" dirty="0"/>
-              <a:t>A document is made up of words/terms/tokens. A corpus is made up of documents.</a:t>
+              <a:t>Here’s today’s agenda…</a:t>
             </a:r>
           </a:p>
         </p:txBody>
@@ -1561,7 +1399,7 @@
           <a:p>
             <a:fld id="{3C20A7C7-CA8D-4C49-BCFB-55E6C5267475}" type="slidenum">
               <a:rPr lang="en-US" smtClean="0"/>
-              <a:t>18</a:t>
+              <a:t>17</a:t>
             </a:fld>
             <a:endParaRPr lang="en-US"/>
           </a:p>
@@ -1570,7 +1408,7 @@
     </p:spTree>
     <p:extLst>
       <p:ext uri="{BB962C8B-B14F-4D97-AF65-F5344CB8AC3E}">
-        <p14:creationId xmlns:p14="http://schemas.microsoft.com/office/powerpoint/2010/main" val="736614886"/>
+        <p14:creationId xmlns:p14="http://schemas.microsoft.com/office/powerpoint/2010/main" val="4038417624"/>
       </p:ext>
     </p:extLst>
   </p:cSld>
@@ -1624,10 +1462,129 @@
           <a:bodyPr/>
           <a:lstStyle/>
           <a:p>
-            <a:r>
-              <a:rPr lang="en-US" dirty="0"/>
-              <a:t>Here’s a reminder of tidy data. Tidy data is a structure of data in which each variable is a column, each observation is a row, and each cell is a single measurement. For text analysis, we can create a tidy text data table or data frame which contains one token per row. Recall that a token is a meaningful unit of text, such as a word. The first step in text analysis is called tokenizing, which involves splitting a long text string, such as a tweet, document, or open-ended responses, into individual words or sets of words. </a:t>
-            </a:r>
+            <a:pPr marL="0" marR="0" lvl="0" indent="0" algn="l" defTabSz="914400" rtl="0" eaLnBrk="1" fontAlgn="auto" latinLnBrk="0" hangingPunct="1">
+              <a:lnSpc>
+                <a:spcPct val="100000"/>
+              </a:lnSpc>
+              <a:spcBef>
+                <a:spcPts val="0"/>
+              </a:spcBef>
+              <a:spcAft>
+                <a:spcPts val="0"/>
+              </a:spcAft>
+              <a:buClrTx/>
+              <a:buSzTx/>
+              <a:buFontTx/>
+              <a:buNone/>
+              <a:tabLst/>
+              <a:defRPr/>
+            </a:pPr>
+            <a:r>
+              <a:rPr lang="en-US" dirty="0"/>
+              <a:t>In Day 1, we talked about text analysis and sentiment analysis and how they can be used. Then we discussed how to set up R for text analysis. In R, we jumped into processing and preparing the data for text analysis. Next, we covered tokenizing and computing word frequencies. </a:t>
+            </a:r>
+          </a:p>
+          <a:p>
+            <a:pPr marL="0" marR="0" lvl="0" indent="0" algn="l" defTabSz="914400" rtl="0" eaLnBrk="1" fontAlgn="auto" latinLnBrk="0" hangingPunct="1">
+              <a:lnSpc>
+                <a:spcPct val="100000"/>
+              </a:lnSpc>
+              <a:spcBef>
+                <a:spcPts val="0"/>
+              </a:spcBef>
+              <a:spcAft>
+                <a:spcPts val="0"/>
+              </a:spcAft>
+              <a:buClrTx/>
+              <a:buSzTx/>
+              <a:buFontTx/>
+              <a:buNone/>
+              <a:tabLst/>
+              <a:defRPr/>
+            </a:pPr>
+            <a:endParaRPr lang="en-US" dirty="0"/>
+          </a:p>
+          <a:p>
+            <a:pPr marL="0" marR="0" lvl="0" indent="0" algn="l" defTabSz="914400" rtl="0" eaLnBrk="1" fontAlgn="auto" latinLnBrk="0" hangingPunct="1">
+              <a:lnSpc>
+                <a:spcPct val="100000"/>
+              </a:lnSpc>
+              <a:spcBef>
+                <a:spcPts val="0"/>
+              </a:spcBef>
+              <a:spcAft>
+                <a:spcPts val="0"/>
+              </a:spcAft>
+              <a:buClrTx/>
+              <a:buSzTx/>
+              <a:buFontTx/>
+              <a:buNone/>
+              <a:tabLst/>
+              <a:defRPr/>
+            </a:pPr>
+            <a:r>
+              <a:rPr lang="en-US" dirty="0"/>
+              <a:t>As a reminder, in R you need the {</a:t>
+            </a:r>
+            <a:r>
+              <a:rPr lang="en-US" dirty="0" err="1"/>
+              <a:t>tidyverse</a:t>
+            </a:r>
+            <a:r>
+              <a:rPr lang="en-US" dirty="0"/>
+              <a:t>} and {</a:t>
+            </a:r>
+            <a:r>
+              <a:rPr lang="en-US" dirty="0" err="1"/>
+              <a:t>tidytext</a:t>
+            </a:r>
+            <a:r>
+              <a:rPr lang="en-US" dirty="0"/>
+              <a:t>} packages for data processing and text analysis. </a:t>
+            </a:r>
+          </a:p>
+          <a:p>
+            <a:pPr marL="0" marR="0" lvl="0" indent="0" algn="l" defTabSz="914400" rtl="0" eaLnBrk="1" fontAlgn="auto" latinLnBrk="0" hangingPunct="1">
+              <a:lnSpc>
+                <a:spcPct val="100000"/>
+              </a:lnSpc>
+              <a:spcBef>
+                <a:spcPts val="0"/>
+              </a:spcBef>
+              <a:spcAft>
+                <a:spcPts val="0"/>
+              </a:spcAft>
+              <a:buClrTx/>
+              <a:buSzTx/>
+              <a:buFontTx/>
+              <a:buNone/>
+              <a:tabLst/>
+              <a:defRPr/>
+            </a:pPr>
+            <a:endParaRPr lang="en-US" dirty="0"/>
+          </a:p>
+          <a:p>
+            <a:pPr marL="0" marR="0" lvl="0" indent="0" algn="l" defTabSz="914400" rtl="0" eaLnBrk="1" fontAlgn="auto" latinLnBrk="0" hangingPunct="1">
+              <a:lnSpc>
+                <a:spcPct val="100000"/>
+              </a:lnSpc>
+              <a:spcBef>
+                <a:spcPts val="0"/>
+              </a:spcBef>
+              <a:spcAft>
+                <a:spcPts val="0"/>
+              </a:spcAft>
+              <a:buClrTx/>
+              <a:buSzTx/>
+              <a:buFontTx/>
+              <a:buNone/>
+              <a:tabLst/>
+              <a:defRPr/>
+            </a:pPr>
+            <a:endParaRPr lang="en-US" dirty="0"/>
+          </a:p>
+          <a:p>
+            <a:endParaRPr lang="en-US" dirty="0"/>
           </a:p>
         </p:txBody>
       </p:sp>
@@ -1648,7 +1605,7 @@
           <a:p>
             <a:fld id="{3C20A7C7-CA8D-4C49-BCFB-55E6C5267475}" type="slidenum">
               <a:rPr lang="en-US" smtClean="0"/>
-              <a:t>19</a:t>
+              <a:t>18</a:t>
             </a:fld>
             <a:endParaRPr lang="en-US"/>
           </a:p>
@@ -1657,7 +1614,7 @@
     </p:spTree>
     <p:extLst>
       <p:ext uri="{BB962C8B-B14F-4D97-AF65-F5344CB8AC3E}">
-        <p14:creationId xmlns:p14="http://schemas.microsoft.com/office/powerpoint/2010/main" val="4252556132"/>
+        <p14:creationId xmlns:p14="http://schemas.microsoft.com/office/powerpoint/2010/main" val="3336625752"/>
       </p:ext>
     </p:extLst>
   </p:cSld>
@@ -1711,69 +1668,45 @@
           <a:bodyPr/>
           <a:lstStyle/>
           <a:p>
-            <a:pPr marL="0" marR="0" lvl="0" indent="0" algn="l" defTabSz="914400" rtl="0" eaLnBrk="1" fontAlgn="auto" latinLnBrk="0" hangingPunct="1">
-              <a:lnSpc>
-                <a:spcPct val="100000"/>
-              </a:lnSpc>
-              <a:spcBef>
-                <a:spcPts val="0"/>
-              </a:spcBef>
-              <a:spcAft>
-                <a:spcPts val="0"/>
-              </a:spcAft>
-              <a:buClrTx/>
-              <a:buSzTx/>
-              <a:buFontTx/>
-              <a:buNone/>
-              <a:tabLst/>
-              <a:defRPr/>
-            </a:pPr>
-            <a:r>
-              <a:rPr lang="en-US" dirty="0"/>
-              <a:t>Text and sentiment analysis are useful for analyzing large quantities of text automatically. They can help us find general themes and feelings, and they allow us to quite quickly analyze text data that could take a long time to process by hand. Applications to institutional research include analyzing course evaluations, student, faculty, or staff responses to surveys, and social media content. In the example we used in this webinar, I analyzed tweets that use the University of Arizona hashtag.</a:t>
-            </a:r>
-          </a:p>
-          <a:p>
-            <a:pPr marL="0" marR="0" lvl="0" indent="0" algn="l" defTabSz="914400" rtl="0" eaLnBrk="1" fontAlgn="auto" latinLnBrk="0" hangingPunct="1">
-              <a:lnSpc>
-                <a:spcPct val="100000"/>
-              </a:lnSpc>
-              <a:spcBef>
-                <a:spcPts val="0"/>
-              </a:spcBef>
-              <a:spcAft>
-                <a:spcPts val="0"/>
-              </a:spcAft>
-              <a:buClrTx/>
-              <a:buSzTx/>
-              <a:buFontTx/>
-              <a:buNone/>
-              <a:tabLst/>
-              <a:defRPr/>
-            </a:pPr>
+            <a:r>
+              <a:rPr lang="en-US" dirty="0"/>
+              <a:t>Here’s a quick review of some of the terminology used in text analysis.</a:t>
+            </a:r>
+          </a:p>
+          <a:p>
             <a:endParaRPr lang="en-US" dirty="0"/>
           </a:p>
           <a:p>
-            <a:pPr marL="0" marR="0" lvl="0" indent="0" algn="l" defTabSz="914400" rtl="0" eaLnBrk="1" fontAlgn="auto" latinLnBrk="0" hangingPunct="1">
-              <a:lnSpc>
-                <a:spcPct val="100000"/>
-              </a:lnSpc>
-              <a:spcBef>
-                <a:spcPts val="0"/>
-              </a:spcBef>
-              <a:spcAft>
-                <a:spcPts val="0"/>
-              </a:spcAft>
-              <a:buClrTx/>
-              <a:buSzTx/>
-              <a:buFontTx/>
-              <a:buNone/>
-              <a:tabLst/>
-              <a:defRPr/>
-            </a:pPr>
-            <a:r>
-              <a:rPr lang="en-US" b="1" dirty="0"/>
-              <a:t>AND WE FOUND….</a:t>
+            <a:r>
+              <a:rPr lang="en-US" dirty="0"/>
+              <a:t>A corpus is a large collection or set of documents.</a:t>
+            </a:r>
+          </a:p>
+          <a:p>
+            <a:endParaRPr lang="en-US" dirty="0"/>
+          </a:p>
+          <a:p>
+            <a:r>
+              <a:rPr lang="en-US" dirty="0"/>
+              <a:t>A document is an individual piece of text data such as a book, an email, a tweet or set of tweets, responses to an open-ended survey question, a course evaluation, etc.</a:t>
+            </a:r>
+          </a:p>
+          <a:p>
+            <a:endParaRPr lang="en-US" dirty="0"/>
+          </a:p>
+          <a:p>
+            <a:r>
+              <a:rPr lang="en-US" dirty="0"/>
+              <a:t>A token is a meaningful unit of text, such as a word. Tokens may also be referred to as terms. </a:t>
+            </a:r>
+          </a:p>
+          <a:p>
+            <a:endParaRPr lang="en-US" dirty="0"/>
+          </a:p>
+          <a:p>
+            <a:r>
+              <a:rPr lang="en-US" dirty="0"/>
+              <a:t>A document is made up of words/terms/tokens. A corpus is made up of documents.</a:t>
             </a:r>
           </a:p>
         </p:txBody>
@@ -1795,7 +1728,7 @@
           <a:p>
             <a:fld id="{3C20A7C7-CA8D-4C49-BCFB-55E6C5267475}" type="slidenum">
               <a:rPr lang="en-US" smtClean="0"/>
-              <a:t>21</a:t>
+              <a:t>19</a:t>
             </a:fld>
             <a:endParaRPr lang="en-US"/>
           </a:p>
@@ -1804,7 +1737,7 @@
     </p:spTree>
     <p:extLst>
       <p:ext uri="{BB962C8B-B14F-4D97-AF65-F5344CB8AC3E}">
-        <p14:creationId xmlns:p14="http://schemas.microsoft.com/office/powerpoint/2010/main" val="2920543570"/>
+        <p14:creationId xmlns:p14="http://schemas.microsoft.com/office/powerpoint/2010/main" val="736614886"/>
       </p:ext>
     </p:extLst>
   </p:cSld>
@@ -1860,32 +1793,7 @@
           <a:p>
             <a:r>
               <a:rPr lang="en-US" dirty="0"/>
-              <a:t>Using the provided code, switch out the example tweet data for text data of your own. Then try out the code and see what insights you can find in your own text analysis.</a:t>
-            </a:r>
-          </a:p>
-          <a:p>
-            <a:endParaRPr lang="en-US" dirty="0"/>
-          </a:p>
-          <a:p>
-            <a:r>
-              <a:rPr lang="en-US" dirty="0"/>
-              <a:t>The book </a:t>
-            </a:r>
-            <a:r>
-              <a:rPr lang="en-US" i="1" dirty="0"/>
-              <a:t>Text Mining with R </a:t>
-            </a:r>
-            <a:r>
-              <a:rPr lang="en-US" dirty="0"/>
-              <a:t>by Julia </a:t>
-            </a:r>
-            <a:r>
-              <a:rPr lang="en-US" dirty="0" err="1"/>
-              <a:t>Silge</a:t>
-            </a:r>
-            <a:r>
-              <a:rPr lang="en-US" dirty="0"/>
-              <a:t> and David Robinson is available online at the URL provided above. This is an extensive resource for text analysis in R and contains lots of examples. If you want to go further with the analysis of Twitter data, it includes a whole case study comparing tweets from each of the authors. There is also a chapter on analyzing n-grams, which expands text analysis from 1 word to multiple words. The book also contains information on how to do some modeling with text data. It is a very comprehensive resource if you’d like to learn more about text analysis in R.</a:t>
+              <a:t>Here’s a reminder of tidy data. Tidy data is a structure of data in which each variable is a column, each observation is a row, and each cell is a single measurement. For text analysis, we can create a tidy text data table or data frame which contains one token per row. Recall that a token is a meaningful unit of text, such as a word. The first step in text analysis is called tokenizing, which involves splitting a long text string, such as a tweet, document, or open-ended responses, into individual words or sets of words. </a:t>
             </a:r>
           </a:p>
         </p:txBody>
@@ -1907,7 +1815,7 @@
           <a:p>
             <a:fld id="{3C20A7C7-CA8D-4C49-BCFB-55E6C5267475}" type="slidenum">
               <a:rPr lang="en-US" smtClean="0"/>
-              <a:t>22</a:t>
+              <a:t>20</a:t>
             </a:fld>
             <a:endParaRPr lang="en-US"/>
           </a:p>
@@ -1916,7 +1824,7 @@
     </p:spTree>
     <p:extLst>
       <p:ext uri="{BB962C8B-B14F-4D97-AF65-F5344CB8AC3E}">
-        <p14:creationId xmlns:p14="http://schemas.microsoft.com/office/powerpoint/2010/main" val="4098988218"/>
+        <p14:creationId xmlns:p14="http://schemas.microsoft.com/office/powerpoint/2010/main" val="4252556132"/>
       </p:ext>
     </p:extLst>
   </p:cSld>
@@ -1972,7 +1880,7 @@
           <a:p>
             <a:r>
               <a:rPr lang="en-US" dirty="0"/>
-              <a:t>Welcome to Day 1 of the Sentiment Analysis in R webinar. I’m Jenn Schilling, my pronouns are she/her/hers, and I am so happy you’re here. I am a senior data analyst at the University of Arizona, and an adjunct faculty member at the College for Creative Studies where I teach graduate classes on data visualization. Thank you for being here, and I hope you will find this webinar beneficial. Before I begin, I would like acknowledge that I am on the </a:t>
+              <a:t>I’m Jenn Schilling, my pronouns are she/her/hers. I am a senior data analyst at the University of Arizona, and an adjunct faculty member at the College for Creative Studies where I teach graduate classes on data visualization. Thank you for being here, and I hope you will find this webinar beneficial. Before I begin, I would like acknowledge that I am on the </a:t>
             </a:r>
             <a:r>
               <a:rPr lang="en-US" b="0" i="0" dirty="0">
@@ -2089,17 +1997,69 @@
           <a:bodyPr/>
           <a:lstStyle/>
           <a:p>
-            <a:r>
-              <a:rPr lang="en-US" dirty="0"/>
-              <a:t>After recapping the previous session, we dove into a complete sentiment analysis and visualized the findings. We also discussed how to move beyond individual words in a text analysis and went through a </a:t>
-            </a:r>
-            <a:r>
-              <a:rPr lang="en-US"/>
-              <a:t>short example of two-word phrases. </a:t>
-            </a:r>
-            <a:r>
-              <a:rPr lang="en-US" dirty="0"/>
-              <a:t>Finally, we reviewed the insights that can be gained from text and sentiment analysis and discussed how to go further. </a:t>
+            <a:pPr marL="0" marR="0" lvl="0" indent="0" algn="l" defTabSz="914400" rtl="0" eaLnBrk="1" fontAlgn="auto" latinLnBrk="0" hangingPunct="1">
+              <a:lnSpc>
+                <a:spcPct val="100000"/>
+              </a:lnSpc>
+              <a:spcBef>
+                <a:spcPts val="0"/>
+              </a:spcBef>
+              <a:spcAft>
+                <a:spcPts val="0"/>
+              </a:spcAft>
+              <a:buClrTx/>
+              <a:buSzTx/>
+              <a:buFontTx/>
+              <a:buNone/>
+              <a:tabLst/>
+              <a:defRPr/>
+            </a:pPr>
+            <a:r>
+              <a:rPr lang="en-US" dirty="0"/>
+              <a:t>Text and sentiment analysis are useful for analyzing large quantities of text automatically. They can help us find general themes and feelings, and they allow us to quite quickly analyze text data that could take a long time to process by hand. Applications to institutional research include analyzing course evaluations, student, faculty, or staff responses to surveys, and social media content. In the example we used in this webinar, I analyzed tweets that use the University of Arizona hashtag.</a:t>
+            </a:r>
+          </a:p>
+          <a:p>
+            <a:pPr marL="0" marR="0" lvl="0" indent="0" algn="l" defTabSz="914400" rtl="0" eaLnBrk="1" fontAlgn="auto" latinLnBrk="0" hangingPunct="1">
+              <a:lnSpc>
+                <a:spcPct val="100000"/>
+              </a:lnSpc>
+              <a:spcBef>
+                <a:spcPts val="0"/>
+              </a:spcBef>
+              <a:spcAft>
+                <a:spcPts val="0"/>
+              </a:spcAft>
+              <a:buClrTx/>
+              <a:buSzTx/>
+              <a:buFontTx/>
+              <a:buNone/>
+              <a:tabLst/>
+              <a:defRPr/>
+            </a:pPr>
+            <a:endParaRPr lang="en-US" dirty="0"/>
+          </a:p>
+          <a:p>
+            <a:pPr marL="0" marR="0" lvl="0" indent="0" algn="l" defTabSz="914400" rtl="0" eaLnBrk="1" fontAlgn="auto" latinLnBrk="0" hangingPunct="1">
+              <a:lnSpc>
+                <a:spcPct val="100000"/>
+              </a:lnSpc>
+              <a:spcBef>
+                <a:spcPts val="0"/>
+              </a:spcBef>
+              <a:spcAft>
+                <a:spcPts val="0"/>
+              </a:spcAft>
+              <a:buClrTx/>
+              <a:buSzTx/>
+              <a:buFontTx/>
+              <a:buNone/>
+              <a:tabLst/>
+              <a:defRPr/>
+            </a:pPr>
+            <a:r>
+              <a:rPr lang="en-US" dirty="0"/>
+              <a:t>And we found sentiment and word frequencies by day as well as overall the tweets. We could see when the University of Arizona football team was not performing well, and when other topics such as Hispanic Heritage Month or Cancer Awareness were being discussed. </a:t>
             </a:r>
           </a:p>
         </p:txBody>
@@ -2121,7 +2081,7 @@
           <a:p>
             <a:fld id="{3C20A7C7-CA8D-4C49-BCFB-55E6C5267475}" type="slidenum">
               <a:rPr lang="en-US" smtClean="0"/>
-              <a:t>23</a:t>
+              <a:t>22</a:t>
             </a:fld>
             <a:endParaRPr lang="en-US"/>
           </a:p>
@@ -2130,7 +2090,7 @@
     </p:spTree>
     <p:extLst>
       <p:ext uri="{BB962C8B-B14F-4D97-AF65-F5344CB8AC3E}">
-        <p14:creationId xmlns:p14="http://schemas.microsoft.com/office/powerpoint/2010/main" val="838260591"/>
+        <p14:creationId xmlns:p14="http://schemas.microsoft.com/office/powerpoint/2010/main" val="2920543570"/>
       </p:ext>
     </p:extLst>
   </p:cSld>
@@ -2186,7 +2146,206 @@
           <a:p>
             <a:r>
               <a:rPr lang="en-US" dirty="0"/>
-              <a:t>Thank you so much for joining this webinar. I hope you found it beneficial and helpful. I am so glad I got to spend a couple of hours with you this week.</a:t>
+              <a:t>Using the provided code, switch out the example tweet data for text data of your own. Then try out the code and see what insights you can find in your own text analysis.</a:t>
+            </a:r>
+          </a:p>
+          <a:p>
+            <a:endParaRPr lang="en-US" dirty="0"/>
+          </a:p>
+          <a:p>
+            <a:r>
+              <a:rPr lang="en-US" dirty="0"/>
+              <a:t>The book </a:t>
+            </a:r>
+            <a:r>
+              <a:rPr lang="en-US" i="1" dirty="0"/>
+              <a:t>Text Mining with R </a:t>
+            </a:r>
+            <a:r>
+              <a:rPr lang="en-US" dirty="0"/>
+              <a:t>by Julia </a:t>
+            </a:r>
+            <a:r>
+              <a:rPr lang="en-US" dirty="0" err="1"/>
+              <a:t>Silge</a:t>
+            </a:r>
+            <a:r>
+              <a:rPr lang="en-US" dirty="0"/>
+              <a:t> and David Robinson is available online at the URL provided above. This is an extensive resource for text analysis in R and contains lots of examples. If you want to go further with the analysis of Twitter data, it includes a whole case study comparing tweets from each of the authors. There is also a chapter on analyzing n-grams, which expands text analysis from 1 word to multiple words. The book also contains information on how to do some modeling with text data. It is a very comprehensive resource if you’d like to learn more about text analysis in R.</a:t>
+            </a:r>
+          </a:p>
+        </p:txBody>
+      </p:sp>
+      <p:sp>
+        <p:nvSpPr>
+          <p:cNvPr id="4" name="Slide Number Placeholder 3"/>
+          <p:cNvSpPr>
+            <a:spLocks noGrp="1"/>
+          </p:cNvSpPr>
+          <p:nvPr>
+            <p:ph type="sldNum" sz="quarter" idx="5"/>
+          </p:nvPr>
+        </p:nvSpPr>
+        <p:spPr/>
+        <p:txBody>
+          <a:bodyPr/>
+          <a:lstStyle/>
+          <a:p>
+            <a:fld id="{3C20A7C7-CA8D-4C49-BCFB-55E6C5267475}" type="slidenum">
+              <a:rPr lang="en-US" smtClean="0"/>
+              <a:t>23</a:t>
+            </a:fld>
+            <a:endParaRPr lang="en-US"/>
+          </a:p>
+        </p:txBody>
+      </p:sp>
+    </p:spTree>
+    <p:extLst>
+      <p:ext uri="{BB962C8B-B14F-4D97-AF65-F5344CB8AC3E}">
+        <p14:creationId xmlns:p14="http://schemas.microsoft.com/office/powerpoint/2010/main" val="4098988218"/>
+      </p:ext>
+    </p:extLst>
+  </p:cSld>
+  <p:clrMapOvr>
+    <a:masterClrMapping/>
+  </p:clrMapOvr>
+</p:notes>
+</file>
+
+<file path=ppt/notesSlides/notesSlide22.xml><?xml version="1.0" encoding="utf-8"?>
+<p:notes xmlns:a="http://schemas.openxmlformats.org/drawingml/2006/main" xmlns:r="http://schemas.openxmlformats.org/officeDocument/2006/relationships" xmlns:p="http://schemas.openxmlformats.org/presentationml/2006/main">
+  <p:cSld>
+    <p:spTree>
+      <p:nvGrpSpPr>
+        <p:cNvPr id="1" name=""/>
+        <p:cNvGrpSpPr/>
+        <p:nvPr/>
+      </p:nvGrpSpPr>
+      <p:grpSpPr>
+        <a:xfrm>
+          <a:off x="0" y="0"/>
+          <a:ext cx="0" cy="0"/>
+          <a:chOff x="0" y="0"/>
+          <a:chExt cx="0" cy="0"/>
+        </a:xfrm>
+      </p:grpSpPr>
+      <p:sp>
+        <p:nvSpPr>
+          <p:cNvPr id="2" name="Slide Image Placeholder 1"/>
+          <p:cNvSpPr>
+            <a:spLocks noGrp="1" noRot="1" noChangeAspect="1"/>
+          </p:cNvSpPr>
+          <p:nvPr>
+            <p:ph type="sldImg"/>
+          </p:nvPr>
+        </p:nvSpPr>
+        <p:spPr/>
+      </p:sp>
+      <p:sp>
+        <p:nvSpPr>
+          <p:cNvPr id="3" name="Notes Placeholder 2"/>
+          <p:cNvSpPr>
+            <a:spLocks noGrp="1"/>
+          </p:cNvSpPr>
+          <p:nvPr>
+            <p:ph type="body" idx="1"/>
+          </p:nvPr>
+        </p:nvSpPr>
+        <p:spPr/>
+        <p:txBody>
+          <a:bodyPr/>
+          <a:lstStyle/>
+          <a:p>
+            <a:r>
+              <a:rPr lang="en-US" dirty="0"/>
+              <a:t>After recapping the previous session, we dove into a complete sentiment analysis and visualized the findings. We also discussed how to move beyond individual words in a text analysis and went through a short example of two-word phrases. Finally, we reviewed the insights that can be gained from text and sentiment analysis and discussed how to go further. </a:t>
+            </a:r>
+          </a:p>
+        </p:txBody>
+      </p:sp>
+      <p:sp>
+        <p:nvSpPr>
+          <p:cNvPr id="4" name="Slide Number Placeholder 3"/>
+          <p:cNvSpPr>
+            <a:spLocks noGrp="1"/>
+          </p:cNvSpPr>
+          <p:nvPr>
+            <p:ph type="sldNum" sz="quarter" idx="5"/>
+          </p:nvPr>
+        </p:nvSpPr>
+        <p:spPr/>
+        <p:txBody>
+          <a:bodyPr/>
+          <a:lstStyle/>
+          <a:p>
+            <a:fld id="{3C20A7C7-CA8D-4C49-BCFB-55E6C5267475}" type="slidenum">
+              <a:rPr lang="en-US" smtClean="0"/>
+              <a:t>24</a:t>
+            </a:fld>
+            <a:endParaRPr lang="en-US"/>
+          </a:p>
+        </p:txBody>
+      </p:sp>
+    </p:spTree>
+    <p:extLst>
+      <p:ext uri="{BB962C8B-B14F-4D97-AF65-F5344CB8AC3E}">
+        <p14:creationId xmlns:p14="http://schemas.microsoft.com/office/powerpoint/2010/main" val="838260591"/>
+      </p:ext>
+    </p:extLst>
+  </p:cSld>
+  <p:clrMapOvr>
+    <a:masterClrMapping/>
+  </p:clrMapOvr>
+</p:notes>
+</file>
+
+<file path=ppt/notesSlides/notesSlide23.xml><?xml version="1.0" encoding="utf-8"?>
+<p:notes xmlns:a="http://schemas.openxmlformats.org/drawingml/2006/main" xmlns:r="http://schemas.openxmlformats.org/officeDocument/2006/relationships" xmlns:p="http://schemas.openxmlformats.org/presentationml/2006/main">
+  <p:cSld>
+    <p:spTree>
+      <p:nvGrpSpPr>
+        <p:cNvPr id="1" name=""/>
+        <p:cNvGrpSpPr/>
+        <p:nvPr/>
+      </p:nvGrpSpPr>
+      <p:grpSpPr>
+        <a:xfrm>
+          <a:off x="0" y="0"/>
+          <a:ext cx="0" cy="0"/>
+          <a:chOff x="0" y="0"/>
+          <a:chExt cx="0" cy="0"/>
+        </a:xfrm>
+      </p:grpSpPr>
+      <p:sp>
+        <p:nvSpPr>
+          <p:cNvPr id="2" name="Slide Image Placeholder 1"/>
+          <p:cNvSpPr>
+            <a:spLocks noGrp="1" noRot="1" noChangeAspect="1"/>
+          </p:cNvSpPr>
+          <p:nvPr>
+            <p:ph type="sldImg"/>
+          </p:nvPr>
+        </p:nvSpPr>
+        <p:spPr/>
+      </p:sp>
+      <p:sp>
+        <p:nvSpPr>
+          <p:cNvPr id="3" name="Notes Placeholder 2"/>
+          <p:cNvSpPr>
+            <a:spLocks noGrp="1"/>
+          </p:cNvSpPr>
+          <p:nvPr>
+            <p:ph type="body" idx="1"/>
+          </p:nvPr>
+        </p:nvSpPr>
+        <p:spPr/>
+        <p:txBody>
+          <a:bodyPr/>
+          <a:lstStyle/>
+          <a:p>
+            <a:r>
+              <a:rPr lang="en-US" dirty="0"/>
+              <a:t>Thank you so much for being here today. I hope this webinar was beneficial. Thank you to AIR for having me and to Elaine and Emily for their support. </a:t>
             </a:r>
           </a:p>
         </p:txBody>
@@ -2209,6 +2368,93 @@
             <a:fld id="{3C20A7C7-CA8D-4C49-BCFB-55E6C5267475}" type="slidenum">
               <a:rPr lang="en-US" smtClean="0"/>
               <a:t>25</a:t>
+            </a:fld>
+            <a:endParaRPr lang="en-US"/>
+          </a:p>
+        </p:txBody>
+      </p:sp>
+    </p:spTree>
+    <p:extLst>
+      <p:ext uri="{BB962C8B-B14F-4D97-AF65-F5344CB8AC3E}">
+        <p14:creationId xmlns:p14="http://schemas.microsoft.com/office/powerpoint/2010/main" val="2328103703"/>
+      </p:ext>
+    </p:extLst>
+  </p:cSld>
+  <p:clrMapOvr>
+    <a:masterClrMapping/>
+  </p:clrMapOvr>
+</p:notes>
+</file>
+
+<file path=ppt/notesSlides/notesSlide24.xml><?xml version="1.0" encoding="utf-8"?>
+<p:notes xmlns:a="http://schemas.openxmlformats.org/drawingml/2006/main" xmlns:r="http://schemas.openxmlformats.org/officeDocument/2006/relationships" xmlns:p="http://schemas.openxmlformats.org/presentationml/2006/main">
+  <p:cSld>
+    <p:spTree>
+      <p:nvGrpSpPr>
+        <p:cNvPr id="1" name=""/>
+        <p:cNvGrpSpPr/>
+        <p:nvPr/>
+      </p:nvGrpSpPr>
+      <p:grpSpPr>
+        <a:xfrm>
+          <a:off x="0" y="0"/>
+          <a:ext cx="0" cy="0"/>
+          <a:chOff x="0" y="0"/>
+          <a:chExt cx="0" cy="0"/>
+        </a:xfrm>
+      </p:grpSpPr>
+      <p:sp>
+        <p:nvSpPr>
+          <p:cNvPr id="2" name="Slide Image Placeholder 1"/>
+          <p:cNvSpPr>
+            <a:spLocks noGrp="1" noRot="1" noChangeAspect="1"/>
+          </p:cNvSpPr>
+          <p:nvPr>
+            <p:ph type="sldImg"/>
+          </p:nvPr>
+        </p:nvSpPr>
+        <p:spPr/>
+      </p:sp>
+      <p:sp>
+        <p:nvSpPr>
+          <p:cNvPr id="3" name="Notes Placeholder 2"/>
+          <p:cNvSpPr>
+            <a:spLocks noGrp="1"/>
+          </p:cNvSpPr>
+          <p:nvPr>
+            <p:ph type="body" idx="1"/>
+          </p:nvPr>
+        </p:nvSpPr>
+        <p:spPr/>
+        <p:txBody>
+          <a:bodyPr/>
+          <a:lstStyle/>
+          <a:p>
+            <a:r>
+              <a:rPr lang="en-US" dirty="0"/>
+              <a:t>Thank you again for joining this webinar. I hope you found it beneficial and helpful. I am so glad I got to spend a couple of hours with you this week.</a:t>
+            </a:r>
+          </a:p>
+        </p:txBody>
+      </p:sp>
+      <p:sp>
+        <p:nvSpPr>
+          <p:cNvPr id="4" name="Slide Number Placeholder 3"/>
+          <p:cNvSpPr>
+            <a:spLocks noGrp="1"/>
+          </p:cNvSpPr>
+          <p:nvPr>
+            <p:ph type="sldNum" sz="quarter" idx="5"/>
+          </p:nvPr>
+        </p:nvSpPr>
+        <p:spPr/>
+        <p:txBody>
+          <a:bodyPr/>
+          <a:lstStyle/>
+          <a:p>
+            <a:fld id="{3C20A7C7-CA8D-4C49-BCFB-55E6C5267475}" type="slidenum">
+              <a:rPr lang="en-US" smtClean="0"/>
+              <a:t>26</a:t>
             </a:fld>
             <a:endParaRPr lang="en-US"/>
           </a:p>
@@ -4887,7 +5133,7 @@
           <a:p>
             <a:fld id="{C9727A96-7105-44AE-B9F0-3BA74D06A54C}" type="datetimeFigureOut">
               <a:rPr lang="en-US" smtClean="0"/>
-              <a:t>9/28/2021</a:t>
+              <a:t>10/18/2021</a:t>
             </a:fld>
             <a:endParaRPr lang="en-US"/>
           </a:p>
@@ -5085,7 +5331,7 @@
           <a:p>
             <a:fld id="{C9727A96-7105-44AE-B9F0-3BA74D06A54C}" type="datetimeFigureOut">
               <a:rPr lang="en-US" smtClean="0"/>
-              <a:t>9/28/2021</a:t>
+              <a:t>10/18/2021</a:t>
             </a:fld>
             <a:endParaRPr lang="en-US"/>
           </a:p>
@@ -5321,7 +5567,7 @@
           <a:p>
             <a:fld id="{C9727A96-7105-44AE-B9F0-3BA74D06A54C}" type="datetimeFigureOut">
               <a:rPr lang="en-US" smtClean="0"/>
-              <a:t>9/28/2021</a:t>
+              <a:t>10/18/2021</a:t>
             </a:fld>
             <a:endParaRPr lang="en-US"/>
           </a:p>
@@ -5657,7 +5903,7 @@
           <a:p>
             <a:fld id="{986F8839-423C-1541-BA9A-A38B5B6A10D1}" type="datetimeFigureOut">
               <a:rPr lang="en-US" smtClean="0"/>
-              <a:t>9/28/2021</a:t>
+              <a:t>10/18/2021</a:t>
             </a:fld>
             <a:endParaRPr lang="en-US"/>
           </a:p>
@@ -6754,7 +7000,7 @@
           <p:cNvPr id="2" name="Title 1">
             <a:extLst>
               <a:ext uri="{FF2B5EF4-FFF2-40B4-BE49-F238E27FC236}">
-                <a16:creationId xmlns:a16="http://schemas.microsoft.com/office/drawing/2014/main" id="{68E7F413-5848-4FF9-90FF-F4D1B37E4837}"/>
+                <a16:creationId xmlns:a16="http://schemas.microsoft.com/office/drawing/2014/main" id="{E93E1AFD-598D-4189-9E4F-06066EAED01F}"/>
               </a:ext>
             </a:extLst>
           </p:cNvPr>
@@ -6774,7 +7020,7 @@
           <a:p>
             <a:r>
               <a:rPr lang="en-US" sz="3600" dirty="0"/>
-              <a:t>Learning Outcomes</a:t>
+              <a:t>Hello!</a:t>
             </a:r>
           </a:p>
         </p:txBody>
@@ -6784,7 +7030,7 @@
           <p:cNvPr id="3" name="Content Placeholder 2">
             <a:extLst>
               <a:ext uri="{FF2B5EF4-FFF2-40B4-BE49-F238E27FC236}">
-                <a16:creationId xmlns:a16="http://schemas.microsoft.com/office/drawing/2014/main" id="{A366A98A-E3CA-4E30-9B3F-09E95FB08DB4}"/>
+                <a16:creationId xmlns:a16="http://schemas.microsoft.com/office/drawing/2014/main" id="{908907C5-255A-4920-A3C4-C80C128AD0BE}"/>
               </a:ext>
             </a:extLst>
           </p:cNvPr>
@@ -6795,48 +7041,131 @@
             <p:ph idx="1"/>
           </p:nvPr>
         </p:nvSpPr>
-        <p:spPr/>
-        <p:txBody>
-          <a:bodyPr>
+        <p:spPr>
+          <a:xfrm>
+            <a:off x="6096000" y="1253331"/>
+            <a:ext cx="4980709" cy="4351338"/>
+          </a:xfrm>
+        </p:spPr>
+        <p:txBody>
+          <a:bodyPr anchor="ctr">
             <a:normAutofit/>
           </a:bodyPr>
           <a:lstStyle/>
           <a:p>
-            <a:pPr>
-              <a:buFont typeface="Arial" panose="020B0604020202020204" pitchFamily="34" charset="0"/>
-              <a:buChar char="•"/>
+            <a:pPr marL="0" indent="0">
+              <a:buNone/>
             </a:pPr>
             <a:r>
-              <a:rPr lang="en-US" dirty="0"/>
-              <a:t>Prepare data for a text analysis in R</a:t>
-            </a:r>
-          </a:p>
-          <a:p>
-            <a:pPr>
-              <a:buFont typeface="Arial" panose="020B0604020202020204" pitchFamily="34" charset="0"/>
-              <a:buChar char="•"/>
+              <a:rPr lang="en-US" b="1" dirty="0"/>
+              <a:t>Jenn Schilling</a:t>
+            </a:r>
+          </a:p>
+          <a:p>
+            <a:pPr marL="0" indent="0">
+              <a:buNone/>
             </a:pPr>
             <a:r>
-              <a:rPr lang="en-US" dirty="0"/>
-              <a:t>Conduct text mining in R</a:t>
-            </a:r>
-          </a:p>
-          <a:p>
-            <a:pPr>
-              <a:buFont typeface="Arial" panose="020B0604020202020204" pitchFamily="34" charset="0"/>
-              <a:buChar char="•"/>
+              <a:rPr lang="en-US" sz="2000" dirty="0"/>
+              <a:t>she/her/hers</a:t>
+            </a:r>
+          </a:p>
+          <a:p>
+            <a:pPr marL="0" indent="0">
+              <a:buNone/>
             </a:pPr>
             <a:r>
-              <a:rPr lang="en-US" dirty="0"/>
-              <a:t>Complete sentiment analysis in R</a:t>
-            </a:r>
-          </a:p>
-        </p:txBody>
-      </p:sp>
+              <a:rPr lang="en-US" sz="2400" dirty="0"/>
+              <a:t>Senior Data Analyst, University Analytics &amp; Institutional Research, University of Arizona</a:t>
+            </a:r>
+          </a:p>
+          <a:p>
+            <a:pPr marL="0" indent="0">
+              <a:buNone/>
+            </a:pPr>
+            <a:r>
+              <a:rPr lang="en-US" sz="2400" dirty="0"/>
+              <a:t>Adjunct Faculty, College for Creative Studies</a:t>
+            </a:r>
+          </a:p>
+          <a:p>
+            <a:pPr marL="0" indent="0">
+              <a:buNone/>
+            </a:pPr>
+            <a:endParaRPr lang="en-US" dirty="0"/>
+          </a:p>
+        </p:txBody>
+      </p:sp>
+      <p:pic>
+        <p:nvPicPr>
+          <p:cNvPr id="3074" name="Picture 2">
+            <a:extLst>
+              <a:ext uri="{FF2B5EF4-FFF2-40B4-BE49-F238E27FC236}">
+                <a16:creationId xmlns:a16="http://schemas.microsoft.com/office/drawing/2014/main" id="{4495077C-E261-40E4-8746-C33486B13681}"/>
+              </a:ext>
+            </a:extLst>
+          </p:cNvPr>
+          <p:cNvPicPr>
+            <a:picLocks noChangeAspect="1" noChangeArrowheads="1"/>
+          </p:cNvPicPr>
+          <p:nvPr/>
+        </p:nvPicPr>
+        <p:blipFill rotWithShape="1">
+          <a:blip r:embed="rId3">
+            <a:extLst>
+              <a:ext uri="{28A0092B-C50C-407E-A947-70E740481C1C}">
+                <a14:useLocalDpi xmlns:a14="http://schemas.microsoft.com/office/drawing/2010/main" val="0"/>
+              </a:ext>
+            </a:extLst>
+          </a:blip>
+          <a:srcRect l="3625" r="7629" b="4"/>
+          <a:stretch/>
+        </p:blipFill>
+        <p:spPr bwMode="auto">
+          <a:xfrm>
+            <a:off x="1115291" y="1255183"/>
+            <a:ext cx="4347635" cy="4347635"/>
+          </a:xfrm>
+          <a:custGeom>
+            <a:avLst/>
+            <a:gdLst/>
+            <a:ahLst/>
+            <a:cxnLst/>
+            <a:rect l="l" t="t" r="r" b="b"/>
+            <a:pathLst>
+              <a:path w="4291285" h="4291285">
+                <a:moveTo>
+                  <a:pt x="2145643" y="0"/>
+                </a:moveTo>
+                <a:lnTo>
+                  <a:pt x="4291285" y="2145643"/>
+                </a:lnTo>
+                <a:lnTo>
+                  <a:pt x="2145643" y="4291285"/>
+                </a:lnTo>
+                <a:lnTo>
+                  <a:pt x="0" y="2145643"/>
+                </a:lnTo>
+                <a:close/>
+              </a:path>
+            </a:pathLst>
+          </a:custGeom>
+          <a:noFill/>
+          <a:extLst>
+            <a:ext uri="{909E8E84-426E-40DD-AFC4-6F175D3DCCD1}">
+              <a14:hiddenFill xmlns:a14="http://schemas.microsoft.com/office/drawing/2010/main">
+                <a:solidFill>
+                  <a:srgbClr val="FFFFFF"/>
+                </a:solidFill>
+              </a14:hiddenFill>
+            </a:ext>
+          </a:extLst>
+        </p:spPr>
+      </p:pic>
     </p:spTree>
     <p:extLst>
       <p:ext uri="{BB962C8B-B14F-4D97-AF65-F5344CB8AC3E}">
-        <p14:creationId xmlns:p14="http://schemas.microsoft.com/office/powerpoint/2010/main" val="386071705"/>
+        <p14:creationId xmlns:p14="http://schemas.microsoft.com/office/powerpoint/2010/main" val="1319676536"/>
       </p:ext>
     </p:extLst>
   </p:cSld>
@@ -6849,14 +7178,6 @@
 <file path=ppt/slides/slide16.xml><?xml version="1.0" encoding="utf-8"?>
 <p:sld xmlns:a="http://schemas.openxmlformats.org/drawingml/2006/main" xmlns:r="http://schemas.openxmlformats.org/officeDocument/2006/relationships" xmlns:p="http://schemas.openxmlformats.org/presentationml/2006/main">
   <p:cSld>
-    <p:bg>
-      <p:bgPr>
-        <a:solidFill>
-          <a:schemeClr val="bg1"/>
-        </a:solidFill>
-        <a:effectLst/>
-      </p:bgPr>
-    </p:bg>
     <p:spTree>
       <p:nvGrpSpPr>
         <p:cNvPr id="1" name=""/>
@@ -6876,7 +7197,7 @@
           <p:cNvPr id="2" name="Title 1">
             <a:extLst>
               <a:ext uri="{FF2B5EF4-FFF2-40B4-BE49-F238E27FC236}">
-                <a16:creationId xmlns:a16="http://schemas.microsoft.com/office/drawing/2014/main" id="{303FC117-54AE-4231-8219-69E3526E2341}"/>
+                <a16:creationId xmlns:a16="http://schemas.microsoft.com/office/drawing/2014/main" id="{68E7F413-5848-4FF9-90FF-F4D1B37E4837}"/>
               </a:ext>
             </a:extLst>
           </p:cNvPr>
@@ -6896,7 +7217,7 @@
           <a:p>
             <a:r>
               <a:rPr lang="en-US" sz="3600" dirty="0"/>
-              <a:t>Day 2 Agenda</a:t>
+              <a:t>Learning Outcomes</a:t>
             </a:r>
           </a:p>
         </p:txBody>
@@ -6906,7 +7227,7 @@
           <p:cNvPr id="3" name="Content Placeholder 2">
             <a:extLst>
               <a:ext uri="{FF2B5EF4-FFF2-40B4-BE49-F238E27FC236}">
-                <a16:creationId xmlns:a16="http://schemas.microsoft.com/office/drawing/2014/main" id="{BDAA0CD9-D632-4B6B-BF3C-73302529A4C9}"/>
+                <a16:creationId xmlns:a16="http://schemas.microsoft.com/office/drawing/2014/main" id="{A366A98A-E3CA-4E30-9B3F-09E95FB08DB4}"/>
               </a:ext>
             </a:extLst>
           </p:cNvPr>
@@ -6924,39 +7245,33 @@
           </a:bodyPr>
           <a:lstStyle/>
           <a:p>
-            <a:r>
-              <a:rPr lang="en-US" dirty="0"/>
-              <a:t>Recap of previous session </a:t>
-            </a:r>
-          </a:p>
-          <a:p>
-            <a:r>
-              <a:rPr lang="en-US" dirty="0"/>
-              <a:t>Sentiment Analysis</a:t>
-            </a:r>
-          </a:p>
-          <a:p>
-            <a:r>
-              <a:rPr lang="en-US" dirty="0"/>
-              <a:t>Visualizing Results</a:t>
-            </a:r>
-          </a:p>
-          <a:p>
-            <a:r>
-              <a:rPr lang="en-US" dirty="0"/>
-              <a:t>Moving Beyond Words</a:t>
-            </a:r>
-          </a:p>
-          <a:p>
-            <a:r>
-              <a:rPr lang="en-US" dirty="0"/>
-              <a:t>Where to go from here </a:t>
-            </a:r>
-          </a:p>
-          <a:p>
-            <a:r>
-              <a:rPr lang="en-US" dirty="0"/>
-              <a:t>Questions</a:t>
+            <a:pPr>
+              <a:buFont typeface="Arial" panose="020B0604020202020204" pitchFamily="34" charset="0"/>
+              <a:buChar char="•"/>
+            </a:pPr>
+            <a:r>
+              <a:rPr lang="en-US" dirty="0"/>
+              <a:t>Prepare data for a text analysis in R</a:t>
+            </a:r>
+          </a:p>
+          <a:p>
+            <a:pPr>
+              <a:buFont typeface="Arial" panose="020B0604020202020204" pitchFamily="34" charset="0"/>
+              <a:buChar char="•"/>
+            </a:pPr>
+            <a:r>
+              <a:rPr lang="en-US" dirty="0"/>
+              <a:t>Conduct text mining in R</a:t>
+            </a:r>
+          </a:p>
+          <a:p>
+            <a:pPr>
+              <a:buFont typeface="Arial" panose="020B0604020202020204" pitchFamily="34" charset="0"/>
+              <a:buChar char="•"/>
+            </a:pPr>
+            <a:r>
+              <a:rPr lang="en-US" dirty="0"/>
+              <a:t>Complete sentiment analysis in R</a:t>
             </a:r>
           </a:p>
         </p:txBody>
@@ -6964,7 +7279,7 @@
     </p:spTree>
     <p:extLst>
       <p:ext uri="{BB962C8B-B14F-4D97-AF65-F5344CB8AC3E}">
-        <p14:creationId xmlns:p14="http://schemas.microsoft.com/office/powerpoint/2010/main" val="1105622917"/>
+        <p14:creationId xmlns:p14="http://schemas.microsoft.com/office/powerpoint/2010/main" val="386071705"/>
       </p:ext>
     </p:extLst>
   </p:cSld>
@@ -7004,7 +7319,7 @@
           <p:cNvPr id="2" name="Title 1">
             <a:extLst>
               <a:ext uri="{FF2B5EF4-FFF2-40B4-BE49-F238E27FC236}">
-                <a16:creationId xmlns:a16="http://schemas.microsoft.com/office/drawing/2014/main" id="{68E7F413-5848-4FF9-90FF-F4D1B37E4837}"/>
+                <a16:creationId xmlns:a16="http://schemas.microsoft.com/office/drawing/2014/main" id="{303FC117-54AE-4231-8219-69E3526E2341}"/>
               </a:ext>
             </a:extLst>
           </p:cNvPr>
@@ -7024,17 +7339,17 @@
           <a:p>
             <a:r>
               <a:rPr lang="en-US" sz="3600" dirty="0"/>
-              <a:t>Quick Recap</a:t>
-            </a:r>
-          </a:p>
-        </p:txBody>
-      </p:sp>
-      <p:sp>
-        <p:nvSpPr>
-          <p:cNvPr id="4" name="Content Placeholder 3">
-            <a:extLst>
-              <a:ext uri="{FF2B5EF4-FFF2-40B4-BE49-F238E27FC236}">
-                <a16:creationId xmlns:a16="http://schemas.microsoft.com/office/drawing/2014/main" id="{E7B66255-171E-4E31-8F2E-799A0AAD221A}"/>
+              <a:t>Day 2 Agenda</a:t>
+            </a:r>
+          </a:p>
+        </p:txBody>
+      </p:sp>
+      <p:sp>
+        <p:nvSpPr>
+          <p:cNvPr id="3" name="Content Placeholder 2">
+            <a:extLst>
+              <a:ext uri="{FF2B5EF4-FFF2-40B4-BE49-F238E27FC236}">
+                <a16:creationId xmlns:a16="http://schemas.microsoft.com/office/drawing/2014/main" id="{BDAA0CD9-D632-4B6B-BF3C-73302529A4C9}"/>
               </a:ext>
             </a:extLst>
           </p:cNvPr>
@@ -7047,50 +7362,52 @@
         </p:nvSpPr>
         <p:spPr/>
         <p:txBody>
-          <a:bodyPr/>
-          <a:lstStyle/>
-          <a:p>
-            <a:r>
-              <a:rPr lang="en-US" dirty="0"/>
-              <a:t>Introduction to Text &amp; Sentiment Analysis</a:t>
-            </a:r>
-          </a:p>
-          <a:p>
-            <a:r>
-              <a:rPr lang="en-US" dirty="0"/>
-              <a:t>R Set-Up</a:t>
-            </a:r>
-          </a:p>
-          <a:p>
-            <a:r>
-              <a:rPr lang="en-US" dirty="0"/>
-              <a:t>Data Processing</a:t>
-            </a:r>
-          </a:p>
-          <a:p>
-            <a:r>
-              <a:rPr lang="en-US" dirty="0"/>
-              <a:t>Tokenizing</a:t>
-            </a:r>
-          </a:p>
-          <a:p>
-            <a:r>
-              <a:rPr lang="en-US" dirty="0"/>
-              <a:t>Word Frequencies </a:t>
-            </a:r>
-          </a:p>
-          <a:p>
-            <a:pPr marL="0" indent="0">
-              <a:buNone/>
-            </a:pPr>
-            <a:endParaRPr lang="en-US" dirty="0"/>
+          <a:bodyPr>
+            <a:normAutofit/>
+          </a:bodyPr>
+          <a:lstStyle/>
+          <a:p>
+            <a:r>
+              <a:rPr lang="en-US" dirty="0"/>
+              <a:t>Recap of previous session </a:t>
+            </a:r>
+          </a:p>
+          <a:p>
+            <a:r>
+              <a:rPr lang="en-US" dirty="0"/>
+              <a:t>Sentiment Analysis</a:t>
+            </a:r>
+          </a:p>
+          <a:p>
+            <a:r>
+              <a:rPr lang="en-US" dirty="0"/>
+              <a:t>Visualizing Results</a:t>
+            </a:r>
+          </a:p>
+          <a:p>
+            <a:r>
+              <a:rPr lang="en-US" dirty="0"/>
+              <a:t>Moving Beyond Words</a:t>
+            </a:r>
+          </a:p>
+          <a:p>
+            <a:r>
+              <a:rPr lang="en-US" dirty="0"/>
+              <a:t>Where to go from here </a:t>
+            </a:r>
+          </a:p>
+          <a:p>
+            <a:r>
+              <a:rPr lang="en-US" dirty="0"/>
+              <a:t>Questions</a:t>
+            </a:r>
           </a:p>
         </p:txBody>
       </p:sp>
     </p:spTree>
     <p:extLst>
       <p:ext uri="{BB962C8B-B14F-4D97-AF65-F5344CB8AC3E}">
-        <p14:creationId xmlns:p14="http://schemas.microsoft.com/office/powerpoint/2010/main" val="1063841203"/>
+        <p14:creationId xmlns:p14="http://schemas.microsoft.com/office/powerpoint/2010/main" val="1105622917"/>
       </p:ext>
     </p:extLst>
   </p:cSld>
@@ -7103,6 +7420,14 @@
 <file path=ppt/slides/slide18.xml><?xml version="1.0" encoding="utf-8"?>
 <p:sld xmlns:a="http://schemas.openxmlformats.org/drawingml/2006/main" xmlns:r="http://schemas.openxmlformats.org/officeDocument/2006/relationships" xmlns:p="http://schemas.openxmlformats.org/presentationml/2006/main">
   <p:cSld>
+    <p:bg>
+      <p:bgPr>
+        <a:solidFill>
+          <a:schemeClr val="bg1"/>
+        </a:solidFill>
+        <a:effectLst/>
+      </p:bgPr>
+    </p:bg>
     <p:spTree>
       <p:nvGrpSpPr>
         <p:cNvPr id="1" name=""/>
@@ -7119,10 +7444,10 @@
       </p:grpSpPr>
       <p:sp>
         <p:nvSpPr>
-          <p:cNvPr id="4" name="Title 3">
-            <a:extLst>
-              <a:ext uri="{FF2B5EF4-FFF2-40B4-BE49-F238E27FC236}">
-                <a16:creationId xmlns:a16="http://schemas.microsoft.com/office/drawing/2014/main" id="{8CC03BEF-DFEA-411F-BBA1-F2A77CE386A1}"/>
+          <p:cNvPr id="2" name="Title 1">
+            <a:extLst>
+              <a:ext uri="{FF2B5EF4-FFF2-40B4-BE49-F238E27FC236}">
+                <a16:creationId xmlns:a16="http://schemas.microsoft.com/office/drawing/2014/main" id="{68E7F413-5848-4FF9-90FF-F4D1B37E4837}"/>
               </a:ext>
             </a:extLst>
           </p:cNvPr>
@@ -7135,60 +7460,80 @@
         </p:nvSpPr>
         <p:spPr/>
         <p:txBody>
+          <a:bodyPr>
+            <a:normAutofit/>
+          </a:bodyPr>
+          <a:lstStyle/>
+          <a:p>
+            <a:r>
+              <a:rPr lang="en-US" sz="3600" dirty="0"/>
+              <a:t>Quick Recap</a:t>
+            </a:r>
+          </a:p>
+        </p:txBody>
+      </p:sp>
+      <p:sp>
+        <p:nvSpPr>
+          <p:cNvPr id="4" name="Content Placeholder 3">
+            <a:extLst>
+              <a:ext uri="{FF2B5EF4-FFF2-40B4-BE49-F238E27FC236}">
+                <a16:creationId xmlns:a16="http://schemas.microsoft.com/office/drawing/2014/main" id="{E7B66255-171E-4E31-8F2E-799A0AAD221A}"/>
+              </a:ext>
+            </a:extLst>
+          </p:cNvPr>
+          <p:cNvSpPr>
+            <a:spLocks noGrp="1"/>
+          </p:cNvSpPr>
+          <p:nvPr>
+            <p:ph idx="1"/>
+          </p:nvPr>
+        </p:nvSpPr>
+        <p:spPr/>
+        <p:txBody>
           <a:bodyPr/>
           <a:lstStyle/>
           <a:p>
             <a:r>
               <a:rPr lang="en-US" dirty="0"/>
-              <a:t>Terminology</a:t>
-            </a:r>
-          </a:p>
-        </p:txBody>
-      </p:sp>
-      <p:sp>
-        <p:nvSpPr>
-          <p:cNvPr id="5" name="Content Placeholder 4">
-            <a:extLst>
-              <a:ext uri="{FF2B5EF4-FFF2-40B4-BE49-F238E27FC236}">
-                <a16:creationId xmlns:a16="http://schemas.microsoft.com/office/drawing/2014/main" id="{42B101CC-F4FD-4C5E-B209-79763C8B004C}"/>
-              </a:ext>
-            </a:extLst>
-          </p:cNvPr>
-          <p:cNvSpPr>
-            <a:spLocks noGrp="1"/>
-          </p:cNvSpPr>
-          <p:nvPr>
-            <p:ph idx="1"/>
-          </p:nvPr>
-        </p:nvSpPr>
-        <p:spPr/>
-        <p:txBody>
-          <a:bodyPr/>
-          <a:lstStyle/>
-          <a:p>
-            <a:r>
-              <a:rPr lang="en-US" dirty="0"/>
-              <a:t>Corpus</a:t>
-            </a:r>
-          </a:p>
-          <a:p>
-            <a:r>
-              <a:rPr lang="en-US" dirty="0"/>
-              <a:t>Document</a:t>
-            </a:r>
-          </a:p>
-          <a:p>
-            <a:r>
-              <a:rPr lang="en-US" dirty="0"/>
-              <a:t>Token / Term / Word</a:t>
-            </a:r>
+              <a:t>Introduction to Text &amp; Sentiment Analysis</a:t>
+            </a:r>
+          </a:p>
+          <a:p>
+            <a:r>
+              <a:rPr lang="en-US" dirty="0"/>
+              <a:t>R Set-Up</a:t>
+            </a:r>
+          </a:p>
+          <a:p>
+            <a:r>
+              <a:rPr lang="en-US" dirty="0"/>
+              <a:t>Data Processing</a:t>
+            </a:r>
+          </a:p>
+          <a:p>
+            <a:r>
+              <a:rPr lang="en-US" dirty="0"/>
+              <a:t>Tokenizing</a:t>
+            </a:r>
+          </a:p>
+          <a:p>
+            <a:r>
+              <a:rPr lang="en-US" dirty="0"/>
+              <a:t>Word Frequencies </a:t>
+            </a:r>
+          </a:p>
+          <a:p>
+            <a:pPr marL="0" indent="0">
+              <a:buNone/>
+            </a:pPr>
+            <a:endParaRPr lang="en-US" dirty="0"/>
           </a:p>
         </p:txBody>
       </p:sp>
     </p:spTree>
     <p:extLst>
       <p:ext uri="{BB962C8B-B14F-4D97-AF65-F5344CB8AC3E}">
-        <p14:creationId xmlns:p14="http://schemas.microsoft.com/office/powerpoint/2010/main" val="207804042"/>
+        <p14:creationId xmlns:p14="http://schemas.microsoft.com/office/powerpoint/2010/main" val="1063841203"/>
       </p:ext>
     </p:extLst>
   </p:cSld>
@@ -7215,137 +7560,70 @@
           <a:chExt cx="0" cy="0"/>
         </a:xfrm>
       </p:grpSpPr>
-      <p:pic>
-        <p:nvPicPr>
-          <p:cNvPr id="7170" name="Picture 2">
-            <a:extLst>
-              <a:ext uri="{FF2B5EF4-FFF2-40B4-BE49-F238E27FC236}">
-                <a16:creationId xmlns:a16="http://schemas.microsoft.com/office/drawing/2014/main" id="{C186A01D-08FB-4F8C-AF97-9DD16D3655A7}"/>
-              </a:ext>
-            </a:extLst>
-          </p:cNvPr>
-          <p:cNvPicPr>
-            <a:picLocks noGrp="1" noChangeAspect="1" noChangeArrowheads="1"/>
-          </p:cNvPicPr>
+      <p:sp>
+        <p:nvSpPr>
+          <p:cNvPr id="4" name="Title 3">
+            <a:extLst>
+              <a:ext uri="{FF2B5EF4-FFF2-40B4-BE49-F238E27FC236}">
+                <a16:creationId xmlns:a16="http://schemas.microsoft.com/office/drawing/2014/main" id="{8CC03BEF-DFEA-411F-BBA1-F2A77CE386A1}"/>
+              </a:ext>
+            </a:extLst>
+          </p:cNvPr>
+          <p:cNvSpPr>
+            <a:spLocks noGrp="1"/>
+          </p:cNvSpPr>
+          <p:nvPr>
+            <p:ph type="title"/>
+          </p:nvPr>
+        </p:nvSpPr>
+        <p:spPr/>
+        <p:txBody>
+          <a:bodyPr/>
+          <a:lstStyle/>
+          <a:p>
+            <a:r>
+              <a:rPr lang="en-US" dirty="0"/>
+              <a:t>Terminology</a:t>
+            </a:r>
+          </a:p>
+        </p:txBody>
+      </p:sp>
+      <p:sp>
+        <p:nvSpPr>
+          <p:cNvPr id="5" name="Content Placeholder 4">
+            <a:extLst>
+              <a:ext uri="{FF2B5EF4-FFF2-40B4-BE49-F238E27FC236}">
+                <a16:creationId xmlns:a16="http://schemas.microsoft.com/office/drawing/2014/main" id="{42B101CC-F4FD-4C5E-B209-79763C8B004C}"/>
+              </a:ext>
+            </a:extLst>
+          </p:cNvPr>
+          <p:cNvSpPr>
+            <a:spLocks noGrp="1"/>
+          </p:cNvSpPr>
           <p:nvPr>
             <p:ph idx="1"/>
           </p:nvPr>
-        </p:nvPicPr>
-        <p:blipFill>
-          <a:blip r:embed="rId3">
-            <a:extLst>
-              <a:ext uri="{28A0092B-C50C-407E-A947-70E740481C1C}">
-                <a14:useLocalDpi xmlns:a14="http://schemas.microsoft.com/office/drawing/2010/main" val="0"/>
-              </a:ext>
-            </a:extLst>
-          </a:blip>
-          <a:stretch>
-            <a:fillRect/>
-          </a:stretch>
-        </p:blipFill>
-        <p:spPr bwMode="auto">
-          <a:xfrm>
-            <a:off x="1143942" y="460586"/>
-            <a:ext cx="9904115" cy="5571065"/>
-          </a:xfrm>
-          <a:prstGeom prst="rect">
-            <a:avLst/>
-          </a:prstGeom>
-          <a:noFill/>
-          <a:ln>
-            <a:noFill/>
-          </a:ln>
-          <a:extLst>
-            <a:ext uri="{909E8E84-426E-40DD-AFC4-6F175D3DCCD1}">
-              <a14:hiddenFill xmlns:a14="http://schemas.microsoft.com/office/drawing/2010/main">
-                <a:solidFill>
-                  <a:srgbClr val="FFFFFF"/>
-                </a:solidFill>
-              </a14:hiddenFill>
-            </a:ext>
-          </a:extLst>
-        </p:spPr>
-      </p:pic>
-      <p:sp>
-        <p:nvSpPr>
-          <p:cNvPr id="17" name="Rectangle 16">
-            <a:extLst>
-              <a:ext uri="{FF2B5EF4-FFF2-40B4-BE49-F238E27FC236}">
-                <a16:creationId xmlns:a16="http://schemas.microsoft.com/office/drawing/2014/main" id="{C4A50008-FECC-4FDA-94B7-D1B3FA56D450}"/>
-              </a:ext>
-            </a:extLst>
-          </p:cNvPr>
-          <p:cNvSpPr/>
-          <p:nvPr/>
-        </p:nvSpPr>
-        <p:spPr>
-          <a:xfrm>
-            <a:off x="0" y="6610231"/>
-            <a:ext cx="8322802" cy="261610"/>
-          </a:xfrm>
-          <a:prstGeom prst="rect">
-            <a:avLst/>
-          </a:prstGeom>
-        </p:spPr>
-        <p:txBody>
-          <a:bodyPr wrap="square">
-            <a:spAutoFit/>
-          </a:bodyPr>
-          <a:lstStyle/>
-          <a:p>
-            <a:r>
-              <a:rPr lang="en-US" sz="1100" dirty="0">
-                <a:solidFill>
-                  <a:srgbClr val="8B8B8B"/>
-                </a:solidFill>
-              </a:rPr>
-              <a:t>Illustrations from the </a:t>
-            </a:r>
-            <a:r>
-              <a:rPr lang="en-US" sz="1100" dirty="0" err="1">
-                <a:solidFill>
-                  <a:srgbClr val="8B8B8B"/>
-                </a:solidFill>
-                <a:hlinkClick r:id="rId4">
-                  <a:extLst>
-                    <a:ext uri="{A12FA001-AC4F-418D-AE19-62706E023703}">
-                      <ahyp:hlinkClr xmlns:ahyp="http://schemas.microsoft.com/office/drawing/2018/hyperlinkcolor" val="tx"/>
-                    </a:ext>
-                  </a:extLst>
-                </a:hlinkClick>
-              </a:rPr>
-              <a:t>Openscapes</a:t>
-            </a:r>
-            <a:r>
-              <a:rPr lang="en-US" sz="1100" dirty="0">
-                <a:solidFill>
-                  <a:srgbClr val="8B8B8B"/>
-                </a:solidFill>
-              </a:rPr>
-              <a:t> blog </a:t>
-            </a:r>
-            <a:r>
-              <a:rPr lang="en-US" sz="1100" i="1" dirty="0">
-                <a:solidFill>
-                  <a:srgbClr val="8B8B8B"/>
-                </a:solidFill>
-                <a:hlinkClick r:id="rId5">
-                  <a:extLst>
-                    <a:ext uri="{A12FA001-AC4F-418D-AE19-62706E023703}">
-                      <ahyp:hlinkClr xmlns:ahyp="http://schemas.microsoft.com/office/drawing/2018/hyperlinkcolor" val="tx"/>
-                    </a:ext>
-                  </a:extLst>
-                </a:hlinkClick>
-              </a:rPr>
-              <a:t>Tidy Data for reproducibility, efficiency, and collaboration</a:t>
-            </a:r>
-            <a:r>
-              <a:rPr lang="en-US" sz="1100" dirty="0">
-                <a:solidFill>
-                  <a:srgbClr val="8B8B8B"/>
-                </a:solidFill>
-              </a:rPr>
-              <a:t> by Julia Lowndes and Allison Horst</a:t>
+        </p:nvSpPr>
+        <p:spPr/>
+        <p:txBody>
+          <a:bodyPr/>
+          <a:lstStyle/>
+          <a:p>
+            <a:r>
+              <a:rPr lang="en-US" dirty="0"/>
+              <a:t>Corpus</a:t>
+            </a:r>
+          </a:p>
+          <a:p>
+            <a:r>
+              <a:rPr lang="en-US" dirty="0"/>
+              <a:t>Document</a:t>
+            </a:r>
+          </a:p>
+          <a:p>
+            <a:r>
+              <a:rPr lang="en-US" dirty="0"/>
+              <a:t>Token / Term / Word</a:t>
             </a:r>
           </a:p>
         </p:txBody>
@@ -7353,7 +7631,7 @@
     </p:spTree>
     <p:extLst>
       <p:ext uri="{BB962C8B-B14F-4D97-AF65-F5344CB8AC3E}">
-        <p14:creationId xmlns:p14="http://schemas.microsoft.com/office/powerpoint/2010/main" val="2424924840"/>
+        <p14:creationId xmlns:p14="http://schemas.microsoft.com/office/powerpoint/2010/main" val="207804042"/>
       </p:ext>
     </p:extLst>
   </p:cSld>
@@ -7585,63 +7863,145 @@
           <a:chExt cx="0" cy="0"/>
         </a:xfrm>
       </p:grpSpPr>
-      <p:sp>
-        <p:nvSpPr>
-          <p:cNvPr id="4" name="Title 3">
-            <a:extLst>
-              <a:ext uri="{FF2B5EF4-FFF2-40B4-BE49-F238E27FC236}">
-                <a16:creationId xmlns:a16="http://schemas.microsoft.com/office/drawing/2014/main" id="{905D5C2E-C162-4046-888B-BA20EE8A4573}"/>
-              </a:ext>
-            </a:extLst>
-          </p:cNvPr>
-          <p:cNvSpPr>
-            <a:spLocks noGrp="1"/>
-          </p:cNvSpPr>
-          <p:nvPr>
-            <p:ph type="ctrTitle"/>
-          </p:nvPr>
-        </p:nvSpPr>
-        <p:spPr/>
-        <p:txBody>
-          <a:bodyPr/>
-          <a:lstStyle/>
-          <a:p>
-            <a:r>
-              <a:rPr lang="en-US" dirty="0"/>
-              <a:t>R</a:t>
-            </a:r>
-          </a:p>
-        </p:txBody>
-      </p:sp>
-      <p:sp>
-        <p:nvSpPr>
-          <p:cNvPr id="5" name="Subtitle 4">
-            <a:extLst>
-              <a:ext uri="{FF2B5EF4-FFF2-40B4-BE49-F238E27FC236}">
-                <a16:creationId xmlns:a16="http://schemas.microsoft.com/office/drawing/2014/main" id="{914AFCD0-D048-4149-8426-E2892F0A24EC}"/>
-              </a:ext>
-            </a:extLst>
-          </p:cNvPr>
-          <p:cNvSpPr>
-            <a:spLocks noGrp="1"/>
-          </p:cNvSpPr>
-          <p:nvPr>
-            <p:ph type="subTitle" idx="1"/>
-          </p:nvPr>
-        </p:nvSpPr>
-        <p:spPr/>
-        <p:txBody>
-          <a:bodyPr/>
-          <a:lstStyle/>
-          <a:p>
-            <a:endParaRPr lang="en-US"/>
+      <p:pic>
+        <p:nvPicPr>
+          <p:cNvPr id="7170" name="Picture 2">
+            <a:extLst>
+              <a:ext uri="{FF2B5EF4-FFF2-40B4-BE49-F238E27FC236}">
+                <a16:creationId xmlns:a16="http://schemas.microsoft.com/office/drawing/2014/main" id="{C186A01D-08FB-4F8C-AF97-9DD16D3655A7}"/>
+              </a:ext>
+            </a:extLst>
+          </p:cNvPr>
+          <p:cNvPicPr>
+            <a:picLocks noGrp="1" noChangeAspect="1" noChangeArrowheads="1"/>
+          </p:cNvPicPr>
+          <p:nvPr>
+            <p:ph idx="1"/>
+          </p:nvPr>
+        </p:nvPicPr>
+        <p:blipFill>
+          <a:blip r:embed="rId3">
+            <a:extLst>
+              <a:ext uri="{28A0092B-C50C-407E-A947-70E740481C1C}">
+                <a14:useLocalDpi xmlns:a14="http://schemas.microsoft.com/office/drawing/2010/main" val="0"/>
+              </a:ext>
+            </a:extLst>
+          </a:blip>
+          <a:stretch>
+            <a:fillRect/>
+          </a:stretch>
+        </p:blipFill>
+        <p:spPr bwMode="auto">
+          <a:xfrm>
+            <a:off x="1143942" y="460586"/>
+            <a:ext cx="9904115" cy="5571065"/>
+          </a:xfrm>
+          <a:prstGeom prst="rect">
+            <a:avLst/>
+          </a:prstGeom>
+          <a:noFill/>
+          <a:ln>
+            <a:noFill/>
+          </a:ln>
+          <a:extLst>
+            <a:ext uri="{909E8E84-426E-40DD-AFC4-6F175D3DCCD1}">
+              <a14:hiddenFill xmlns:a14="http://schemas.microsoft.com/office/drawing/2010/main">
+                <a:solidFill>
+                  <a:srgbClr val="FFFFFF"/>
+                </a:solidFill>
+              </a14:hiddenFill>
+            </a:ext>
+          </a:extLst>
+        </p:spPr>
+      </p:pic>
+      <p:sp>
+        <p:nvSpPr>
+          <p:cNvPr id="17" name="Rectangle 16">
+            <a:extLst>
+              <a:ext uri="{FF2B5EF4-FFF2-40B4-BE49-F238E27FC236}">
+                <a16:creationId xmlns:a16="http://schemas.microsoft.com/office/drawing/2014/main" id="{C4A50008-FECC-4FDA-94B7-D1B3FA56D450}"/>
+              </a:ext>
+            </a:extLst>
+          </p:cNvPr>
+          <p:cNvSpPr/>
+          <p:nvPr/>
+        </p:nvSpPr>
+        <p:spPr>
+          <a:xfrm>
+            <a:off x="0" y="6610231"/>
+            <a:ext cx="8322802" cy="261610"/>
+          </a:xfrm>
+          <a:prstGeom prst="rect">
+            <a:avLst/>
+          </a:prstGeom>
+        </p:spPr>
+        <p:txBody>
+          <a:bodyPr wrap="square">
+            <a:spAutoFit/>
+          </a:bodyPr>
+          <a:lstStyle/>
+          <a:p>
+            <a:r>
+              <a:rPr lang="en-US" sz="1100" dirty="0">
+                <a:solidFill>
+                  <a:srgbClr val="8B8B8B"/>
+                </a:solidFill>
+              </a:rPr>
+              <a:t>Illustrations from the </a:t>
+            </a:r>
+            <a:r>
+              <a:rPr lang="en-US" sz="1100" dirty="0" err="1">
+                <a:solidFill>
+                  <a:srgbClr val="8B8B8B"/>
+                </a:solidFill>
+                <a:hlinkClick r:id="rId4">
+                  <a:extLst>
+                    <a:ext uri="{A12FA001-AC4F-418D-AE19-62706E023703}">
+                      <ahyp:hlinkClr xmlns:ahyp="http://schemas.microsoft.com/office/drawing/2018/hyperlinkcolor" val="tx"/>
+                    </a:ext>
+                  </a:extLst>
+                </a:hlinkClick>
+              </a:rPr>
+              <a:t>Openscapes</a:t>
+            </a:r>
+            <a:r>
+              <a:rPr lang="en-US" sz="1100" dirty="0">
+                <a:solidFill>
+                  <a:srgbClr val="8B8B8B"/>
+                </a:solidFill>
+              </a:rPr>
+              <a:t> blog </a:t>
+            </a:r>
+            <a:r>
+              <a:rPr lang="en-US" sz="1100" i="1" dirty="0">
+                <a:solidFill>
+                  <a:srgbClr val="8B8B8B"/>
+                </a:solidFill>
+                <a:hlinkClick r:id="rId5">
+                  <a:extLst>
+                    <a:ext uri="{A12FA001-AC4F-418D-AE19-62706E023703}">
+                      <ahyp:hlinkClr xmlns:ahyp="http://schemas.microsoft.com/office/drawing/2018/hyperlinkcolor" val="tx"/>
+                    </a:ext>
+                  </a:extLst>
+                </a:hlinkClick>
+              </a:rPr>
+              <a:t>Tidy Data for reproducibility, efficiency, and collaboration</a:t>
+            </a:r>
+            <a:r>
+              <a:rPr lang="en-US" sz="1100" dirty="0">
+                <a:solidFill>
+                  <a:srgbClr val="8B8B8B"/>
+                </a:solidFill>
+              </a:rPr>
+              <a:t> by Julia Lowndes and Allison Horst</a:t>
+            </a:r>
           </a:p>
         </p:txBody>
       </p:sp>
     </p:spTree>
     <p:extLst>
       <p:ext uri="{BB962C8B-B14F-4D97-AF65-F5344CB8AC3E}">
-        <p14:creationId xmlns:p14="http://schemas.microsoft.com/office/powerpoint/2010/main" val="163456702"/>
+        <p14:creationId xmlns:p14="http://schemas.microsoft.com/office/powerpoint/2010/main" val="2424924840"/>
       </p:ext>
     </p:extLst>
   </p:cSld>
@@ -7670,10 +8030,10 @@
       </p:grpSpPr>
       <p:sp>
         <p:nvSpPr>
-          <p:cNvPr id="2" name="Title 1">
-            <a:extLst>
-              <a:ext uri="{FF2B5EF4-FFF2-40B4-BE49-F238E27FC236}">
-                <a16:creationId xmlns:a16="http://schemas.microsoft.com/office/drawing/2014/main" id="{0EB5568E-6A7C-412F-99C9-20C7929FFADE}"/>
+          <p:cNvPr id="4" name="Title 3">
+            <a:extLst>
+              <a:ext uri="{FF2B5EF4-FFF2-40B4-BE49-F238E27FC236}">
+                <a16:creationId xmlns:a16="http://schemas.microsoft.com/office/drawing/2014/main" id="{905D5C2E-C162-4046-888B-BA20EE8A4573}"/>
               </a:ext>
             </a:extLst>
           </p:cNvPr>
@@ -7686,14 +8046,12 @@
         </p:nvSpPr>
         <p:spPr/>
         <p:txBody>
-          <a:bodyPr>
-            <a:normAutofit fontScale="90000"/>
-          </a:bodyPr>
-          <a:lstStyle/>
-          <a:p>
-            <a:r>
-              <a:rPr lang="en-US" dirty="0"/>
-              <a:t>What insights can be gained from text and sentiment analysis?</a:t>
+          <a:bodyPr/>
+          <a:lstStyle/>
+          <a:p>
+            <a:r>
+              <a:rPr lang="en-US" dirty="0"/>
+              <a:t>R</a:t>
             </a:r>
           </a:p>
         </p:txBody>
@@ -7703,7 +8061,7 @@
           <p:cNvPr id="5" name="Subtitle 4">
             <a:extLst>
               <a:ext uri="{FF2B5EF4-FFF2-40B4-BE49-F238E27FC236}">
-                <a16:creationId xmlns:a16="http://schemas.microsoft.com/office/drawing/2014/main" id="{21983AF0-55D7-45A9-9464-4DB647757ADF}"/>
+                <a16:creationId xmlns:a16="http://schemas.microsoft.com/office/drawing/2014/main" id="{914AFCD0-D048-4149-8426-E2892F0A24EC}"/>
               </a:ext>
             </a:extLst>
           </p:cNvPr>
@@ -7726,7 +8084,7 @@
     </p:spTree>
     <p:extLst>
       <p:ext uri="{BB962C8B-B14F-4D97-AF65-F5344CB8AC3E}">
-        <p14:creationId xmlns:p14="http://schemas.microsoft.com/office/powerpoint/2010/main" val="2504649934"/>
+        <p14:creationId xmlns:p14="http://schemas.microsoft.com/office/powerpoint/2010/main" val="163456702"/>
       </p:ext>
     </p:extLst>
   </p:cSld>
@@ -7739,14 +8097,6 @@
 <file path=ppt/slides/slide22.xml><?xml version="1.0" encoding="utf-8"?>
 <p:sld xmlns:a="http://schemas.openxmlformats.org/drawingml/2006/main" xmlns:r="http://schemas.openxmlformats.org/officeDocument/2006/relationships" xmlns:p="http://schemas.openxmlformats.org/presentationml/2006/main">
   <p:cSld>
-    <p:bg>
-      <p:bgPr>
-        <a:solidFill>
-          <a:schemeClr val="bg1"/>
-        </a:solidFill>
-        <a:effectLst/>
-      </p:bgPr>
-    </p:bg>
     <p:spTree>
       <p:nvGrpSpPr>
         <p:cNvPr id="1" name=""/>
@@ -7766,103 +8116,60 @@
           <p:cNvPr id="2" name="Title 1">
             <a:extLst>
               <a:ext uri="{FF2B5EF4-FFF2-40B4-BE49-F238E27FC236}">
-                <a16:creationId xmlns:a16="http://schemas.microsoft.com/office/drawing/2014/main" id="{68E7F413-5848-4FF9-90FF-F4D1B37E4837}"/>
-              </a:ext>
-            </a:extLst>
-          </p:cNvPr>
-          <p:cNvSpPr>
-            <a:spLocks noGrp="1"/>
-          </p:cNvSpPr>
-          <p:nvPr>
-            <p:ph type="title"/>
+                <a16:creationId xmlns:a16="http://schemas.microsoft.com/office/drawing/2014/main" id="{0EB5568E-6A7C-412F-99C9-20C7929FFADE}"/>
+              </a:ext>
+            </a:extLst>
+          </p:cNvPr>
+          <p:cNvSpPr>
+            <a:spLocks noGrp="1"/>
+          </p:cNvSpPr>
+          <p:nvPr>
+            <p:ph type="ctrTitle"/>
           </p:nvPr>
         </p:nvSpPr>
         <p:spPr/>
         <p:txBody>
           <a:bodyPr>
-            <a:normAutofit/>
+            <a:normAutofit fontScale="90000"/>
           </a:bodyPr>
           <a:lstStyle/>
           <a:p>
             <a:r>
-              <a:rPr lang="en-US" sz="3600" dirty="0"/>
-              <a:t>Where to go next</a:t>
-            </a:r>
-          </a:p>
-        </p:txBody>
-      </p:sp>
-      <p:sp>
-        <p:nvSpPr>
-          <p:cNvPr id="3" name="Content Placeholder 2">
-            <a:extLst>
-              <a:ext uri="{FF2B5EF4-FFF2-40B4-BE49-F238E27FC236}">
-                <a16:creationId xmlns:a16="http://schemas.microsoft.com/office/drawing/2014/main" id="{A366A98A-E3CA-4E30-9B3F-09E95FB08DB4}"/>
-              </a:ext>
-            </a:extLst>
-          </p:cNvPr>
-          <p:cNvSpPr>
-            <a:spLocks noGrp="1"/>
-          </p:cNvSpPr>
-          <p:nvPr>
-            <p:ph idx="1"/>
-          </p:nvPr>
-        </p:nvSpPr>
-        <p:spPr/>
-        <p:txBody>
-          <a:bodyPr>
-            <a:normAutofit/>
-          </a:bodyPr>
-          <a:lstStyle/>
-          <a:p>
-            <a:r>
-              <a:rPr lang="en-US" dirty="0"/>
-              <a:t>Try out a text analysis of your own. </a:t>
-            </a:r>
-          </a:p>
-          <a:p>
-            <a:r>
-              <a:rPr lang="en-US" dirty="0"/>
-              <a:t>Review </a:t>
-            </a:r>
-            <a:r>
-              <a:rPr lang="en-US" i="1" dirty="0"/>
-              <a:t>Text Mining with R </a:t>
-            </a:r>
-            <a:r>
-              <a:rPr lang="en-US" dirty="0"/>
-              <a:t>by Julia </a:t>
-            </a:r>
-            <a:r>
-              <a:rPr lang="en-US" dirty="0" err="1"/>
-              <a:t>Silge</a:t>
-            </a:r>
-            <a:r>
-              <a:rPr lang="en-US" dirty="0"/>
-              <a:t> and David Robinson</a:t>
-            </a:r>
-          </a:p>
-          <a:p>
-            <a:pPr lvl="1"/>
-            <a:r>
-              <a:rPr lang="en-US" dirty="0">
-                <a:hlinkClick r:id="rId3"/>
-              </a:rPr>
-              <a:t>https://www.tidytextmining.com/index.html</a:t>
-            </a:r>
-            <a:r>
-              <a:rPr lang="en-US" dirty="0"/>
-              <a:t> </a:t>
-            </a:r>
-          </a:p>
-          <a:p>
-            <a:endParaRPr lang="en-US" dirty="0"/>
+              <a:rPr lang="en-US" dirty="0"/>
+              <a:t>What insights can be gained from text and sentiment analysis?</a:t>
+            </a:r>
+          </a:p>
+        </p:txBody>
+      </p:sp>
+      <p:sp>
+        <p:nvSpPr>
+          <p:cNvPr id="5" name="Subtitle 4">
+            <a:extLst>
+              <a:ext uri="{FF2B5EF4-FFF2-40B4-BE49-F238E27FC236}">
+                <a16:creationId xmlns:a16="http://schemas.microsoft.com/office/drawing/2014/main" id="{21983AF0-55D7-45A9-9464-4DB647757ADF}"/>
+              </a:ext>
+            </a:extLst>
+          </p:cNvPr>
+          <p:cNvSpPr>
+            <a:spLocks noGrp="1"/>
+          </p:cNvSpPr>
+          <p:nvPr>
+            <p:ph type="subTitle" idx="1"/>
+          </p:nvPr>
+        </p:nvSpPr>
+        <p:spPr/>
+        <p:txBody>
+          <a:bodyPr/>
+          <a:lstStyle/>
+          <a:p>
+            <a:endParaRPr lang="en-US"/>
           </a:p>
         </p:txBody>
       </p:sp>
     </p:spTree>
     <p:extLst>
       <p:ext uri="{BB962C8B-B14F-4D97-AF65-F5344CB8AC3E}">
-        <p14:creationId xmlns:p14="http://schemas.microsoft.com/office/powerpoint/2010/main" val="254307914"/>
+        <p14:creationId xmlns:p14="http://schemas.microsoft.com/office/powerpoint/2010/main" val="2504649934"/>
       </p:ext>
     </p:extLst>
   </p:cSld>
@@ -7902,6 +8209,142 @@
           <p:cNvPr id="2" name="Title 1">
             <a:extLst>
               <a:ext uri="{FF2B5EF4-FFF2-40B4-BE49-F238E27FC236}">
+                <a16:creationId xmlns:a16="http://schemas.microsoft.com/office/drawing/2014/main" id="{68E7F413-5848-4FF9-90FF-F4D1B37E4837}"/>
+              </a:ext>
+            </a:extLst>
+          </p:cNvPr>
+          <p:cNvSpPr>
+            <a:spLocks noGrp="1"/>
+          </p:cNvSpPr>
+          <p:nvPr>
+            <p:ph type="title"/>
+          </p:nvPr>
+        </p:nvSpPr>
+        <p:spPr/>
+        <p:txBody>
+          <a:bodyPr>
+            <a:normAutofit/>
+          </a:bodyPr>
+          <a:lstStyle/>
+          <a:p>
+            <a:r>
+              <a:rPr lang="en-US" sz="3600" dirty="0"/>
+              <a:t>Where to go next</a:t>
+            </a:r>
+          </a:p>
+        </p:txBody>
+      </p:sp>
+      <p:sp>
+        <p:nvSpPr>
+          <p:cNvPr id="3" name="Content Placeholder 2">
+            <a:extLst>
+              <a:ext uri="{FF2B5EF4-FFF2-40B4-BE49-F238E27FC236}">
+                <a16:creationId xmlns:a16="http://schemas.microsoft.com/office/drawing/2014/main" id="{A366A98A-E3CA-4E30-9B3F-09E95FB08DB4}"/>
+              </a:ext>
+            </a:extLst>
+          </p:cNvPr>
+          <p:cNvSpPr>
+            <a:spLocks noGrp="1"/>
+          </p:cNvSpPr>
+          <p:nvPr>
+            <p:ph idx="1"/>
+          </p:nvPr>
+        </p:nvSpPr>
+        <p:spPr/>
+        <p:txBody>
+          <a:bodyPr>
+            <a:normAutofit/>
+          </a:bodyPr>
+          <a:lstStyle/>
+          <a:p>
+            <a:r>
+              <a:rPr lang="en-US" dirty="0"/>
+              <a:t>Try out a text analysis of your own. </a:t>
+            </a:r>
+          </a:p>
+          <a:p>
+            <a:r>
+              <a:rPr lang="en-US" dirty="0"/>
+              <a:t>Review </a:t>
+            </a:r>
+            <a:r>
+              <a:rPr lang="en-US" i="1" dirty="0"/>
+              <a:t>Text Mining with R </a:t>
+            </a:r>
+            <a:r>
+              <a:rPr lang="en-US" dirty="0"/>
+              <a:t>by Julia </a:t>
+            </a:r>
+            <a:r>
+              <a:rPr lang="en-US" dirty="0" err="1"/>
+              <a:t>Silge</a:t>
+            </a:r>
+            <a:r>
+              <a:rPr lang="en-US" dirty="0"/>
+              <a:t> and David Robinson</a:t>
+            </a:r>
+          </a:p>
+          <a:p>
+            <a:pPr lvl="1"/>
+            <a:r>
+              <a:rPr lang="en-US" dirty="0">
+                <a:hlinkClick r:id="rId3"/>
+              </a:rPr>
+              <a:t>https://www.tidytextmining.com/index.html</a:t>
+            </a:r>
+            <a:r>
+              <a:rPr lang="en-US" dirty="0"/>
+              <a:t> </a:t>
+            </a:r>
+          </a:p>
+          <a:p>
+            <a:endParaRPr lang="en-US" dirty="0"/>
+          </a:p>
+        </p:txBody>
+      </p:sp>
+    </p:spTree>
+    <p:extLst>
+      <p:ext uri="{BB962C8B-B14F-4D97-AF65-F5344CB8AC3E}">
+        <p14:creationId xmlns:p14="http://schemas.microsoft.com/office/powerpoint/2010/main" val="254307914"/>
+      </p:ext>
+    </p:extLst>
+  </p:cSld>
+  <p:clrMapOvr>
+    <a:masterClrMapping/>
+  </p:clrMapOvr>
+</p:sld>
+</file>
+
+<file path=ppt/slides/slide24.xml><?xml version="1.0" encoding="utf-8"?>
+<p:sld xmlns:a="http://schemas.openxmlformats.org/drawingml/2006/main" xmlns:r="http://schemas.openxmlformats.org/officeDocument/2006/relationships" xmlns:p="http://schemas.openxmlformats.org/presentationml/2006/main">
+  <p:cSld>
+    <p:bg>
+      <p:bgPr>
+        <a:solidFill>
+          <a:schemeClr val="bg1"/>
+        </a:solidFill>
+        <a:effectLst/>
+      </p:bgPr>
+    </p:bg>
+    <p:spTree>
+      <p:nvGrpSpPr>
+        <p:cNvPr id="1" name=""/>
+        <p:cNvGrpSpPr/>
+        <p:nvPr/>
+      </p:nvGrpSpPr>
+      <p:grpSpPr>
+        <a:xfrm>
+          <a:off x="0" y="0"/>
+          <a:ext cx="0" cy="0"/>
+          <a:chOff x="0" y="0"/>
+          <a:chExt cx="0" cy="0"/>
+        </a:xfrm>
+      </p:grpSpPr>
+      <p:sp>
+        <p:nvSpPr>
+          <p:cNvPr id="2" name="Title 1">
+            <a:extLst>
+              <a:ext uri="{FF2B5EF4-FFF2-40B4-BE49-F238E27FC236}">
                 <a16:creationId xmlns:a16="http://schemas.microsoft.com/office/drawing/2014/main" id="{BDA1388A-4824-4A29-ADD9-8CFCC321EE86}"/>
               </a:ext>
             </a:extLst>
@@ -7986,7 +8429,7 @@
 </p:sld>
 </file>
 
-<file path=ppt/slides/slide24.xml><?xml version="1.0" encoding="utf-8"?>
+<file path=ppt/slides/slide25.xml><?xml version="1.0" encoding="utf-8"?>
 <p:sld xmlns:a="http://schemas.openxmlformats.org/drawingml/2006/main" xmlns:r="http://schemas.openxmlformats.org/officeDocument/2006/relationships" xmlns:p="http://schemas.openxmlformats.org/presentationml/2006/main">
   <p:cSld>
     <p:spTree>
@@ -8044,7 +8487,7 @@
 </p:sld>
 </file>
 
-<file path=ppt/slides/slide25.xml><?xml version="1.0" encoding="utf-8"?>
+<file path=ppt/slides/slide26.xml><?xml version="1.0" encoding="utf-8"?>
 <p:sld xmlns:a="http://schemas.openxmlformats.org/drawingml/2006/main" xmlns:r="http://schemas.openxmlformats.org/officeDocument/2006/relationships" xmlns:p="http://schemas.openxmlformats.org/presentationml/2006/main">
   <p:cSld>
     <p:bg>

</xml_diff>

<commit_message>
added extra example slide
</commit_message>
<xml_diff>
--- a/slides/Sentiment Analysis in R.pptx
+++ b/slides/Sentiment Analysis in R.pptx
@@ -5,7 +5,7 @@
     <p:sldMasterId id="2147483660" r:id="rId1"/>
   </p:sldMasterIdLst>
   <p:notesMasterIdLst>
-    <p:notesMasterId r:id="rId28"/>
+    <p:notesMasterId r:id="rId29"/>
   </p:notesMasterIdLst>
   <p:sldIdLst>
     <p:sldId id="344" r:id="rId2"/>
@@ -30,10 +30,11 @@
     <p:sldId id="356" r:id="rId21"/>
     <p:sldId id="357" r:id="rId22"/>
     <p:sldId id="353" r:id="rId23"/>
-    <p:sldId id="291" r:id="rId24"/>
-    <p:sldId id="342" r:id="rId25"/>
-    <p:sldId id="347" r:id="rId26"/>
-    <p:sldId id="343" r:id="rId27"/>
+    <p:sldId id="360" r:id="rId24"/>
+    <p:sldId id="291" r:id="rId25"/>
+    <p:sldId id="342" r:id="rId26"/>
+    <p:sldId id="347" r:id="rId27"/>
+    <p:sldId id="343" r:id="rId28"/>
   </p:sldIdLst>
   <p:sldSz cx="12192000" cy="6858000"/>
   <p:notesSz cx="6858000" cy="9144000"/>
@@ -222,7 +223,7 @@
           <a:p>
             <a:fld id="{73CD064E-05FC-4E18-9D0C-A4994F368CAC}" type="datetimeFigureOut">
               <a:rPr lang="en-US" smtClean="0"/>
-              <a:t>10/18/2021</a:t>
+              <a:t>10/19/2021</a:t>
             </a:fld>
             <a:endParaRPr lang="en-US"/>
           </a:p>
@@ -2146,33 +2147,19 @@
           <a:p>
             <a:r>
               <a:rPr lang="en-US" dirty="0"/>
-              <a:t>Using the provided code, switch out the example tweet data for text data of your own. Then try out the code and see what insights you can find in your own text analysis.</a:t>
-            </a:r>
-          </a:p>
-          <a:p>
+              <a:t>In 2019, the National Association for College Admission Counseling’s national conference had an opening keynote by Randi Zuckerberg that was widely criticized. A colleague of mine, Brad Weiner, currently the interim Chief Data Officer at the University of Colorado Boulder u</a:t>
+            </a:r>
+            <a:r>
+              <a:rPr lang="en-US" b="0" i="0" dirty="0">
+                <a:solidFill>
+                  <a:srgbClr val="1D1C1D"/>
+                </a:solidFill>
+                <a:effectLst/>
+                <a:latin typeface="Slack-Lato"/>
+              </a:rPr>
+              <a:t>sed to do fairly real time analytics on Twitter from the NACAC conference. He shared his example with me from an analysis he did of the sentiments of tweets using the #nacac19, you can see a pretty significant increase in the anger, disgust, fear, and sadness sentiments while there’s a decline in anticipation, joy, and trust around the time of the opening keynote. This is just one more example of how sentiment analysis can be interesting and useful. </a:t>
+            </a:r>
             <a:endParaRPr lang="en-US" dirty="0"/>
-          </a:p>
-          <a:p>
-            <a:r>
-              <a:rPr lang="en-US" dirty="0"/>
-              <a:t>The book </a:t>
-            </a:r>
-            <a:r>
-              <a:rPr lang="en-US" i="1" dirty="0"/>
-              <a:t>Text Mining with R </a:t>
-            </a:r>
-            <a:r>
-              <a:rPr lang="en-US" dirty="0"/>
-              <a:t>by Julia </a:t>
-            </a:r>
-            <a:r>
-              <a:rPr lang="en-US" dirty="0" err="1"/>
-              <a:t>Silge</a:t>
-            </a:r>
-            <a:r>
-              <a:rPr lang="en-US" dirty="0"/>
-              <a:t> and David Robinson is available online at the URL provided above. This is an extensive resource for text analysis in R and contains lots of examples. If you want to go further with the analysis of Twitter data, it includes a whole case study comparing tweets from each of the authors. There is also a chapter on analyzing n-grams, which expands text analysis from 1 word to multiple words. The book also contains information on how to do some modeling with text data. It is a very comprehensive resource if you’d like to learn more about text analysis in R.</a:t>
-            </a:r>
           </a:p>
         </p:txBody>
       </p:sp>
@@ -2202,7 +2189,7 @@
     </p:spTree>
     <p:extLst>
       <p:ext uri="{BB962C8B-B14F-4D97-AF65-F5344CB8AC3E}">
-        <p14:creationId xmlns:p14="http://schemas.microsoft.com/office/powerpoint/2010/main" val="4098988218"/>
+        <p14:creationId xmlns:p14="http://schemas.microsoft.com/office/powerpoint/2010/main" val="37271565"/>
       </p:ext>
     </p:extLst>
   </p:cSld>
@@ -2258,7 +2245,32 @@
           <a:p>
             <a:r>
               <a:rPr lang="en-US" dirty="0"/>
-              <a:t>After recapping the previous session, we dove into a complete sentiment analysis and visualized the findings. We also discussed how to move beyond individual words in a text analysis and went through a short example of two-word phrases. Finally, we reviewed the insights that can be gained from text and sentiment analysis and discussed how to go further. </a:t>
+              <a:t>Using the provided code, switch out the example tweet data for text data of your own. Then try out the code and see what insights you can find in your own text analysis.</a:t>
+            </a:r>
+          </a:p>
+          <a:p>
+            <a:endParaRPr lang="en-US" dirty="0"/>
+          </a:p>
+          <a:p>
+            <a:r>
+              <a:rPr lang="en-US" dirty="0"/>
+              <a:t>The book </a:t>
+            </a:r>
+            <a:r>
+              <a:rPr lang="en-US" i="1" dirty="0"/>
+              <a:t>Text Mining with R </a:t>
+            </a:r>
+            <a:r>
+              <a:rPr lang="en-US" dirty="0"/>
+              <a:t>by Julia </a:t>
+            </a:r>
+            <a:r>
+              <a:rPr lang="en-US" dirty="0" err="1"/>
+              <a:t>Silge</a:t>
+            </a:r>
+            <a:r>
+              <a:rPr lang="en-US" dirty="0"/>
+              <a:t> and David Robinson is available online at the URL provided above. This is an extensive resource for text analysis in R and contains lots of examples. If you want to go further with the analysis of Twitter data, it includes a whole case study comparing tweets from each of the authors. There is also a chapter on analyzing n-grams, which expands text analysis from 1 word to multiple words. The book also contains information on how to do some modeling with text data. It is a very comprehensive resource if you’d like to learn more about text analysis in R.</a:t>
             </a:r>
           </a:p>
         </p:txBody>
@@ -2289,7 +2301,7 @@
     </p:spTree>
     <p:extLst>
       <p:ext uri="{BB962C8B-B14F-4D97-AF65-F5344CB8AC3E}">
-        <p14:creationId xmlns:p14="http://schemas.microsoft.com/office/powerpoint/2010/main" val="838260591"/>
+        <p14:creationId xmlns:p14="http://schemas.microsoft.com/office/powerpoint/2010/main" val="4098988218"/>
       </p:ext>
     </p:extLst>
   </p:cSld>
@@ -2345,7 +2357,7 @@
           <a:p>
             <a:r>
               <a:rPr lang="en-US" dirty="0"/>
-              <a:t>Thank you so much for being here today. I hope this webinar was beneficial. Thank you to AIR for having me and to Elaine and Emily for their support. </a:t>
+              <a:t>After recapping the previous session, we dove into a complete sentiment analysis and visualized the findings. We also discussed how to move beyond individual words in a text analysis and went through a short example of two-word phrases. Finally, we reviewed the insights that can be gained from text and sentiment analysis and discussed how to go further. </a:t>
             </a:r>
           </a:p>
         </p:txBody>
@@ -2376,7 +2388,7 @@
     </p:spTree>
     <p:extLst>
       <p:ext uri="{BB962C8B-B14F-4D97-AF65-F5344CB8AC3E}">
-        <p14:creationId xmlns:p14="http://schemas.microsoft.com/office/powerpoint/2010/main" val="2328103703"/>
+        <p14:creationId xmlns:p14="http://schemas.microsoft.com/office/powerpoint/2010/main" val="838260591"/>
       </p:ext>
     </p:extLst>
   </p:cSld>
@@ -2432,7 +2444,7 @@
           <a:p>
             <a:r>
               <a:rPr lang="en-US" dirty="0"/>
-              <a:t>Thank you again for joining this webinar. I hope you found it beneficial and helpful. I am so glad I got to spend a couple of hours with you this week.</a:t>
+              <a:t>Thank you so much for being here today. I hope this webinar was beneficial. Thank you to AIR for having me and to Elaine and Emily for their support. </a:t>
             </a:r>
           </a:p>
         </p:txBody>
@@ -2455,6 +2467,93 @@
             <a:fld id="{3C20A7C7-CA8D-4C49-BCFB-55E6C5267475}" type="slidenum">
               <a:rPr lang="en-US" smtClean="0"/>
               <a:t>26</a:t>
+            </a:fld>
+            <a:endParaRPr lang="en-US"/>
+          </a:p>
+        </p:txBody>
+      </p:sp>
+    </p:spTree>
+    <p:extLst>
+      <p:ext uri="{BB962C8B-B14F-4D97-AF65-F5344CB8AC3E}">
+        <p14:creationId xmlns:p14="http://schemas.microsoft.com/office/powerpoint/2010/main" val="2328103703"/>
+      </p:ext>
+    </p:extLst>
+  </p:cSld>
+  <p:clrMapOvr>
+    <a:masterClrMapping/>
+  </p:clrMapOvr>
+</p:notes>
+</file>
+
+<file path=ppt/notesSlides/notesSlide25.xml><?xml version="1.0" encoding="utf-8"?>
+<p:notes xmlns:a="http://schemas.openxmlformats.org/drawingml/2006/main" xmlns:r="http://schemas.openxmlformats.org/officeDocument/2006/relationships" xmlns:p="http://schemas.openxmlformats.org/presentationml/2006/main">
+  <p:cSld>
+    <p:spTree>
+      <p:nvGrpSpPr>
+        <p:cNvPr id="1" name=""/>
+        <p:cNvGrpSpPr/>
+        <p:nvPr/>
+      </p:nvGrpSpPr>
+      <p:grpSpPr>
+        <a:xfrm>
+          <a:off x="0" y="0"/>
+          <a:ext cx="0" cy="0"/>
+          <a:chOff x="0" y="0"/>
+          <a:chExt cx="0" cy="0"/>
+        </a:xfrm>
+      </p:grpSpPr>
+      <p:sp>
+        <p:nvSpPr>
+          <p:cNvPr id="2" name="Slide Image Placeholder 1"/>
+          <p:cNvSpPr>
+            <a:spLocks noGrp="1" noRot="1" noChangeAspect="1"/>
+          </p:cNvSpPr>
+          <p:nvPr>
+            <p:ph type="sldImg"/>
+          </p:nvPr>
+        </p:nvSpPr>
+        <p:spPr/>
+      </p:sp>
+      <p:sp>
+        <p:nvSpPr>
+          <p:cNvPr id="3" name="Notes Placeholder 2"/>
+          <p:cNvSpPr>
+            <a:spLocks noGrp="1"/>
+          </p:cNvSpPr>
+          <p:nvPr>
+            <p:ph type="body" idx="1"/>
+          </p:nvPr>
+        </p:nvSpPr>
+        <p:spPr/>
+        <p:txBody>
+          <a:bodyPr/>
+          <a:lstStyle/>
+          <a:p>
+            <a:r>
+              <a:rPr lang="en-US" dirty="0"/>
+              <a:t>Thank you again for joining this webinar. I hope you found it beneficial and helpful. I am so glad I got to spend a couple of hours with you this week.</a:t>
+            </a:r>
+          </a:p>
+        </p:txBody>
+      </p:sp>
+      <p:sp>
+        <p:nvSpPr>
+          <p:cNvPr id="4" name="Slide Number Placeholder 3"/>
+          <p:cNvSpPr>
+            <a:spLocks noGrp="1"/>
+          </p:cNvSpPr>
+          <p:nvPr>
+            <p:ph type="sldNum" sz="quarter" idx="5"/>
+          </p:nvPr>
+        </p:nvSpPr>
+        <p:spPr/>
+        <p:txBody>
+          <a:bodyPr/>
+          <a:lstStyle/>
+          <a:p>
+            <a:fld id="{3C20A7C7-CA8D-4C49-BCFB-55E6C5267475}" type="slidenum">
+              <a:rPr lang="en-US" smtClean="0"/>
+              <a:t>27</a:t>
             </a:fld>
             <a:endParaRPr lang="en-US"/>
           </a:p>
@@ -5133,7 +5232,7 @@
           <a:p>
             <a:fld id="{C9727A96-7105-44AE-B9F0-3BA74D06A54C}" type="datetimeFigureOut">
               <a:rPr lang="en-US" smtClean="0"/>
-              <a:t>10/18/2021</a:t>
+              <a:t>10/19/2021</a:t>
             </a:fld>
             <a:endParaRPr lang="en-US"/>
           </a:p>
@@ -5331,7 +5430,7 @@
           <a:p>
             <a:fld id="{C9727A96-7105-44AE-B9F0-3BA74D06A54C}" type="datetimeFigureOut">
               <a:rPr lang="en-US" smtClean="0"/>
-              <a:t>10/18/2021</a:t>
+              <a:t>10/19/2021</a:t>
             </a:fld>
             <a:endParaRPr lang="en-US"/>
           </a:p>
@@ -5567,7 +5666,7 @@
           <a:p>
             <a:fld id="{C9727A96-7105-44AE-B9F0-3BA74D06A54C}" type="datetimeFigureOut">
               <a:rPr lang="en-US" smtClean="0"/>
-              <a:t>10/18/2021</a:t>
+              <a:t>10/19/2021</a:t>
             </a:fld>
             <a:endParaRPr lang="en-US"/>
           </a:p>
@@ -5903,7 +6002,7 @@
           <a:p>
             <a:fld id="{986F8839-423C-1541-BA9A-A38B5B6A10D1}" type="datetimeFigureOut">
               <a:rPr lang="en-US" smtClean="0"/>
-              <a:t>10/18/2021</a:t>
+              <a:t>10/19/2021</a:t>
             </a:fld>
             <a:endParaRPr lang="en-US"/>
           </a:p>
@@ -8182,14 +8281,6 @@
 <file path=ppt/slides/slide23.xml><?xml version="1.0" encoding="utf-8"?>
 <p:sld xmlns:a="http://schemas.openxmlformats.org/drawingml/2006/main" xmlns:r="http://schemas.openxmlformats.org/officeDocument/2006/relationships" xmlns:p="http://schemas.openxmlformats.org/presentationml/2006/main">
   <p:cSld>
-    <p:bg>
-      <p:bgPr>
-        <a:solidFill>
-          <a:schemeClr val="bg1"/>
-        </a:solidFill>
-        <a:effectLst/>
-      </p:bgPr>
-    </p:bg>
     <p:spTree>
       <p:nvGrpSpPr>
         <p:cNvPr id="1" name=""/>
@@ -8209,7 +8300,7 @@
           <p:cNvPr id="2" name="Title 1">
             <a:extLst>
               <a:ext uri="{FF2B5EF4-FFF2-40B4-BE49-F238E27FC236}">
-                <a16:creationId xmlns:a16="http://schemas.microsoft.com/office/drawing/2014/main" id="{68E7F413-5848-4FF9-90FF-F4D1B37E4837}"/>
+                <a16:creationId xmlns:a16="http://schemas.microsoft.com/office/drawing/2014/main" id="{C3CF5F6D-0132-40F6-B592-832E9063ACA9}"/>
               </a:ext>
             </a:extLst>
           </p:cNvPr>
@@ -8222,90 +8313,80 @@
         </p:nvSpPr>
         <p:spPr/>
         <p:txBody>
-          <a:bodyPr>
-            <a:normAutofit/>
-          </a:bodyPr>
-          <a:lstStyle/>
-          <a:p>
-            <a:r>
-              <a:rPr lang="en-US" sz="3600" dirty="0"/>
-              <a:t>Where to go next</a:t>
-            </a:r>
-          </a:p>
-        </p:txBody>
-      </p:sp>
-      <p:sp>
-        <p:nvSpPr>
-          <p:cNvPr id="3" name="Content Placeholder 2">
-            <a:extLst>
-              <a:ext uri="{FF2B5EF4-FFF2-40B4-BE49-F238E27FC236}">
-                <a16:creationId xmlns:a16="http://schemas.microsoft.com/office/drawing/2014/main" id="{A366A98A-E3CA-4E30-9B3F-09E95FB08DB4}"/>
-              </a:ext>
-            </a:extLst>
-          </p:cNvPr>
-          <p:cNvSpPr>
-            <a:spLocks noGrp="1"/>
-          </p:cNvSpPr>
-          <p:nvPr>
-            <p:ph idx="1"/>
-          </p:nvPr>
-        </p:nvSpPr>
-        <p:spPr/>
-        <p:txBody>
-          <a:bodyPr>
-            <a:normAutofit/>
-          </a:bodyPr>
-          <a:lstStyle/>
-          <a:p>
-            <a:r>
-              <a:rPr lang="en-US" dirty="0"/>
-              <a:t>Try out a text analysis of your own. </a:t>
-            </a:r>
-          </a:p>
-          <a:p>
-            <a:r>
-              <a:rPr lang="en-US" dirty="0"/>
-              <a:t>Review </a:t>
-            </a:r>
-            <a:r>
-              <a:rPr lang="en-US" i="1" dirty="0"/>
-              <a:t>Text Mining with R </a:t>
-            </a:r>
-            <a:r>
-              <a:rPr lang="en-US" dirty="0"/>
-              <a:t>by Julia </a:t>
-            </a:r>
-            <a:r>
-              <a:rPr lang="en-US" dirty="0" err="1"/>
-              <a:t>Silge</a:t>
-            </a:r>
-            <a:r>
-              <a:rPr lang="en-US" dirty="0"/>
-              <a:t> and David Robinson</a:t>
-            </a:r>
-          </a:p>
-          <a:p>
-            <a:pPr lvl="1"/>
-            <a:r>
-              <a:rPr lang="en-US" dirty="0">
-                <a:hlinkClick r:id="rId3"/>
-              </a:rPr>
-              <a:t>https://www.tidytextmining.com/index.html</a:t>
-            </a:r>
-            <a:r>
-              <a:rPr lang="en-US" dirty="0"/>
-              <a:t> </a:t>
-            </a:r>
-          </a:p>
-          <a:p>
-            <a:endParaRPr lang="en-US" dirty="0"/>
-          </a:p>
-        </p:txBody>
-      </p:sp>
+          <a:bodyPr/>
+          <a:lstStyle/>
+          <a:p>
+            <a:r>
+              <a:rPr lang="en-US" dirty="0"/>
+              <a:t>Example</a:t>
+            </a:r>
+          </a:p>
+        </p:txBody>
+      </p:sp>
+      <p:pic>
+        <p:nvPicPr>
+          <p:cNvPr id="5" name="Picture 4">
+            <a:extLst>
+              <a:ext uri="{FF2B5EF4-FFF2-40B4-BE49-F238E27FC236}">
+                <a16:creationId xmlns:a16="http://schemas.microsoft.com/office/drawing/2014/main" id="{C8DA7000-B6A7-4406-8D98-23B622F5378A}"/>
+              </a:ext>
+            </a:extLst>
+          </p:cNvPr>
+          <p:cNvPicPr>
+            <a:picLocks noChangeAspect="1"/>
+          </p:cNvPicPr>
+          <p:nvPr/>
+        </p:nvPicPr>
+        <p:blipFill>
+          <a:blip r:embed="rId3"/>
+          <a:stretch>
+            <a:fillRect/>
+          </a:stretch>
+        </p:blipFill>
+        <p:spPr>
+          <a:xfrm>
+            <a:off x="661395" y="1287108"/>
+            <a:ext cx="5756828" cy="5029200"/>
+          </a:xfrm>
+          <a:prstGeom prst="rect">
+            <a:avLst/>
+          </a:prstGeom>
+        </p:spPr>
+      </p:pic>
+      <p:pic>
+        <p:nvPicPr>
+          <p:cNvPr id="7" name="Picture 6">
+            <a:extLst>
+              <a:ext uri="{FF2B5EF4-FFF2-40B4-BE49-F238E27FC236}">
+                <a16:creationId xmlns:a16="http://schemas.microsoft.com/office/drawing/2014/main" id="{AF7E185D-48F0-499E-B128-02F0A86EB4EC}"/>
+              </a:ext>
+            </a:extLst>
+          </p:cNvPr>
+          <p:cNvPicPr>
+            <a:picLocks noChangeAspect="1"/>
+          </p:cNvPicPr>
+          <p:nvPr/>
+        </p:nvPicPr>
+        <p:blipFill>
+          <a:blip r:embed="rId4"/>
+          <a:stretch>
+            <a:fillRect/>
+          </a:stretch>
+        </p:blipFill>
+        <p:spPr>
+          <a:xfrm>
+            <a:off x="7079618" y="1297594"/>
+            <a:ext cx="4450987" cy="5018714"/>
+          </a:xfrm>
+          <a:prstGeom prst="rect">
+            <a:avLst/>
+          </a:prstGeom>
+        </p:spPr>
+      </p:pic>
     </p:spTree>
     <p:extLst>
       <p:ext uri="{BB962C8B-B14F-4D97-AF65-F5344CB8AC3E}">
-        <p14:creationId xmlns:p14="http://schemas.microsoft.com/office/powerpoint/2010/main" val="254307914"/>
+        <p14:creationId xmlns:p14="http://schemas.microsoft.com/office/powerpoint/2010/main" val="289252328"/>
       </p:ext>
     </p:extLst>
   </p:cSld>
@@ -8345,6 +8426,142 @@
           <p:cNvPr id="2" name="Title 1">
             <a:extLst>
               <a:ext uri="{FF2B5EF4-FFF2-40B4-BE49-F238E27FC236}">
+                <a16:creationId xmlns:a16="http://schemas.microsoft.com/office/drawing/2014/main" id="{68E7F413-5848-4FF9-90FF-F4D1B37E4837}"/>
+              </a:ext>
+            </a:extLst>
+          </p:cNvPr>
+          <p:cNvSpPr>
+            <a:spLocks noGrp="1"/>
+          </p:cNvSpPr>
+          <p:nvPr>
+            <p:ph type="title"/>
+          </p:nvPr>
+        </p:nvSpPr>
+        <p:spPr/>
+        <p:txBody>
+          <a:bodyPr>
+            <a:normAutofit/>
+          </a:bodyPr>
+          <a:lstStyle/>
+          <a:p>
+            <a:r>
+              <a:rPr lang="en-US" sz="3600" dirty="0"/>
+              <a:t>Where to go next</a:t>
+            </a:r>
+          </a:p>
+        </p:txBody>
+      </p:sp>
+      <p:sp>
+        <p:nvSpPr>
+          <p:cNvPr id="3" name="Content Placeholder 2">
+            <a:extLst>
+              <a:ext uri="{FF2B5EF4-FFF2-40B4-BE49-F238E27FC236}">
+                <a16:creationId xmlns:a16="http://schemas.microsoft.com/office/drawing/2014/main" id="{A366A98A-E3CA-4E30-9B3F-09E95FB08DB4}"/>
+              </a:ext>
+            </a:extLst>
+          </p:cNvPr>
+          <p:cNvSpPr>
+            <a:spLocks noGrp="1"/>
+          </p:cNvSpPr>
+          <p:nvPr>
+            <p:ph idx="1"/>
+          </p:nvPr>
+        </p:nvSpPr>
+        <p:spPr/>
+        <p:txBody>
+          <a:bodyPr>
+            <a:normAutofit/>
+          </a:bodyPr>
+          <a:lstStyle/>
+          <a:p>
+            <a:r>
+              <a:rPr lang="en-US" dirty="0"/>
+              <a:t>Try out a text analysis of your own. </a:t>
+            </a:r>
+          </a:p>
+          <a:p>
+            <a:r>
+              <a:rPr lang="en-US" dirty="0"/>
+              <a:t>Review </a:t>
+            </a:r>
+            <a:r>
+              <a:rPr lang="en-US" i="1" dirty="0"/>
+              <a:t>Text Mining with R </a:t>
+            </a:r>
+            <a:r>
+              <a:rPr lang="en-US" dirty="0"/>
+              <a:t>by Julia </a:t>
+            </a:r>
+            <a:r>
+              <a:rPr lang="en-US" dirty="0" err="1"/>
+              <a:t>Silge</a:t>
+            </a:r>
+            <a:r>
+              <a:rPr lang="en-US" dirty="0"/>
+              <a:t> and David Robinson</a:t>
+            </a:r>
+          </a:p>
+          <a:p>
+            <a:pPr lvl="1"/>
+            <a:r>
+              <a:rPr lang="en-US" dirty="0">
+                <a:hlinkClick r:id="rId3"/>
+              </a:rPr>
+              <a:t>https://www.tidytextmining.com/index.html</a:t>
+            </a:r>
+            <a:r>
+              <a:rPr lang="en-US" dirty="0"/>
+              <a:t> </a:t>
+            </a:r>
+          </a:p>
+          <a:p>
+            <a:endParaRPr lang="en-US" dirty="0"/>
+          </a:p>
+        </p:txBody>
+      </p:sp>
+    </p:spTree>
+    <p:extLst>
+      <p:ext uri="{BB962C8B-B14F-4D97-AF65-F5344CB8AC3E}">
+        <p14:creationId xmlns:p14="http://schemas.microsoft.com/office/powerpoint/2010/main" val="254307914"/>
+      </p:ext>
+    </p:extLst>
+  </p:cSld>
+  <p:clrMapOvr>
+    <a:masterClrMapping/>
+  </p:clrMapOvr>
+</p:sld>
+</file>
+
+<file path=ppt/slides/slide25.xml><?xml version="1.0" encoding="utf-8"?>
+<p:sld xmlns:a="http://schemas.openxmlformats.org/drawingml/2006/main" xmlns:r="http://schemas.openxmlformats.org/officeDocument/2006/relationships" xmlns:p="http://schemas.openxmlformats.org/presentationml/2006/main">
+  <p:cSld>
+    <p:bg>
+      <p:bgPr>
+        <a:solidFill>
+          <a:schemeClr val="bg1"/>
+        </a:solidFill>
+        <a:effectLst/>
+      </p:bgPr>
+    </p:bg>
+    <p:spTree>
+      <p:nvGrpSpPr>
+        <p:cNvPr id="1" name=""/>
+        <p:cNvGrpSpPr/>
+        <p:nvPr/>
+      </p:nvGrpSpPr>
+      <p:grpSpPr>
+        <a:xfrm>
+          <a:off x="0" y="0"/>
+          <a:ext cx="0" cy="0"/>
+          <a:chOff x="0" y="0"/>
+          <a:chExt cx="0" cy="0"/>
+        </a:xfrm>
+      </p:grpSpPr>
+      <p:sp>
+        <p:nvSpPr>
+          <p:cNvPr id="2" name="Title 1">
+            <a:extLst>
+              <a:ext uri="{FF2B5EF4-FFF2-40B4-BE49-F238E27FC236}">
                 <a16:creationId xmlns:a16="http://schemas.microsoft.com/office/drawing/2014/main" id="{BDA1388A-4824-4A29-ADD9-8CFCC321EE86}"/>
               </a:ext>
             </a:extLst>
@@ -8429,7 +8646,7 @@
 </p:sld>
 </file>
 
-<file path=ppt/slides/slide25.xml><?xml version="1.0" encoding="utf-8"?>
+<file path=ppt/slides/slide26.xml><?xml version="1.0" encoding="utf-8"?>
 <p:sld xmlns:a="http://schemas.openxmlformats.org/drawingml/2006/main" xmlns:r="http://schemas.openxmlformats.org/officeDocument/2006/relationships" xmlns:p="http://schemas.openxmlformats.org/presentationml/2006/main">
   <p:cSld>
     <p:spTree>
@@ -8487,7 +8704,7 @@
 </p:sld>
 </file>
 
-<file path=ppt/slides/slide26.xml><?xml version="1.0" encoding="utf-8"?>
+<file path=ppt/slides/slide27.xml><?xml version="1.0" encoding="utf-8"?>
 <p:sld xmlns:a="http://schemas.openxmlformats.org/drawingml/2006/main" xmlns:r="http://schemas.openxmlformats.org/officeDocument/2006/relationships" xmlns:p="http://schemas.openxmlformats.org/presentationml/2006/main">
   <p:cSld>
     <p:bg>

</xml_diff>

<commit_message>
presented part 1 of the webinar
</commit_message>
<xml_diff>
--- a/slides/Sentiment Analysis in R.pptx
+++ b/slides/Sentiment Analysis in R.pptx
@@ -33,7 +33,7 @@
     <p:sldId id="360" r:id="rId24"/>
     <p:sldId id="291" r:id="rId25"/>
     <p:sldId id="342" r:id="rId26"/>
-    <p:sldId id="347" r:id="rId27"/>
+    <p:sldId id="361" r:id="rId27"/>
     <p:sldId id="343" r:id="rId28"/>
   </p:sldIdLst>
   <p:sldSz cx="12192000" cy="6858000"/>
@@ -223,7 +223,7 @@
           <a:p>
             <a:fld id="{73CD064E-05FC-4E18-9D0C-A4994F368CAC}" type="datetimeFigureOut">
               <a:rPr lang="en-US" smtClean="0"/>
-              <a:t>10/19/2021</a:t>
+              <a:t>10/20/2021</a:t>
             </a:fld>
             <a:endParaRPr lang="en-US"/>
           </a:p>
@@ -1881,40 +1881,59 @@
           <a:p>
             <a:r>
               <a:rPr lang="en-US" dirty="0"/>
-              <a:t>I’m Jenn Schilling, my pronouns are she/her/hers. I am a senior data analyst at the University of Arizona, and an adjunct faculty member at the College for Creative Studies where I teach graduate classes on data visualization. Thank you for being here, and I hope you will find this webinar beneficial. Before I begin, I would like acknowledge that I am on the </a:t>
-            </a:r>
-            <a:r>
-              <a:rPr lang="en-US" b="0" i="0" dirty="0">
+              <a:t>I’m Jenn Schilling, my pronouns are she/her/hers. I am a senior data analyst at the University of Arizona, and an adjunct faculty member at the College for Creative Studies where I teach graduate classes on data visualization. </a:t>
+            </a:r>
+          </a:p>
+          <a:p>
+            <a:endParaRPr lang="en-US" dirty="0"/>
+          </a:p>
+          <a:p>
+            <a:r>
+              <a:rPr lang="en-US" sz="1800" i="0" dirty="0">
                 <a:solidFill>
-                  <a:srgbClr val="403635"/>
+                  <a:srgbClr val="333333"/>
                 </a:solidFill>
                 <a:effectLst/>
-                <a:latin typeface="MiloWeb"/>
+                <a:latin typeface="Calibri" panose="020F0502020204030204" pitchFamily="34" charset="0"/>
+                <a:ea typeface="Calibri" panose="020F0502020204030204" pitchFamily="34" charset="0"/>
               </a:rPr>
-              <a:t>ancestral lands of the Tohono O'odham and Pascua Yaqui nations, indigenous peoples who have occupied this land since time immemorial. </a:t>
-            </a:r>
-          </a:p>
-          <a:p>
-            <a:endParaRPr lang="en-US" b="0" i="0" dirty="0">
+              <a:t>Today I’m presenting from The University of Arizona [which] is on the land and territories of Indigenous peoples. Today, Arizona is home to 22 federally recognized tribes, with Tucson being home to the O’odham and the Yaqui. Committed to diversity and inclusion, the University strives to build sustainable relationships with sovereign Native Nations and Indigenous communities through education offerings, partnerships, and community service.</a:t>
+            </a:r>
+          </a:p>
+          <a:p>
+            <a:endParaRPr lang="en-US" sz="1800" i="0" dirty="0">
               <a:solidFill>
-                <a:srgbClr val="403635"/>
+                <a:srgbClr val="333333"/>
               </a:solidFill>
               <a:effectLst/>
-              <a:latin typeface="MiloWeb"/>
+              <a:latin typeface="Calibri" panose="020F0502020204030204" pitchFamily="34" charset="0"/>
             </a:endParaRPr>
           </a:p>
           <a:p>
-            <a:r>
-              <a:rPr lang="en-US" b="0" i="0" dirty="0">
-                <a:solidFill>
-                  <a:srgbClr val="403635"/>
-                </a:solidFill>
-                <a:effectLst/>
-                <a:latin typeface="MiloWeb"/>
-              </a:rPr>
-              <a:t>Territory acknowledgements are one small part of disrupting and dismantling colonial structures.</a:t>
-            </a:r>
-            <a:endParaRPr lang="en-US" dirty="0"/>
+            <a:pPr marL="0" marR="0" lvl="0" indent="0" algn="l" defTabSz="914400" rtl="0" eaLnBrk="1" fontAlgn="auto" latinLnBrk="0" hangingPunct="1">
+              <a:lnSpc>
+                <a:spcPct val="100000"/>
+              </a:lnSpc>
+              <a:spcBef>
+                <a:spcPts val="0"/>
+              </a:spcBef>
+              <a:spcAft>
+                <a:spcPts val="0"/>
+              </a:spcAft>
+              <a:buClrTx/>
+              <a:buSzTx/>
+              <a:buFontTx/>
+              <a:buNone/>
+              <a:tabLst/>
+              <a:defRPr/>
+            </a:pPr>
+            <a:r>
+              <a:rPr lang="en-US" dirty="0"/>
+              <a:t>Thank you for being here, and I hope you will find this webinar beneficial. </a:t>
+            </a:r>
+          </a:p>
+          <a:p>
+            <a:endParaRPr lang="en-US" i="0" dirty="0"/>
           </a:p>
         </p:txBody>
       </p:sp>
@@ -2444,8 +2463,13 @@
           <a:p>
             <a:r>
               <a:rPr lang="en-US" dirty="0"/>
-              <a:t>Thank you so much for being here today. I hope this webinar was beneficial. Thank you to AIR for having me and to Elaine and Emily for their support. </a:t>
-            </a:r>
+              <a:t>Thank you so much for being here today! I look forward to seeing you in Part 2. Thank you to AIR and Emily and Elaine for their support and </a:t>
+            </a:r>
+            <a:r>
+              <a:rPr lang="en-US"/>
+              <a:t>for having me. </a:t>
+            </a:r>
+            <a:endParaRPr lang="en-US" dirty="0"/>
           </a:p>
         </p:txBody>
       </p:sp>
@@ -2475,7 +2499,7 @@
     </p:spTree>
     <p:extLst>
       <p:ext uri="{BB962C8B-B14F-4D97-AF65-F5344CB8AC3E}">
-        <p14:creationId xmlns:p14="http://schemas.microsoft.com/office/powerpoint/2010/main" val="2328103703"/>
+        <p14:creationId xmlns:p14="http://schemas.microsoft.com/office/powerpoint/2010/main" val="872062292"/>
       </p:ext>
     </p:extLst>
   </p:cSld>
@@ -5232,7 +5256,7 @@
           <a:p>
             <a:fld id="{C9727A96-7105-44AE-B9F0-3BA74D06A54C}" type="datetimeFigureOut">
               <a:rPr lang="en-US" smtClean="0"/>
-              <a:t>10/19/2021</a:t>
+              <a:t>10/20/2021</a:t>
             </a:fld>
             <a:endParaRPr lang="en-US"/>
           </a:p>
@@ -5430,7 +5454,7 @@
           <a:p>
             <a:fld id="{C9727A96-7105-44AE-B9F0-3BA74D06A54C}" type="datetimeFigureOut">
               <a:rPr lang="en-US" smtClean="0"/>
-              <a:t>10/19/2021</a:t>
+              <a:t>10/20/2021</a:t>
             </a:fld>
             <a:endParaRPr lang="en-US"/>
           </a:p>
@@ -5666,7 +5690,7 @@
           <a:p>
             <a:fld id="{C9727A96-7105-44AE-B9F0-3BA74D06A54C}" type="datetimeFigureOut">
               <a:rPr lang="en-US" smtClean="0"/>
-              <a:t>10/19/2021</a:t>
+              <a:t>10/20/2021</a:t>
             </a:fld>
             <a:endParaRPr lang="en-US"/>
           </a:p>
@@ -6002,7 +6026,7 @@
           <a:p>
             <a:fld id="{986F8839-423C-1541-BA9A-A38B5B6A10D1}" type="datetimeFigureOut">
               <a:rPr lang="en-US" smtClean="0"/>
-              <a:t>10/19/2021</a:t>
+              <a:t>10/20/2021</a:t>
             </a:fld>
             <a:endParaRPr lang="en-US"/>
           </a:p>
@@ -6474,7 +6498,7 @@
           <a:p>
             <a:r>
               <a:rPr lang="en-US" dirty="0"/>
-              <a:t>October 20, 2021</a:t>
+              <a:t>Part 1 | October 20, 2021</a:t>
             </a:r>
           </a:p>
         </p:txBody>
@@ -6960,7 +6984,12 @@
             <p:ph type="ctrTitle"/>
           </p:nvPr>
         </p:nvSpPr>
-        <p:spPr/>
+        <p:spPr>
+          <a:xfrm>
+            <a:off x="1058687" y="1241854"/>
+            <a:ext cx="10062100" cy="3671522"/>
+          </a:xfrm>
+        </p:spPr>
         <p:txBody>
           <a:bodyPr/>
           <a:lstStyle/>
@@ -6969,6 +6998,36 @@
               <a:rPr lang="en-US" dirty="0"/>
               <a:t>Questions</a:t>
             </a:r>
+            <a:br>
+              <a:rPr lang="en-US" dirty="0"/>
+            </a:br>
+            <a:br>
+              <a:rPr lang="en-US" dirty="0"/>
+            </a:br>
+            <a:r>
+              <a:rPr lang="en-US" sz="3200" b="0" dirty="0">
+                <a:solidFill>
+                  <a:schemeClr val="bg1"/>
+                </a:solidFill>
+              </a:rPr>
+              <a:t>Email: jaschilling@arizona.edu</a:t>
+            </a:r>
+            <a:br>
+              <a:rPr lang="en-US" sz="3200" b="0" dirty="0">
+                <a:solidFill>
+                  <a:schemeClr val="bg1"/>
+                </a:solidFill>
+              </a:rPr>
+            </a:br>
+            <a:r>
+              <a:rPr lang="en-US" sz="3200" b="0" dirty="0">
+                <a:solidFill>
+                  <a:schemeClr val="bg1"/>
+                </a:solidFill>
+              </a:rPr>
+              <a:t>Twitter: @datasciencejenn</a:t>
+            </a:r>
+            <a:endParaRPr lang="en-US" b="0" dirty="0"/>
           </a:p>
         </p:txBody>
       </p:sp>
@@ -7059,7 +7118,7 @@
           <a:p>
             <a:r>
               <a:rPr lang="en-US" dirty="0"/>
-              <a:t>October 22, 2021</a:t>
+              <a:t>Part 2 | October 22, 2021</a:t>
             </a:r>
           </a:p>
         </p:txBody>
@@ -8679,7 +8738,12 @@
             <p:ph type="ctrTitle"/>
           </p:nvPr>
         </p:nvSpPr>
-        <p:spPr/>
+        <p:spPr>
+          <a:xfrm>
+            <a:off x="1058687" y="1241854"/>
+            <a:ext cx="10062100" cy="3671522"/>
+          </a:xfrm>
+        </p:spPr>
         <p:txBody>
           <a:bodyPr/>
           <a:lstStyle/>
@@ -8688,13 +8752,43 @@
               <a:rPr lang="en-US" dirty="0"/>
               <a:t>Questions</a:t>
             </a:r>
+            <a:br>
+              <a:rPr lang="en-US" dirty="0"/>
+            </a:br>
+            <a:br>
+              <a:rPr lang="en-US" dirty="0"/>
+            </a:br>
+            <a:r>
+              <a:rPr lang="en-US" sz="3200" b="0" dirty="0">
+                <a:solidFill>
+                  <a:schemeClr val="bg1"/>
+                </a:solidFill>
+              </a:rPr>
+              <a:t>Email: jaschilling@arizona.edu</a:t>
+            </a:r>
+            <a:br>
+              <a:rPr lang="en-US" sz="3200" b="0" dirty="0">
+                <a:solidFill>
+                  <a:schemeClr val="bg1"/>
+                </a:solidFill>
+              </a:rPr>
+            </a:br>
+            <a:r>
+              <a:rPr lang="en-US" sz="3200" b="0" dirty="0">
+                <a:solidFill>
+                  <a:schemeClr val="bg1"/>
+                </a:solidFill>
+              </a:rPr>
+              <a:t>Twitter: @datasciencejenn</a:t>
+            </a:r>
+            <a:endParaRPr lang="en-US" b="0" dirty="0"/>
           </a:p>
         </p:txBody>
       </p:sp>
     </p:spTree>
     <p:extLst>
       <p:ext uri="{BB962C8B-B14F-4D97-AF65-F5344CB8AC3E}">
-        <p14:creationId xmlns:p14="http://schemas.microsoft.com/office/powerpoint/2010/main" val="2093359691"/>
+        <p14:creationId xmlns:p14="http://schemas.microsoft.com/office/powerpoint/2010/main" val="4251848133"/>
       </p:ext>
     </p:extLst>
   </p:cSld>

</xml_diff>

<commit_message>
completed webinar part 2
</commit_message>
<xml_diff>
--- a/slides/Sentiment Analysis in R.pptx
+++ b/slides/Sentiment Analysis in R.pptx
@@ -5,7 +5,7 @@
     <p:sldMasterId id="2147483660" r:id="rId1"/>
   </p:sldMasterIdLst>
   <p:notesMasterIdLst>
-    <p:notesMasterId r:id="rId29"/>
+    <p:notesMasterId r:id="rId28"/>
   </p:notesMasterIdLst>
   <p:sldIdLst>
     <p:sldId id="344" r:id="rId2"/>
@@ -26,15 +26,14 @@
     <p:sldId id="348" r:id="rId17"/>
     <p:sldId id="284" r:id="rId18"/>
     <p:sldId id="286" r:id="rId19"/>
-    <p:sldId id="355" r:id="rId20"/>
-    <p:sldId id="356" r:id="rId21"/>
-    <p:sldId id="357" r:id="rId22"/>
-    <p:sldId id="353" r:id="rId23"/>
-    <p:sldId id="360" r:id="rId24"/>
-    <p:sldId id="291" r:id="rId25"/>
-    <p:sldId id="342" r:id="rId26"/>
-    <p:sldId id="361" r:id="rId27"/>
-    <p:sldId id="343" r:id="rId28"/>
+    <p:sldId id="356" r:id="rId20"/>
+    <p:sldId id="357" r:id="rId21"/>
+    <p:sldId id="353" r:id="rId22"/>
+    <p:sldId id="360" r:id="rId23"/>
+    <p:sldId id="291" r:id="rId24"/>
+    <p:sldId id="342" r:id="rId25"/>
+    <p:sldId id="361" r:id="rId26"/>
+    <p:sldId id="343" r:id="rId27"/>
   </p:sldIdLst>
   <p:sldSz cx="12192000" cy="6858000"/>
   <p:notesSz cx="6858000" cy="9144000"/>
@@ -223,7 +222,7 @@
           <a:p>
             <a:fld id="{73CD064E-05FC-4E18-9D0C-A4994F368CAC}" type="datetimeFigureOut">
               <a:rPr lang="en-US" smtClean="0"/>
-              <a:t>10/20/2021</a:t>
+              <a:t>10/22/2021</a:t>
             </a:fld>
             <a:endParaRPr lang="en-US"/>
           </a:p>
@@ -1031,7 +1030,7 @@
             </a:pPr>
             <a:r>
               <a:rPr lang="en-US" dirty="0"/>
-              <a:t>Welcome back to Day 2 of the Sentiment Analysis in R webinar. I am so happy you’re here.</a:t>
+              <a:t>Welcome back to Part 2 of the Sentiment Analysis in R webinar. I am so happy you’re here.</a:t>
             </a:r>
             <a:endParaRPr lang="en-US" dirty="0">
               <a:cs typeface="Calibri"/>
@@ -1482,7 +1481,7 @@
             </a:pPr>
             <a:r>
               <a:rPr lang="en-US" dirty="0"/>
-              <a:t>In Day 1, we talked about text analysis and sentiment analysis and how they can be used. Then we discussed how to set up R for text analysis. In R, we jumped into processing and preparing the data for text analysis. Next, we covered tokenizing and computing word frequencies. </a:t>
+              <a:t>In Part 1, we talked about text analysis and sentiment analysis and how they can be used. Then we discussed how to set up R for text analysis. In R, we jumped into processing and preparing the data for text analysis. Next, we covered tokenizing and computing word frequencies. </a:t>
             </a:r>
           </a:p>
           <a:p>
@@ -1543,6 +1542,61 @@
               <a:rPr lang="en-US" dirty="0"/>
               <a:t>} packages for data processing and text analysis. </a:t>
             </a:r>
+          </a:p>
+          <a:p>
+            <a:pPr marL="0" marR="0" lvl="0" indent="0" algn="l" defTabSz="914400" rtl="0" eaLnBrk="1" fontAlgn="auto" latinLnBrk="0" hangingPunct="1">
+              <a:lnSpc>
+                <a:spcPct val="100000"/>
+              </a:lnSpc>
+              <a:spcBef>
+                <a:spcPts val="0"/>
+              </a:spcBef>
+              <a:spcAft>
+                <a:spcPts val="0"/>
+              </a:spcAft>
+              <a:buClrTx/>
+              <a:buSzTx/>
+              <a:buFontTx/>
+              <a:buNone/>
+              <a:tabLst/>
+              <a:defRPr/>
+            </a:pPr>
+            <a:endParaRPr lang="en-US" dirty="0"/>
+          </a:p>
+          <a:p>
+            <a:r>
+              <a:rPr lang="en-US" dirty="0"/>
+              <a:t>A token is a meaningful unit of text, such as a word. Tokens may also be referred to as terms. </a:t>
+            </a:r>
+          </a:p>
+          <a:p>
+            <a:endParaRPr lang="en-US" dirty="0"/>
+          </a:p>
+          <a:p>
+            <a:r>
+              <a:rPr lang="en-US" dirty="0"/>
+              <a:t>A document is made up of words/terms/tokens. A corpus is made up of documents.</a:t>
+            </a:r>
+          </a:p>
+          <a:p>
+            <a:pPr marL="0" marR="0" lvl="0" indent="0" algn="l" defTabSz="914400" rtl="0" eaLnBrk="1" fontAlgn="auto" latinLnBrk="0" hangingPunct="1">
+              <a:lnSpc>
+                <a:spcPct val="100000"/>
+              </a:lnSpc>
+              <a:spcBef>
+                <a:spcPts val="0"/>
+              </a:spcBef>
+              <a:spcAft>
+                <a:spcPts val="0"/>
+              </a:spcAft>
+              <a:buClrTx/>
+              <a:buSzTx/>
+              <a:buFontTx/>
+              <a:buNone/>
+              <a:tabLst/>
+              <a:defRPr/>
+            </a:pPr>
+            <a:endParaRPr lang="en-US" dirty="0"/>
           </a:p>
           <a:p>
             <a:pPr marL="0" marR="0" lvl="0" indent="0" algn="l" defTabSz="914400" rtl="0" eaLnBrk="1" fontAlgn="auto" latinLnBrk="0" hangingPunct="1">
@@ -1671,43 +1725,7 @@
           <a:p>
             <a:r>
               <a:rPr lang="en-US" dirty="0"/>
-              <a:t>Here’s a quick review of some of the terminology used in text analysis.</a:t>
-            </a:r>
-          </a:p>
-          <a:p>
-            <a:endParaRPr lang="en-US" dirty="0"/>
-          </a:p>
-          <a:p>
-            <a:r>
-              <a:rPr lang="en-US" dirty="0"/>
-              <a:t>A corpus is a large collection or set of documents.</a:t>
-            </a:r>
-          </a:p>
-          <a:p>
-            <a:endParaRPr lang="en-US" dirty="0"/>
-          </a:p>
-          <a:p>
-            <a:r>
-              <a:rPr lang="en-US" dirty="0"/>
-              <a:t>A document is an individual piece of text data such as a book, an email, a tweet or set of tweets, responses to an open-ended survey question, a course evaluation, etc.</a:t>
-            </a:r>
-          </a:p>
-          <a:p>
-            <a:endParaRPr lang="en-US" dirty="0"/>
-          </a:p>
-          <a:p>
-            <a:r>
-              <a:rPr lang="en-US" dirty="0"/>
-              <a:t>A token is a meaningful unit of text, such as a word. Tokens may also be referred to as terms. </a:t>
-            </a:r>
-          </a:p>
-          <a:p>
-            <a:endParaRPr lang="en-US" dirty="0"/>
-          </a:p>
-          <a:p>
-            <a:r>
-              <a:rPr lang="en-US" dirty="0"/>
-              <a:t>A document is made up of words/terms/tokens. A corpus is made up of documents.</a:t>
+              <a:t>Here’s a reminder of tidy data. Tidy data is a structure of data in which each variable is a column, each observation is a row, and each cell is a single measurement. For text analysis, we can create a tidy text data table or data frame which contains one token per row. The first step in text analysis is called tokenizing, which involves splitting a long text string, such as a tweet, document, or open-ended responses, into individual words or sets of words. </a:t>
             </a:r>
           </a:p>
         </p:txBody>
@@ -1738,7 +1756,7 @@
     </p:spTree>
     <p:extLst>
       <p:ext uri="{BB962C8B-B14F-4D97-AF65-F5344CB8AC3E}">
-        <p14:creationId xmlns:p14="http://schemas.microsoft.com/office/powerpoint/2010/main" val="736614886"/>
+        <p14:creationId xmlns:p14="http://schemas.microsoft.com/office/powerpoint/2010/main" val="4252556132"/>
       </p:ext>
     </p:extLst>
   </p:cSld>
@@ -1792,9 +1810,26 @@
           <a:bodyPr/>
           <a:lstStyle/>
           <a:p>
-            <a:r>
-              <a:rPr lang="en-US" dirty="0"/>
-              <a:t>Here’s a reminder of tidy data. Tidy data is a structure of data in which each variable is a column, each observation is a row, and each cell is a single measurement. For text analysis, we can create a tidy text data table or data frame which contains one token per row. Recall that a token is a meaningful unit of text, such as a word. The first step in text analysis is called tokenizing, which involves splitting a long text string, such as a tweet, document, or open-ended responses, into individual words or sets of words. </a:t>
+            <a:pPr marL="0" marR="0" lvl="0" indent="0" algn="l" defTabSz="914400" rtl="0" eaLnBrk="1" fontAlgn="auto" latinLnBrk="0" hangingPunct="1">
+              <a:lnSpc>
+                <a:spcPct val="100000"/>
+              </a:lnSpc>
+              <a:spcBef>
+                <a:spcPts val="0"/>
+              </a:spcBef>
+              <a:spcAft>
+                <a:spcPts val="0"/>
+              </a:spcAft>
+              <a:buClrTx/>
+              <a:buSzTx/>
+              <a:buFontTx/>
+              <a:buNone/>
+              <a:tabLst/>
+              <a:defRPr/>
+            </a:pPr>
+            <a:r>
+              <a:rPr lang="en-US" dirty="0"/>
+              <a:t>Text and sentiment analysis are useful for analyzing large quantities of text automatically. They can help us find general themes and feelings, and they allow us to quite quickly analyze text data that could take a long time to process by hand. Applications to institutional research include analyzing course evaluations, student, faculty, or staff responses to surveys, and social media content. In the example we used in this webinar, I analyzed tweets that use the University of Arizona hashtag. We found sentiment and word frequencies by day as well as over all the tweets. We could see when the University of Arizona football team was not performing well, and when other topics such as Hispanic Heritage Month or Cancer Awareness were being discussed. </a:t>
             </a:r>
           </a:p>
         </p:txBody>
@@ -1816,7 +1851,7 @@
           <a:p>
             <a:fld id="{3C20A7C7-CA8D-4C49-BCFB-55E6C5267475}" type="slidenum">
               <a:rPr lang="en-US" smtClean="0"/>
-              <a:t>20</a:t>
+              <a:t>21</a:t>
             </a:fld>
             <a:endParaRPr lang="en-US"/>
           </a:p>
@@ -1825,7 +1860,7 @@
     </p:spTree>
     <p:extLst>
       <p:ext uri="{BB962C8B-B14F-4D97-AF65-F5344CB8AC3E}">
-        <p14:creationId xmlns:p14="http://schemas.microsoft.com/office/powerpoint/2010/main" val="4252556132"/>
+        <p14:creationId xmlns:p14="http://schemas.microsoft.com/office/powerpoint/2010/main" val="2920543570"/>
       </p:ext>
     </p:extLst>
   </p:cSld>
@@ -2017,70 +2052,30 @@
           <a:bodyPr/>
           <a:lstStyle/>
           <a:p>
-            <a:pPr marL="0" marR="0" lvl="0" indent="0" algn="l" defTabSz="914400" rtl="0" eaLnBrk="1" fontAlgn="auto" latinLnBrk="0" hangingPunct="1">
-              <a:lnSpc>
-                <a:spcPct val="100000"/>
-              </a:lnSpc>
-              <a:spcBef>
-                <a:spcPts val="0"/>
-              </a:spcBef>
-              <a:spcAft>
-                <a:spcPts val="0"/>
-              </a:spcAft>
-              <a:buClrTx/>
-              <a:buSzTx/>
-              <a:buFontTx/>
-              <a:buNone/>
-              <a:tabLst/>
-              <a:defRPr/>
-            </a:pPr>
-            <a:r>
-              <a:rPr lang="en-US" dirty="0"/>
-              <a:t>Text and sentiment analysis are useful for analyzing large quantities of text automatically. They can help us find general themes and feelings, and they allow us to quite quickly analyze text data that could take a long time to process by hand. Applications to institutional research include analyzing course evaluations, student, faculty, or staff responses to surveys, and social media content. In the example we used in this webinar, I analyzed tweets that use the University of Arizona hashtag.</a:t>
-            </a:r>
-          </a:p>
-          <a:p>
-            <a:pPr marL="0" marR="0" lvl="0" indent="0" algn="l" defTabSz="914400" rtl="0" eaLnBrk="1" fontAlgn="auto" latinLnBrk="0" hangingPunct="1">
-              <a:lnSpc>
-                <a:spcPct val="100000"/>
-              </a:lnSpc>
-              <a:spcBef>
-                <a:spcPts val="0"/>
-              </a:spcBef>
-              <a:spcAft>
-                <a:spcPts val="0"/>
-              </a:spcAft>
-              <a:buClrTx/>
-              <a:buSzTx/>
-              <a:buFontTx/>
-              <a:buNone/>
-              <a:tabLst/>
-              <a:defRPr/>
-            </a:pPr>
+            <a:r>
+              <a:rPr lang="en-US" dirty="0"/>
+              <a:t>I wanted to provide another example of sentiment analysis in higher education. This also involves tweets and was done by a colleague of mine, Brad Weiner, who is currently the interim Chief Data Officer at the University of Colorado Boulder. </a:t>
+            </a:r>
+          </a:p>
+          <a:p>
             <a:endParaRPr lang="en-US" dirty="0"/>
           </a:p>
           <a:p>
-            <a:pPr marL="0" marR="0" lvl="0" indent="0" algn="l" defTabSz="914400" rtl="0" eaLnBrk="1" fontAlgn="auto" latinLnBrk="0" hangingPunct="1">
-              <a:lnSpc>
-                <a:spcPct val="100000"/>
-              </a:lnSpc>
-              <a:spcBef>
-                <a:spcPts val="0"/>
-              </a:spcBef>
-              <a:spcAft>
-                <a:spcPts val="0"/>
-              </a:spcAft>
-              <a:buClrTx/>
-              <a:buSzTx/>
-              <a:buFontTx/>
-              <a:buNone/>
-              <a:tabLst/>
-              <a:defRPr/>
-            </a:pPr>
-            <a:r>
-              <a:rPr lang="en-US" dirty="0"/>
-              <a:t>And we found sentiment and word frequencies by day as well as overall the tweets. We could see when the University of Arizona football team was not performing well, and when other topics such as Hispanic Heritage Month or Cancer Awareness were being discussed. </a:t>
-            </a:r>
+            <a:r>
+              <a:rPr lang="en-US" dirty="0"/>
+              <a:t>In 2019, the National Association for College Admission Counseling’s national conference had an opening keynote by Randi Zuckerberg that did not go over very well. Brad u</a:t>
+            </a:r>
+            <a:r>
+              <a:rPr lang="en-US" b="0" i="0" dirty="0">
+                <a:solidFill>
+                  <a:srgbClr val="1D1C1D"/>
+                </a:solidFill>
+                <a:effectLst/>
+                <a:latin typeface="Slack-Lato"/>
+              </a:rPr>
+              <a:t>sed to do close to real-time analytics on Twitter from the NACAC conference. He shared this example with me from an analysis he did of the sentiments of tweets using the #nacac19. You can see a pretty significant increase in the anger, disgust, fear, and sadness sentiments while there’s a decline in anticipation, joy, and trust around the time of the opening keynote. This is just one extra example of how sentiment analysis can be interesting and useful. </a:t>
+            </a:r>
+            <a:endParaRPr lang="en-US" dirty="0"/>
           </a:p>
         </p:txBody>
       </p:sp>
@@ -2110,7 +2105,7 @@
     </p:spTree>
     <p:extLst>
       <p:ext uri="{BB962C8B-B14F-4D97-AF65-F5344CB8AC3E}">
-        <p14:creationId xmlns:p14="http://schemas.microsoft.com/office/powerpoint/2010/main" val="2920543570"/>
+        <p14:creationId xmlns:p14="http://schemas.microsoft.com/office/powerpoint/2010/main" val="37271565"/>
       </p:ext>
     </p:extLst>
   </p:cSld>
@@ -2166,19 +2161,33 @@
           <a:p>
             <a:r>
               <a:rPr lang="en-US" dirty="0"/>
-              <a:t>In 2019, the National Association for College Admission Counseling’s national conference had an opening keynote by Randi Zuckerberg that was widely criticized. A colleague of mine, Brad Weiner, currently the interim Chief Data Officer at the University of Colorado Boulder u</a:t>
-            </a:r>
-            <a:r>
-              <a:rPr lang="en-US" b="0" i="0" dirty="0">
-                <a:solidFill>
-                  <a:srgbClr val="1D1C1D"/>
-                </a:solidFill>
-                <a:effectLst/>
-                <a:latin typeface="Slack-Lato"/>
-              </a:rPr>
-              <a:t>sed to do fairly real time analytics on Twitter from the NACAC conference. He shared his example with me from an analysis he did of the sentiments of tweets using the #nacac19, you can see a pretty significant increase in the anger, disgust, fear, and sadness sentiments while there’s a decline in anticipation, joy, and trust around the time of the opening keynote. This is just one more example of how sentiment analysis can be interesting and useful. </a:t>
-            </a:r>
+              <a:t>There are many places you could go next. You could use the provided code and switch out the example tweet data for text data of your own to see what insights you can find in your own text analysis.</a:t>
+            </a:r>
+          </a:p>
+          <a:p>
             <a:endParaRPr lang="en-US" dirty="0"/>
+          </a:p>
+          <a:p>
+            <a:r>
+              <a:rPr lang="en-US" dirty="0"/>
+              <a:t>The book </a:t>
+            </a:r>
+            <a:r>
+              <a:rPr lang="en-US" i="1" dirty="0"/>
+              <a:t>Text Mining with R </a:t>
+            </a:r>
+            <a:r>
+              <a:rPr lang="en-US" dirty="0"/>
+              <a:t>by Julia </a:t>
+            </a:r>
+            <a:r>
+              <a:rPr lang="en-US" dirty="0" err="1"/>
+              <a:t>Silge</a:t>
+            </a:r>
+            <a:r>
+              <a:rPr lang="en-US" dirty="0"/>
+              <a:t> and David Robinson is available online at the URL provided above. This is an extensive resource for text analysis in R and contains lots of examples. If you want to go further with the analysis of Twitter data, it includes a whole case study comparing tweets from each of the authors. There is also a chapter on analyzing n-grams, which expands text analysis from 1 word to multiple words. The book also contains information on how to do some modeling with text data. It is a very comprehensive resource if you’d like to learn more about text analysis in R.</a:t>
+            </a:r>
           </a:p>
         </p:txBody>
       </p:sp>
@@ -2208,7 +2217,7 @@
     </p:spTree>
     <p:extLst>
       <p:ext uri="{BB962C8B-B14F-4D97-AF65-F5344CB8AC3E}">
-        <p14:creationId xmlns:p14="http://schemas.microsoft.com/office/powerpoint/2010/main" val="37271565"/>
+        <p14:creationId xmlns:p14="http://schemas.microsoft.com/office/powerpoint/2010/main" val="4098988218"/>
       </p:ext>
     </p:extLst>
   </p:cSld>
@@ -2264,32 +2273,7 @@
           <a:p>
             <a:r>
               <a:rPr lang="en-US" dirty="0"/>
-              <a:t>Using the provided code, switch out the example tweet data for text data of your own. Then try out the code and see what insights you can find in your own text analysis.</a:t>
-            </a:r>
-          </a:p>
-          <a:p>
-            <a:endParaRPr lang="en-US" dirty="0"/>
-          </a:p>
-          <a:p>
-            <a:r>
-              <a:rPr lang="en-US" dirty="0"/>
-              <a:t>The book </a:t>
-            </a:r>
-            <a:r>
-              <a:rPr lang="en-US" i="1" dirty="0"/>
-              <a:t>Text Mining with R </a:t>
-            </a:r>
-            <a:r>
-              <a:rPr lang="en-US" dirty="0"/>
-              <a:t>by Julia </a:t>
-            </a:r>
-            <a:r>
-              <a:rPr lang="en-US" dirty="0" err="1"/>
-              <a:t>Silge</a:t>
-            </a:r>
-            <a:r>
-              <a:rPr lang="en-US" dirty="0"/>
-              <a:t> and David Robinson is available online at the URL provided above. This is an extensive resource for text analysis in R and contains lots of examples. If you want to go further with the analysis of Twitter data, it includes a whole case study comparing tweets from each of the authors. There is also a chapter on analyzing n-grams, which expands text analysis from 1 word to multiple words. The book also contains information on how to do some modeling with text data. It is a very comprehensive resource if you’d like to learn more about text analysis in R.</a:t>
+              <a:t>After recapping the previous session, we dove into a complete sentiment analysis and visualized the findings. We also discussed how to move beyond individual words in a text analysis and went through a short example of two-word phrases. Finally, we reviewed the insights that can be gained from text and sentiment analysis and discussed how to go further. </a:t>
             </a:r>
           </a:p>
         </p:txBody>
@@ -2320,7 +2304,7 @@
     </p:spTree>
     <p:extLst>
       <p:ext uri="{BB962C8B-B14F-4D97-AF65-F5344CB8AC3E}">
-        <p14:creationId xmlns:p14="http://schemas.microsoft.com/office/powerpoint/2010/main" val="4098988218"/>
+        <p14:creationId xmlns:p14="http://schemas.microsoft.com/office/powerpoint/2010/main" val="838260591"/>
       </p:ext>
     </p:extLst>
   </p:cSld>
@@ -2376,7 +2360,7 @@
           <a:p>
             <a:r>
               <a:rPr lang="en-US" dirty="0"/>
-              <a:t>After recapping the previous session, we dove into a complete sentiment analysis and visualized the findings. We also discussed how to move beyond individual words in a text analysis and went through a short example of two-word phrases. Finally, we reviewed the insights that can be gained from text and sentiment analysis and discussed how to go further. </a:t>
+              <a:t>Thank you so much for being here today! Thank you to AIR and Emily and Elaine for their support and for having me. </a:t>
             </a:r>
           </a:p>
         </p:txBody>
@@ -2407,7 +2391,7 @@
     </p:spTree>
     <p:extLst>
       <p:ext uri="{BB962C8B-B14F-4D97-AF65-F5344CB8AC3E}">
-        <p14:creationId xmlns:p14="http://schemas.microsoft.com/office/powerpoint/2010/main" val="838260591"/>
+        <p14:creationId xmlns:p14="http://schemas.microsoft.com/office/powerpoint/2010/main" val="872062292"/>
       </p:ext>
     </p:extLst>
   </p:cSld>
@@ -2463,13 +2447,8 @@
           <a:p>
             <a:r>
               <a:rPr lang="en-US" dirty="0"/>
-              <a:t>Thank you so much for being here today! I look forward to seeing you in Part 2. Thank you to AIR and Emily and Elaine for their support and </a:t>
-            </a:r>
-            <a:r>
-              <a:rPr lang="en-US"/>
-              <a:t>for having me. </a:t>
-            </a:r>
-            <a:endParaRPr lang="en-US" dirty="0"/>
+              <a:t>Thank you again for joining this webinar. I hope you found it beneficial and helpful. I am so glad I got to spend a couple of hours with you this week.</a:t>
+            </a:r>
           </a:p>
         </p:txBody>
       </p:sp>
@@ -2491,93 +2470,6 @@
             <a:fld id="{3C20A7C7-CA8D-4C49-BCFB-55E6C5267475}" type="slidenum">
               <a:rPr lang="en-US" smtClean="0"/>
               <a:t>26</a:t>
-            </a:fld>
-            <a:endParaRPr lang="en-US"/>
-          </a:p>
-        </p:txBody>
-      </p:sp>
-    </p:spTree>
-    <p:extLst>
-      <p:ext uri="{BB962C8B-B14F-4D97-AF65-F5344CB8AC3E}">
-        <p14:creationId xmlns:p14="http://schemas.microsoft.com/office/powerpoint/2010/main" val="872062292"/>
-      </p:ext>
-    </p:extLst>
-  </p:cSld>
-  <p:clrMapOvr>
-    <a:masterClrMapping/>
-  </p:clrMapOvr>
-</p:notes>
-</file>
-
-<file path=ppt/notesSlides/notesSlide25.xml><?xml version="1.0" encoding="utf-8"?>
-<p:notes xmlns:a="http://schemas.openxmlformats.org/drawingml/2006/main" xmlns:r="http://schemas.openxmlformats.org/officeDocument/2006/relationships" xmlns:p="http://schemas.openxmlformats.org/presentationml/2006/main">
-  <p:cSld>
-    <p:spTree>
-      <p:nvGrpSpPr>
-        <p:cNvPr id="1" name=""/>
-        <p:cNvGrpSpPr/>
-        <p:nvPr/>
-      </p:nvGrpSpPr>
-      <p:grpSpPr>
-        <a:xfrm>
-          <a:off x="0" y="0"/>
-          <a:ext cx="0" cy="0"/>
-          <a:chOff x="0" y="0"/>
-          <a:chExt cx="0" cy="0"/>
-        </a:xfrm>
-      </p:grpSpPr>
-      <p:sp>
-        <p:nvSpPr>
-          <p:cNvPr id="2" name="Slide Image Placeholder 1"/>
-          <p:cNvSpPr>
-            <a:spLocks noGrp="1" noRot="1" noChangeAspect="1"/>
-          </p:cNvSpPr>
-          <p:nvPr>
-            <p:ph type="sldImg"/>
-          </p:nvPr>
-        </p:nvSpPr>
-        <p:spPr/>
-      </p:sp>
-      <p:sp>
-        <p:nvSpPr>
-          <p:cNvPr id="3" name="Notes Placeholder 2"/>
-          <p:cNvSpPr>
-            <a:spLocks noGrp="1"/>
-          </p:cNvSpPr>
-          <p:nvPr>
-            <p:ph type="body" idx="1"/>
-          </p:nvPr>
-        </p:nvSpPr>
-        <p:spPr/>
-        <p:txBody>
-          <a:bodyPr/>
-          <a:lstStyle/>
-          <a:p>
-            <a:r>
-              <a:rPr lang="en-US" dirty="0"/>
-              <a:t>Thank you again for joining this webinar. I hope you found it beneficial and helpful. I am so glad I got to spend a couple of hours with you this week.</a:t>
-            </a:r>
-          </a:p>
-        </p:txBody>
-      </p:sp>
-      <p:sp>
-        <p:nvSpPr>
-          <p:cNvPr id="4" name="Slide Number Placeholder 3"/>
-          <p:cNvSpPr>
-            <a:spLocks noGrp="1"/>
-          </p:cNvSpPr>
-          <p:nvPr>
-            <p:ph type="sldNum" sz="quarter" idx="5"/>
-          </p:nvPr>
-        </p:nvSpPr>
-        <p:spPr/>
-        <p:txBody>
-          <a:bodyPr/>
-          <a:lstStyle/>
-          <a:p>
-            <a:fld id="{3C20A7C7-CA8D-4C49-BCFB-55E6C5267475}" type="slidenum">
-              <a:rPr lang="en-US" smtClean="0"/>
-              <a:t>27</a:t>
             </a:fld>
             <a:endParaRPr lang="en-US"/>
           </a:p>
@@ -5256,7 +5148,7 @@
           <a:p>
             <a:fld id="{C9727A96-7105-44AE-B9F0-3BA74D06A54C}" type="datetimeFigureOut">
               <a:rPr lang="en-US" smtClean="0"/>
-              <a:t>10/20/2021</a:t>
+              <a:t>10/22/2021</a:t>
             </a:fld>
             <a:endParaRPr lang="en-US"/>
           </a:p>
@@ -5454,7 +5346,7 @@
           <a:p>
             <a:fld id="{C9727A96-7105-44AE-B9F0-3BA74D06A54C}" type="datetimeFigureOut">
               <a:rPr lang="en-US" smtClean="0"/>
-              <a:t>10/20/2021</a:t>
+              <a:t>10/22/2021</a:t>
             </a:fld>
             <a:endParaRPr lang="en-US"/>
           </a:p>
@@ -5690,7 +5582,7 @@
           <a:p>
             <a:fld id="{C9727A96-7105-44AE-B9F0-3BA74D06A54C}" type="datetimeFigureOut">
               <a:rPr lang="en-US" smtClean="0"/>
-              <a:t>10/20/2021</a:t>
+              <a:t>10/22/2021</a:t>
             </a:fld>
             <a:endParaRPr lang="en-US"/>
           </a:p>
@@ -6026,7 +5918,7 @@
           <a:p>
             <a:fld id="{986F8839-423C-1541-BA9A-A38B5B6A10D1}" type="datetimeFigureOut">
               <a:rPr lang="en-US" smtClean="0"/>
-              <a:t>10/20/2021</a:t>
+              <a:t>10/22/2021</a:t>
             </a:fld>
             <a:endParaRPr lang="en-US"/>
           </a:p>
@@ -7497,7 +7389,7 @@
           <a:p>
             <a:r>
               <a:rPr lang="en-US" sz="3600" dirty="0"/>
-              <a:t>Day 2 Agenda</a:t>
+              <a:t>Part 2 Agenda</a:t>
             </a:r>
           </a:p>
         </p:txBody>
@@ -7718,70 +7610,137 @@
           <a:chExt cx="0" cy="0"/>
         </a:xfrm>
       </p:grpSpPr>
-      <p:sp>
-        <p:nvSpPr>
-          <p:cNvPr id="4" name="Title 3">
-            <a:extLst>
-              <a:ext uri="{FF2B5EF4-FFF2-40B4-BE49-F238E27FC236}">
-                <a16:creationId xmlns:a16="http://schemas.microsoft.com/office/drawing/2014/main" id="{8CC03BEF-DFEA-411F-BBA1-F2A77CE386A1}"/>
-              </a:ext>
-            </a:extLst>
-          </p:cNvPr>
-          <p:cNvSpPr>
-            <a:spLocks noGrp="1"/>
-          </p:cNvSpPr>
-          <p:nvPr>
-            <p:ph type="title"/>
-          </p:nvPr>
-        </p:nvSpPr>
-        <p:spPr/>
-        <p:txBody>
-          <a:bodyPr/>
-          <a:lstStyle/>
-          <a:p>
-            <a:r>
-              <a:rPr lang="en-US" dirty="0"/>
-              <a:t>Terminology</a:t>
-            </a:r>
-          </a:p>
-        </p:txBody>
-      </p:sp>
-      <p:sp>
-        <p:nvSpPr>
-          <p:cNvPr id="5" name="Content Placeholder 4">
-            <a:extLst>
-              <a:ext uri="{FF2B5EF4-FFF2-40B4-BE49-F238E27FC236}">
-                <a16:creationId xmlns:a16="http://schemas.microsoft.com/office/drawing/2014/main" id="{42B101CC-F4FD-4C5E-B209-79763C8B004C}"/>
-              </a:ext>
-            </a:extLst>
-          </p:cNvPr>
-          <p:cNvSpPr>
-            <a:spLocks noGrp="1"/>
-          </p:cNvSpPr>
+      <p:pic>
+        <p:nvPicPr>
+          <p:cNvPr id="7170" name="Picture 2">
+            <a:extLst>
+              <a:ext uri="{FF2B5EF4-FFF2-40B4-BE49-F238E27FC236}">
+                <a16:creationId xmlns:a16="http://schemas.microsoft.com/office/drawing/2014/main" id="{C186A01D-08FB-4F8C-AF97-9DD16D3655A7}"/>
+              </a:ext>
+            </a:extLst>
+          </p:cNvPr>
+          <p:cNvPicPr>
+            <a:picLocks noGrp="1" noChangeAspect="1" noChangeArrowheads="1"/>
+          </p:cNvPicPr>
           <p:nvPr>
             <p:ph idx="1"/>
           </p:nvPr>
-        </p:nvSpPr>
-        <p:spPr/>
-        <p:txBody>
-          <a:bodyPr/>
-          <a:lstStyle/>
-          <a:p>
-            <a:r>
-              <a:rPr lang="en-US" dirty="0"/>
-              <a:t>Corpus</a:t>
-            </a:r>
-          </a:p>
-          <a:p>
-            <a:r>
-              <a:rPr lang="en-US" dirty="0"/>
-              <a:t>Document</a:t>
-            </a:r>
-          </a:p>
-          <a:p>
-            <a:r>
-              <a:rPr lang="en-US" dirty="0"/>
-              <a:t>Token / Term / Word</a:t>
+        </p:nvPicPr>
+        <p:blipFill>
+          <a:blip r:embed="rId3">
+            <a:extLst>
+              <a:ext uri="{28A0092B-C50C-407E-A947-70E740481C1C}">
+                <a14:useLocalDpi xmlns:a14="http://schemas.microsoft.com/office/drawing/2010/main" val="0"/>
+              </a:ext>
+            </a:extLst>
+          </a:blip>
+          <a:stretch>
+            <a:fillRect/>
+          </a:stretch>
+        </p:blipFill>
+        <p:spPr bwMode="auto">
+          <a:xfrm>
+            <a:off x="1143942" y="460586"/>
+            <a:ext cx="9904115" cy="5571065"/>
+          </a:xfrm>
+          <a:prstGeom prst="rect">
+            <a:avLst/>
+          </a:prstGeom>
+          <a:noFill/>
+          <a:ln>
+            <a:noFill/>
+          </a:ln>
+          <a:extLst>
+            <a:ext uri="{909E8E84-426E-40DD-AFC4-6F175D3DCCD1}">
+              <a14:hiddenFill xmlns:a14="http://schemas.microsoft.com/office/drawing/2010/main">
+                <a:solidFill>
+                  <a:srgbClr val="FFFFFF"/>
+                </a:solidFill>
+              </a14:hiddenFill>
+            </a:ext>
+          </a:extLst>
+        </p:spPr>
+      </p:pic>
+      <p:sp>
+        <p:nvSpPr>
+          <p:cNvPr id="17" name="Rectangle 16">
+            <a:extLst>
+              <a:ext uri="{FF2B5EF4-FFF2-40B4-BE49-F238E27FC236}">
+                <a16:creationId xmlns:a16="http://schemas.microsoft.com/office/drawing/2014/main" id="{C4A50008-FECC-4FDA-94B7-D1B3FA56D450}"/>
+              </a:ext>
+            </a:extLst>
+          </p:cNvPr>
+          <p:cNvSpPr/>
+          <p:nvPr/>
+        </p:nvSpPr>
+        <p:spPr>
+          <a:xfrm>
+            <a:off x="0" y="6610231"/>
+            <a:ext cx="8322802" cy="261610"/>
+          </a:xfrm>
+          <a:prstGeom prst="rect">
+            <a:avLst/>
+          </a:prstGeom>
+        </p:spPr>
+        <p:txBody>
+          <a:bodyPr wrap="square">
+            <a:spAutoFit/>
+          </a:bodyPr>
+          <a:lstStyle/>
+          <a:p>
+            <a:r>
+              <a:rPr lang="en-US" sz="1100" dirty="0">
+                <a:solidFill>
+                  <a:srgbClr val="8B8B8B"/>
+                </a:solidFill>
+              </a:rPr>
+              <a:t>Illustrations from the </a:t>
+            </a:r>
+            <a:r>
+              <a:rPr lang="en-US" sz="1100" dirty="0" err="1">
+                <a:solidFill>
+                  <a:srgbClr val="8B8B8B"/>
+                </a:solidFill>
+                <a:hlinkClick r:id="rId4">
+                  <a:extLst>
+                    <a:ext uri="{A12FA001-AC4F-418D-AE19-62706E023703}">
+                      <ahyp:hlinkClr xmlns:ahyp="http://schemas.microsoft.com/office/drawing/2018/hyperlinkcolor" val="tx"/>
+                    </a:ext>
+                  </a:extLst>
+                </a:hlinkClick>
+              </a:rPr>
+              <a:t>Openscapes</a:t>
+            </a:r>
+            <a:r>
+              <a:rPr lang="en-US" sz="1100" dirty="0">
+                <a:solidFill>
+                  <a:srgbClr val="8B8B8B"/>
+                </a:solidFill>
+              </a:rPr>
+              <a:t> blog </a:t>
+            </a:r>
+            <a:r>
+              <a:rPr lang="en-US" sz="1100" i="1" dirty="0">
+                <a:solidFill>
+                  <a:srgbClr val="8B8B8B"/>
+                </a:solidFill>
+                <a:hlinkClick r:id="rId5">
+                  <a:extLst>
+                    <a:ext uri="{A12FA001-AC4F-418D-AE19-62706E023703}">
+                      <ahyp:hlinkClr xmlns:ahyp="http://schemas.microsoft.com/office/drawing/2018/hyperlinkcolor" val="tx"/>
+                    </a:ext>
+                  </a:extLst>
+                </a:hlinkClick>
+              </a:rPr>
+              <a:t>Tidy Data for reproducibility, efficiency, and collaboration</a:t>
+            </a:r>
+            <a:r>
+              <a:rPr lang="en-US" sz="1100" dirty="0">
+                <a:solidFill>
+                  <a:srgbClr val="8B8B8B"/>
+                </a:solidFill>
+              </a:rPr>
+              <a:t> by Julia Lowndes and Allison Horst</a:t>
             </a:r>
           </a:p>
         </p:txBody>
@@ -7789,7 +7748,7 @@
     </p:spTree>
     <p:extLst>
       <p:ext uri="{BB962C8B-B14F-4D97-AF65-F5344CB8AC3E}">
-        <p14:creationId xmlns:p14="http://schemas.microsoft.com/office/powerpoint/2010/main" val="207804042"/>
+        <p14:creationId xmlns:p14="http://schemas.microsoft.com/office/powerpoint/2010/main" val="2424924840"/>
       </p:ext>
     </p:extLst>
   </p:cSld>
@@ -8021,145 +7980,63 @@
           <a:chExt cx="0" cy="0"/>
         </a:xfrm>
       </p:grpSpPr>
-      <p:pic>
-        <p:nvPicPr>
-          <p:cNvPr id="7170" name="Picture 2">
-            <a:extLst>
-              <a:ext uri="{FF2B5EF4-FFF2-40B4-BE49-F238E27FC236}">
-                <a16:creationId xmlns:a16="http://schemas.microsoft.com/office/drawing/2014/main" id="{C186A01D-08FB-4F8C-AF97-9DD16D3655A7}"/>
-              </a:ext>
-            </a:extLst>
-          </p:cNvPr>
-          <p:cNvPicPr>
-            <a:picLocks noGrp="1" noChangeAspect="1" noChangeArrowheads="1"/>
-          </p:cNvPicPr>
-          <p:nvPr>
-            <p:ph idx="1"/>
-          </p:nvPr>
-        </p:nvPicPr>
-        <p:blipFill>
-          <a:blip r:embed="rId3">
-            <a:extLst>
-              <a:ext uri="{28A0092B-C50C-407E-A947-70E740481C1C}">
-                <a14:useLocalDpi xmlns:a14="http://schemas.microsoft.com/office/drawing/2010/main" val="0"/>
-              </a:ext>
-            </a:extLst>
-          </a:blip>
-          <a:stretch>
-            <a:fillRect/>
-          </a:stretch>
-        </p:blipFill>
-        <p:spPr bwMode="auto">
-          <a:xfrm>
-            <a:off x="1143942" y="460586"/>
-            <a:ext cx="9904115" cy="5571065"/>
-          </a:xfrm>
-          <a:prstGeom prst="rect">
-            <a:avLst/>
-          </a:prstGeom>
-          <a:noFill/>
-          <a:ln>
-            <a:noFill/>
-          </a:ln>
-          <a:extLst>
-            <a:ext uri="{909E8E84-426E-40DD-AFC4-6F175D3DCCD1}">
-              <a14:hiddenFill xmlns:a14="http://schemas.microsoft.com/office/drawing/2010/main">
-                <a:solidFill>
-                  <a:srgbClr val="FFFFFF"/>
-                </a:solidFill>
-              </a14:hiddenFill>
-            </a:ext>
-          </a:extLst>
-        </p:spPr>
-      </p:pic>
-      <p:sp>
-        <p:nvSpPr>
-          <p:cNvPr id="17" name="Rectangle 16">
-            <a:extLst>
-              <a:ext uri="{FF2B5EF4-FFF2-40B4-BE49-F238E27FC236}">
-                <a16:creationId xmlns:a16="http://schemas.microsoft.com/office/drawing/2014/main" id="{C4A50008-FECC-4FDA-94B7-D1B3FA56D450}"/>
-              </a:ext>
-            </a:extLst>
-          </p:cNvPr>
-          <p:cNvSpPr/>
-          <p:nvPr/>
-        </p:nvSpPr>
-        <p:spPr>
-          <a:xfrm>
-            <a:off x="0" y="6610231"/>
-            <a:ext cx="8322802" cy="261610"/>
-          </a:xfrm>
-          <a:prstGeom prst="rect">
-            <a:avLst/>
-          </a:prstGeom>
-        </p:spPr>
-        <p:txBody>
-          <a:bodyPr wrap="square">
-            <a:spAutoFit/>
-          </a:bodyPr>
-          <a:lstStyle/>
-          <a:p>
-            <a:r>
-              <a:rPr lang="en-US" sz="1100" dirty="0">
-                <a:solidFill>
-                  <a:srgbClr val="8B8B8B"/>
-                </a:solidFill>
-              </a:rPr>
-              <a:t>Illustrations from the </a:t>
-            </a:r>
-            <a:r>
-              <a:rPr lang="en-US" sz="1100" dirty="0" err="1">
-                <a:solidFill>
-                  <a:srgbClr val="8B8B8B"/>
-                </a:solidFill>
-                <a:hlinkClick r:id="rId4">
-                  <a:extLst>
-                    <a:ext uri="{A12FA001-AC4F-418D-AE19-62706E023703}">
-                      <ahyp:hlinkClr xmlns:ahyp="http://schemas.microsoft.com/office/drawing/2018/hyperlinkcolor" val="tx"/>
-                    </a:ext>
-                  </a:extLst>
-                </a:hlinkClick>
-              </a:rPr>
-              <a:t>Openscapes</a:t>
-            </a:r>
-            <a:r>
-              <a:rPr lang="en-US" sz="1100" dirty="0">
-                <a:solidFill>
-                  <a:srgbClr val="8B8B8B"/>
-                </a:solidFill>
-              </a:rPr>
-              <a:t> blog </a:t>
-            </a:r>
-            <a:r>
-              <a:rPr lang="en-US" sz="1100" i="1" dirty="0">
-                <a:solidFill>
-                  <a:srgbClr val="8B8B8B"/>
-                </a:solidFill>
-                <a:hlinkClick r:id="rId5">
-                  <a:extLst>
-                    <a:ext uri="{A12FA001-AC4F-418D-AE19-62706E023703}">
-                      <ahyp:hlinkClr xmlns:ahyp="http://schemas.microsoft.com/office/drawing/2018/hyperlinkcolor" val="tx"/>
-                    </a:ext>
-                  </a:extLst>
-                </a:hlinkClick>
-              </a:rPr>
-              <a:t>Tidy Data for reproducibility, efficiency, and collaboration</a:t>
-            </a:r>
-            <a:r>
-              <a:rPr lang="en-US" sz="1100" dirty="0">
-                <a:solidFill>
-                  <a:srgbClr val="8B8B8B"/>
-                </a:solidFill>
-              </a:rPr>
-              <a:t> by Julia Lowndes and Allison Horst</a:t>
-            </a:r>
+      <p:sp>
+        <p:nvSpPr>
+          <p:cNvPr id="4" name="Title 3">
+            <a:extLst>
+              <a:ext uri="{FF2B5EF4-FFF2-40B4-BE49-F238E27FC236}">
+                <a16:creationId xmlns:a16="http://schemas.microsoft.com/office/drawing/2014/main" id="{905D5C2E-C162-4046-888B-BA20EE8A4573}"/>
+              </a:ext>
+            </a:extLst>
+          </p:cNvPr>
+          <p:cNvSpPr>
+            <a:spLocks noGrp="1"/>
+          </p:cNvSpPr>
+          <p:nvPr>
+            <p:ph type="ctrTitle"/>
+          </p:nvPr>
+        </p:nvSpPr>
+        <p:spPr/>
+        <p:txBody>
+          <a:bodyPr/>
+          <a:lstStyle/>
+          <a:p>
+            <a:r>
+              <a:rPr lang="en-US" dirty="0"/>
+              <a:t>R</a:t>
+            </a:r>
+          </a:p>
+        </p:txBody>
+      </p:sp>
+      <p:sp>
+        <p:nvSpPr>
+          <p:cNvPr id="5" name="Subtitle 4">
+            <a:extLst>
+              <a:ext uri="{FF2B5EF4-FFF2-40B4-BE49-F238E27FC236}">
+                <a16:creationId xmlns:a16="http://schemas.microsoft.com/office/drawing/2014/main" id="{914AFCD0-D048-4149-8426-E2892F0A24EC}"/>
+              </a:ext>
+            </a:extLst>
+          </p:cNvPr>
+          <p:cNvSpPr>
+            <a:spLocks noGrp="1"/>
+          </p:cNvSpPr>
+          <p:nvPr>
+            <p:ph type="subTitle" idx="1"/>
+          </p:nvPr>
+        </p:nvSpPr>
+        <p:spPr/>
+        <p:txBody>
+          <a:bodyPr/>
+          <a:lstStyle/>
+          <a:p>
+            <a:endParaRPr lang="en-US"/>
           </a:p>
         </p:txBody>
       </p:sp>
     </p:spTree>
     <p:extLst>
       <p:ext uri="{BB962C8B-B14F-4D97-AF65-F5344CB8AC3E}">
-        <p14:creationId xmlns:p14="http://schemas.microsoft.com/office/powerpoint/2010/main" val="2424924840"/>
+        <p14:creationId xmlns:p14="http://schemas.microsoft.com/office/powerpoint/2010/main" val="163456702"/>
       </p:ext>
     </p:extLst>
   </p:cSld>
@@ -8188,89 +8065,6 @@
       </p:grpSpPr>
       <p:sp>
         <p:nvSpPr>
-          <p:cNvPr id="4" name="Title 3">
-            <a:extLst>
-              <a:ext uri="{FF2B5EF4-FFF2-40B4-BE49-F238E27FC236}">
-                <a16:creationId xmlns:a16="http://schemas.microsoft.com/office/drawing/2014/main" id="{905D5C2E-C162-4046-888B-BA20EE8A4573}"/>
-              </a:ext>
-            </a:extLst>
-          </p:cNvPr>
-          <p:cNvSpPr>
-            <a:spLocks noGrp="1"/>
-          </p:cNvSpPr>
-          <p:nvPr>
-            <p:ph type="ctrTitle"/>
-          </p:nvPr>
-        </p:nvSpPr>
-        <p:spPr/>
-        <p:txBody>
-          <a:bodyPr/>
-          <a:lstStyle/>
-          <a:p>
-            <a:r>
-              <a:rPr lang="en-US" dirty="0"/>
-              <a:t>R</a:t>
-            </a:r>
-          </a:p>
-        </p:txBody>
-      </p:sp>
-      <p:sp>
-        <p:nvSpPr>
-          <p:cNvPr id="5" name="Subtitle 4">
-            <a:extLst>
-              <a:ext uri="{FF2B5EF4-FFF2-40B4-BE49-F238E27FC236}">
-                <a16:creationId xmlns:a16="http://schemas.microsoft.com/office/drawing/2014/main" id="{914AFCD0-D048-4149-8426-E2892F0A24EC}"/>
-              </a:ext>
-            </a:extLst>
-          </p:cNvPr>
-          <p:cNvSpPr>
-            <a:spLocks noGrp="1"/>
-          </p:cNvSpPr>
-          <p:nvPr>
-            <p:ph type="subTitle" idx="1"/>
-          </p:nvPr>
-        </p:nvSpPr>
-        <p:spPr/>
-        <p:txBody>
-          <a:bodyPr/>
-          <a:lstStyle/>
-          <a:p>
-            <a:endParaRPr lang="en-US"/>
-          </a:p>
-        </p:txBody>
-      </p:sp>
-    </p:spTree>
-    <p:extLst>
-      <p:ext uri="{BB962C8B-B14F-4D97-AF65-F5344CB8AC3E}">
-        <p14:creationId xmlns:p14="http://schemas.microsoft.com/office/powerpoint/2010/main" val="163456702"/>
-      </p:ext>
-    </p:extLst>
-  </p:cSld>
-  <p:clrMapOvr>
-    <a:masterClrMapping/>
-  </p:clrMapOvr>
-</p:sld>
-</file>
-
-<file path=ppt/slides/slide22.xml><?xml version="1.0" encoding="utf-8"?>
-<p:sld xmlns:a="http://schemas.openxmlformats.org/drawingml/2006/main" xmlns:r="http://schemas.openxmlformats.org/officeDocument/2006/relationships" xmlns:p="http://schemas.openxmlformats.org/presentationml/2006/main">
-  <p:cSld>
-    <p:spTree>
-      <p:nvGrpSpPr>
-        <p:cNvPr id="1" name=""/>
-        <p:cNvGrpSpPr/>
-        <p:nvPr/>
-      </p:nvGrpSpPr>
-      <p:grpSpPr>
-        <a:xfrm>
-          <a:off x="0" y="0"/>
-          <a:ext cx="0" cy="0"/>
-          <a:chOff x="0" y="0"/>
-          <a:chExt cx="0" cy="0"/>
-        </a:xfrm>
-      </p:grpSpPr>
-      <p:sp>
-        <p:nvSpPr>
           <p:cNvPr id="2" name="Title 1">
             <a:extLst>
               <a:ext uri="{FF2B5EF4-FFF2-40B4-BE49-F238E27FC236}">
@@ -8337,7 +8131,7 @@
 </p:sld>
 </file>
 
-<file path=ppt/slides/slide23.xml><?xml version="1.0" encoding="utf-8"?>
+<file path=ppt/slides/slide22.xml><?xml version="1.0" encoding="utf-8"?>
 <p:sld xmlns:a="http://schemas.openxmlformats.org/drawingml/2006/main" xmlns:r="http://schemas.openxmlformats.org/officeDocument/2006/relationships" xmlns:p="http://schemas.openxmlformats.org/presentationml/2006/main">
   <p:cSld>
     <p:spTree>
@@ -8455,6 +8249,142 @@
 </p:sld>
 </file>
 
+<file path=ppt/slides/slide23.xml><?xml version="1.0" encoding="utf-8"?>
+<p:sld xmlns:a="http://schemas.openxmlformats.org/drawingml/2006/main" xmlns:r="http://schemas.openxmlformats.org/officeDocument/2006/relationships" xmlns:p="http://schemas.openxmlformats.org/presentationml/2006/main">
+  <p:cSld>
+    <p:bg>
+      <p:bgPr>
+        <a:solidFill>
+          <a:schemeClr val="bg1"/>
+        </a:solidFill>
+        <a:effectLst/>
+      </p:bgPr>
+    </p:bg>
+    <p:spTree>
+      <p:nvGrpSpPr>
+        <p:cNvPr id="1" name=""/>
+        <p:cNvGrpSpPr/>
+        <p:nvPr/>
+      </p:nvGrpSpPr>
+      <p:grpSpPr>
+        <a:xfrm>
+          <a:off x="0" y="0"/>
+          <a:ext cx="0" cy="0"/>
+          <a:chOff x="0" y="0"/>
+          <a:chExt cx="0" cy="0"/>
+        </a:xfrm>
+      </p:grpSpPr>
+      <p:sp>
+        <p:nvSpPr>
+          <p:cNvPr id="2" name="Title 1">
+            <a:extLst>
+              <a:ext uri="{FF2B5EF4-FFF2-40B4-BE49-F238E27FC236}">
+                <a16:creationId xmlns:a16="http://schemas.microsoft.com/office/drawing/2014/main" id="{68E7F413-5848-4FF9-90FF-F4D1B37E4837}"/>
+              </a:ext>
+            </a:extLst>
+          </p:cNvPr>
+          <p:cNvSpPr>
+            <a:spLocks noGrp="1"/>
+          </p:cNvSpPr>
+          <p:nvPr>
+            <p:ph type="title"/>
+          </p:nvPr>
+        </p:nvSpPr>
+        <p:spPr/>
+        <p:txBody>
+          <a:bodyPr>
+            <a:normAutofit/>
+          </a:bodyPr>
+          <a:lstStyle/>
+          <a:p>
+            <a:r>
+              <a:rPr lang="en-US" sz="3600" dirty="0"/>
+              <a:t>Where to go next</a:t>
+            </a:r>
+          </a:p>
+        </p:txBody>
+      </p:sp>
+      <p:sp>
+        <p:nvSpPr>
+          <p:cNvPr id="3" name="Content Placeholder 2">
+            <a:extLst>
+              <a:ext uri="{FF2B5EF4-FFF2-40B4-BE49-F238E27FC236}">
+                <a16:creationId xmlns:a16="http://schemas.microsoft.com/office/drawing/2014/main" id="{A366A98A-E3CA-4E30-9B3F-09E95FB08DB4}"/>
+              </a:ext>
+            </a:extLst>
+          </p:cNvPr>
+          <p:cNvSpPr>
+            <a:spLocks noGrp="1"/>
+          </p:cNvSpPr>
+          <p:nvPr>
+            <p:ph idx="1"/>
+          </p:nvPr>
+        </p:nvSpPr>
+        <p:spPr/>
+        <p:txBody>
+          <a:bodyPr>
+            <a:normAutofit/>
+          </a:bodyPr>
+          <a:lstStyle/>
+          <a:p>
+            <a:r>
+              <a:rPr lang="en-US" dirty="0"/>
+              <a:t>Try out a text analysis of your own. </a:t>
+            </a:r>
+          </a:p>
+          <a:p>
+            <a:r>
+              <a:rPr lang="en-US" dirty="0"/>
+              <a:t>Review </a:t>
+            </a:r>
+            <a:r>
+              <a:rPr lang="en-US" i="1" dirty="0"/>
+              <a:t>Text Mining with R </a:t>
+            </a:r>
+            <a:r>
+              <a:rPr lang="en-US" dirty="0"/>
+              <a:t>by Julia </a:t>
+            </a:r>
+            <a:r>
+              <a:rPr lang="en-US" dirty="0" err="1"/>
+              <a:t>Silge</a:t>
+            </a:r>
+            <a:r>
+              <a:rPr lang="en-US" dirty="0"/>
+              <a:t> and David Robinson</a:t>
+            </a:r>
+          </a:p>
+          <a:p>
+            <a:pPr lvl="1"/>
+            <a:r>
+              <a:rPr lang="en-US" dirty="0">
+                <a:hlinkClick r:id="rId3"/>
+              </a:rPr>
+              <a:t>https://www.tidytextmining.com/index.html</a:t>
+            </a:r>
+            <a:r>
+              <a:rPr lang="en-US" dirty="0"/>
+              <a:t> </a:t>
+            </a:r>
+          </a:p>
+          <a:p>
+            <a:endParaRPr lang="en-US" dirty="0"/>
+          </a:p>
+        </p:txBody>
+      </p:sp>
+    </p:spTree>
+    <p:extLst>
+      <p:ext uri="{BB962C8B-B14F-4D97-AF65-F5344CB8AC3E}">
+        <p14:creationId xmlns:p14="http://schemas.microsoft.com/office/powerpoint/2010/main" val="254307914"/>
+      </p:ext>
+    </p:extLst>
+  </p:cSld>
+  <p:clrMapOvr>
+    <a:masterClrMapping/>
+  </p:clrMapOvr>
+</p:sld>
+</file>
+
 <file path=ppt/slides/slide24.xml><?xml version="1.0" encoding="utf-8"?>
 <p:sld xmlns:a="http://schemas.openxmlformats.org/drawingml/2006/main" xmlns:r="http://schemas.openxmlformats.org/officeDocument/2006/relationships" xmlns:p="http://schemas.openxmlformats.org/presentationml/2006/main">
   <p:cSld>
@@ -8485,7 +8415,7 @@
           <p:cNvPr id="2" name="Title 1">
             <a:extLst>
               <a:ext uri="{FF2B5EF4-FFF2-40B4-BE49-F238E27FC236}">
-                <a16:creationId xmlns:a16="http://schemas.microsoft.com/office/drawing/2014/main" id="{68E7F413-5848-4FF9-90FF-F4D1B37E4837}"/>
+                <a16:creationId xmlns:a16="http://schemas.microsoft.com/office/drawing/2014/main" id="{BDA1388A-4824-4A29-ADD9-8CFCC321EE86}"/>
               </a:ext>
             </a:extLst>
           </p:cNvPr>
@@ -8505,17 +8435,17 @@
           <a:p>
             <a:r>
               <a:rPr lang="en-US" sz="3600" dirty="0"/>
-              <a:t>Where to go next</a:t>
-            </a:r>
-          </a:p>
-        </p:txBody>
-      </p:sp>
-      <p:sp>
-        <p:nvSpPr>
-          <p:cNvPr id="3" name="Content Placeholder 2">
-            <a:extLst>
-              <a:ext uri="{FF2B5EF4-FFF2-40B4-BE49-F238E27FC236}">
-                <a16:creationId xmlns:a16="http://schemas.microsoft.com/office/drawing/2014/main" id="{A366A98A-E3CA-4E30-9B3F-09E95FB08DB4}"/>
+              <a:t>What did we learn today?</a:t>
+            </a:r>
+          </a:p>
+        </p:txBody>
+      </p:sp>
+      <p:sp>
+        <p:nvSpPr>
+          <p:cNvPr id="5" name="Content Placeholder 4">
+            <a:extLst>
+              <a:ext uri="{FF2B5EF4-FFF2-40B4-BE49-F238E27FC236}">
+                <a16:creationId xmlns:a16="http://schemas.microsoft.com/office/drawing/2014/main" id="{ACA1CE19-A37A-4A21-B36B-667FA4DF6063}"/>
               </a:ext>
             </a:extLst>
           </p:cNvPr>
@@ -8528,60 +8458,38 @@
         </p:nvSpPr>
         <p:spPr/>
         <p:txBody>
-          <a:bodyPr>
-            <a:normAutofit/>
-          </a:bodyPr>
-          <a:lstStyle/>
-          <a:p>
-            <a:r>
-              <a:rPr lang="en-US" dirty="0"/>
-              <a:t>Try out a text analysis of your own. </a:t>
-            </a:r>
-          </a:p>
-          <a:p>
-            <a:r>
-              <a:rPr lang="en-US" dirty="0"/>
-              <a:t>Review </a:t>
-            </a:r>
-            <a:r>
-              <a:rPr lang="en-US" i="1" dirty="0"/>
-              <a:t>Text Mining with R </a:t>
-            </a:r>
-            <a:r>
-              <a:rPr lang="en-US" dirty="0"/>
-              <a:t>by Julia </a:t>
-            </a:r>
-            <a:r>
-              <a:rPr lang="en-US" dirty="0" err="1"/>
-              <a:t>Silge</a:t>
-            </a:r>
-            <a:r>
-              <a:rPr lang="en-US" dirty="0"/>
-              <a:t> and David Robinson</a:t>
-            </a:r>
-          </a:p>
-          <a:p>
-            <a:pPr lvl="1"/>
-            <a:r>
-              <a:rPr lang="en-US" dirty="0">
-                <a:hlinkClick r:id="rId3"/>
-              </a:rPr>
-              <a:t>https://www.tidytextmining.com/index.html</a:t>
-            </a:r>
-            <a:r>
-              <a:rPr lang="en-US" dirty="0"/>
-              <a:t> </a:t>
-            </a:r>
-          </a:p>
-          <a:p>
-            <a:endParaRPr lang="en-US" dirty="0"/>
+          <a:bodyPr/>
+          <a:lstStyle/>
+          <a:p>
+            <a:r>
+              <a:rPr lang="en-US" dirty="0"/>
+              <a:t>Sentiment Analysis</a:t>
+            </a:r>
+          </a:p>
+          <a:p>
+            <a:r>
+              <a:rPr lang="en-US" dirty="0"/>
+              <a:t>Visualizing Results</a:t>
+            </a:r>
+          </a:p>
+          <a:p>
+            <a:r>
+              <a:rPr lang="en-US" dirty="0"/>
+              <a:t>Moving Beyond Words</a:t>
+            </a:r>
+          </a:p>
+          <a:p>
+            <a:r>
+              <a:rPr lang="en-US" dirty="0"/>
+              <a:t>Where to go from here </a:t>
+            </a:r>
           </a:p>
         </p:txBody>
       </p:sp>
     </p:spTree>
     <p:extLst>
       <p:ext uri="{BB962C8B-B14F-4D97-AF65-F5344CB8AC3E}">
-        <p14:creationId xmlns:p14="http://schemas.microsoft.com/office/powerpoint/2010/main" val="254307914"/>
+        <p14:creationId xmlns:p14="http://schemas.microsoft.com/office/powerpoint/2010/main" val="182398492"/>
       </p:ext>
     </p:extLst>
   </p:cSld>
@@ -8592,6 +8500,99 @@
 </file>
 
 <file path=ppt/slides/slide25.xml><?xml version="1.0" encoding="utf-8"?>
+<p:sld xmlns:a="http://schemas.openxmlformats.org/drawingml/2006/main" xmlns:r="http://schemas.openxmlformats.org/officeDocument/2006/relationships" xmlns:p="http://schemas.openxmlformats.org/presentationml/2006/main">
+  <p:cSld>
+    <p:spTree>
+      <p:nvGrpSpPr>
+        <p:cNvPr id="1" name=""/>
+        <p:cNvGrpSpPr/>
+        <p:nvPr/>
+      </p:nvGrpSpPr>
+      <p:grpSpPr>
+        <a:xfrm>
+          <a:off x="0" y="0"/>
+          <a:ext cx="0" cy="0"/>
+          <a:chOff x="0" y="0"/>
+          <a:chExt cx="0" cy="0"/>
+        </a:xfrm>
+      </p:grpSpPr>
+      <p:sp>
+        <p:nvSpPr>
+          <p:cNvPr id="4" name="Title 3">
+            <a:extLst>
+              <a:ext uri="{FF2B5EF4-FFF2-40B4-BE49-F238E27FC236}">
+                <a16:creationId xmlns:a16="http://schemas.microsoft.com/office/drawing/2014/main" id="{B86A4B02-4000-49F6-A883-1F84DEF62767}"/>
+              </a:ext>
+            </a:extLst>
+          </p:cNvPr>
+          <p:cNvSpPr>
+            <a:spLocks noGrp="1"/>
+          </p:cNvSpPr>
+          <p:nvPr>
+            <p:ph type="ctrTitle"/>
+          </p:nvPr>
+        </p:nvSpPr>
+        <p:spPr>
+          <a:xfrm>
+            <a:off x="1058687" y="1241854"/>
+            <a:ext cx="10062100" cy="3671522"/>
+          </a:xfrm>
+        </p:spPr>
+        <p:txBody>
+          <a:bodyPr/>
+          <a:lstStyle/>
+          <a:p>
+            <a:r>
+              <a:rPr lang="en-US" dirty="0"/>
+              <a:t>Questions</a:t>
+            </a:r>
+            <a:br>
+              <a:rPr lang="en-US" dirty="0"/>
+            </a:br>
+            <a:br>
+              <a:rPr lang="en-US" dirty="0"/>
+            </a:br>
+            <a:r>
+              <a:rPr lang="en-US" sz="3200" b="0" dirty="0">
+                <a:solidFill>
+                  <a:schemeClr val="bg1"/>
+                </a:solidFill>
+              </a:rPr>
+              <a:t>Email: jaschilling@arizona.edu</a:t>
+            </a:r>
+            <a:br>
+              <a:rPr lang="en-US" sz="3200" b="0" dirty="0">
+                <a:solidFill>
+                  <a:schemeClr val="bg1"/>
+                </a:solidFill>
+              </a:rPr>
+            </a:br>
+            <a:r>
+              <a:rPr lang="en-US" sz="3200" b="0" dirty="0">
+                <a:solidFill>
+                  <a:schemeClr val="bg1"/>
+                </a:solidFill>
+              </a:rPr>
+              <a:t>Twitter: @datasciencejenn</a:t>
+            </a:r>
+            <a:endParaRPr lang="en-US" b="0" dirty="0"/>
+          </a:p>
+        </p:txBody>
+      </p:sp>
+    </p:spTree>
+    <p:extLst>
+      <p:ext uri="{BB962C8B-B14F-4D97-AF65-F5344CB8AC3E}">
+        <p14:creationId xmlns:p14="http://schemas.microsoft.com/office/powerpoint/2010/main" val="4251848133"/>
+      </p:ext>
+    </p:extLst>
+  </p:cSld>
+  <p:clrMapOvr>
+    <a:masterClrMapping/>
+  </p:clrMapOvr>
+</p:sld>
+</file>
+
+<file path=ppt/slides/slide26.xml><?xml version="1.0" encoding="utf-8"?>
 <p:sld xmlns:a="http://schemas.openxmlformats.org/drawingml/2006/main" xmlns:r="http://schemas.openxmlformats.org/officeDocument/2006/relationships" xmlns:p="http://schemas.openxmlformats.org/presentationml/2006/main">
   <p:cSld>
     <p:bg>
@@ -8632,214 +8633,12 @@
             <p:ph type="title"/>
           </p:nvPr>
         </p:nvSpPr>
-        <p:spPr/>
-        <p:txBody>
-          <a:bodyPr>
-            <a:normAutofit/>
-          </a:bodyPr>
-          <a:lstStyle/>
-          <a:p>
-            <a:r>
-              <a:rPr lang="en-US" sz="3600" dirty="0"/>
-              <a:t>What did we learn today?</a:t>
-            </a:r>
-          </a:p>
-        </p:txBody>
-      </p:sp>
-      <p:sp>
-        <p:nvSpPr>
-          <p:cNvPr id="5" name="Content Placeholder 4">
-            <a:extLst>
-              <a:ext uri="{FF2B5EF4-FFF2-40B4-BE49-F238E27FC236}">
-                <a16:creationId xmlns:a16="http://schemas.microsoft.com/office/drawing/2014/main" id="{ACA1CE19-A37A-4A21-B36B-667FA4DF6063}"/>
-              </a:ext>
-            </a:extLst>
-          </p:cNvPr>
-          <p:cNvSpPr>
-            <a:spLocks noGrp="1"/>
-          </p:cNvSpPr>
-          <p:nvPr>
-            <p:ph idx="1"/>
-          </p:nvPr>
-        </p:nvSpPr>
-        <p:spPr/>
-        <p:txBody>
-          <a:bodyPr/>
-          <a:lstStyle/>
-          <a:p>
-            <a:r>
-              <a:rPr lang="en-US" dirty="0"/>
-              <a:t>Sentiment Analysis</a:t>
-            </a:r>
-          </a:p>
-          <a:p>
-            <a:r>
-              <a:rPr lang="en-US" dirty="0"/>
-              <a:t>Visualizing Results</a:t>
-            </a:r>
-          </a:p>
-          <a:p>
-            <a:r>
-              <a:rPr lang="en-US" dirty="0"/>
-              <a:t>Moving Beyond Words</a:t>
-            </a:r>
-          </a:p>
-          <a:p>
-            <a:r>
-              <a:rPr lang="en-US" dirty="0"/>
-              <a:t>Where to go from here </a:t>
-            </a:r>
-          </a:p>
-        </p:txBody>
-      </p:sp>
-    </p:spTree>
-    <p:extLst>
-      <p:ext uri="{BB962C8B-B14F-4D97-AF65-F5344CB8AC3E}">
-        <p14:creationId xmlns:p14="http://schemas.microsoft.com/office/powerpoint/2010/main" val="182398492"/>
-      </p:ext>
-    </p:extLst>
-  </p:cSld>
-  <p:clrMapOvr>
-    <a:masterClrMapping/>
-  </p:clrMapOvr>
-</p:sld>
-</file>
-
-<file path=ppt/slides/slide26.xml><?xml version="1.0" encoding="utf-8"?>
-<p:sld xmlns:a="http://schemas.openxmlformats.org/drawingml/2006/main" xmlns:r="http://schemas.openxmlformats.org/officeDocument/2006/relationships" xmlns:p="http://schemas.openxmlformats.org/presentationml/2006/main">
-  <p:cSld>
-    <p:spTree>
-      <p:nvGrpSpPr>
-        <p:cNvPr id="1" name=""/>
-        <p:cNvGrpSpPr/>
-        <p:nvPr/>
-      </p:nvGrpSpPr>
-      <p:grpSpPr>
-        <a:xfrm>
-          <a:off x="0" y="0"/>
-          <a:ext cx="0" cy="0"/>
-          <a:chOff x="0" y="0"/>
-          <a:chExt cx="0" cy="0"/>
-        </a:xfrm>
-      </p:grpSpPr>
-      <p:sp>
-        <p:nvSpPr>
-          <p:cNvPr id="4" name="Title 3">
-            <a:extLst>
-              <a:ext uri="{FF2B5EF4-FFF2-40B4-BE49-F238E27FC236}">
-                <a16:creationId xmlns:a16="http://schemas.microsoft.com/office/drawing/2014/main" id="{B86A4B02-4000-49F6-A883-1F84DEF62767}"/>
-              </a:ext>
-            </a:extLst>
-          </p:cNvPr>
-          <p:cNvSpPr>
-            <a:spLocks noGrp="1"/>
-          </p:cNvSpPr>
-          <p:nvPr>
-            <p:ph type="ctrTitle"/>
-          </p:nvPr>
-        </p:nvSpPr>
         <p:spPr>
           <a:xfrm>
-            <a:off x="1058687" y="1241854"/>
-            <a:ext cx="10062100" cy="3671522"/>
+            <a:off x="838200" y="399427"/>
+            <a:ext cx="10515600" cy="1060719"/>
           </a:xfrm>
         </p:spPr>
-        <p:txBody>
-          <a:bodyPr/>
-          <a:lstStyle/>
-          <a:p>
-            <a:r>
-              <a:rPr lang="en-US" dirty="0"/>
-              <a:t>Questions</a:t>
-            </a:r>
-            <a:br>
-              <a:rPr lang="en-US" dirty="0"/>
-            </a:br>
-            <a:br>
-              <a:rPr lang="en-US" dirty="0"/>
-            </a:br>
-            <a:r>
-              <a:rPr lang="en-US" sz="3200" b="0" dirty="0">
-                <a:solidFill>
-                  <a:schemeClr val="bg1"/>
-                </a:solidFill>
-              </a:rPr>
-              <a:t>Email: jaschilling@arizona.edu</a:t>
-            </a:r>
-            <a:br>
-              <a:rPr lang="en-US" sz="3200" b="0" dirty="0">
-                <a:solidFill>
-                  <a:schemeClr val="bg1"/>
-                </a:solidFill>
-              </a:rPr>
-            </a:br>
-            <a:r>
-              <a:rPr lang="en-US" sz="3200" b="0" dirty="0">
-                <a:solidFill>
-                  <a:schemeClr val="bg1"/>
-                </a:solidFill>
-              </a:rPr>
-              <a:t>Twitter: @datasciencejenn</a:t>
-            </a:r>
-            <a:endParaRPr lang="en-US" b="0" dirty="0"/>
-          </a:p>
-        </p:txBody>
-      </p:sp>
-    </p:spTree>
-    <p:extLst>
-      <p:ext uri="{BB962C8B-B14F-4D97-AF65-F5344CB8AC3E}">
-        <p14:creationId xmlns:p14="http://schemas.microsoft.com/office/powerpoint/2010/main" val="4251848133"/>
-      </p:ext>
-    </p:extLst>
-  </p:cSld>
-  <p:clrMapOvr>
-    <a:masterClrMapping/>
-  </p:clrMapOvr>
-</p:sld>
-</file>
-
-<file path=ppt/slides/slide27.xml><?xml version="1.0" encoding="utf-8"?>
-<p:sld xmlns:a="http://schemas.openxmlformats.org/drawingml/2006/main" xmlns:r="http://schemas.openxmlformats.org/officeDocument/2006/relationships" xmlns:p="http://schemas.openxmlformats.org/presentationml/2006/main">
-  <p:cSld>
-    <p:bg>
-      <p:bgPr>
-        <a:solidFill>
-          <a:schemeClr val="bg1"/>
-        </a:solidFill>
-        <a:effectLst/>
-      </p:bgPr>
-    </p:bg>
-    <p:spTree>
-      <p:nvGrpSpPr>
-        <p:cNvPr id="1" name=""/>
-        <p:cNvGrpSpPr/>
-        <p:nvPr/>
-      </p:nvGrpSpPr>
-      <p:grpSpPr>
-        <a:xfrm>
-          <a:off x="0" y="0"/>
-          <a:ext cx="0" cy="0"/>
-          <a:chOff x="0" y="0"/>
-          <a:chExt cx="0" cy="0"/>
-        </a:xfrm>
-      </p:grpSpPr>
-      <p:sp>
-        <p:nvSpPr>
-          <p:cNvPr id="2" name="Title 1">
-            <a:extLst>
-              <a:ext uri="{FF2B5EF4-FFF2-40B4-BE49-F238E27FC236}">
-                <a16:creationId xmlns:a16="http://schemas.microsoft.com/office/drawing/2014/main" id="{BDA1388A-4824-4A29-ADD9-8CFCC321EE86}"/>
-              </a:ext>
-            </a:extLst>
-          </p:cNvPr>
-          <p:cNvSpPr>
-            <a:spLocks noGrp="1"/>
-          </p:cNvSpPr>
-          <p:nvPr>
-            <p:ph type="title"/>
-          </p:nvPr>
-        </p:nvSpPr>
-        <p:spPr/>
         <p:txBody>
           <a:bodyPr>
             <a:normAutofit/>
@@ -8914,6 +8713,9 @@
           </a:p>
           <a:p>
             <a:pPr marL="0" indent="0">
+              <a:spcBef>
+                <a:spcPts val="0"/>
+              </a:spcBef>
               <a:buNone/>
             </a:pPr>
             <a:r>
@@ -8926,7 +8728,7 @@
               <a:rPr lang="en-US" sz="2400" dirty="0">
                 <a:effectLst/>
               </a:rPr>
-              <a:t>, J., &amp;amp; Robinson, D. (2021, April 10). Introduction to </a:t>
+              <a:t>, J., &amp; Robinson, D. (2021, April 10). Introduction to </a:t>
             </a:r>
             <a:r>
               <a:rPr lang="en-US" sz="2400" dirty="0" err="1">
@@ -8938,7 +8740,25 @@
               <a:rPr lang="en-US" sz="2400" dirty="0">
                 <a:effectLst/>
               </a:rPr>
-              <a:t>. Retrieved September 28, 2021, from https://cran.r-project.org/web/packages/tidytext/vignettes/tidytext.html. </a:t>
+              <a:t>. Retrieved 	September 28, 2021, from </a:t>
+            </a:r>
+          </a:p>
+          <a:p>
+            <a:pPr marL="0" indent="0">
+              <a:spcBef>
+                <a:spcPts val="0"/>
+              </a:spcBef>
+              <a:buNone/>
+            </a:pPr>
+            <a:r>
+              <a:rPr lang="en-US" sz="2400" dirty="0"/>
+              <a:t>	</a:t>
+            </a:r>
+            <a:r>
+              <a:rPr lang="en-US" sz="2400" dirty="0">
+                <a:effectLst/>
+              </a:rPr>
+              <a:t>https://cran.r-project.org/web/packages/tidytext/vignettes/tidytext.html. </a:t>
             </a:r>
           </a:p>
         </p:txBody>
@@ -9128,7 +8948,7 @@
           <a:p>
             <a:r>
               <a:rPr lang="en-US" sz="3600" dirty="0"/>
-              <a:t>Day 1 Agenda</a:t>
+              <a:t>Part 1 Agenda</a:t>
             </a:r>
           </a:p>
         </p:txBody>

</xml_diff>